<commit_message>
doc: complete version 1 of kubernetes slide
</commit_message>
<xml_diff>
--- a/slide-dao-tao/Kubernetes-cho-người-mới-bắt-đầu.pptx
+++ b/slide-dao-tao/Kubernetes-cho-người-mới-bắt-đầu.pptx
@@ -5,7 +5,7 @@
     <p:sldMasterId id="2147483657" r:id="rId1"/>
   </p:sldMasterIdLst>
   <p:notesMasterIdLst>
-    <p:notesMasterId r:id="rId21"/>
+    <p:notesMasterId r:id="rId29"/>
   </p:notesMasterIdLst>
   <p:sldIdLst>
     <p:sldId id="256" r:id="rId2"/>
@@ -27,6 +27,14 @@
     <p:sldId id="288" r:id="rId18"/>
     <p:sldId id="289" r:id="rId19"/>
     <p:sldId id="290" r:id="rId20"/>
+    <p:sldId id="291" r:id="rId21"/>
+    <p:sldId id="292" r:id="rId22"/>
+    <p:sldId id="294" r:id="rId23"/>
+    <p:sldId id="295" r:id="rId24"/>
+    <p:sldId id="296" r:id="rId25"/>
+    <p:sldId id="297" r:id="rId26"/>
+    <p:sldId id="298" r:id="rId27"/>
+    <p:sldId id="299" r:id="rId28"/>
   </p:sldIdLst>
   <p:sldSz cx="9144000" cy="5143500" type="screen16x9"/>
   <p:notesSz cx="6858000" cy="9144000"/>
@@ -262,7 +270,7 @@
   <p:extLst>
     <p:ext uri="{EFAFB233-063F-42B5-8137-9DF3F51BA10A}">
       <p15:sldGuideLst xmlns:p15="http://schemas.microsoft.com/office/powerpoint/2012/main">
-        <p15:guide id="1" orient="horz" pos="1980" userDrawn="1">
+        <p15:guide id="1" orient="horz" pos="2004" userDrawn="1">
           <p15:clr>
             <a:srgbClr val="A4A3A4"/>
           </p15:clr>
@@ -2013,6 +2021,878 @@
     <p:extLst>
       <p:ext uri="{BB962C8B-B14F-4D97-AF65-F5344CB8AC3E}">
         <p14:creationId xmlns:p14="http://schemas.microsoft.com/office/powerpoint/2010/main" val="3288989878"/>
+      </p:ext>
+    </p:extLst>
+  </p:cSld>
+  <p:clrMapOvr>
+    <a:masterClrMapping/>
+  </p:clrMapOvr>
+</p:notes>
+</file>
+
+<file path=ppt/notesSlides/notesSlide20.xml><?xml version="1.0" encoding="utf-8"?>
+<p:notes xmlns:a="http://schemas.openxmlformats.org/drawingml/2006/main" xmlns:r="http://schemas.openxmlformats.org/officeDocument/2006/relationships" xmlns:p="http://schemas.openxmlformats.org/presentationml/2006/main" showMasterSp="0" showMasterPhAnim="0">
+  <p:cSld>
+    <p:spTree>
+      <p:nvGrpSpPr>
+        <p:cNvPr id="1" name="Shape 70"/>
+        <p:cNvGrpSpPr/>
+        <p:nvPr/>
+      </p:nvGrpSpPr>
+      <p:grpSpPr>
+        <a:xfrm>
+          <a:off x="0" y="0"/>
+          <a:ext cx="0" cy="0"/>
+          <a:chOff x="0" y="0"/>
+          <a:chExt cx="0" cy="0"/>
+        </a:xfrm>
+      </p:grpSpPr>
+      <p:sp>
+        <p:nvSpPr>
+          <p:cNvPr id="71" name="Google Shape;71;g338ac0a8b6_0_36:notes"/>
+          <p:cNvSpPr>
+            <a:spLocks noGrp="1" noRot="1" noChangeAspect="1"/>
+          </p:cNvSpPr>
+          <p:nvPr>
+            <p:ph type="sldImg" idx="2"/>
+          </p:nvPr>
+        </p:nvSpPr>
+        <p:spPr>
+          <a:xfrm>
+            <a:off x="381000" y="685800"/>
+            <a:ext cx="6096000" cy="3429000"/>
+          </a:xfrm>
+          <a:custGeom>
+            <a:avLst/>
+            <a:gdLst/>
+            <a:ahLst/>
+            <a:cxnLst/>
+            <a:rect l="l" t="t" r="r" b="b"/>
+            <a:pathLst>
+              <a:path w="120000" h="120000" extrusionOk="0">
+                <a:moveTo>
+                  <a:pt x="0" y="0"/>
+                </a:moveTo>
+                <a:lnTo>
+                  <a:pt x="120000" y="0"/>
+                </a:lnTo>
+                <a:lnTo>
+                  <a:pt x="120000" y="120000"/>
+                </a:lnTo>
+                <a:lnTo>
+                  <a:pt x="0" y="120000"/>
+                </a:lnTo>
+                <a:close/>
+              </a:path>
+            </a:pathLst>
+          </a:custGeom>
+        </p:spPr>
+      </p:sp>
+      <p:sp>
+        <p:nvSpPr>
+          <p:cNvPr id="72" name="Google Shape;72;g338ac0a8b6_0_36:notes"/>
+          <p:cNvSpPr txBox="1">
+            <a:spLocks noGrp="1"/>
+          </p:cNvSpPr>
+          <p:nvPr>
+            <p:ph type="body" idx="1"/>
+          </p:nvPr>
+        </p:nvSpPr>
+        <p:spPr>
+          <a:xfrm>
+            <a:off x="685800" y="4343400"/>
+            <a:ext cx="5486400" cy="4114800"/>
+          </a:xfrm>
+          <a:prstGeom prst="rect">
+            <a:avLst/>
+          </a:prstGeom>
+        </p:spPr>
+        <p:txBody>
+          <a:bodyPr spcFirstLastPara="1" wrap="square" lIns="91425" tIns="91425" rIns="91425" bIns="91425" anchor="t" anchorCtr="0">
+            <a:noAutofit/>
+          </a:bodyPr>
+          <a:lstStyle/>
+          <a:p>
+            <a:pPr marL="0" lvl="0" indent="0" algn="l" rtl="0">
+              <a:spcBef>
+                <a:spcPts val="0"/>
+              </a:spcBef>
+              <a:spcAft>
+                <a:spcPts val="0"/>
+              </a:spcAft>
+              <a:buNone/>
+            </a:pPr>
+            <a:endParaRPr/>
+          </a:p>
+        </p:txBody>
+      </p:sp>
+    </p:spTree>
+    <p:extLst>
+      <p:ext uri="{BB962C8B-B14F-4D97-AF65-F5344CB8AC3E}">
+        <p14:creationId xmlns:p14="http://schemas.microsoft.com/office/powerpoint/2010/main" val="1235265169"/>
+      </p:ext>
+    </p:extLst>
+  </p:cSld>
+  <p:clrMapOvr>
+    <a:masterClrMapping/>
+  </p:clrMapOvr>
+</p:notes>
+</file>
+
+<file path=ppt/notesSlides/notesSlide21.xml><?xml version="1.0" encoding="utf-8"?>
+<p:notes xmlns:a="http://schemas.openxmlformats.org/drawingml/2006/main" xmlns:r="http://schemas.openxmlformats.org/officeDocument/2006/relationships" xmlns:p="http://schemas.openxmlformats.org/presentationml/2006/main" showMasterSp="0" showMasterPhAnim="0">
+  <p:cSld>
+    <p:spTree>
+      <p:nvGrpSpPr>
+        <p:cNvPr id="1" name="Shape 75"/>
+        <p:cNvGrpSpPr/>
+        <p:nvPr/>
+      </p:nvGrpSpPr>
+      <p:grpSpPr>
+        <a:xfrm>
+          <a:off x="0" y="0"/>
+          <a:ext cx="0" cy="0"/>
+          <a:chOff x="0" y="0"/>
+          <a:chExt cx="0" cy="0"/>
+        </a:xfrm>
+      </p:grpSpPr>
+      <p:sp>
+        <p:nvSpPr>
+          <p:cNvPr id="76" name="Google Shape;76;g338ac0a8b6_0_27:notes"/>
+          <p:cNvSpPr>
+            <a:spLocks noGrp="1" noRot="1" noChangeAspect="1"/>
+          </p:cNvSpPr>
+          <p:nvPr>
+            <p:ph type="sldImg" idx="2"/>
+          </p:nvPr>
+        </p:nvSpPr>
+        <p:spPr>
+          <a:xfrm>
+            <a:off x="381000" y="685800"/>
+            <a:ext cx="6096000" cy="3429000"/>
+          </a:xfrm>
+          <a:custGeom>
+            <a:avLst/>
+            <a:gdLst/>
+            <a:ahLst/>
+            <a:cxnLst/>
+            <a:rect l="l" t="t" r="r" b="b"/>
+            <a:pathLst>
+              <a:path w="120000" h="120000" extrusionOk="0">
+                <a:moveTo>
+                  <a:pt x="0" y="0"/>
+                </a:moveTo>
+                <a:lnTo>
+                  <a:pt x="120000" y="0"/>
+                </a:lnTo>
+                <a:lnTo>
+                  <a:pt x="120000" y="120000"/>
+                </a:lnTo>
+                <a:lnTo>
+                  <a:pt x="0" y="120000"/>
+                </a:lnTo>
+                <a:close/>
+              </a:path>
+            </a:pathLst>
+          </a:custGeom>
+        </p:spPr>
+      </p:sp>
+      <p:sp>
+        <p:nvSpPr>
+          <p:cNvPr id="77" name="Google Shape;77;g338ac0a8b6_0_27:notes"/>
+          <p:cNvSpPr txBox="1">
+            <a:spLocks noGrp="1"/>
+          </p:cNvSpPr>
+          <p:nvPr>
+            <p:ph type="body" idx="1"/>
+          </p:nvPr>
+        </p:nvSpPr>
+        <p:spPr>
+          <a:xfrm>
+            <a:off x="685800" y="4343400"/>
+            <a:ext cx="5486400" cy="4114800"/>
+          </a:xfrm>
+          <a:prstGeom prst="rect">
+            <a:avLst/>
+          </a:prstGeom>
+        </p:spPr>
+        <p:txBody>
+          <a:bodyPr spcFirstLastPara="1" wrap="square" lIns="91425" tIns="91425" rIns="91425" bIns="91425" anchor="t" anchorCtr="0">
+            <a:noAutofit/>
+          </a:bodyPr>
+          <a:lstStyle/>
+          <a:p>
+            <a:pPr marL="0" lvl="0" indent="0" algn="l" rtl="0">
+              <a:spcBef>
+                <a:spcPts val="0"/>
+              </a:spcBef>
+              <a:spcAft>
+                <a:spcPts val="0"/>
+              </a:spcAft>
+              <a:buNone/>
+            </a:pPr>
+            <a:endParaRPr/>
+          </a:p>
+        </p:txBody>
+      </p:sp>
+    </p:spTree>
+    <p:extLst>
+      <p:ext uri="{BB962C8B-B14F-4D97-AF65-F5344CB8AC3E}">
+        <p14:creationId xmlns:p14="http://schemas.microsoft.com/office/powerpoint/2010/main" val="947796055"/>
+      </p:ext>
+    </p:extLst>
+  </p:cSld>
+  <p:clrMapOvr>
+    <a:masterClrMapping/>
+  </p:clrMapOvr>
+</p:notes>
+</file>
+
+<file path=ppt/notesSlides/notesSlide22.xml><?xml version="1.0" encoding="utf-8"?>
+<p:notes xmlns:a="http://schemas.openxmlformats.org/drawingml/2006/main" xmlns:r="http://schemas.openxmlformats.org/officeDocument/2006/relationships" xmlns:p="http://schemas.openxmlformats.org/presentationml/2006/main" showMasterSp="0" showMasterPhAnim="0">
+  <p:cSld>
+    <p:spTree>
+      <p:nvGrpSpPr>
+        <p:cNvPr id="1" name="Shape 75"/>
+        <p:cNvGrpSpPr/>
+        <p:nvPr/>
+      </p:nvGrpSpPr>
+      <p:grpSpPr>
+        <a:xfrm>
+          <a:off x="0" y="0"/>
+          <a:ext cx="0" cy="0"/>
+          <a:chOff x="0" y="0"/>
+          <a:chExt cx="0" cy="0"/>
+        </a:xfrm>
+      </p:grpSpPr>
+      <p:sp>
+        <p:nvSpPr>
+          <p:cNvPr id="76" name="Google Shape;76;g338ac0a8b6_0_27:notes"/>
+          <p:cNvSpPr>
+            <a:spLocks noGrp="1" noRot="1" noChangeAspect="1"/>
+          </p:cNvSpPr>
+          <p:nvPr>
+            <p:ph type="sldImg" idx="2"/>
+          </p:nvPr>
+        </p:nvSpPr>
+        <p:spPr>
+          <a:xfrm>
+            <a:off x="381000" y="685800"/>
+            <a:ext cx="6096000" cy="3429000"/>
+          </a:xfrm>
+          <a:custGeom>
+            <a:avLst/>
+            <a:gdLst/>
+            <a:ahLst/>
+            <a:cxnLst/>
+            <a:rect l="l" t="t" r="r" b="b"/>
+            <a:pathLst>
+              <a:path w="120000" h="120000" extrusionOk="0">
+                <a:moveTo>
+                  <a:pt x="0" y="0"/>
+                </a:moveTo>
+                <a:lnTo>
+                  <a:pt x="120000" y="0"/>
+                </a:lnTo>
+                <a:lnTo>
+                  <a:pt x="120000" y="120000"/>
+                </a:lnTo>
+                <a:lnTo>
+                  <a:pt x="0" y="120000"/>
+                </a:lnTo>
+                <a:close/>
+              </a:path>
+            </a:pathLst>
+          </a:custGeom>
+        </p:spPr>
+      </p:sp>
+      <p:sp>
+        <p:nvSpPr>
+          <p:cNvPr id="77" name="Google Shape;77;g338ac0a8b6_0_27:notes"/>
+          <p:cNvSpPr txBox="1">
+            <a:spLocks noGrp="1"/>
+          </p:cNvSpPr>
+          <p:nvPr>
+            <p:ph type="body" idx="1"/>
+          </p:nvPr>
+        </p:nvSpPr>
+        <p:spPr>
+          <a:xfrm>
+            <a:off x="685800" y="4343400"/>
+            <a:ext cx="5486400" cy="4114800"/>
+          </a:xfrm>
+          <a:prstGeom prst="rect">
+            <a:avLst/>
+          </a:prstGeom>
+        </p:spPr>
+        <p:txBody>
+          <a:bodyPr spcFirstLastPara="1" wrap="square" lIns="91425" tIns="91425" rIns="91425" bIns="91425" anchor="t" anchorCtr="0">
+            <a:noAutofit/>
+          </a:bodyPr>
+          <a:lstStyle/>
+          <a:p>
+            <a:pPr marL="0" lvl="0" indent="0" algn="l" rtl="0">
+              <a:spcBef>
+                <a:spcPts val="0"/>
+              </a:spcBef>
+              <a:spcAft>
+                <a:spcPts val="0"/>
+              </a:spcAft>
+              <a:buNone/>
+            </a:pPr>
+            <a:endParaRPr/>
+          </a:p>
+        </p:txBody>
+      </p:sp>
+    </p:spTree>
+    <p:extLst>
+      <p:ext uri="{BB962C8B-B14F-4D97-AF65-F5344CB8AC3E}">
+        <p14:creationId xmlns:p14="http://schemas.microsoft.com/office/powerpoint/2010/main" val="1372079914"/>
+      </p:ext>
+    </p:extLst>
+  </p:cSld>
+  <p:clrMapOvr>
+    <a:masterClrMapping/>
+  </p:clrMapOvr>
+</p:notes>
+</file>
+
+<file path=ppt/notesSlides/notesSlide23.xml><?xml version="1.0" encoding="utf-8"?>
+<p:notes xmlns:a="http://schemas.openxmlformats.org/drawingml/2006/main" xmlns:r="http://schemas.openxmlformats.org/officeDocument/2006/relationships" xmlns:p="http://schemas.openxmlformats.org/presentationml/2006/main" showMasterSp="0" showMasterPhAnim="0">
+  <p:cSld>
+    <p:spTree>
+      <p:nvGrpSpPr>
+        <p:cNvPr id="1" name="Shape 75"/>
+        <p:cNvGrpSpPr/>
+        <p:nvPr/>
+      </p:nvGrpSpPr>
+      <p:grpSpPr>
+        <a:xfrm>
+          <a:off x="0" y="0"/>
+          <a:ext cx="0" cy="0"/>
+          <a:chOff x="0" y="0"/>
+          <a:chExt cx="0" cy="0"/>
+        </a:xfrm>
+      </p:grpSpPr>
+      <p:sp>
+        <p:nvSpPr>
+          <p:cNvPr id="76" name="Google Shape;76;g338ac0a8b6_0_27:notes"/>
+          <p:cNvSpPr>
+            <a:spLocks noGrp="1" noRot="1" noChangeAspect="1"/>
+          </p:cNvSpPr>
+          <p:nvPr>
+            <p:ph type="sldImg" idx="2"/>
+          </p:nvPr>
+        </p:nvSpPr>
+        <p:spPr>
+          <a:xfrm>
+            <a:off x="381000" y="685800"/>
+            <a:ext cx="6096000" cy="3429000"/>
+          </a:xfrm>
+          <a:custGeom>
+            <a:avLst/>
+            <a:gdLst/>
+            <a:ahLst/>
+            <a:cxnLst/>
+            <a:rect l="l" t="t" r="r" b="b"/>
+            <a:pathLst>
+              <a:path w="120000" h="120000" extrusionOk="0">
+                <a:moveTo>
+                  <a:pt x="0" y="0"/>
+                </a:moveTo>
+                <a:lnTo>
+                  <a:pt x="120000" y="0"/>
+                </a:lnTo>
+                <a:lnTo>
+                  <a:pt x="120000" y="120000"/>
+                </a:lnTo>
+                <a:lnTo>
+                  <a:pt x="0" y="120000"/>
+                </a:lnTo>
+                <a:close/>
+              </a:path>
+            </a:pathLst>
+          </a:custGeom>
+        </p:spPr>
+      </p:sp>
+      <p:sp>
+        <p:nvSpPr>
+          <p:cNvPr id="77" name="Google Shape;77;g338ac0a8b6_0_27:notes"/>
+          <p:cNvSpPr txBox="1">
+            <a:spLocks noGrp="1"/>
+          </p:cNvSpPr>
+          <p:nvPr>
+            <p:ph type="body" idx="1"/>
+          </p:nvPr>
+        </p:nvSpPr>
+        <p:spPr>
+          <a:xfrm>
+            <a:off x="685800" y="4343400"/>
+            <a:ext cx="5486400" cy="4114800"/>
+          </a:xfrm>
+          <a:prstGeom prst="rect">
+            <a:avLst/>
+          </a:prstGeom>
+        </p:spPr>
+        <p:txBody>
+          <a:bodyPr spcFirstLastPara="1" wrap="square" lIns="91425" tIns="91425" rIns="91425" bIns="91425" anchor="t" anchorCtr="0">
+            <a:noAutofit/>
+          </a:bodyPr>
+          <a:lstStyle/>
+          <a:p>
+            <a:pPr marL="0" lvl="0" indent="0" algn="l" rtl="0">
+              <a:spcBef>
+                <a:spcPts val="0"/>
+              </a:spcBef>
+              <a:spcAft>
+                <a:spcPts val="0"/>
+              </a:spcAft>
+              <a:buNone/>
+            </a:pPr>
+            <a:endParaRPr/>
+          </a:p>
+        </p:txBody>
+      </p:sp>
+    </p:spTree>
+    <p:extLst>
+      <p:ext uri="{BB962C8B-B14F-4D97-AF65-F5344CB8AC3E}">
+        <p14:creationId xmlns:p14="http://schemas.microsoft.com/office/powerpoint/2010/main" val="2910715994"/>
+      </p:ext>
+    </p:extLst>
+  </p:cSld>
+  <p:clrMapOvr>
+    <a:masterClrMapping/>
+  </p:clrMapOvr>
+</p:notes>
+</file>
+
+<file path=ppt/notesSlides/notesSlide24.xml><?xml version="1.0" encoding="utf-8"?>
+<p:notes xmlns:a="http://schemas.openxmlformats.org/drawingml/2006/main" xmlns:r="http://schemas.openxmlformats.org/officeDocument/2006/relationships" xmlns:p="http://schemas.openxmlformats.org/presentationml/2006/main" showMasterSp="0" showMasterPhAnim="0">
+  <p:cSld>
+    <p:spTree>
+      <p:nvGrpSpPr>
+        <p:cNvPr id="1" name="Shape 75"/>
+        <p:cNvGrpSpPr/>
+        <p:nvPr/>
+      </p:nvGrpSpPr>
+      <p:grpSpPr>
+        <a:xfrm>
+          <a:off x="0" y="0"/>
+          <a:ext cx="0" cy="0"/>
+          <a:chOff x="0" y="0"/>
+          <a:chExt cx="0" cy="0"/>
+        </a:xfrm>
+      </p:grpSpPr>
+      <p:sp>
+        <p:nvSpPr>
+          <p:cNvPr id="76" name="Google Shape;76;g338ac0a8b6_0_27:notes"/>
+          <p:cNvSpPr>
+            <a:spLocks noGrp="1" noRot="1" noChangeAspect="1"/>
+          </p:cNvSpPr>
+          <p:nvPr>
+            <p:ph type="sldImg" idx="2"/>
+          </p:nvPr>
+        </p:nvSpPr>
+        <p:spPr>
+          <a:xfrm>
+            <a:off x="381000" y="685800"/>
+            <a:ext cx="6096000" cy="3429000"/>
+          </a:xfrm>
+          <a:custGeom>
+            <a:avLst/>
+            <a:gdLst/>
+            <a:ahLst/>
+            <a:cxnLst/>
+            <a:rect l="l" t="t" r="r" b="b"/>
+            <a:pathLst>
+              <a:path w="120000" h="120000" extrusionOk="0">
+                <a:moveTo>
+                  <a:pt x="0" y="0"/>
+                </a:moveTo>
+                <a:lnTo>
+                  <a:pt x="120000" y="0"/>
+                </a:lnTo>
+                <a:lnTo>
+                  <a:pt x="120000" y="120000"/>
+                </a:lnTo>
+                <a:lnTo>
+                  <a:pt x="0" y="120000"/>
+                </a:lnTo>
+                <a:close/>
+              </a:path>
+            </a:pathLst>
+          </a:custGeom>
+        </p:spPr>
+      </p:sp>
+      <p:sp>
+        <p:nvSpPr>
+          <p:cNvPr id="77" name="Google Shape;77;g338ac0a8b6_0_27:notes"/>
+          <p:cNvSpPr txBox="1">
+            <a:spLocks noGrp="1"/>
+          </p:cNvSpPr>
+          <p:nvPr>
+            <p:ph type="body" idx="1"/>
+          </p:nvPr>
+        </p:nvSpPr>
+        <p:spPr>
+          <a:xfrm>
+            <a:off x="685800" y="4343400"/>
+            <a:ext cx="5486400" cy="4114800"/>
+          </a:xfrm>
+          <a:prstGeom prst="rect">
+            <a:avLst/>
+          </a:prstGeom>
+        </p:spPr>
+        <p:txBody>
+          <a:bodyPr spcFirstLastPara="1" wrap="square" lIns="91425" tIns="91425" rIns="91425" bIns="91425" anchor="t" anchorCtr="0">
+            <a:noAutofit/>
+          </a:bodyPr>
+          <a:lstStyle/>
+          <a:p>
+            <a:pPr marL="0" lvl="0" indent="0" algn="l" rtl="0">
+              <a:spcBef>
+                <a:spcPts val="0"/>
+              </a:spcBef>
+              <a:spcAft>
+                <a:spcPts val="0"/>
+              </a:spcAft>
+              <a:buNone/>
+            </a:pPr>
+            <a:endParaRPr/>
+          </a:p>
+        </p:txBody>
+      </p:sp>
+    </p:spTree>
+    <p:extLst>
+      <p:ext uri="{BB962C8B-B14F-4D97-AF65-F5344CB8AC3E}">
+        <p14:creationId xmlns:p14="http://schemas.microsoft.com/office/powerpoint/2010/main" val="462608996"/>
+      </p:ext>
+    </p:extLst>
+  </p:cSld>
+  <p:clrMapOvr>
+    <a:masterClrMapping/>
+  </p:clrMapOvr>
+</p:notes>
+</file>
+
+<file path=ppt/notesSlides/notesSlide25.xml><?xml version="1.0" encoding="utf-8"?>
+<p:notes xmlns:a="http://schemas.openxmlformats.org/drawingml/2006/main" xmlns:r="http://schemas.openxmlformats.org/officeDocument/2006/relationships" xmlns:p="http://schemas.openxmlformats.org/presentationml/2006/main" showMasterSp="0" showMasterPhAnim="0">
+  <p:cSld>
+    <p:spTree>
+      <p:nvGrpSpPr>
+        <p:cNvPr id="1" name="Shape 75"/>
+        <p:cNvGrpSpPr/>
+        <p:nvPr/>
+      </p:nvGrpSpPr>
+      <p:grpSpPr>
+        <a:xfrm>
+          <a:off x="0" y="0"/>
+          <a:ext cx="0" cy="0"/>
+          <a:chOff x="0" y="0"/>
+          <a:chExt cx="0" cy="0"/>
+        </a:xfrm>
+      </p:grpSpPr>
+      <p:sp>
+        <p:nvSpPr>
+          <p:cNvPr id="76" name="Google Shape;76;g338ac0a8b6_0_27:notes"/>
+          <p:cNvSpPr>
+            <a:spLocks noGrp="1" noRot="1" noChangeAspect="1"/>
+          </p:cNvSpPr>
+          <p:nvPr>
+            <p:ph type="sldImg" idx="2"/>
+          </p:nvPr>
+        </p:nvSpPr>
+        <p:spPr>
+          <a:xfrm>
+            <a:off x="381000" y="685800"/>
+            <a:ext cx="6096000" cy="3429000"/>
+          </a:xfrm>
+          <a:custGeom>
+            <a:avLst/>
+            <a:gdLst/>
+            <a:ahLst/>
+            <a:cxnLst/>
+            <a:rect l="l" t="t" r="r" b="b"/>
+            <a:pathLst>
+              <a:path w="120000" h="120000" extrusionOk="0">
+                <a:moveTo>
+                  <a:pt x="0" y="0"/>
+                </a:moveTo>
+                <a:lnTo>
+                  <a:pt x="120000" y="0"/>
+                </a:lnTo>
+                <a:lnTo>
+                  <a:pt x="120000" y="120000"/>
+                </a:lnTo>
+                <a:lnTo>
+                  <a:pt x="0" y="120000"/>
+                </a:lnTo>
+                <a:close/>
+              </a:path>
+            </a:pathLst>
+          </a:custGeom>
+        </p:spPr>
+      </p:sp>
+      <p:sp>
+        <p:nvSpPr>
+          <p:cNvPr id="77" name="Google Shape;77;g338ac0a8b6_0_27:notes"/>
+          <p:cNvSpPr txBox="1">
+            <a:spLocks noGrp="1"/>
+          </p:cNvSpPr>
+          <p:nvPr>
+            <p:ph type="body" idx="1"/>
+          </p:nvPr>
+        </p:nvSpPr>
+        <p:spPr>
+          <a:xfrm>
+            <a:off x="685800" y="4343400"/>
+            <a:ext cx="5486400" cy="4114800"/>
+          </a:xfrm>
+          <a:prstGeom prst="rect">
+            <a:avLst/>
+          </a:prstGeom>
+        </p:spPr>
+        <p:txBody>
+          <a:bodyPr spcFirstLastPara="1" wrap="square" lIns="91425" tIns="91425" rIns="91425" bIns="91425" anchor="t" anchorCtr="0">
+            <a:noAutofit/>
+          </a:bodyPr>
+          <a:lstStyle/>
+          <a:p>
+            <a:pPr marL="0" lvl="0" indent="0" algn="l" rtl="0">
+              <a:spcBef>
+                <a:spcPts val="0"/>
+              </a:spcBef>
+              <a:spcAft>
+                <a:spcPts val="0"/>
+              </a:spcAft>
+              <a:buNone/>
+            </a:pPr>
+            <a:endParaRPr/>
+          </a:p>
+        </p:txBody>
+      </p:sp>
+    </p:spTree>
+    <p:extLst>
+      <p:ext uri="{BB962C8B-B14F-4D97-AF65-F5344CB8AC3E}">
+        <p14:creationId xmlns:p14="http://schemas.microsoft.com/office/powerpoint/2010/main" val="2809449390"/>
+      </p:ext>
+    </p:extLst>
+  </p:cSld>
+  <p:clrMapOvr>
+    <a:masterClrMapping/>
+  </p:clrMapOvr>
+</p:notes>
+</file>
+
+<file path=ppt/notesSlides/notesSlide26.xml><?xml version="1.0" encoding="utf-8"?>
+<p:notes xmlns:a="http://schemas.openxmlformats.org/drawingml/2006/main" xmlns:r="http://schemas.openxmlformats.org/officeDocument/2006/relationships" xmlns:p="http://schemas.openxmlformats.org/presentationml/2006/main" showMasterSp="0" showMasterPhAnim="0">
+  <p:cSld>
+    <p:spTree>
+      <p:nvGrpSpPr>
+        <p:cNvPr id="1" name="Shape 75"/>
+        <p:cNvGrpSpPr/>
+        <p:nvPr/>
+      </p:nvGrpSpPr>
+      <p:grpSpPr>
+        <a:xfrm>
+          <a:off x="0" y="0"/>
+          <a:ext cx="0" cy="0"/>
+          <a:chOff x="0" y="0"/>
+          <a:chExt cx="0" cy="0"/>
+        </a:xfrm>
+      </p:grpSpPr>
+      <p:sp>
+        <p:nvSpPr>
+          <p:cNvPr id="76" name="Google Shape;76;g338ac0a8b6_0_27:notes"/>
+          <p:cNvSpPr>
+            <a:spLocks noGrp="1" noRot="1" noChangeAspect="1"/>
+          </p:cNvSpPr>
+          <p:nvPr>
+            <p:ph type="sldImg" idx="2"/>
+          </p:nvPr>
+        </p:nvSpPr>
+        <p:spPr>
+          <a:xfrm>
+            <a:off x="381000" y="685800"/>
+            <a:ext cx="6096000" cy="3429000"/>
+          </a:xfrm>
+          <a:custGeom>
+            <a:avLst/>
+            <a:gdLst/>
+            <a:ahLst/>
+            <a:cxnLst/>
+            <a:rect l="l" t="t" r="r" b="b"/>
+            <a:pathLst>
+              <a:path w="120000" h="120000" extrusionOk="0">
+                <a:moveTo>
+                  <a:pt x="0" y="0"/>
+                </a:moveTo>
+                <a:lnTo>
+                  <a:pt x="120000" y="0"/>
+                </a:lnTo>
+                <a:lnTo>
+                  <a:pt x="120000" y="120000"/>
+                </a:lnTo>
+                <a:lnTo>
+                  <a:pt x="0" y="120000"/>
+                </a:lnTo>
+                <a:close/>
+              </a:path>
+            </a:pathLst>
+          </a:custGeom>
+        </p:spPr>
+      </p:sp>
+      <p:sp>
+        <p:nvSpPr>
+          <p:cNvPr id="77" name="Google Shape;77;g338ac0a8b6_0_27:notes"/>
+          <p:cNvSpPr txBox="1">
+            <a:spLocks noGrp="1"/>
+          </p:cNvSpPr>
+          <p:nvPr>
+            <p:ph type="body" idx="1"/>
+          </p:nvPr>
+        </p:nvSpPr>
+        <p:spPr>
+          <a:xfrm>
+            <a:off x="685800" y="4343400"/>
+            <a:ext cx="5486400" cy="4114800"/>
+          </a:xfrm>
+          <a:prstGeom prst="rect">
+            <a:avLst/>
+          </a:prstGeom>
+        </p:spPr>
+        <p:txBody>
+          <a:bodyPr spcFirstLastPara="1" wrap="square" lIns="91425" tIns="91425" rIns="91425" bIns="91425" anchor="t" anchorCtr="0">
+            <a:noAutofit/>
+          </a:bodyPr>
+          <a:lstStyle/>
+          <a:p>
+            <a:pPr marL="0" lvl="0" indent="0" algn="l" rtl="0">
+              <a:spcBef>
+                <a:spcPts val="0"/>
+              </a:spcBef>
+              <a:spcAft>
+                <a:spcPts val="0"/>
+              </a:spcAft>
+              <a:buNone/>
+            </a:pPr>
+            <a:endParaRPr/>
+          </a:p>
+        </p:txBody>
+      </p:sp>
+    </p:spTree>
+    <p:extLst>
+      <p:ext uri="{BB962C8B-B14F-4D97-AF65-F5344CB8AC3E}">
+        <p14:creationId xmlns:p14="http://schemas.microsoft.com/office/powerpoint/2010/main" val="2888293655"/>
+      </p:ext>
+    </p:extLst>
+  </p:cSld>
+  <p:clrMapOvr>
+    <a:masterClrMapping/>
+  </p:clrMapOvr>
+</p:notes>
+</file>
+
+<file path=ppt/notesSlides/notesSlide27.xml><?xml version="1.0" encoding="utf-8"?>
+<p:notes xmlns:a="http://schemas.openxmlformats.org/drawingml/2006/main" xmlns:r="http://schemas.openxmlformats.org/officeDocument/2006/relationships" xmlns:p="http://schemas.openxmlformats.org/presentationml/2006/main" showMasterSp="0" showMasterPhAnim="0">
+  <p:cSld>
+    <p:spTree>
+      <p:nvGrpSpPr>
+        <p:cNvPr id="1" name="Shape 75"/>
+        <p:cNvGrpSpPr/>
+        <p:nvPr/>
+      </p:nvGrpSpPr>
+      <p:grpSpPr>
+        <a:xfrm>
+          <a:off x="0" y="0"/>
+          <a:ext cx="0" cy="0"/>
+          <a:chOff x="0" y="0"/>
+          <a:chExt cx="0" cy="0"/>
+        </a:xfrm>
+      </p:grpSpPr>
+      <p:sp>
+        <p:nvSpPr>
+          <p:cNvPr id="76" name="Google Shape;76;g338ac0a8b6_0_27:notes"/>
+          <p:cNvSpPr>
+            <a:spLocks noGrp="1" noRot="1" noChangeAspect="1"/>
+          </p:cNvSpPr>
+          <p:nvPr>
+            <p:ph type="sldImg" idx="2"/>
+          </p:nvPr>
+        </p:nvSpPr>
+        <p:spPr>
+          <a:xfrm>
+            <a:off x="381000" y="685800"/>
+            <a:ext cx="6096000" cy="3429000"/>
+          </a:xfrm>
+          <a:custGeom>
+            <a:avLst/>
+            <a:gdLst/>
+            <a:ahLst/>
+            <a:cxnLst/>
+            <a:rect l="l" t="t" r="r" b="b"/>
+            <a:pathLst>
+              <a:path w="120000" h="120000" extrusionOk="0">
+                <a:moveTo>
+                  <a:pt x="0" y="0"/>
+                </a:moveTo>
+                <a:lnTo>
+                  <a:pt x="120000" y="0"/>
+                </a:lnTo>
+                <a:lnTo>
+                  <a:pt x="120000" y="120000"/>
+                </a:lnTo>
+                <a:lnTo>
+                  <a:pt x="0" y="120000"/>
+                </a:lnTo>
+                <a:close/>
+              </a:path>
+            </a:pathLst>
+          </a:custGeom>
+        </p:spPr>
+      </p:sp>
+      <p:sp>
+        <p:nvSpPr>
+          <p:cNvPr id="77" name="Google Shape;77;g338ac0a8b6_0_27:notes"/>
+          <p:cNvSpPr txBox="1">
+            <a:spLocks noGrp="1"/>
+          </p:cNvSpPr>
+          <p:nvPr>
+            <p:ph type="body" idx="1"/>
+          </p:nvPr>
+        </p:nvSpPr>
+        <p:spPr>
+          <a:xfrm>
+            <a:off x="685800" y="4343400"/>
+            <a:ext cx="5486400" cy="4114800"/>
+          </a:xfrm>
+          <a:prstGeom prst="rect">
+            <a:avLst/>
+          </a:prstGeom>
+        </p:spPr>
+        <p:txBody>
+          <a:bodyPr spcFirstLastPara="1" wrap="square" lIns="91425" tIns="91425" rIns="91425" bIns="91425" anchor="t" anchorCtr="0">
+            <a:noAutofit/>
+          </a:bodyPr>
+          <a:lstStyle/>
+          <a:p>
+            <a:pPr marL="0" lvl="0" indent="0" algn="l" rtl="0">
+              <a:spcBef>
+                <a:spcPts val="0"/>
+              </a:spcBef>
+              <a:spcAft>
+                <a:spcPts val="0"/>
+              </a:spcAft>
+              <a:buNone/>
+            </a:pPr>
+            <a:endParaRPr/>
+          </a:p>
+        </p:txBody>
+      </p:sp>
+    </p:spTree>
+    <p:extLst>
+      <p:ext uri="{BB962C8B-B14F-4D97-AF65-F5344CB8AC3E}">
+        <p14:creationId xmlns:p14="http://schemas.microsoft.com/office/powerpoint/2010/main" val="3848069153"/>
       </p:ext>
     </p:extLst>
   </p:cSld>
@@ -9836,6 +10716,13 @@
   <p:clrMapOvr>
     <a:masterClrMapping/>
   </p:clrMapOvr>
+  <p:timing>
+    <p:tnLst>
+      <p:par>
+        <p:cTn id="1" dur="indefinite" restart="never" nodeType="tmRoot"/>
+      </p:par>
+    </p:tnLst>
+  </p:timing>
 </p:sld>
 </file>
 
@@ -9895,406 +10782,30 @@
           </a:p>
         </p:txBody>
       </p:sp>
-      <p:grpSp>
-        <p:nvGrpSpPr>
-          <p:cNvPr id="7" name="Group 6"/>
-          <p:cNvGrpSpPr/>
+      <p:pic>
+        <p:nvPicPr>
+          <p:cNvPr id="25" name="Picture 24"/>
+          <p:cNvPicPr>
+            <a:picLocks noChangeAspect="1"/>
+          </p:cNvPicPr>
           <p:nvPr/>
-        </p:nvGrpSpPr>
-        <p:grpSpPr>
+        </p:nvPicPr>
+        <p:blipFill>
+          <a:blip r:embed="rId3"/>
+          <a:stretch>
+            <a:fillRect/>
+          </a:stretch>
+        </p:blipFill>
+        <p:spPr>
           <a:xfrm>
-            <a:off x="2792412" y="1372609"/>
-            <a:ext cx="3559175" cy="3541281"/>
-            <a:chOff x="3225800" y="1747976"/>
-            <a:chExt cx="2692400" cy="2790550"/>
+            <a:off x="894556" y="1252077"/>
+            <a:ext cx="7354887" cy="3404060"/>
           </a:xfrm>
-        </p:grpSpPr>
-        <p:sp>
-          <p:nvSpPr>
-            <p:cNvPr id="5" name="Hexagon 4"/>
-            <p:cNvSpPr/>
-            <p:nvPr/>
-          </p:nvSpPr>
-          <p:spPr>
-            <a:xfrm>
-              <a:off x="3225800" y="2229713"/>
-              <a:ext cx="990600" cy="863600"/>
-            </a:xfrm>
-            <a:prstGeom prst="hexagon">
-              <a:avLst/>
-            </a:prstGeom>
-            <a:solidFill>
-              <a:srgbClr val="4AB4F6"/>
-            </a:solidFill>
-            <a:ln>
-              <a:solidFill>
-                <a:schemeClr val="accent5">
-                  <a:lumMod val="60000"/>
-                  <a:lumOff val="40000"/>
-                </a:schemeClr>
-              </a:solidFill>
-            </a:ln>
-          </p:spPr>
-          <p:style>
-            <a:lnRef idx="2">
-              <a:schemeClr val="accent1">
-                <a:shade val="50000"/>
-              </a:schemeClr>
-            </a:lnRef>
-            <a:fillRef idx="1">
-              <a:schemeClr val="accent1"/>
-            </a:fillRef>
-            <a:effectRef idx="0">
-              <a:schemeClr val="accent1"/>
-            </a:effectRef>
-            <a:fontRef idx="minor">
-              <a:schemeClr val="lt1"/>
-            </a:fontRef>
-          </p:style>
-          <p:txBody>
-            <a:bodyPr rtlCol="0" anchor="ctr"/>
-            <a:lstStyle/>
-            <a:p>
-              <a:pPr algn="ctr"/>
-              <a:r>
-                <a:rPr lang="en-US" sz="1200" smtClean="0"/>
-                <a:t>Scheduler</a:t>
-              </a:r>
-              <a:endParaRPr lang="en-US" sz="1200"/>
-            </a:p>
-          </p:txBody>
-        </p:sp>
-        <p:sp>
-          <p:nvSpPr>
-            <p:cNvPr id="16" name="Hexagon 15"/>
-            <p:cNvSpPr/>
-            <p:nvPr/>
-          </p:nvSpPr>
-          <p:spPr>
-            <a:xfrm>
-              <a:off x="4089400" y="1747976"/>
-              <a:ext cx="990600" cy="863600"/>
-            </a:xfrm>
-            <a:prstGeom prst="hexagon">
-              <a:avLst/>
-            </a:prstGeom>
-            <a:solidFill>
-              <a:srgbClr val="4AB4F6"/>
-            </a:solidFill>
-            <a:ln>
-              <a:solidFill>
-                <a:schemeClr val="accent5">
-                  <a:lumMod val="60000"/>
-                  <a:lumOff val="40000"/>
-                </a:schemeClr>
-              </a:solidFill>
-            </a:ln>
-          </p:spPr>
-          <p:style>
-            <a:lnRef idx="2">
-              <a:schemeClr val="accent1">
-                <a:shade val="50000"/>
-              </a:schemeClr>
-            </a:lnRef>
-            <a:fillRef idx="1">
-              <a:schemeClr val="accent1"/>
-            </a:fillRef>
-            <a:effectRef idx="0">
-              <a:schemeClr val="accent1"/>
-            </a:effectRef>
-            <a:fontRef idx="minor">
-              <a:schemeClr val="lt1"/>
-            </a:fontRef>
-          </p:style>
-          <p:txBody>
-            <a:bodyPr rtlCol="0" anchor="ctr"/>
-            <a:lstStyle/>
-            <a:p>
-              <a:pPr algn="ctr"/>
-              <a:r>
-                <a:rPr lang="en-US" sz="1200" smtClean="0"/>
-                <a:t>etcd</a:t>
-              </a:r>
-              <a:endParaRPr lang="en-US" sz="1200"/>
-            </a:p>
-          </p:txBody>
-        </p:sp>
-        <p:sp>
-          <p:nvSpPr>
-            <p:cNvPr id="17" name="Hexagon 16"/>
-            <p:cNvSpPr/>
-            <p:nvPr/>
-          </p:nvSpPr>
-          <p:spPr>
-            <a:xfrm>
-              <a:off x="4076700" y="2711450"/>
-              <a:ext cx="990600" cy="863600"/>
-            </a:xfrm>
-            <a:prstGeom prst="hexagon">
-              <a:avLst/>
-            </a:prstGeom>
-            <a:solidFill>
-              <a:srgbClr val="4AB4F6"/>
-            </a:solidFill>
-            <a:ln>
-              <a:solidFill>
-                <a:schemeClr val="accent5">
-                  <a:lumMod val="60000"/>
-                  <a:lumOff val="40000"/>
-                </a:schemeClr>
-              </a:solidFill>
-            </a:ln>
-          </p:spPr>
-          <p:style>
-            <a:lnRef idx="2">
-              <a:schemeClr val="accent1">
-                <a:shade val="50000"/>
-              </a:schemeClr>
-            </a:lnRef>
-            <a:fillRef idx="1">
-              <a:schemeClr val="accent1"/>
-            </a:fillRef>
-            <a:effectRef idx="0">
-              <a:schemeClr val="accent1"/>
-            </a:effectRef>
-            <a:fontRef idx="minor">
-              <a:schemeClr val="lt1"/>
-            </a:fontRef>
-          </p:style>
-          <p:txBody>
-            <a:bodyPr rtlCol="0" anchor="ctr"/>
-            <a:lstStyle/>
-            <a:p>
-              <a:pPr algn="ctr"/>
-              <a:r>
-                <a:rPr lang="en-US" sz="1200" smtClean="0"/>
-                <a:t>Kube</a:t>
-              </a:r>
-              <a:endParaRPr lang="en-US" sz="1200"/>
-            </a:p>
-          </p:txBody>
-        </p:sp>
-        <p:sp>
-          <p:nvSpPr>
-            <p:cNvPr id="18" name="Hexagon 17"/>
-            <p:cNvSpPr/>
-            <p:nvPr/>
-          </p:nvSpPr>
-          <p:spPr>
-            <a:xfrm>
-              <a:off x="4927600" y="2229713"/>
-              <a:ext cx="990600" cy="863600"/>
-            </a:xfrm>
-            <a:prstGeom prst="hexagon">
-              <a:avLst/>
-            </a:prstGeom>
-            <a:solidFill>
-              <a:srgbClr val="4AB4F6"/>
-            </a:solidFill>
-            <a:ln>
-              <a:solidFill>
-                <a:schemeClr val="accent5">
-                  <a:lumMod val="60000"/>
-                  <a:lumOff val="40000"/>
-                </a:schemeClr>
-              </a:solidFill>
-            </a:ln>
-          </p:spPr>
-          <p:style>
-            <a:lnRef idx="2">
-              <a:schemeClr val="accent1">
-                <a:shade val="50000"/>
-              </a:schemeClr>
-            </a:lnRef>
-            <a:fillRef idx="1">
-              <a:schemeClr val="accent1"/>
-            </a:fillRef>
-            <a:effectRef idx="0">
-              <a:schemeClr val="accent1"/>
-            </a:effectRef>
-            <a:fontRef idx="minor">
-              <a:schemeClr val="lt1"/>
-            </a:fontRef>
-          </p:style>
-          <p:txBody>
-            <a:bodyPr rtlCol="0" anchor="ctr"/>
-            <a:lstStyle/>
-            <a:p>
-              <a:pPr algn="ctr"/>
-              <a:r>
-                <a:rPr lang="en-US" sz="1200" smtClean="0"/>
-                <a:t>kubelet</a:t>
-              </a:r>
-              <a:endParaRPr lang="en-US" sz="1200"/>
-            </a:p>
-          </p:txBody>
-        </p:sp>
-        <p:sp>
-          <p:nvSpPr>
-            <p:cNvPr id="19" name="Hexagon 18"/>
-            <p:cNvSpPr/>
-            <p:nvPr/>
-          </p:nvSpPr>
-          <p:spPr>
-            <a:xfrm>
-              <a:off x="3225800" y="3193187"/>
-              <a:ext cx="990600" cy="863600"/>
-            </a:xfrm>
-            <a:prstGeom prst="hexagon">
-              <a:avLst/>
-            </a:prstGeom>
-            <a:solidFill>
-              <a:srgbClr val="4AB4F6"/>
-            </a:solidFill>
-            <a:ln>
-              <a:solidFill>
-                <a:schemeClr val="accent5">
-                  <a:lumMod val="60000"/>
-                  <a:lumOff val="40000"/>
-                </a:schemeClr>
-              </a:solidFill>
-            </a:ln>
-          </p:spPr>
-          <p:style>
-            <a:lnRef idx="2">
-              <a:schemeClr val="accent1">
-                <a:shade val="50000"/>
-              </a:schemeClr>
-            </a:lnRef>
-            <a:fillRef idx="1">
-              <a:schemeClr val="accent1"/>
-            </a:fillRef>
-            <a:effectRef idx="0">
-              <a:schemeClr val="accent1"/>
-            </a:effectRef>
-            <a:fontRef idx="minor">
-              <a:schemeClr val="lt1"/>
-            </a:fontRef>
-          </p:style>
-          <p:txBody>
-            <a:bodyPr rtlCol="0" anchor="ctr"/>
-            <a:lstStyle/>
-            <a:p>
-              <a:pPr algn="ctr"/>
-              <a:r>
-                <a:rPr lang="en-US" sz="1200" smtClean="0"/>
-                <a:t>Controller</a:t>
-              </a:r>
-              <a:endParaRPr lang="en-US" sz="1200"/>
-            </a:p>
-          </p:txBody>
-        </p:sp>
-        <p:sp>
-          <p:nvSpPr>
-            <p:cNvPr id="20" name="Hexagon 19"/>
-            <p:cNvSpPr/>
-            <p:nvPr/>
-          </p:nvSpPr>
-          <p:spPr>
-            <a:xfrm>
-              <a:off x="4089400" y="3674926"/>
-              <a:ext cx="990600" cy="863600"/>
-            </a:xfrm>
-            <a:prstGeom prst="hexagon">
-              <a:avLst/>
-            </a:prstGeom>
-            <a:solidFill>
-              <a:srgbClr val="4AB4F6"/>
-            </a:solidFill>
-            <a:ln>
-              <a:solidFill>
-                <a:schemeClr val="accent5">
-                  <a:lumMod val="60000"/>
-                  <a:lumOff val="40000"/>
-                </a:schemeClr>
-              </a:solidFill>
-            </a:ln>
-          </p:spPr>
-          <p:style>
-            <a:lnRef idx="2">
-              <a:schemeClr val="accent1">
-                <a:shade val="50000"/>
-              </a:schemeClr>
-            </a:lnRef>
-            <a:fillRef idx="1">
-              <a:schemeClr val="accent1"/>
-            </a:fillRef>
-            <a:effectRef idx="0">
-              <a:schemeClr val="accent1"/>
-            </a:effectRef>
-            <a:fontRef idx="minor">
-              <a:schemeClr val="lt1"/>
-            </a:fontRef>
-          </p:style>
-          <p:txBody>
-            <a:bodyPr rtlCol="0" anchor="ctr"/>
-            <a:lstStyle/>
-            <a:p>
-              <a:pPr algn="ctr"/>
-              <a:r>
-                <a:rPr lang="en-US" sz="1200" smtClean="0"/>
-                <a:t>Api Server</a:t>
-              </a:r>
-              <a:endParaRPr lang="en-US" sz="1200"/>
-            </a:p>
-          </p:txBody>
-        </p:sp>
-        <p:sp>
-          <p:nvSpPr>
-            <p:cNvPr id="21" name="Hexagon 20"/>
-            <p:cNvSpPr/>
-            <p:nvPr/>
-          </p:nvSpPr>
-          <p:spPr>
-            <a:xfrm>
-              <a:off x="4927600" y="3193187"/>
-              <a:ext cx="990600" cy="863600"/>
-            </a:xfrm>
-            <a:prstGeom prst="hexagon">
-              <a:avLst/>
-            </a:prstGeom>
-            <a:solidFill>
-              <a:srgbClr val="4AB4F6"/>
-            </a:solidFill>
-            <a:ln>
-              <a:solidFill>
-                <a:schemeClr val="accent5">
-                  <a:lumMod val="60000"/>
-                  <a:lumOff val="40000"/>
-                </a:schemeClr>
-              </a:solidFill>
-            </a:ln>
-          </p:spPr>
-          <p:style>
-            <a:lnRef idx="2">
-              <a:schemeClr val="accent1">
-                <a:shade val="50000"/>
-              </a:schemeClr>
-            </a:lnRef>
-            <a:fillRef idx="1">
-              <a:schemeClr val="accent1"/>
-            </a:fillRef>
-            <a:effectRef idx="0">
-              <a:schemeClr val="accent1"/>
-            </a:effectRef>
-            <a:fontRef idx="minor">
-              <a:schemeClr val="lt1"/>
-            </a:fontRef>
-          </p:style>
-          <p:txBody>
-            <a:bodyPr rtlCol="0" anchor="ctr"/>
-            <a:lstStyle/>
-            <a:p>
-              <a:pPr algn="ctr"/>
-              <a:r>
-                <a:rPr lang="en-US" sz="1200" smtClean="0"/>
-                <a:t>Container Runtime</a:t>
-              </a:r>
-              <a:endParaRPr lang="en-US" sz="1200"/>
-            </a:p>
-          </p:txBody>
-        </p:sp>
-      </p:grpSp>
+          <a:prstGeom prst="rect">
+            <a:avLst/>
+          </a:prstGeom>
+        </p:spPr>
+      </p:pic>
     </p:spTree>
     <p:extLst>
       <p:ext uri="{BB962C8B-B14F-4D97-AF65-F5344CB8AC3E}">
@@ -10305,6 +10816,13 @@
   <p:clrMapOvr>
     <a:masterClrMapping/>
   </p:clrMapOvr>
+  <p:timing>
+    <p:tnLst>
+      <p:par>
+        <p:cTn id="1" dur="indefinite" restart="never" nodeType="tmRoot"/>
+      </p:par>
+    </p:tnLst>
+  </p:timing>
 </p:sld>
 </file>
 
@@ -10389,6 +10907,1570 @@
       </p:par>
     </p:tnLst>
   </p:timing>
+</p:sld>
+</file>
+
+<file path=ppt/slides/slide20.xml><?xml version="1.0" encoding="utf-8"?>
+<p:sld xmlns:a="http://schemas.openxmlformats.org/drawingml/2006/main" xmlns:r="http://schemas.openxmlformats.org/officeDocument/2006/relationships" xmlns:p="http://schemas.openxmlformats.org/presentationml/2006/main">
+  <p:cSld>
+    <p:spTree>
+      <p:nvGrpSpPr>
+        <p:cNvPr id="1" name="Shape 73"/>
+        <p:cNvGrpSpPr/>
+        <p:nvPr/>
+      </p:nvGrpSpPr>
+      <p:grpSpPr>
+        <a:xfrm>
+          <a:off x="0" y="0"/>
+          <a:ext cx="0" cy="0"/>
+          <a:chOff x="0" y="0"/>
+          <a:chExt cx="0" cy="0"/>
+        </a:xfrm>
+      </p:grpSpPr>
+      <p:sp>
+        <p:nvSpPr>
+          <p:cNvPr id="74" name="Google Shape;74;p15"/>
+          <p:cNvSpPr txBox="1">
+            <a:spLocks noGrp="1"/>
+          </p:cNvSpPr>
+          <p:nvPr>
+            <p:ph type="title"/>
+          </p:nvPr>
+        </p:nvSpPr>
+        <p:spPr>
+          <a:xfrm>
+            <a:off x="418000" y="1791025"/>
+            <a:ext cx="5093400" cy="2001900"/>
+          </a:xfrm>
+          <a:prstGeom prst="rect">
+            <a:avLst/>
+          </a:prstGeom>
+        </p:spPr>
+        <p:txBody>
+          <a:bodyPr spcFirstLastPara="1" wrap="square" lIns="91425" tIns="91425" rIns="91425" bIns="91425" anchor="t" anchorCtr="0">
+            <a:noAutofit/>
+          </a:bodyPr>
+          <a:lstStyle/>
+          <a:p>
+            <a:pPr lvl="0"/>
+            <a:r>
+              <a:rPr lang="en-US" smtClean="0"/>
+              <a:t>Kubernetes resources</a:t>
+            </a:r>
+            <a:endParaRPr>
+              <a:latin typeface="Roboto Medium"/>
+              <a:ea typeface="Roboto Medium"/>
+              <a:cs typeface="Roboto Medium"/>
+              <a:sym typeface="Roboto Medium"/>
+            </a:endParaRPr>
+          </a:p>
+        </p:txBody>
+      </p:sp>
+    </p:spTree>
+    <p:extLst>
+      <p:ext uri="{BB962C8B-B14F-4D97-AF65-F5344CB8AC3E}">
+        <p14:creationId xmlns:p14="http://schemas.microsoft.com/office/powerpoint/2010/main" val="3654026876"/>
+      </p:ext>
+    </p:extLst>
+  </p:cSld>
+  <p:clrMapOvr>
+    <a:masterClrMapping/>
+  </p:clrMapOvr>
+  <p:timing>
+    <p:tnLst>
+      <p:par>
+        <p:cTn id="1" dur="indefinite" restart="never" nodeType="tmRoot"/>
+      </p:par>
+    </p:tnLst>
+  </p:timing>
+</p:sld>
+</file>
+
+<file path=ppt/slides/slide21.xml><?xml version="1.0" encoding="utf-8"?>
+<p:sld xmlns:a="http://schemas.openxmlformats.org/drawingml/2006/main" xmlns:r="http://schemas.openxmlformats.org/officeDocument/2006/relationships" xmlns:p="http://schemas.openxmlformats.org/presentationml/2006/main">
+  <p:cSld>
+    <p:spTree>
+      <p:nvGrpSpPr>
+        <p:cNvPr id="1" name="Shape 78"/>
+        <p:cNvGrpSpPr/>
+        <p:nvPr/>
+      </p:nvGrpSpPr>
+      <p:grpSpPr>
+        <a:xfrm>
+          <a:off x="0" y="0"/>
+          <a:ext cx="0" cy="0"/>
+          <a:chOff x="0" y="0"/>
+          <a:chExt cx="0" cy="0"/>
+        </a:xfrm>
+      </p:grpSpPr>
+      <p:sp>
+        <p:nvSpPr>
+          <p:cNvPr id="79" name="Google Shape;79;p16"/>
+          <p:cNvSpPr txBox="1">
+            <a:spLocks noGrp="1"/>
+          </p:cNvSpPr>
+          <p:nvPr>
+            <p:ph type="title"/>
+          </p:nvPr>
+        </p:nvSpPr>
+        <p:spPr>
+          <a:xfrm>
+            <a:off x="311700" y="292625"/>
+            <a:ext cx="8520600" cy="572700"/>
+          </a:xfrm>
+          <a:prstGeom prst="rect">
+            <a:avLst/>
+          </a:prstGeom>
+        </p:spPr>
+        <p:txBody>
+          <a:bodyPr spcFirstLastPara="1" wrap="square" lIns="91425" tIns="91425" rIns="91425" bIns="91425" anchor="t" anchorCtr="0">
+            <a:noAutofit/>
+          </a:bodyPr>
+          <a:lstStyle/>
+          <a:p>
+            <a:pPr lvl="0"/>
+            <a:r>
+              <a:rPr lang="en-US" smtClean="0"/>
+              <a:t>Kubernetes main feature</a:t>
+            </a:r>
+            <a:endParaRPr>
+              <a:latin typeface="Roboto Medium"/>
+              <a:ea typeface="Roboto Medium"/>
+              <a:cs typeface="Roboto Medium"/>
+              <a:sym typeface="Roboto Medium"/>
+            </a:endParaRPr>
+          </a:p>
+        </p:txBody>
+      </p:sp>
+      <p:pic>
+        <p:nvPicPr>
+          <p:cNvPr id="5" name="Picture 4"/>
+          <p:cNvPicPr>
+            <a:picLocks noChangeAspect="1"/>
+          </p:cNvPicPr>
+          <p:nvPr/>
+        </p:nvPicPr>
+        <p:blipFill>
+          <a:blip r:embed="rId3">
+            <a:extLst>
+              <a:ext uri="{28A0092B-C50C-407E-A947-70E740481C1C}">
+                <a14:useLocalDpi xmlns:a14="http://schemas.microsoft.com/office/drawing/2010/main" val="0"/>
+              </a:ext>
+            </a:extLst>
+          </a:blip>
+          <a:stretch>
+            <a:fillRect/>
+          </a:stretch>
+        </p:blipFill>
+        <p:spPr>
+          <a:xfrm>
+            <a:off x="1213702" y="1363146"/>
+            <a:ext cx="1323646" cy="1282282"/>
+          </a:xfrm>
+          <a:prstGeom prst="rect">
+            <a:avLst/>
+          </a:prstGeom>
+        </p:spPr>
+      </p:pic>
+      <p:pic>
+        <p:nvPicPr>
+          <p:cNvPr id="7" name="Picture 6"/>
+          <p:cNvPicPr>
+            <a:picLocks noChangeAspect="1"/>
+          </p:cNvPicPr>
+          <p:nvPr/>
+        </p:nvPicPr>
+        <p:blipFill>
+          <a:blip r:embed="rId4">
+            <a:extLst>
+              <a:ext uri="{28A0092B-C50C-407E-A947-70E740481C1C}">
+                <a14:useLocalDpi xmlns:a14="http://schemas.microsoft.com/office/drawing/2010/main" val="0"/>
+              </a:ext>
+            </a:extLst>
+          </a:blip>
+          <a:stretch>
+            <a:fillRect/>
+          </a:stretch>
+        </p:blipFill>
+        <p:spPr>
+          <a:xfrm>
+            <a:off x="6424681" y="1363146"/>
+            <a:ext cx="1323646" cy="1282282"/>
+          </a:xfrm>
+          <a:prstGeom prst="rect">
+            <a:avLst/>
+          </a:prstGeom>
+        </p:spPr>
+      </p:pic>
+      <p:pic>
+        <p:nvPicPr>
+          <p:cNvPr id="9" name="Picture 8"/>
+          <p:cNvPicPr>
+            <a:picLocks noChangeAspect="1"/>
+          </p:cNvPicPr>
+          <p:nvPr/>
+        </p:nvPicPr>
+        <p:blipFill>
+          <a:blip r:embed="rId5">
+            <a:extLst>
+              <a:ext uri="{28A0092B-C50C-407E-A947-70E740481C1C}">
+                <a14:useLocalDpi xmlns:a14="http://schemas.microsoft.com/office/drawing/2010/main" val="0"/>
+              </a:ext>
+            </a:extLst>
+          </a:blip>
+          <a:stretch>
+            <a:fillRect/>
+          </a:stretch>
+        </p:blipFill>
+        <p:spPr>
+          <a:xfrm>
+            <a:off x="6417693" y="3390105"/>
+            <a:ext cx="1330634" cy="1289051"/>
+          </a:xfrm>
+          <a:prstGeom prst="rect">
+            <a:avLst/>
+          </a:prstGeom>
+        </p:spPr>
+      </p:pic>
+      <p:pic>
+        <p:nvPicPr>
+          <p:cNvPr id="10" name="Picture 9"/>
+          <p:cNvPicPr>
+            <a:picLocks noChangeAspect="1"/>
+          </p:cNvPicPr>
+          <p:nvPr/>
+        </p:nvPicPr>
+        <p:blipFill>
+          <a:blip r:embed="rId6">
+            <a:extLst>
+              <a:ext uri="{28A0092B-C50C-407E-A947-70E740481C1C}">
+                <a14:useLocalDpi xmlns:a14="http://schemas.microsoft.com/office/drawing/2010/main" val="0"/>
+              </a:ext>
+            </a:extLst>
+          </a:blip>
+          <a:stretch>
+            <a:fillRect/>
+          </a:stretch>
+        </p:blipFill>
+        <p:spPr>
+          <a:xfrm>
+            <a:off x="3858618" y="1363146"/>
+            <a:ext cx="1323645" cy="1282282"/>
+          </a:xfrm>
+          <a:prstGeom prst="rect">
+            <a:avLst/>
+          </a:prstGeom>
+        </p:spPr>
+      </p:pic>
+      <p:sp>
+        <p:nvSpPr>
+          <p:cNvPr id="12" name="AutoShape 2" descr="data:image/png;base64,iVBORw0KGgoAAAANSUhEUgAAANMAAADvCAMAAABfYRE9AAAAnFBMVEUAljn///8Akiyez6wAlTUAkzEAjh8AjyQAkzAAkCYro1PO5NNltn3q9OwAjRwAjyX5/ftRrWzV69zi8efv+PJwuoXa7eDD4cy73cVZsHKo1LWw17uIxJn0+vaTyaJGqWMZnEV6vo04pFmj0bDy8vLQ0NChoaHe3t65ubmVlZWOx55Mq2ggnUnA4Mmnp6fCwsIAiQCPj4/W1tbp6emMqYL9AAAP0UlEQVR4nO2daXPiuhKGjZBtCYKHENawQ1ZCkpmT///frs1ig5HULavFcE7d99NUTZXFE0uyelVQu4Y6m/kiWMw3nauMFlxhjPE2EjwIAi6i7fgK4/lnajbiDGgvHjea3kf0zdQaJQXRjioZtTyP6ZlpIsOgLCEnfgf1yjQO2AVRJhZ4XVYemTqNWEmUKV553AK9MXXvIq5FSpdV1Ov6GtoX00wKA9F+WdU9je2HaRhIgCiTXHx6Gd0HU39unHanE/Cj72F8eqZpL7rcv3UKo2Wb/BeQM9XBhXQuxtbUP4GYabDFLKRzye2A9keQMj18IBfSuXh0T3pcImRqbywW0rnCaEK4rOiYdAchnCiPS1RMnZX+IIRT3KA6LtEwde+SKgvpXDy5o1lWJEwzZrd/6yTYjOLnEDANnRbSuVgwvAGm9CBERpQpmjsflxyZpr246v6tUxj3pn+TqR7RLKRzidjNCnFh+qxwEMLJ7bhUnaniQQgnHs8frs40XSbUC+lcYVJ5WVVkWod0+7dOQlS0QioxVbEoqqjisqrA9FB2rfpTaoVUWFbWTO0J+RfJpDC2N+5tmR65/4V0LsYfvTI1Da5Vf/plGQuxYQJcq/7EI6tYiAXTxtIjRCkRW8RC0EyOFkUoGBOhw2tmHG3cI5k6c5eFJCIxWm5mk7ttwqpjoWMhKKaujWv1QoxPcpOouz6NhFqKR3eoWAiGCY5RGBTKkptruKg+iYXEGPcw03DhchBijcsda+lgGcsFbNxDTA/z6nMlQxqpHvroAJVaIZBxb2aaLl0Wkg7JDSoII8AKMTKthdtBiDd0T944HeyFMBr3BqaB00LKJPVf/7nbQVguDFaIlunh3vkgZPJAPjh60ExWiIapvSSwKEKTlXDn+ny9FaJmemQEFgUzHtH67q5OxtRWiIqJyKKIzXtug+CMr87IumTqjogsCmFEqk0oTvmpFXJ5XCoztSdUPq7wzsw0pPHThMlFiLHE5BbsO5MALJ4+lcl8EWI8Y3IP9p0OBTi9W3RjlayQEyaSYF+hKzJlIcaTZVUwUQX7jmIbM5PrV/dcpyHGI5ObRaEcZWlmGhAPWFghe6YWNuvJQvoD7F51akchj+atgmnAfLhWI7NFcE8/ZsgGR6ZBQv70TNLoP516CSMkgz1Tyw+SYEbnFfnU2ytp7ZgcTRm1eALku3ry6IYfGdOANhdgJx6vAKfBxlcoIRqkTB7Wan5a0b6qjregXDiqBVPySEWRuDZLNI6rbuAvmCDbQZOYqYhBfAYyiJVQ3YXHsFzcCca0EzsPwfb3qQaR4tTXCXxGGuUwIN1TRXwIlRf+jF8fZV/IxMkLCoqtKZkKZ+KpPyOMlqcusbXv4CmrEzLlGV3Nxq+z/xDJajPMto3meiS9ZyEQMuWZdyp/Bme/s3e1UFRDkcuWiYciVAb7hDxaSzN1qliUMVVxFfEwtIsvWjGxiM/venf320iWxigyWbXFJ9WYuIy29+mYcx7hfyaaicsgr0RtjednzqVf24OXzRDYqcIUJvPxcXvpbILyX1IjNBNbnB+y+6P8U83EwaYwutEqMMWj8zPjGBdgxDJFvQvX9HAfbU536sP+bXajWTNxdnEEafcwx20kU6Ky7lrpASc1lw9fVMiNZssULlRxnkeEqYdjitWxnnYjPhaawW40S6awoY5ZIBwzKCZtxu1Dvn/DbjRLJqaLxtXBIzeGKbzXPD7/22HcaHZM6uP8TqC5h2GSZhscmeprxWT6M7agPyCCiS1NROgMRSumxGT4L4F5jmAyv6YR1qK0YTLPduhFwUzAakIHkWyYpDlVBVhRMBNQldn1wmRewWvgF4NMMZBfhl0iFkyQo71jnu8wUwIk44+QFpEFU6hJ6Dlqaj5MIJjMz6/1kEErCybRA8Z0ZYqA50M7axWmJTCm+STr/p6w6Sg2cw8I2Lu/J6C2YO5hj5ibhwSCpjCTBKpAFjgkq718YR4SOJvDTECWAzrQbMMEzA0gAQZm4lvj82dY14cNE1CluzU/BXHei421Egus9WCzniLjJgEFLRBMxgPfEB0UwTNBXVogAwpjP0WGXQL9mtBMYQSkioBhTQwTD7Tpkku8DxfHpExdO1ObQ89A+SOEbvaNLcJxKKYieLXS5SHcg+cWnN+Iqdfs0Ca4jWAS0WG/y4JXkXpR3SF+Lc6/x+aK6Ve3SqsAmYoCk/EueJUovFXtD8yPRfphRVDeKLpoq30viEkeM1tz52d8sbQGAebAjPaX83h+StVa2mYomZnymOm0V3ihBDsLMA6QlSMWsZow5sthfzqdtgazVWKd6mdiSqfdwfJcnzs/RbKaDbL/ehguOTbh3S6mJmQcsTiSVWrNDEy/js1lyjHTYBdgzObkyOKPSBrPNSrZMSn+1OKY+D5VV5XuzmY2RQNXYhIxb2QL/m4Rl94xj49RIF2fsdtkYnLZOX4LHuqL0/0yTzjWdwW4RSYeT85dT0VRLAsP065lKD24QSbWuDTwertXVbTem5mK4W6PSVNPmJxkiHyaQz03x6Q5KdbGybEqugWVjt0aU7hSI6WL6jDtJmAN5q0xGeoJS9uFXjfGBBQ940p/b4zJWCeLLf29LSZzPWHnN+4pt8UEuB6Rzr7bYuJGJGw94U0xQeGJMS5selNMRPWEN8UE9aZs4dxOt8VEU094W0w09YQ3xQSFmj//hXsEELnCFnXdFFMQmd35yBql22JKjGk93d//vnNECBXfPeLaR94OE4/u4Xa8E0zl9s0w/cI1omz14MYON8KUZ9HXtPHth8O8hK+tuAkmkTcIG2x/a8LN0yIZGuphegNMYV6O0s88Quo0mGkjDGReLfFo7Az115mKZl7H9naRYkPv70okee5Ybk8MjeP+NpPcHuZau+gTGV+0opwdXSs8GR1M4Za+wd/fZSqano5PawZDtjzZ1qfr0+qYUB79yx3dZuGdiQsmJROqEYpKtcG2FBoT8XYy7Dy0+oPZRzlYw/Ibk9Sdw3myY7KoQrRi4pJ9TB7H48fJBysXBob5FVX9e0U5Cs9CjFEsVVHgoj/HZUkoi1e9bOqOR0GMjRRaMPFoNc6DLu3h/PSX89yhX6WXfrqx5JvFWTGiDOrFWmz2kPFPPBPblr6fnUY+H/L0k/YM/dc8U5jf79e9yzeLsNwNrHuHsozRTNGydqHJ3lAttgaHXsxhPCltFmx16WwfYqLjWCZloVptHGXh/uOPcbwdgIXHL9kuICWVnrQHRD8DJFOk6UIyTPKEGvR9Y3qdbBahLi2xC6aFIZmk1luyPixut6a4R6VbzeF5U60frQ9mOaGYuDYydtSGqoVVCHfqnRHUdKWLCShDGVM0VTxKXLaeKwnK7UTVE34YhxhQt2mH+spDfnYMU2xMuW0iXSU2SpamEdvutXcBN88FDz07zOnfUCkPJhcbqEbqeWj7Zf4rApMPU/cJhCfo/RnQPgt0YcXUfQIt66nb6MHBuLZrrRBUhFlrXuQRugqs6fo/k0L/xbn3X9wjoL3cub/1pYAvIlC7jTrv/fe+ubouHwf56EgIbBIUZ1hjFX8TdZu2pZhpalCcYc3dHLLrCshXlHFfAsoJaWzClsqj5yZDZ4I6iU1oyC08DD1wuK5FqVBbdkxkuwdBpDlLDH7n6dTEd0NJTXIFohEmug+VEio9QuS3MrWIL8OLl0qkLbx28T5LhetotpsGeSdY4ksL5f1l54qmMvpQEt63LMs33/TvD4fXIp/f9rp6s0T5euDpBPUttKrpuj/5+A5GJ77+3CtC26mex9si6lDrL5HuKatYTfgrHm2Gn5/D2UiWohf5BGw2KCcgl8lqMv4cDOs9jr6p1zamFjKZShFF4nnL0TVtC34udiNaPJMw9ilEXm+mCqqFLJW4xvWGpPHcvC6wszq3fTmT295sva4vV8J/51HauDvPA6BrcTJZ5KKeZ5pPhz5vR96JOj9CyLzO9jgBL8J9nZXftrcpE3kP6fN6aPZx+enceL0IlY0Dah9JcSXJYzoB1ec2q+p/W8lBQH/DgThmYU97vzVH0U8/1yrslLQCkrulSiomoBoJ05ayqnijFsBGVpUHg/E+D7cQ7CXrKVPby94qpLkMAFnZYK+wnd2vMfR0DcrC6NLCNoSzVHarQlYft/QzuaXve+8UirIxdzV/LhelGp5vrlNbeZjz+3SbfR3jo5erpo1INPfenUkcbv05DNyivXcs05XuvctVNIbP/5jNFXEg6Wr33u11cgn8yQQhvMcv0zXviDtPqjid9HT3Le6GuR5T6d7F84Vsak5hq6vde3dx7Wx5cxqQOUmI6tRAyUY5mHS54a4lzbKC6tTQLRaNyq1QIxPNfcABWKf2QTCI+l5g5YexT+I00NzYe1DXfYvg0YcyNKb52H8ShP/McSv3qScDTcaa9gBTd/c9GrPkXJGEPpioP5R1EUVkZnFD81qLtpHKR5uqFU0Hzf7K8UYtpt3OB06riZcuzLVgcr+tVVX9lOnB6S3J8sXGVkxZsZLTsoqVex8m9V0rEc+ALGCIKaugcJmAqqKIzyoN/A7i0R3QYAjB5HpLtSxP/enSwf9hXkh4plLdma14NDr5Ha2NsSLSrDwiTsCUFSY57OthvFiOm51+Z7hZxdWJijs3SZhcrZCsTi1VpU6Yx0dEI6DlvTWTsoPmFSVx1eaWTOe3Q15XzHweTvX69vL+8vZqzURmhVgqtSiAm0ueXl6ef55+nl9enmyZ0Lc9USq1KKCF9PTn+fCv5z9P1kzkKTigoLbzmd7/qb3+8/zPa8rzz58KTKkVIvy471USkPcp0/dbrfb2/v32lb2ut+8qTFkA+jrLCux/std7+n7evjK492weVmLKKiL93uu7U9HkwKynlGTP9PwnI/ypxuRuhcCS5bwwnV4znLeXn5/X92yr+HqtyqS9VJZIYQTUH5SZ3r9e/rzVHJmyRta+lhWP7jELaa9i7r1kUNXn3k5uVohel65Vo95/jusppft5r7hH5HKyQjRiwL10F3r+ytZTbf9x+qq2l59pQxxiVLtWzXp5rj1lh6L2z+5VOTPRhhgvYhQoPb1/H/71/V7lbKQQnRUiF1YLqdDXn+/Xn9fvP9mqImFy6hxxIiEQByGNfr6/Xr6+f2p0TI7G/U5hnlLrKiKm1AqBGpGbhT0IYUTG5BZiLPphEIiQqXohgAC6gluKlKlav4+iNxKRaJmytjeWx6WiuxGZqJlwDfELMaxFYSF6JpvjktC3r3GQDyZsLATOMK0mL0zZcQleVqgYRRV5YoKPS8gYRRV5YzJf/V70B/Mgf0zZcUljhRRNH73IJ5POaWsTo6giv0xZO7OL3oehpWluLd9MWfj2dFmFCRSjcJd3pp0VcvwGi0qmua2uwJT1ouRJLOOE98zdLoh0FaZUreagCSY2EOl/ZZoBvOYlVeEAAAAASUVORK5CYII="/>
+          <p:cNvSpPr>
+            <a:spLocks noChangeAspect="1" noChangeArrowheads="1"/>
+          </p:cNvSpPr>
+          <p:nvPr/>
+        </p:nvSpPr>
+        <p:spPr bwMode="auto">
+          <a:xfrm>
+            <a:off x="155575" y="-144463"/>
+            <a:ext cx="304800" cy="304801"/>
+          </a:xfrm>
+          <a:prstGeom prst="rect">
+            <a:avLst/>
+          </a:prstGeom>
+          <a:noFill/>
+          <a:extLst>
+            <a:ext uri="{909E8E84-426E-40DD-AFC4-6F175D3DCCD1}">
+              <a14:hiddenFill xmlns:a14="http://schemas.microsoft.com/office/drawing/2010/main">
+                <a:solidFill>
+                  <a:srgbClr val="FFFFFF"/>
+                </a:solidFill>
+              </a14:hiddenFill>
+            </a:ext>
+          </a:extLst>
+        </p:spPr>
+        <p:txBody>
+          <a:bodyPr vert="horz" wrap="square" lIns="91440" tIns="45720" rIns="91440" bIns="45720" numCol="1" anchor="t" anchorCtr="0" compatLnSpc="1">
+            <a:prstTxWarp prst="textNoShape">
+              <a:avLst/>
+            </a:prstTxWarp>
+          </a:bodyPr>
+          <a:lstStyle/>
+          <a:p>
+            <a:endParaRPr lang="en-US"/>
+          </a:p>
+        </p:txBody>
+      </p:sp>
+      <p:pic>
+        <p:nvPicPr>
+          <p:cNvPr id="17" name="Picture 16"/>
+          <p:cNvPicPr>
+            <a:picLocks noChangeAspect="1"/>
+          </p:cNvPicPr>
+          <p:nvPr/>
+        </p:nvPicPr>
+        <p:blipFill>
+          <a:blip r:embed="rId7">
+            <a:extLst>
+              <a:ext uri="{28A0092B-C50C-407E-A947-70E740481C1C}">
+                <a14:useLocalDpi xmlns:a14="http://schemas.microsoft.com/office/drawing/2010/main" val="0"/>
+              </a:ext>
+            </a:extLst>
+          </a:blip>
+          <a:stretch>
+            <a:fillRect/>
+          </a:stretch>
+        </p:blipFill>
+        <p:spPr>
+          <a:xfrm>
+            <a:off x="3906684" y="3390105"/>
+            <a:ext cx="1330632" cy="1289050"/>
+          </a:xfrm>
+          <a:prstGeom prst="rect">
+            <a:avLst/>
+          </a:prstGeom>
+        </p:spPr>
+      </p:pic>
+      <p:pic>
+        <p:nvPicPr>
+          <p:cNvPr id="18" name="Picture 17"/>
+          <p:cNvPicPr>
+            <a:picLocks noChangeAspect="1"/>
+          </p:cNvPicPr>
+          <p:nvPr/>
+        </p:nvPicPr>
+        <p:blipFill>
+          <a:blip r:embed="rId8">
+            <a:extLst>
+              <a:ext uri="{28A0092B-C50C-407E-A947-70E740481C1C}">
+                <a14:useLocalDpi xmlns:a14="http://schemas.microsoft.com/office/drawing/2010/main" val="0"/>
+              </a:ext>
+            </a:extLst>
+          </a:blip>
+          <a:stretch>
+            <a:fillRect/>
+          </a:stretch>
+        </p:blipFill>
+        <p:spPr>
+          <a:xfrm>
+            <a:off x="1213702" y="3390105"/>
+            <a:ext cx="1330632" cy="1289050"/>
+          </a:xfrm>
+          <a:prstGeom prst="rect">
+            <a:avLst/>
+          </a:prstGeom>
+        </p:spPr>
+      </p:pic>
+    </p:spTree>
+    <p:extLst>
+      <p:ext uri="{BB962C8B-B14F-4D97-AF65-F5344CB8AC3E}">
+        <p14:creationId xmlns:p14="http://schemas.microsoft.com/office/powerpoint/2010/main" val="759946583"/>
+      </p:ext>
+    </p:extLst>
+  </p:cSld>
+  <p:clrMapOvr>
+    <a:masterClrMapping/>
+  </p:clrMapOvr>
+</p:sld>
+</file>
+
+<file path=ppt/slides/slide22.xml><?xml version="1.0" encoding="utf-8"?>
+<p:sld xmlns:a="http://schemas.openxmlformats.org/drawingml/2006/main" xmlns:r="http://schemas.openxmlformats.org/officeDocument/2006/relationships" xmlns:p="http://schemas.openxmlformats.org/presentationml/2006/main">
+  <p:cSld>
+    <p:spTree>
+      <p:nvGrpSpPr>
+        <p:cNvPr id="1" name="Shape 78"/>
+        <p:cNvGrpSpPr/>
+        <p:nvPr/>
+      </p:nvGrpSpPr>
+      <p:grpSpPr>
+        <a:xfrm>
+          <a:off x="0" y="0"/>
+          <a:ext cx="0" cy="0"/>
+          <a:chOff x="0" y="0"/>
+          <a:chExt cx="0" cy="0"/>
+        </a:xfrm>
+      </p:grpSpPr>
+      <p:sp>
+        <p:nvSpPr>
+          <p:cNvPr id="79" name="Google Shape;79;p16"/>
+          <p:cNvSpPr txBox="1">
+            <a:spLocks noGrp="1"/>
+          </p:cNvSpPr>
+          <p:nvPr>
+            <p:ph type="title"/>
+          </p:nvPr>
+        </p:nvSpPr>
+        <p:spPr>
+          <a:xfrm>
+            <a:off x="311700" y="292625"/>
+            <a:ext cx="8520600" cy="572700"/>
+          </a:xfrm>
+          <a:prstGeom prst="rect">
+            <a:avLst/>
+          </a:prstGeom>
+        </p:spPr>
+        <p:txBody>
+          <a:bodyPr spcFirstLastPara="1" wrap="square" lIns="91425" tIns="91425" rIns="91425" bIns="91425" anchor="t" anchorCtr="0">
+            <a:noAutofit/>
+          </a:bodyPr>
+          <a:lstStyle/>
+          <a:p>
+            <a:pPr marL="0" lvl="0" indent="0" algn="l" rtl="0">
+              <a:spcBef>
+                <a:spcPts val="0"/>
+              </a:spcBef>
+              <a:spcAft>
+                <a:spcPts val="0"/>
+              </a:spcAft>
+              <a:buNone/>
+            </a:pPr>
+            <a:r>
+              <a:rPr lang="en" smtClean="0">
+                <a:latin typeface="Roboto Medium"/>
+                <a:ea typeface="Roboto Medium"/>
+                <a:cs typeface="Roboto Medium"/>
+                <a:sym typeface="Roboto Medium"/>
+              </a:rPr>
+              <a:t>Pod</a:t>
+            </a:r>
+            <a:endParaRPr>
+              <a:latin typeface="Roboto Medium"/>
+              <a:ea typeface="Roboto Medium"/>
+              <a:cs typeface="Roboto Medium"/>
+              <a:sym typeface="Roboto Medium"/>
+            </a:endParaRPr>
+          </a:p>
+        </p:txBody>
+      </p:sp>
+      <p:sp>
+        <p:nvSpPr>
+          <p:cNvPr id="80" name="Google Shape;80;p16"/>
+          <p:cNvSpPr txBox="1">
+            <a:spLocks noGrp="1"/>
+          </p:cNvSpPr>
+          <p:nvPr>
+            <p:ph type="body" idx="1"/>
+          </p:nvPr>
+        </p:nvSpPr>
+        <p:spPr>
+          <a:xfrm>
+            <a:off x="311700" y="1283840"/>
+            <a:ext cx="6457400" cy="3554860"/>
+          </a:xfrm>
+          <a:prstGeom prst="rect">
+            <a:avLst/>
+          </a:prstGeom>
+        </p:spPr>
+        <p:txBody>
+          <a:bodyPr spcFirstLastPara="1" wrap="square" lIns="91425" tIns="91425" rIns="91425" bIns="91425" anchor="t" anchorCtr="0">
+            <a:noAutofit/>
+          </a:bodyPr>
+          <a:lstStyle/>
+          <a:p>
+            <a:pPr lvl="0">
+              <a:buClr>
+                <a:srgbClr val="666666"/>
+              </a:buClr>
+            </a:pPr>
+            <a:r>
+              <a:rPr lang="en-US" smtClean="0">
+                <a:solidFill>
+                  <a:srgbClr val="666666"/>
+                </a:solidFill>
+              </a:rPr>
+              <a:t>Nhóm một hoặc nhiều containers, chia sẻ lưu trữ và các cấu hình cho các containers</a:t>
+            </a:r>
+          </a:p>
+          <a:p>
+            <a:pPr lvl="0">
+              <a:buClr>
+                <a:srgbClr val="666666"/>
+              </a:buClr>
+            </a:pPr>
+            <a:r>
+              <a:rPr lang="en-US" smtClean="0">
+                <a:solidFill>
+                  <a:srgbClr val="666666"/>
+                </a:solidFill>
+              </a:rPr>
+              <a:t>Các containers chia sẻ địa chỉ ip</a:t>
+            </a:r>
+            <a:endParaRPr>
+              <a:solidFill>
+                <a:srgbClr val="666666"/>
+              </a:solidFill>
+              <a:latin typeface="Roboto"/>
+              <a:ea typeface="Roboto"/>
+              <a:cs typeface="Roboto"/>
+              <a:sym typeface="Roboto"/>
+            </a:endParaRPr>
+          </a:p>
+        </p:txBody>
+      </p:sp>
+      <p:pic>
+        <p:nvPicPr>
+          <p:cNvPr id="7" name="Picture 6"/>
+          <p:cNvPicPr>
+            <a:picLocks noChangeAspect="1"/>
+          </p:cNvPicPr>
+          <p:nvPr/>
+        </p:nvPicPr>
+        <p:blipFill>
+          <a:blip r:embed="rId3">
+            <a:extLst>
+              <a:ext uri="{28A0092B-C50C-407E-A947-70E740481C1C}">
+                <a14:useLocalDpi xmlns:a14="http://schemas.microsoft.com/office/drawing/2010/main" val="0"/>
+              </a:ext>
+            </a:extLst>
+          </a:blip>
+          <a:stretch>
+            <a:fillRect/>
+          </a:stretch>
+        </p:blipFill>
+        <p:spPr>
+          <a:xfrm>
+            <a:off x="7347802" y="1283840"/>
+            <a:ext cx="1323646" cy="1282282"/>
+          </a:xfrm>
+          <a:prstGeom prst="rect">
+            <a:avLst/>
+          </a:prstGeom>
+        </p:spPr>
+      </p:pic>
+    </p:spTree>
+    <p:extLst>
+      <p:ext uri="{BB962C8B-B14F-4D97-AF65-F5344CB8AC3E}">
+        <p14:creationId xmlns:p14="http://schemas.microsoft.com/office/powerpoint/2010/main" val="3638308053"/>
+      </p:ext>
+    </p:extLst>
+  </p:cSld>
+  <p:clrMapOvr>
+    <a:masterClrMapping/>
+  </p:clrMapOvr>
+</p:sld>
+</file>
+
+<file path=ppt/slides/slide23.xml><?xml version="1.0" encoding="utf-8"?>
+<p:sld xmlns:a="http://schemas.openxmlformats.org/drawingml/2006/main" xmlns:r="http://schemas.openxmlformats.org/officeDocument/2006/relationships" xmlns:p="http://schemas.openxmlformats.org/presentationml/2006/main">
+  <p:cSld>
+    <p:spTree>
+      <p:nvGrpSpPr>
+        <p:cNvPr id="1" name="Shape 78"/>
+        <p:cNvGrpSpPr/>
+        <p:nvPr/>
+      </p:nvGrpSpPr>
+      <p:grpSpPr>
+        <a:xfrm>
+          <a:off x="0" y="0"/>
+          <a:ext cx="0" cy="0"/>
+          <a:chOff x="0" y="0"/>
+          <a:chExt cx="0" cy="0"/>
+        </a:xfrm>
+      </p:grpSpPr>
+      <p:sp>
+        <p:nvSpPr>
+          <p:cNvPr id="79" name="Google Shape;79;p16"/>
+          <p:cNvSpPr txBox="1">
+            <a:spLocks noGrp="1"/>
+          </p:cNvSpPr>
+          <p:nvPr>
+            <p:ph type="title"/>
+          </p:nvPr>
+        </p:nvSpPr>
+        <p:spPr>
+          <a:xfrm>
+            <a:off x="311700" y="292625"/>
+            <a:ext cx="8520600" cy="572700"/>
+          </a:xfrm>
+          <a:prstGeom prst="rect">
+            <a:avLst/>
+          </a:prstGeom>
+        </p:spPr>
+        <p:txBody>
+          <a:bodyPr spcFirstLastPara="1" wrap="square" lIns="91425" tIns="91425" rIns="91425" bIns="91425" anchor="t" anchorCtr="0">
+            <a:noAutofit/>
+          </a:bodyPr>
+          <a:lstStyle/>
+          <a:p>
+            <a:pPr marL="0" lvl="0" indent="0" algn="l" rtl="0">
+              <a:spcBef>
+                <a:spcPts val="0"/>
+              </a:spcBef>
+              <a:spcAft>
+                <a:spcPts val="0"/>
+              </a:spcAft>
+              <a:buNone/>
+            </a:pPr>
+            <a:r>
+              <a:rPr lang="en" smtClean="0"/>
+              <a:t>Replica set</a:t>
+            </a:r>
+            <a:endParaRPr>
+              <a:latin typeface="Roboto Medium"/>
+              <a:ea typeface="Roboto Medium"/>
+              <a:cs typeface="Roboto Medium"/>
+              <a:sym typeface="Roboto Medium"/>
+            </a:endParaRPr>
+          </a:p>
+        </p:txBody>
+      </p:sp>
+      <p:sp>
+        <p:nvSpPr>
+          <p:cNvPr id="80" name="Google Shape;80;p16"/>
+          <p:cNvSpPr txBox="1">
+            <a:spLocks noGrp="1"/>
+          </p:cNvSpPr>
+          <p:nvPr>
+            <p:ph type="body" idx="1"/>
+          </p:nvPr>
+        </p:nvSpPr>
+        <p:spPr>
+          <a:xfrm>
+            <a:off x="311700" y="1283840"/>
+            <a:ext cx="6457400" cy="3554860"/>
+          </a:xfrm>
+          <a:prstGeom prst="rect">
+            <a:avLst/>
+          </a:prstGeom>
+        </p:spPr>
+        <p:txBody>
+          <a:bodyPr spcFirstLastPara="1" wrap="square" lIns="91425" tIns="91425" rIns="91425" bIns="91425" anchor="t" anchorCtr="0">
+            <a:noAutofit/>
+          </a:bodyPr>
+          <a:lstStyle/>
+          <a:p>
+            <a:pPr lvl="0">
+              <a:spcAft>
+                <a:spcPts val="600"/>
+              </a:spcAft>
+              <a:buClr>
+                <a:srgbClr val="666666"/>
+              </a:buClr>
+            </a:pPr>
+            <a:r>
+              <a:rPr lang="en-US" smtClean="0">
+                <a:solidFill>
+                  <a:srgbClr val="666666"/>
+                </a:solidFill>
+              </a:rPr>
+              <a:t>Định sẵn một số lượng pod</a:t>
+            </a:r>
+          </a:p>
+          <a:p>
+            <a:pPr lvl="0">
+              <a:spcAft>
+                <a:spcPts val="600"/>
+              </a:spcAft>
+              <a:buClr>
+                <a:srgbClr val="666666"/>
+              </a:buClr>
+            </a:pPr>
+            <a:r>
+              <a:rPr lang="en-US" smtClean="0">
+                <a:solidFill>
+                  <a:srgbClr val="666666"/>
+                </a:solidFill>
+              </a:rPr>
+              <a:t>Thêm hoặc bớt pod để đặt được số lượng pod định sẵn</a:t>
+            </a:r>
+          </a:p>
+          <a:p>
+            <a:pPr lvl="0">
+              <a:spcAft>
+                <a:spcPts val="600"/>
+              </a:spcAft>
+              <a:buClr>
+                <a:srgbClr val="666666"/>
+              </a:buClr>
+            </a:pPr>
+            <a:r>
+              <a:rPr lang="en-US" smtClean="0">
+                <a:solidFill>
+                  <a:srgbClr val="666666"/>
+                </a:solidFill>
+              </a:rPr>
+              <a:t>Dải đều các pod trên các worker node</a:t>
+            </a:r>
+          </a:p>
+          <a:p>
+            <a:pPr lvl="0">
+              <a:spcAft>
+                <a:spcPts val="600"/>
+              </a:spcAft>
+              <a:buClr>
+                <a:srgbClr val="666666"/>
+              </a:buClr>
+            </a:pPr>
+            <a:r>
+              <a:rPr lang="en-US" smtClean="0">
+                <a:solidFill>
+                  <a:srgbClr val="666666"/>
+                </a:solidFill>
+                <a:latin typeface="Roboto"/>
+                <a:ea typeface="Roboto"/>
+                <a:cs typeface="Roboto"/>
+                <a:sym typeface="Roboto"/>
+              </a:rPr>
+              <a:t>Tự động thay thế bất kì pod nào bị lỗi</a:t>
+            </a:r>
+          </a:p>
+          <a:p>
+            <a:pPr lvl="0">
+              <a:spcAft>
+                <a:spcPts val="600"/>
+              </a:spcAft>
+              <a:buClr>
+                <a:srgbClr val="666666"/>
+              </a:buClr>
+            </a:pPr>
+            <a:r>
+              <a:rPr lang="en-US" smtClean="0">
+                <a:solidFill>
+                  <a:srgbClr val="666666"/>
+                </a:solidFill>
+              </a:rPr>
+              <a:t>Đảm bảo độ sẵn sàng</a:t>
+            </a:r>
+            <a:endParaRPr>
+              <a:solidFill>
+                <a:srgbClr val="666666"/>
+              </a:solidFill>
+              <a:latin typeface="Roboto"/>
+              <a:ea typeface="Roboto"/>
+              <a:cs typeface="Roboto"/>
+              <a:sym typeface="Roboto"/>
+            </a:endParaRPr>
+          </a:p>
+        </p:txBody>
+      </p:sp>
+      <p:pic>
+        <p:nvPicPr>
+          <p:cNvPr id="5" name="Picture 4"/>
+          <p:cNvPicPr>
+            <a:picLocks noChangeAspect="1"/>
+          </p:cNvPicPr>
+          <p:nvPr/>
+        </p:nvPicPr>
+        <p:blipFill>
+          <a:blip r:embed="rId3">
+            <a:extLst>
+              <a:ext uri="{28A0092B-C50C-407E-A947-70E740481C1C}">
+                <a14:useLocalDpi xmlns:a14="http://schemas.microsoft.com/office/drawing/2010/main" val="0"/>
+              </a:ext>
+            </a:extLst>
+          </a:blip>
+          <a:stretch>
+            <a:fillRect/>
+          </a:stretch>
+        </p:blipFill>
+        <p:spPr>
+          <a:xfrm>
+            <a:off x="7300318" y="1283840"/>
+            <a:ext cx="1323645" cy="1282282"/>
+          </a:xfrm>
+          <a:prstGeom prst="rect">
+            <a:avLst/>
+          </a:prstGeom>
+        </p:spPr>
+      </p:pic>
+    </p:spTree>
+    <p:extLst>
+      <p:ext uri="{BB962C8B-B14F-4D97-AF65-F5344CB8AC3E}">
+        <p14:creationId xmlns:p14="http://schemas.microsoft.com/office/powerpoint/2010/main" val="2386170304"/>
+      </p:ext>
+    </p:extLst>
+  </p:cSld>
+  <p:clrMapOvr>
+    <a:masterClrMapping/>
+  </p:clrMapOvr>
+  <p:timing>
+    <p:tnLst>
+      <p:par>
+        <p:cTn id="1" dur="indefinite" restart="never" nodeType="tmRoot"/>
+      </p:par>
+    </p:tnLst>
+  </p:timing>
+</p:sld>
+</file>
+
+<file path=ppt/slides/slide24.xml><?xml version="1.0" encoding="utf-8"?>
+<p:sld xmlns:a="http://schemas.openxmlformats.org/drawingml/2006/main" xmlns:r="http://schemas.openxmlformats.org/officeDocument/2006/relationships" xmlns:p="http://schemas.openxmlformats.org/presentationml/2006/main">
+  <p:cSld>
+    <p:spTree>
+      <p:nvGrpSpPr>
+        <p:cNvPr id="1" name="Shape 78"/>
+        <p:cNvGrpSpPr/>
+        <p:nvPr/>
+      </p:nvGrpSpPr>
+      <p:grpSpPr>
+        <a:xfrm>
+          <a:off x="0" y="0"/>
+          <a:ext cx="0" cy="0"/>
+          <a:chOff x="0" y="0"/>
+          <a:chExt cx="0" cy="0"/>
+        </a:xfrm>
+      </p:grpSpPr>
+      <p:sp>
+        <p:nvSpPr>
+          <p:cNvPr id="79" name="Google Shape;79;p16"/>
+          <p:cNvSpPr txBox="1">
+            <a:spLocks noGrp="1"/>
+          </p:cNvSpPr>
+          <p:nvPr>
+            <p:ph type="title"/>
+          </p:nvPr>
+        </p:nvSpPr>
+        <p:spPr>
+          <a:xfrm>
+            <a:off x="311700" y="292625"/>
+            <a:ext cx="8520600" cy="572700"/>
+          </a:xfrm>
+          <a:prstGeom prst="rect">
+            <a:avLst/>
+          </a:prstGeom>
+        </p:spPr>
+        <p:txBody>
+          <a:bodyPr spcFirstLastPara="1" wrap="square" lIns="91425" tIns="91425" rIns="91425" bIns="91425" anchor="t" anchorCtr="0">
+            <a:noAutofit/>
+          </a:bodyPr>
+          <a:lstStyle/>
+          <a:p>
+            <a:pPr marL="0" lvl="0" indent="0" algn="l" rtl="0">
+              <a:spcBef>
+                <a:spcPts val="0"/>
+              </a:spcBef>
+              <a:spcAft>
+                <a:spcPts val="0"/>
+              </a:spcAft>
+              <a:buNone/>
+            </a:pPr>
+            <a:r>
+              <a:rPr lang="en" smtClean="0"/>
+              <a:t>Deployment</a:t>
+            </a:r>
+            <a:endParaRPr>
+              <a:latin typeface="Roboto Medium"/>
+              <a:ea typeface="Roboto Medium"/>
+              <a:cs typeface="Roboto Medium"/>
+              <a:sym typeface="Roboto Medium"/>
+            </a:endParaRPr>
+          </a:p>
+        </p:txBody>
+      </p:sp>
+      <p:sp>
+        <p:nvSpPr>
+          <p:cNvPr id="80" name="Google Shape;80;p16"/>
+          <p:cNvSpPr txBox="1">
+            <a:spLocks noGrp="1"/>
+          </p:cNvSpPr>
+          <p:nvPr>
+            <p:ph type="body" idx="1"/>
+          </p:nvPr>
+        </p:nvSpPr>
+        <p:spPr>
+          <a:xfrm>
+            <a:off x="311700" y="1283840"/>
+            <a:ext cx="5746200" cy="3554860"/>
+          </a:xfrm>
+          <a:prstGeom prst="rect">
+            <a:avLst/>
+          </a:prstGeom>
+        </p:spPr>
+        <p:txBody>
+          <a:bodyPr spcFirstLastPara="1" wrap="square" lIns="91425" tIns="91425" rIns="91425" bIns="91425" anchor="t" anchorCtr="0">
+            <a:noAutofit/>
+          </a:bodyPr>
+          <a:lstStyle/>
+          <a:p>
+            <a:pPr lvl="0">
+              <a:spcAft>
+                <a:spcPts val="600"/>
+              </a:spcAft>
+              <a:buClr>
+                <a:srgbClr val="666666"/>
+              </a:buClr>
+            </a:pPr>
+            <a:r>
+              <a:rPr lang="en-US" smtClean="0">
+                <a:solidFill>
+                  <a:srgbClr val="666666"/>
+                </a:solidFill>
+                <a:latin typeface="Roboto"/>
+                <a:ea typeface="Roboto"/>
+                <a:cs typeface="Roboto"/>
+                <a:sym typeface="Roboto"/>
+              </a:rPr>
+              <a:t>Tính năng cao hơn của Replica Set</a:t>
+            </a:r>
+          </a:p>
+          <a:p>
+            <a:pPr lvl="0">
+              <a:spcAft>
+                <a:spcPts val="600"/>
+              </a:spcAft>
+              <a:buClr>
+                <a:srgbClr val="666666"/>
+              </a:buClr>
+            </a:pPr>
+            <a:r>
+              <a:rPr lang="en-US" smtClean="0">
+                <a:solidFill>
+                  <a:srgbClr val="666666"/>
+                </a:solidFill>
+              </a:rPr>
+              <a:t>Ngoài các chức năng của Replica Set, còn cung cấp tính năng rolling update</a:t>
+            </a:r>
+            <a:endParaRPr lang="en-US" smtClean="0">
+              <a:solidFill>
+                <a:srgbClr val="666666"/>
+              </a:solidFill>
+              <a:latin typeface="Roboto"/>
+              <a:ea typeface="Roboto"/>
+              <a:cs typeface="Roboto"/>
+              <a:sym typeface="Roboto"/>
+            </a:endParaRPr>
+          </a:p>
+          <a:p>
+            <a:pPr lvl="0">
+              <a:spcAft>
+                <a:spcPts val="600"/>
+              </a:spcAft>
+              <a:buClr>
+                <a:srgbClr val="666666"/>
+              </a:buClr>
+            </a:pPr>
+            <a:endParaRPr>
+              <a:solidFill>
+                <a:srgbClr val="666666"/>
+              </a:solidFill>
+              <a:latin typeface="Roboto"/>
+              <a:ea typeface="Roboto"/>
+              <a:cs typeface="Roboto"/>
+              <a:sym typeface="Roboto"/>
+            </a:endParaRPr>
+          </a:p>
+        </p:txBody>
+      </p:sp>
+      <p:pic>
+        <p:nvPicPr>
+          <p:cNvPr id="3074" name="Picture 2" descr="https://blogd.net/kubernetes/kien-truc-kubernetes/img/deployment-trong-kubernetes.png"/>
+          <p:cNvPicPr>
+            <a:picLocks noChangeAspect="1" noChangeArrowheads="1"/>
+          </p:cNvPicPr>
+          <p:nvPr/>
+        </p:nvPicPr>
+        <p:blipFill>
+          <a:blip r:embed="rId3">
+            <a:extLst>
+              <a:ext uri="{28A0092B-C50C-407E-A947-70E740481C1C}">
+                <a14:useLocalDpi xmlns:a14="http://schemas.microsoft.com/office/drawing/2010/main" val="0"/>
+              </a:ext>
+            </a:extLst>
+          </a:blip>
+          <a:srcRect/>
+          <a:stretch>
+            <a:fillRect/>
+          </a:stretch>
+        </p:blipFill>
+        <p:spPr bwMode="auto">
+          <a:xfrm>
+            <a:off x="5876261" y="1283840"/>
+            <a:ext cx="2765329" cy="3104657"/>
+          </a:xfrm>
+          <a:prstGeom prst="rect">
+            <a:avLst/>
+          </a:prstGeom>
+          <a:noFill/>
+          <a:extLst>
+            <a:ext uri="{909E8E84-426E-40DD-AFC4-6F175D3DCCD1}">
+              <a14:hiddenFill xmlns:a14="http://schemas.microsoft.com/office/drawing/2010/main">
+                <a:solidFill>
+                  <a:srgbClr val="FFFFFF"/>
+                </a:solidFill>
+              </a14:hiddenFill>
+            </a:ext>
+          </a:extLst>
+        </p:spPr>
+      </p:pic>
+    </p:spTree>
+    <p:extLst>
+      <p:ext uri="{BB962C8B-B14F-4D97-AF65-F5344CB8AC3E}">
+        <p14:creationId xmlns:p14="http://schemas.microsoft.com/office/powerpoint/2010/main" val="3929719202"/>
+      </p:ext>
+    </p:extLst>
+  </p:cSld>
+  <p:clrMapOvr>
+    <a:masterClrMapping/>
+  </p:clrMapOvr>
+  <p:timing>
+    <p:tnLst>
+      <p:par>
+        <p:cTn id="1" dur="indefinite" restart="never" nodeType="tmRoot"/>
+      </p:par>
+    </p:tnLst>
+  </p:timing>
+</p:sld>
+</file>
+
+<file path=ppt/slides/slide25.xml><?xml version="1.0" encoding="utf-8"?>
+<p:sld xmlns:a="http://schemas.openxmlformats.org/drawingml/2006/main" xmlns:r="http://schemas.openxmlformats.org/officeDocument/2006/relationships" xmlns:p="http://schemas.openxmlformats.org/presentationml/2006/main">
+  <p:cSld>
+    <p:spTree>
+      <p:nvGrpSpPr>
+        <p:cNvPr id="1" name="Shape 78"/>
+        <p:cNvGrpSpPr/>
+        <p:nvPr/>
+      </p:nvGrpSpPr>
+      <p:grpSpPr>
+        <a:xfrm>
+          <a:off x="0" y="0"/>
+          <a:ext cx="0" cy="0"/>
+          <a:chOff x="0" y="0"/>
+          <a:chExt cx="0" cy="0"/>
+        </a:xfrm>
+      </p:grpSpPr>
+      <p:sp>
+        <p:nvSpPr>
+          <p:cNvPr id="79" name="Google Shape;79;p16"/>
+          <p:cNvSpPr txBox="1">
+            <a:spLocks noGrp="1"/>
+          </p:cNvSpPr>
+          <p:nvPr>
+            <p:ph type="title"/>
+          </p:nvPr>
+        </p:nvSpPr>
+        <p:spPr>
+          <a:xfrm>
+            <a:off x="311700" y="292625"/>
+            <a:ext cx="8520600" cy="572700"/>
+          </a:xfrm>
+          <a:prstGeom prst="rect">
+            <a:avLst/>
+          </a:prstGeom>
+        </p:spPr>
+        <p:txBody>
+          <a:bodyPr spcFirstLastPara="1" wrap="square" lIns="91425" tIns="91425" rIns="91425" bIns="91425" anchor="t" anchorCtr="0">
+            <a:noAutofit/>
+          </a:bodyPr>
+          <a:lstStyle/>
+          <a:p>
+            <a:pPr marL="0" lvl="0" indent="0" algn="l" rtl="0">
+              <a:spcBef>
+                <a:spcPts val="0"/>
+              </a:spcBef>
+              <a:spcAft>
+                <a:spcPts val="0"/>
+              </a:spcAft>
+              <a:buNone/>
+            </a:pPr>
+            <a:r>
+              <a:rPr lang="en" smtClean="0"/>
+              <a:t>Service</a:t>
+            </a:r>
+            <a:endParaRPr>
+              <a:latin typeface="Roboto Medium"/>
+              <a:ea typeface="Roboto Medium"/>
+              <a:cs typeface="Roboto Medium"/>
+              <a:sym typeface="Roboto Medium"/>
+            </a:endParaRPr>
+          </a:p>
+        </p:txBody>
+      </p:sp>
+      <p:sp>
+        <p:nvSpPr>
+          <p:cNvPr id="80" name="Google Shape;80;p16"/>
+          <p:cNvSpPr txBox="1">
+            <a:spLocks noGrp="1"/>
+          </p:cNvSpPr>
+          <p:nvPr>
+            <p:ph type="body" idx="1"/>
+          </p:nvPr>
+        </p:nvSpPr>
+        <p:spPr>
+          <a:xfrm>
+            <a:off x="311700" y="1283840"/>
+            <a:ext cx="4060275" cy="3554860"/>
+          </a:xfrm>
+          <a:prstGeom prst="rect">
+            <a:avLst/>
+          </a:prstGeom>
+        </p:spPr>
+        <p:txBody>
+          <a:bodyPr spcFirstLastPara="1" wrap="square" lIns="91425" tIns="91425" rIns="91425" bIns="91425" anchor="t" anchorCtr="0">
+            <a:noAutofit/>
+          </a:bodyPr>
+          <a:lstStyle/>
+          <a:p>
+            <a:pPr lvl="0">
+              <a:spcAft>
+                <a:spcPts val="600"/>
+              </a:spcAft>
+              <a:buClr>
+                <a:srgbClr val="666666"/>
+              </a:buClr>
+            </a:pPr>
+            <a:r>
+              <a:rPr lang="en-US" smtClean="0"/>
+              <a:t>Kubernetes Services cho phép kết nối giữa nhiều thành phần khác nhau trong và ngoài ứng dụng</a:t>
+            </a:r>
+          </a:p>
+          <a:p>
+            <a:pPr lvl="0">
+              <a:spcAft>
+                <a:spcPts val="600"/>
+              </a:spcAft>
+              <a:buClr>
+                <a:srgbClr val="666666"/>
+              </a:buClr>
+            </a:pPr>
+            <a:r>
+              <a:rPr lang="en-US" smtClean="0"/>
+              <a:t>Cung cấp domain name ổn định cho một nhóm pods cho giao tiếp giữa các pods trong một cluster</a:t>
+            </a:r>
+          </a:p>
+          <a:p>
+            <a:pPr lvl="0">
+              <a:spcAft>
+                <a:spcPts val="600"/>
+              </a:spcAft>
+              <a:buClr>
+                <a:srgbClr val="666666"/>
+              </a:buClr>
+            </a:pPr>
+            <a:r>
+              <a:rPr lang="en-US" smtClean="0">
+                <a:solidFill>
+                  <a:srgbClr val="666666"/>
+                </a:solidFill>
+                <a:latin typeface="Roboto"/>
+                <a:ea typeface="Roboto"/>
+                <a:cs typeface="Roboto"/>
+                <a:sym typeface="Roboto"/>
+              </a:rPr>
+              <a:t>Loadbalance nhóm pod đó</a:t>
+            </a:r>
+            <a:endParaRPr>
+              <a:solidFill>
+                <a:srgbClr val="666666"/>
+              </a:solidFill>
+              <a:latin typeface="Roboto"/>
+              <a:ea typeface="Roboto"/>
+              <a:cs typeface="Roboto"/>
+              <a:sym typeface="Roboto"/>
+            </a:endParaRPr>
+          </a:p>
+        </p:txBody>
+      </p:sp>
+      <p:pic>
+        <p:nvPicPr>
+          <p:cNvPr id="2" name="Picture 1"/>
+          <p:cNvPicPr>
+            <a:picLocks noChangeAspect="1"/>
+          </p:cNvPicPr>
+          <p:nvPr/>
+        </p:nvPicPr>
+        <p:blipFill>
+          <a:blip r:embed="rId3">
+            <a:extLst>
+              <a:ext uri="{28A0092B-C50C-407E-A947-70E740481C1C}">
+                <a14:useLocalDpi xmlns:a14="http://schemas.microsoft.com/office/drawing/2010/main" val="0"/>
+              </a:ext>
+            </a:extLst>
+          </a:blip>
+          <a:stretch>
+            <a:fillRect/>
+          </a:stretch>
+        </p:blipFill>
+        <p:spPr>
+          <a:xfrm>
+            <a:off x="4695825" y="1283840"/>
+            <a:ext cx="4296160" cy="3240535"/>
+          </a:xfrm>
+          <a:prstGeom prst="rect">
+            <a:avLst/>
+          </a:prstGeom>
+        </p:spPr>
+      </p:pic>
+    </p:spTree>
+    <p:extLst>
+      <p:ext uri="{BB962C8B-B14F-4D97-AF65-F5344CB8AC3E}">
+        <p14:creationId xmlns:p14="http://schemas.microsoft.com/office/powerpoint/2010/main" val="4031012825"/>
+      </p:ext>
+    </p:extLst>
+  </p:cSld>
+  <p:clrMapOvr>
+    <a:masterClrMapping/>
+  </p:clrMapOvr>
+  <p:timing>
+    <p:tnLst>
+      <p:par>
+        <p:cTn id="1" dur="indefinite" restart="never" nodeType="tmRoot"/>
+      </p:par>
+    </p:tnLst>
+  </p:timing>
+</p:sld>
+</file>
+
+<file path=ppt/slides/slide26.xml><?xml version="1.0" encoding="utf-8"?>
+<p:sld xmlns:a="http://schemas.openxmlformats.org/drawingml/2006/main" xmlns:r="http://schemas.openxmlformats.org/officeDocument/2006/relationships" xmlns:p="http://schemas.openxmlformats.org/presentationml/2006/main">
+  <p:cSld>
+    <p:spTree>
+      <p:nvGrpSpPr>
+        <p:cNvPr id="1" name="Shape 78"/>
+        <p:cNvGrpSpPr/>
+        <p:nvPr/>
+      </p:nvGrpSpPr>
+      <p:grpSpPr>
+        <a:xfrm>
+          <a:off x="0" y="0"/>
+          <a:ext cx="0" cy="0"/>
+          <a:chOff x="0" y="0"/>
+          <a:chExt cx="0" cy="0"/>
+        </a:xfrm>
+      </p:grpSpPr>
+      <p:sp>
+        <p:nvSpPr>
+          <p:cNvPr id="79" name="Google Shape;79;p16"/>
+          <p:cNvSpPr txBox="1">
+            <a:spLocks noGrp="1"/>
+          </p:cNvSpPr>
+          <p:nvPr>
+            <p:ph type="title"/>
+          </p:nvPr>
+        </p:nvSpPr>
+        <p:spPr>
+          <a:xfrm>
+            <a:off x="311700" y="292625"/>
+            <a:ext cx="8520600" cy="572700"/>
+          </a:xfrm>
+          <a:prstGeom prst="rect">
+            <a:avLst/>
+          </a:prstGeom>
+        </p:spPr>
+        <p:txBody>
+          <a:bodyPr spcFirstLastPara="1" wrap="square" lIns="91425" tIns="91425" rIns="91425" bIns="91425" anchor="t" anchorCtr="0">
+            <a:noAutofit/>
+          </a:bodyPr>
+          <a:lstStyle/>
+          <a:p>
+            <a:pPr marL="0" lvl="0" indent="0" algn="l" rtl="0">
+              <a:spcBef>
+                <a:spcPts val="0"/>
+              </a:spcBef>
+              <a:spcAft>
+                <a:spcPts val="0"/>
+              </a:spcAft>
+              <a:buNone/>
+            </a:pPr>
+            <a:r>
+              <a:rPr lang="en" smtClean="0">
+                <a:latin typeface="Roboto Medium"/>
+                <a:ea typeface="Roboto Medium"/>
+                <a:cs typeface="Roboto Medium"/>
+                <a:sym typeface="Roboto Medium"/>
+              </a:rPr>
+              <a:t>Ingress</a:t>
+            </a:r>
+            <a:endParaRPr>
+              <a:latin typeface="Roboto Medium"/>
+              <a:ea typeface="Roboto Medium"/>
+              <a:cs typeface="Roboto Medium"/>
+              <a:sym typeface="Roboto Medium"/>
+            </a:endParaRPr>
+          </a:p>
+        </p:txBody>
+      </p:sp>
+      <p:sp>
+        <p:nvSpPr>
+          <p:cNvPr id="80" name="Google Shape;80;p16"/>
+          <p:cNvSpPr txBox="1">
+            <a:spLocks noGrp="1"/>
+          </p:cNvSpPr>
+          <p:nvPr>
+            <p:ph type="body" idx="1"/>
+          </p:nvPr>
+        </p:nvSpPr>
+        <p:spPr>
+          <a:xfrm>
+            <a:off x="311700" y="1283840"/>
+            <a:ext cx="4374600" cy="3431035"/>
+          </a:xfrm>
+          <a:prstGeom prst="rect">
+            <a:avLst/>
+          </a:prstGeom>
+        </p:spPr>
+        <p:txBody>
+          <a:bodyPr spcFirstLastPara="1" wrap="square" lIns="91425" tIns="91425" rIns="91425" bIns="91425" anchor="t" anchorCtr="0">
+            <a:noAutofit/>
+          </a:bodyPr>
+          <a:lstStyle/>
+          <a:p>
+            <a:pPr lvl="0">
+              <a:buClr>
+                <a:srgbClr val="666666"/>
+              </a:buClr>
+            </a:pPr>
+            <a:r>
+              <a:rPr lang="en-US" smtClean="0">
+                <a:solidFill>
+                  <a:srgbClr val="666666"/>
+                </a:solidFill>
+              </a:rPr>
+              <a:t>Quản lý các kết nối từ bên ngoài đến các services trong cluster, thông thường là HTTP</a:t>
+            </a:r>
+          </a:p>
+          <a:p>
+            <a:pPr lvl="0">
+              <a:buClr>
+                <a:srgbClr val="666666"/>
+              </a:buClr>
+            </a:pPr>
+            <a:r>
+              <a:rPr lang="en-US" smtClean="0">
+                <a:solidFill>
+                  <a:srgbClr val="666666"/>
+                </a:solidFill>
+              </a:rPr>
+              <a:t>Smart router cho phép route đến các service khác nhau dựa trên tên miền trên tất các kết nối trên cùng một port</a:t>
+            </a:r>
+          </a:p>
+          <a:p>
+            <a:pPr lvl="0">
+              <a:buClr>
+                <a:srgbClr val="666666"/>
+              </a:buClr>
+            </a:pPr>
+            <a:r>
+              <a:rPr lang="en-US" smtClean="0">
+                <a:solidFill>
+                  <a:srgbClr val="666666"/>
+                </a:solidFill>
+              </a:rPr>
+              <a:t>Có thể cung cấp SSL termination và loadbalancing</a:t>
+            </a:r>
+          </a:p>
+          <a:p>
+            <a:pPr lvl="0">
+              <a:buClr>
+                <a:srgbClr val="666666"/>
+              </a:buClr>
+            </a:pPr>
+            <a:endParaRPr>
+              <a:solidFill>
+                <a:srgbClr val="666666"/>
+              </a:solidFill>
+              <a:latin typeface="Roboto"/>
+              <a:ea typeface="Roboto"/>
+              <a:cs typeface="Roboto"/>
+              <a:sym typeface="Roboto"/>
+            </a:endParaRPr>
+          </a:p>
+        </p:txBody>
+      </p:sp>
+      <p:pic>
+        <p:nvPicPr>
+          <p:cNvPr id="2" name="Picture 1"/>
+          <p:cNvPicPr>
+            <a:picLocks noChangeAspect="1"/>
+          </p:cNvPicPr>
+          <p:nvPr/>
+        </p:nvPicPr>
+        <p:blipFill>
+          <a:blip r:embed="rId3">
+            <a:extLst>
+              <a:ext uri="{28A0092B-C50C-407E-A947-70E740481C1C}">
+                <a14:useLocalDpi xmlns:a14="http://schemas.microsoft.com/office/drawing/2010/main" val="0"/>
+              </a:ext>
+            </a:extLst>
+          </a:blip>
+          <a:stretch>
+            <a:fillRect/>
+          </a:stretch>
+        </p:blipFill>
+        <p:spPr>
+          <a:xfrm>
+            <a:off x="5178508" y="1283840"/>
+            <a:ext cx="3469595" cy="3231010"/>
+          </a:xfrm>
+          <a:prstGeom prst="rect">
+            <a:avLst/>
+          </a:prstGeom>
+        </p:spPr>
+      </p:pic>
+    </p:spTree>
+    <p:extLst>
+      <p:ext uri="{BB962C8B-B14F-4D97-AF65-F5344CB8AC3E}">
+        <p14:creationId xmlns:p14="http://schemas.microsoft.com/office/powerpoint/2010/main" val="4108072642"/>
+      </p:ext>
+    </p:extLst>
+  </p:cSld>
+  <p:clrMapOvr>
+    <a:masterClrMapping/>
+  </p:clrMapOvr>
+</p:sld>
+</file>
+
+<file path=ppt/slides/slide27.xml><?xml version="1.0" encoding="utf-8"?>
+<p:sld xmlns:a="http://schemas.openxmlformats.org/drawingml/2006/main" xmlns:r="http://schemas.openxmlformats.org/officeDocument/2006/relationships" xmlns:p="http://schemas.openxmlformats.org/presentationml/2006/main">
+  <p:cSld>
+    <p:spTree>
+      <p:nvGrpSpPr>
+        <p:cNvPr id="1" name="Shape 78"/>
+        <p:cNvGrpSpPr/>
+        <p:nvPr/>
+      </p:nvGrpSpPr>
+      <p:grpSpPr>
+        <a:xfrm>
+          <a:off x="0" y="0"/>
+          <a:ext cx="0" cy="0"/>
+          <a:chOff x="0" y="0"/>
+          <a:chExt cx="0" cy="0"/>
+        </a:xfrm>
+      </p:grpSpPr>
+      <p:sp>
+        <p:nvSpPr>
+          <p:cNvPr id="79" name="Google Shape;79;p16"/>
+          <p:cNvSpPr txBox="1">
+            <a:spLocks noGrp="1"/>
+          </p:cNvSpPr>
+          <p:nvPr>
+            <p:ph type="title"/>
+          </p:nvPr>
+        </p:nvSpPr>
+        <p:spPr>
+          <a:xfrm>
+            <a:off x="311700" y="292625"/>
+            <a:ext cx="8520600" cy="572700"/>
+          </a:xfrm>
+          <a:prstGeom prst="rect">
+            <a:avLst/>
+          </a:prstGeom>
+        </p:spPr>
+        <p:txBody>
+          <a:bodyPr spcFirstLastPara="1" wrap="square" lIns="91425" tIns="91425" rIns="91425" bIns="91425" anchor="t" anchorCtr="0">
+            <a:noAutofit/>
+          </a:bodyPr>
+          <a:lstStyle/>
+          <a:p>
+            <a:pPr marL="0" lvl="0" indent="0" algn="l" rtl="0">
+              <a:spcBef>
+                <a:spcPts val="0"/>
+              </a:spcBef>
+              <a:spcAft>
+                <a:spcPts val="0"/>
+              </a:spcAft>
+              <a:buNone/>
+            </a:pPr>
+            <a:r>
+              <a:rPr lang="en" smtClean="0">
+                <a:latin typeface="Roboto Medium"/>
+                <a:ea typeface="Roboto Medium"/>
+                <a:cs typeface="Roboto Medium"/>
+                <a:sym typeface="Roboto Medium"/>
+              </a:rPr>
+              <a:t>Persitent volume</a:t>
+            </a:r>
+            <a:endParaRPr>
+              <a:latin typeface="Roboto Medium"/>
+              <a:ea typeface="Roboto Medium"/>
+              <a:cs typeface="Roboto Medium"/>
+              <a:sym typeface="Roboto Medium"/>
+            </a:endParaRPr>
+          </a:p>
+        </p:txBody>
+      </p:sp>
+      <p:sp>
+        <p:nvSpPr>
+          <p:cNvPr id="2" name="Text Placeholder 1"/>
+          <p:cNvSpPr>
+            <a:spLocks noGrp="1"/>
+          </p:cNvSpPr>
+          <p:nvPr>
+            <p:ph type="body" idx="1"/>
+          </p:nvPr>
+        </p:nvSpPr>
+        <p:spPr>
+          <a:xfrm>
+            <a:off x="311700" y="1333499"/>
+            <a:ext cx="4822275" cy="3235375"/>
+          </a:xfrm>
+        </p:spPr>
+        <p:txBody>
+          <a:bodyPr/>
+          <a:lstStyle/>
+          <a:p>
+            <a:r>
+              <a:rPr lang="en-US" smtClean="0"/>
+              <a:t>Khi một container down, dữ liệu của nó sẽ bị mất</a:t>
+            </a:r>
+          </a:p>
+          <a:p>
+            <a:r>
+              <a:rPr lang="en-US" smtClean="0"/>
+              <a:t>Persistent volume cho phép mount một ổ đĩa ảo lên một thư mục trong container, dữ liệu ghi vào volume sẽ được dữ lại cho các container khác sử dụng</a:t>
+            </a:r>
+          </a:p>
+          <a:p>
+            <a:r>
+              <a:rPr lang="en-US" smtClean="0"/>
+              <a:t>Nhiều container có thể mount cùng một volume</a:t>
+            </a:r>
+            <a:endParaRPr lang="en-US"/>
+          </a:p>
+        </p:txBody>
+      </p:sp>
+      <p:pic>
+        <p:nvPicPr>
+          <p:cNvPr id="5124" name="Picture 4" descr="https://docs.ovh.com/au/en/kubernetes/ovh-kubernetes-persistent-volumes/images/working-with-persistent-volumes-01.png"/>
+          <p:cNvPicPr>
+            <a:picLocks noChangeAspect="1" noChangeArrowheads="1"/>
+          </p:cNvPicPr>
+          <p:nvPr/>
+        </p:nvPicPr>
+        <p:blipFill>
+          <a:blip r:embed="rId3">
+            <a:extLst>
+              <a:ext uri="{28A0092B-C50C-407E-A947-70E740481C1C}">
+                <a14:useLocalDpi xmlns:a14="http://schemas.microsoft.com/office/drawing/2010/main" val="0"/>
+              </a:ext>
+            </a:extLst>
+          </a:blip>
+          <a:srcRect/>
+          <a:stretch>
+            <a:fillRect/>
+          </a:stretch>
+        </p:blipFill>
+        <p:spPr bwMode="auto">
+          <a:xfrm>
+            <a:off x="6144298" y="1506608"/>
+            <a:ext cx="2507577" cy="2893941"/>
+          </a:xfrm>
+          <a:prstGeom prst="rect">
+            <a:avLst/>
+          </a:prstGeom>
+          <a:noFill/>
+          <a:extLst>
+            <a:ext uri="{909E8E84-426E-40DD-AFC4-6F175D3DCCD1}">
+              <a14:hiddenFill xmlns:a14="http://schemas.microsoft.com/office/drawing/2010/main">
+                <a:solidFill>
+                  <a:srgbClr val="FFFFFF"/>
+                </a:solidFill>
+              </a14:hiddenFill>
+            </a:ext>
+          </a:extLst>
+        </p:spPr>
+      </p:pic>
+    </p:spTree>
+    <p:extLst>
+      <p:ext uri="{BB962C8B-B14F-4D97-AF65-F5344CB8AC3E}">
+        <p14:creationId xmlns:p14="http://schemas.microsoft.com/office/powerpoint/2010/main" val="1286468589"/>
+      </p:ext>
+    </p:extLst>
+  </p:cSld>
+  <p:clrMapOvr>
+    <a:masterClrMapping/>
+  </p:clrMapOvr>
 </p:sld>
 </file>
 

</xml_diff>

<commit_message>
add kubernetes architecture example
</commit_message>
<xml_diff>
--- a/slide-dao-tao/Kubernetes-cho-người-mới-bắt-đầu.pptx
+++ b/slide-dao-tao/Kubernetes-cho-người-mới-bắt-đầu.pptx
@@ -5,7 +5,7 @@
     <p:sldMasterId id="2147483657" r:id="rId1"/>
   </p:sldMasterIdLst>
   <p:notesMasterIdLst>
-    <p:notesMasterId r:id="rId29"/>
+    <p:notesMasterId r:id="rId38"/>
   </p:notesMasterIdLst>
   <p:sldIdLst>
     <p:sldId id="256" r:id="rId2"/>
@@ -22,19 +22,28 @@
     <p:sldId id="275" r:id="rId13"/>
     <p:sldId id="285" r:id="rId14"/>
     <p:sldId id="286" r:id="rId15"/>
-    <p:sldId id="281" r:id="rId16"/>
-    <p:sldId id="287" r:id="rId17"/>
-    <p:sldId id="288" r:id="rId18"/>
-    <p:sldId id="289" r:id="rId19"/>
-    <p:sldId id="290" r:id="rId20"/>
-    <p:sldId id="291" r:id="rId21"/>
-    <p:sldId id="292" r:id="rId22"/>
-    <p:sldId id="294" r:id="rId23"/>
-    <p:sldId id="295" r:id="rId24"/>
-    <p:sldId id="296" r:id="rId25"/>
-    <p:sldId id="297" r:id="rId26"/>
-    <p:sldId id="298" r:id="rId27"/>
-    <p:sldId id="299" r:id="rId28"/>
+    <p:sldId id="302" r:id="rId16"/>
+    <p:sldId id="301" r:id="rId17"/>
+    <p:sldId id="303" r:id="rId18"/>
+    <p:sldId id="304" r:id="rId19"/>
+    <p:sldId id="281" r:id="rId20"/>
+    <p:sldId id="287" r:id="rId21"/>
+    <p:sldId id="288" r:id="rId22"/>
+    <p:sldId id="289" r:id="rId23"/>
+    <p:sldId id="290" r:id="rId24"/>
+    <p:sldId id="291" r:id="rId25"/>
+    <p:sldId id="292" r:id="rId26"/>
+    <p:sldId id="294" r:id="rId27"/>
+    <p:sldId id="295" r:id="rId28"/>
+    <p:sldId id="296" r:id="rId29"/>
+    <p:sldId id="297" r:id="rId30"/>
+    <p:sldId id="298" r:id="rId31"/>
+    <p:sldId id="299" r:id="rId32"/>
+    <p:sldId id="306" r:id="rId33"/>
+    <p:sldId id="305" r:id="rId34"/>
+    <p:sldId id="307" r:id="rId35"/>
+    <p:sldId id="308" r:id="rId36"/>
+    <p:sldId id="300" r:id="rId37"/>
   </p:sldIdLst>
   <p:sldSz cx="9144000" cy="5143500" type="screen16x9"/>
   <p:notesSz cx="6858000" cy="9144000"/>
@@ -1475,7 +1484,7 @@
     </p:spTree>
     <p:extLst>
       <p:ext uri="{BB962C8B-B14F-4D97-AF65-F5344CB8AC3E}">
-        <p14:creationId xmlns:p14="http://schemas.microsoft.com/office/powerpoint/2010/main" val="4134360228"/>
+        <p14:creationId xmlns:p14="http://schemas.microsoft.com/office/powerpoint/2010/main" val="2280347033"/>
       </p:ext>
     </p:extLst>
   </p:cSld>
@@ -1584,7 +1593,7 @@
     </p:spTree>
     <p:extLst>
       <p:ext uri="{BB962C8B-B14F-4D97-AF65-F5344CB8AC3E}">
-        <p14:creationId xmlns:p14="http://schemas.microsoft.com/office/powerpoint/2010/main" val="131497234"/>
+        <p14:creationId xmlns:p14="http://schemas.microsoft.com/office/powerpoint/2010/main" val="3230869097"/>
       </p:ext>
     </p:extLst>
   </p:cSld>
@@ -1693,7 +1702,7 @@
     </p:spTree>
     <p:extLst>
       <p:ext uri="{BB962C8B-B14F-4D97-AF65-F5344CB8AC3E}">
-        <p14:creationId xmlns:p14="http://schemas.microsoft.com/office/powerpoint/2010/main" val="4147011343"/>
+        <p14:creationId xmlns:p14="http://schemas.microsoft.com/office/powerpoint/2010/main" val="2319433852"/>
       </p:ext>
     </p:extLst>
   </p:cSld>
@@ -1802,7 +1811,7 @@
     </p:spTree>
     <p:extLst>
       <p:ext uri="{BB962C8B-B14F-4D97-AF65-F5344CB8AC3E}">
-        <p14:creationId xmlns:p14="http://schemas.microsoft.com/office/powerpoint/2010/main" val="3130877274"/>
+        <p14:creationId xmlns:p14="http://schemas.microsoft.com/office/powerpoint/2010/main" val="1119850483"/>
       </p:ext>
     </p:extLst>
   </p:cSld>
@@ -1817,7 +1826,7 @@
   <p:cSld>
     <p:spTree>
       <p:nvGrpSpPr>
-        <p:cNvPr id="1" name="Shape 75"/>
+        <p:cNvPr id="1" name="Shape 70"/>
         <p:cNvGrpSpPr/>
         <p:nvPr/>
       </p:nvGrpSpPr>
@@ -1831,7 +1840,7 @@
       </p:grpSpPr>
       <p:sp>
         <p:nvSpPr>
-          <p:cNvPr id="76" name="Google Shape;76;g338ac0a8b6_0_27:notes"/>
+          <p:cNvPr id="71" name="Google Shape;71;g338ac0a8b6_0_36:notes"/>
           <p:cNvSpPr>
             <a:spLocks noGrp="1" noRot="1" noChangeAspect="1"/>
           </p:cNvSpPr>
@@ -1872,7 +1881,7 @@
       </p:sp>
       <p:sp>
         <p:nvSpPr>
-          <p:cNvPr id="77" name="Google Shape;77;g338ac0a8b6_0_27:notes"/>
+          <p:cNvPr id="72" name="Google Shape;72;g338ac0a8b6_0_36:notes"/>
           <p:cNvSpPr txBox="1">
             <a:spLocks noGrp="1"/>
           </p:cNvSpPr>
@@ -1911,7 +1920,7 @@
     </p:spTree>
     <p:extLst>
       <p:ext uri="{BB962C8B-B14F-4D97-AF65-F5344CB8AC3E}">
-        <p14:creationId xmlns:p14="http://schemas.microsoft.com/office/powerpoint/2010/main" val="3802548395"/>
+        <p14:creationId xmlns:p14="http://schemas.microsoft.com/office/powerpoint/2010/main" val="4134360228"/>
       </p:ext>
     </p:extLst>
   </p:cSld>
@@ -2035,7 +2044,7 @@
   <p:cSld>
     <p:spTree>
       <p:nvGrpSpPr>
-        <p:cNvPr id="1" name="Shape 70"/>
+        <p:cNvPr id="1" name="Shape 75"/>
         <p:cNvGrpSpPr/>
         <p:nvPr/>
       </p:nvGrpSpPr>
@@ -2049,7 +2058,7 @@
       </p:grpSpPr>
       <p:sp>
         <p:nvSpPr>
-          <p:cNvPr id="71" name="Google Shape;71;g338ac0a8b6_0_36:notes"/>
+          <p:cNvPr id="76" name="Google Shape;76;g338ac0a8b6_0_27:notes"/>
           <p:cNvSpPr>
             <a:spLocks noGrp="1" noRot="1" noChangeAspect="1"/>
           </p:cNvSpPr>
@@ -2090,7 +2099,7 @@
       </p:sp>
       <p:sp>
         <p:nvSpPr>
-          <p:cNvPr id="72" name="Google Shape;72;g338ac0a8b6_0_36:notes"/>
+          <p:cNvPr id="77" name="Google Shape;77;g338ac0a8b6_0_27:notes"/>
           <p:cNvSpPr txBox="1">
             <a:spLocks noGrp="1"/>
           </p:cNvSpPr>
@@ -2129,7 +2138,7 @@
     </p:spTree>
     <p:extLst>
       <p:ext uri="{BB962C8B-B14F-4D97-AF65-F5344CB8AC3E}">
-        <p14:creationId xmlns:p14="http://schemas.microsoft.com/office/powerpoint/2010/main" val="1235265169"/>
+        <p14:creationId xmlns:p14="http://schemas.microsoft.com/office/powerpoint/2010/main" val="131497234"/>
       </p:ext>
     </p:extLst>
   </p:cSld>
@@ -2238,7 +2247,7 @@
     </p:spTree>
     <p:extLst>
       <p:ext uri="{BB962C8B-B14F-4D97-AF65-F5344CB8AC3E}">
-        <p14:creationId xmlns:p14="http://schemas.microsoft.com/office/powerpoint/2010/main" val="947796055"/>
+        <p14:creationId xmlns:p14="http://schemas.microsoft.com/office/powerpoint/2010/main" val="4147011343"/>
       </p:ext>
     </p:extLst>
   </p:cSld>
@@ -2347,7 +2356,7 @@
     </p:spTree>
     <p:extLst>
       <p:ext uri="{BB962C8B-B14F-4D97-AF65-F5344CB8AC3E}">
-        <p14:creationId xmlns:p14="http://schemas.microsoft.com/office/powerpoint/2010/main" val="1372079914"/>
+        <p14:creationId xmlns:p14="http://schemas.microsoft.com/office/powerpoint/2010/main" val="3130877274"/>
       </p:ext>
     </p:extLst>
   </p:cSld>
@@ -2456,7 +2465,7 @@
     </p:spTree>
     <p:extLst>
       <p:ext uri="{BB962C8B-B14F-4D97-AF65-F5344CB8AC3E}">
-        <p14:creationId xmlns:p14="http://schemas.microsoft.com/office/powerpoint/2010/main" val="2910715994"/>
+        <p14:creationId xmlns:p14="http://schemas.microsoft.com/office/powerpoint/2010/main" val="3802548395"/>
       </p:ext>
     </p:extLst>
   </p:cSld>
@@ -2471,7 +2480,7 @@
   <p:cSld>
     <p:spTree>
       <p:nvGrpSpPr>
-        <p:cNvPr id="1" name="Shape 75"/>
+        <p:cNvPr id="1" name="Shape 70"/>
         <p:cNvGrpSpPr/>
         <p:nvPr/>
       </p:nvGrpSpPr>
@@ -2485,7 +2494,7 @@
       </p:grpSpPr>
       <p:sp>
         <p:nvSpPr>
-          <p:cNvPr id="76" name="Google Shape;76;g338ac0a8b6_0_27:notes"/>
+          <p:cNvPr id="71" name="Google Shape;71;g338ac0a8b6_0_36:notes"/>
           <p:cNvSpPr>
             <a:spLocks noGrp="1" noRot="1" noChangeAspect="1"/>
           </p:cNvSpPr>
@@ -2526,7 +2535,7 @@
       </p:sp>
       <p:sp>
         <p:nvSpPr>
-          <p:cNvPr id="77" name="Google Shape;77;g338ac0a8b6_0_27:notes"/>
+          <p:cNvPr id="72" name="Google Shape;72;g338ac0a8b6_0_36:notes"/>
           <p:cNvSpPr txBox="1">
             <a:spLocks noGrp="1"/>
           </p:cNvSpPr>
@@ -2565,7 +2574,7 @@
     </p:spTree>
     <p:extLst>
       <p:ext uri="{BB962C8B-B14F-4D97-AF65-F5344CB8AC3E}">
-        <p14:creationId xmlns:p14="http://schemas.microsoft.com/office/powerpoint/2010/main" val="462608996"/>
+        <p14:creationId xmlns:p14="http://schemas.microsoft.com/office/powerpoint/2010/main" val="1235265169"/>
       </p:ext>
     </p:extLst>
   </p:cSld>
@@ -2674,7 +2683,7 @@
     </p:spTree>
     <p:extLst>
       <p:ext uri="{BB962C8B-B14F-4D97-AF65-F5344CB8AC3E}">
-        <p14:creationId xmlns:p14="http://schemas.microsoft.com/office/powerpoint/2010/main" val="2809449390"/>
+        <p14:creationId xmlns:p14="http://schemas.microsoft.com/office/powerpoint/2010/main" val="947796055"/>
       </p:ext>
     </p:extLst>
   </p:cSld>
@@ -2783,7 +2792,7 @@
     </p:spTree>
     <p:extLst>
       <p:ext uri="{BB962C8B-B14F-4D97-AF65-F5344CB8AC3E}">
-        <p14:creationId xmlns:p14="http://schemas.microsoft.com/office/powerpoint/2010/main" val="2888293655"/>
+        <p14:creationId xmlns:p14="http://schemas.microsoft.com/office/powerpoint/2010/main" val="1372079914"/>
       </p:ext>
     </p:extLst>
   </p:cSld>
@@ -2892,7 +2901,225 @@
     </p:spTree>
     <p:extLst>
       <p:ext uri="{BB962C8B-B14F-4D97-AF65-F5344CB8AC3E}">
-        <p14:creationId xmlns:p14="http://schemas.microsoft.com/office/powerpoint/2010/main" val="3848069153"/>
+        <p14:creationId xmlns:p14="http://schemas.microsoft.com/office/powerpoint/2010/main" val="2910715994"/>
+      </p:ext>
+    </p:extLst>
+  </p:cSld>
+  <p:clrMapOvr>
+    <a:masterClrMapping/>
+  </p:clrMapOvr>
+</p:notes>
+</file>
+
+<file path=ppt/notesSlides/notesSlide28.xml><?xml version="1.0" encoding="utf-8"?>
+<p:notes xmlns:a="http://schemas.openxmlformats.org/drawingml/2006/main" xmlns:r="http://schemas.openxmlformats.org/officeDocument/2006/relationships" xmlns:p="http://schemas.openxmlformats.org/presentationml/2006/main" showMasterSp="0" showMasterPhAnim="0">
+  <p:cSld>
+    <p:spTree>
+      <p:nvGrpSpPr>
+        <p:cNvPr id="1" name="Shape 75"/>
+        <p:cNvGrpSpPr/>
+        <p:nvPr/>
+      </p:nvGrpSpPr>
+      <p:grpSpPr>
+        <a:xfrm>
+          <a:off x="0" y="0"/>
+          <a:ext cx="0" cy="0"/>
+          <a:chOff x="0" y="0"/>
+          <a:chExt cx="0" cy="0"/>
+        </a:xfrm>
+      </p:grpSpPr>
+      <p:sp>
+        <p:nvSpPr>
+          <p:cNvPr id="76" name="Google Shape;76;g338ac0a8b6_0_27:notes"/>
+          <p:cNvSpPr>
+            <a:spLocks noGrp="1" noRot="1" noChangeAspect="1"/>
+          </p:cNvSpPr>
+          <p:nvPr>
+            <p:ph type="sldImg" idx="2"/>
+          </p:nvPr>
+        </p:nvSpPr>
+        <p:spPr>
+          <a:xfrm>
+            <a:off x="381000" y="685800"/>
+            <a:ext cx="6096000" cy="3429000"/>
+          </a:xfrm>
+          <a:custGeom>
+            <a:avLst/>
+            <a:gdLst/>
+            <a:ahLst/>
+            <a:cxnLst/>
+            <a:rect l="l" t="t" r="r" b="b"/>
+            <a:pathLst>
+              <a:path w="120000" h="120000" extrusionOk="0">
+                <a:moveTo>
+                  <a:pt x="0" y="0"/>
+                </a:moveTo>
+                <a:lnTo>
+                  <a:pt x="120000" y="0"/>
+                </a:lnTo>
+                <a:lnTo>
+                  <a:pt x="120000" y="120000"/>
+                </a:lnTo>
+                <a:lnTo>
+                  <a:pt x="0" y="120000"/>
+                </a:lnTo>
+                <a:close/>
+              </a:path>
+            </a:pathLst>
+          </a:custGeom>
+        </p:spPr>
+      </p:sp>
+      <p:sp>
+        <p:nvSpPr>
+          <p:cNvPr id="77" name="Google Shape;77;g338ac0a8b6_0_27:notes"/>
+          <p:cNvSpPr txBox="1">
+            <a:spLocks noGrp="1"/>
+          </p:cNvSpPr>
+          <p:nvPr>
+            <p:ph type="body" idx="1"/>
+          </p:nvPr>
+        </p:nvSpPr>
+        <p:spPr>
+          <a:xfrm>
+            <a:off x="685800" y="4343400"/>
+            <a:ext cx="5486400" cy="4114800"/>
+          </a:xfrm>
+          <a:prstGeom prst="rect">
+            <a:avLst/>
+          </a:prstGeom>
+        </p:spPr>
+        <p:txBody>
+          <a:bodyPr spcFirstLastPara="1" wrap="square" lIns="91425" tIns="91425" rIns="91425" bIns="91425" anchor="t" anchorCtr="0">
+            <a:noAutofit/>
+          </a:bodyPr>
+          <a:lstStyle/>
+          <a:p>
+            <a:pPr marL="0" lvl="0" indent="0" algn="l" rtl="0">
+              <a:spcBef>
+                <a:spcPts val="0"/>
+              </a:spcBef>
+              <a:spcAft>
+                <a:spcPts val="0"/>
+              </a:spcAft>
+              <a:buNone/>
+            </a:pPr>
+            <a:endParaRPr/>
+          </a:p>
+        </p:txBody>
+      </p:sp>
+    </p:spTree>
+    <p:extLst>
+      <p:ext uri="{BB962C8B-B14F-4D97-AF65-F5344CB8AC3E}">
+        <p14:creationId xmlns:p14="http://schemas.microsoft.com/office/powerpoint/2010/main" val="462608996"/>
+      </p:ext>
+    </p:extLst>
+  </p:cSld>
+  <p:clrMapOvr>
+    <a:masterClrMapping/>
+  </p:clrMapOvr>
+</p:notes>
+</file>
+
+<file path=ppt/notesSlides/notesSlide29.xml><?xml version="1.0" encoding="utf-8"?>
+<p:notes xmlns:a="http://schemas.openxmlformats.org/drawingml/2006/main" xmlns:r="http://schemas.openxmlformats.org/officeDocument/2006/relationships" xmlns:p="http://schemas.openxmlformats.org/presentationml/2006/main" showMasterSp="0" showMasterPhAnim="0">
+  <p:cSld>
+    <p:spTree>
+      <p:nvGrpSpPr>
+        <p:cNvPr id="1" name="Shape 75"/>
+        <p:cNvGrpSpPr/>
+        <p:nvPr/>
+      </p:nvGrpSpPr>
+      <p:grpSpPr>
+        <a:xfrm>
+          <a:off x="0" y="0"/>
+          <a:ext cx="0" cy="0"/>
+          <a:chOff x="0" y="0"/>
+          <a:chExt cx="0" cy="0"/>
+        </a:xfrm>
+      </p:grpSpPr>
+      <p:sp>
+        <p:nvSpPr>
+          <p:cNvPr id="76" name="Google Shape;76;g338ac0a8b6_0_27:notes"/>
+          <p:cNvSpPr>
+            <a:spLocks noGrp="1" noRot="1" noChangeAspect="1"/>
+          </p:cNvSpPr>
+          <p:nvPr>
+            <p:ph type="sldImg" idx="2"/>
+          </p:nvPr>
+        </p:nvSpPr>
+        <p:spPr>
+          <a:xfrm>
+            <a:off x="381000" y="685800"/>
+            <a:ext cx="6096000" cy="3429000"/>
+          </a:xfrm>
+          <a:custGeom>
+            <a:avLst/>
+            <a:gdLst/>
+            <a:ahLst/>
+            <a:cxnLst/>
+            <a:rect l="l" t="t" r="r" b="b"/>
+            <a:pathLst>
+              <a:path w="120000" h="120000" extrusionOk="0">
+                <a:moveTo>
+                  <a:pt x="0" y="0"/>
+                </a:moveTo>
+                <a:lnTo>
+                  <a:pt x="120000" y="0"/>
+                </a:lnTo>
+                <a:lnTo>
+                  <a:pt x="120000" y="120000"/>
+                </a:lnTo>
+                <a:lnTo>
+                  <a:pt x="0" y="120000"/>
+                </a:lnTo>
+                <a:close/>
+              </a:path>
+            </a:pathLst>
+          </a:custGeom>
+        </p:spPr>
+      </p:sp>
+      <p:sp>
+        <p:nvSpPr>
+          <p:cNvPr id="77" name="Google Shape;77;g338ac0a8b6_0_27:notes"/>
+          <p:cNvSpPr txBox="1">
+            <a:spLocks noGrp="1"/>
+          </p:cNvSpPr>
+          <p:nvPr>
+            <p:ph type="body" idx="1"/>
+          </p:nvPr>
+        </p:nvSpPr>
+        <p:spPr>
+          <a:xfrm>
+            <a:off x="685800" y="4343400"/>
+            <a:ext cx="5486400" cy="4114800"/>
+          </a:xfrm>
+          <a:prstGeom prst="rect">
+            <a:avLst/>
+          </a:prstGeom>
+        </p:spPr>
+        <p:txBody>
+          <a:bodyPr spcFirstLastPara="1" wrap="square" lIns="91425" tIns="91425" rIns="91425" bIns="91425" anchor="t" anchorCtr="0">
+            <a:noAutofit/>
+          </a:bodyPr>
+          <a:lstStyle/>
+          <a:p>
+            <a:pPr marL="0" lvl="0" indent="0" algn="l" rtl="0">
+              <a:spcBef>
+                <a:spcPts val="0"/>
+              </a:spcBef>
+              <a:spcAft>
+                <a:spcPts val="0"/>
+              </a:spcAft>
+              <a:buNone/>
+            </a:pPr>
+            <a:endParaRPr/>
+          </a:p>
+        </p:txBody>
+      </p:sp>
+    </p:spTree>
+    <p:extLst>
+      <p:ext uri="{BB962C8B-B14F-4D97-AF65-F5344CB8AC3E}">
+        <p14:creationId xmlns:p14="http://schemas.microsoft.com/office/powerpoint/2010/main" val="2809449390"/>
       </p:ext>
     </p:extLst>
   </p:cSld>
@@ -3002,6 +3229,769 @@
     <p:extLst>
       <p:ext uri="{BB962C8B-B14F-4D97-AF65-F5344CB8AC3E}">
         <p14:creationId xmlns:p14="http://schemas.microsoft.com/office/powerpoint/2010/main" val="4067105690"/>
+      </p:ext>
+    </p:extLst>
+  </p:cSld>
+  <p:clrMapOvr>
+    <a:masterClrMapping/>
+  </p:clrMapOvr>
+</p:notes>
+</file>
+
+<file path=ppt/notesSlides/notesSlide30.xml><?xml version="1.0" encoding="utf-8"?>
+<p:notes xmlns:a="http://schemas.openxmlformats.org/drawingml/2006/main" xmlns:r="http://schemas.openxmlformats.org/officeDocument/2006/relationships" xmlns:p="http://schemas.openxmlformats.org/presentationml/2006/main" showMasterSp="0" showMasterPhAnim="0">
+  <p:cSld>
+    <p:spTree>
+      <p:nvGrpSpPr>
+        <p:cNvPr id="1" name="Shape 75"/>
+        <p:cNvGrpSpPr/>
+        <p:nvPr/>
+      </p:nvGrpSpPr>
+      <p:grpSpPr>
+        <a:xfrm>
+          <a:off x="0" y="0"/>
+          <a:ext cx="0" cy="0"/>
+          <a:chOff x="0" y="0"/>
+          <a:chExt cx="0" cy="0"/>
+        </a:xfrm>
+      </p:grpSpPr>
+      <p:sp>
+        <p:nvSpPr>
+          <p:cNvPr id="76" name="Google Shape;76;g338ac0a8b6_0_27:notes"/>
+          <p:cNvSpPr>
+            <a:spLocks noGrp="1" noRot="1" noChangeAspect="1"/>
+          </p:cNvSpPr>
+          <p:nvPr>
+            <p:ph type="sldImg" idx="2"/>
+          </p:nvPr>
+        </p:nvSpPr>
+        <p:spPr>
+          <a:xfrm>
+            <a:off x="381000" y="685800"/>
+            <a:ext cx="6096000" cy="3429000"/>
+          </a:xfrm>
+          <a:custGeom>
+            <a:avLst/>
+            <a:gdLst/>
+            <a:ahLst/>
+            <a:cxnLst/>
+            <a:rect l="l" t="t" r="r" b="b"/>
+            <a:pathLst>
+              <a:path w="120000" h="120000" extrusionOk="0">
+                <a:moveTo>
+                  <a:pt x="0" y="0"/>
+                </a:moveTo>
+                <a:lnTo>
+                  <a:pt x="120000" y="0"/>
+                </a:lnTo>
+                <a:lnTo>
+                  <a:pt x="120000" y="120000"/>
+                </a:lnTo>
+                <a:lnTo>
+                  <a:pt x="0" y="120000"/>
+                </a:lnTo>
+                <a:close/>
+              </a:path>
+            </a:pathLst>
+          </a:custGeom>
+        </p:spPr>
+      </p:sp>
+      <p:sp>
+        <p:nvSpPr>
+          <p:cNvPr id="77" name="Google Shape;77;g338ac0a8b6_0_27:notes"/>
+          <p:cNvSpPr txBox="1">
+            <a:spLocks noGrp="1"/>
+          </p:cNvSpPr>
+          <p:nvPr>
+            <p:ph type="body" idx="1"/>
+          </p:nvPr>
+        </p:nvSpPr>
+        <p:spPr>
+          <a:xfrm>
+            <a:off x="685800" y="4343400"/>
+            <a:ext cx="5486400" cy="4114800"/>
+          </a:xfrm>
+          <a:prstGeom prst="rect">
+            <a:avLst/>
+          </a:prstGeom>
+        </p:spPr>
+        <p:txBody>
+          <a:bodyPr spcFirstLastPara="1" wrap="square" lIns="91425" tIns="91425" rIns="91425" bIns="91425" anchor="t" anchorCtr="0">
+            <a:noAutofit/>
+          </a:bodyPr>
+          <a:lstStyle/>
+          <a:p>
+            <a:pPr marL="0" lvl="0" indent="0" algn="l" rtl="0">
+              <a:spcBef>
+                <a:spcPts val="0"/>
+              </a:spcBef>
+              <a:spcAft>
+                <a:spcPts val="0"/>
+              </a:spcAft>
+              <a:buNone/>
+            </a:pPr>
+            <a:endParaRPr/>
+          </a:p>
+        </p:txBody>
+      </p:sp>
+    </p:spTree>
+    <p:extLst>
+      <p:ext uri="{BB962C8B-B14F-4D97-AF65-F5344CB8AC3E}">
+        <p14:creationId xmlns:p14="http://schemas.microsoft.com/office/powerpoint/2010/main" val="2888293655"/>
+      </p:ext>
+    </p:extLst>
+  </p:cSld>
+  <p:clrMapOvr>
+    <a:masterClrMapping/>
+  </p:clrMapOvr>
+</p:notes>
+</file>
+
+<file path=ppt/notesSlides/notesSlide31.xml><?xml version="1.0" encoding="utf-8"?>
+<p:notes xmlns:a="http://schemas.openxmlformats.org/drawingml/2006/main" xmlns:r="http://schemas.openxmlformats.org/officeDocument/2006/relationships" xmlns:p="http://schemas.openxmlformats.org/presentationml/2006/main" showMasterSp="0" showMasterPhAnim="0">
+  <p:cSld>
+    <p:spTree>
+      <p:nvGrpSpPr>
+        <p:cNvPr id="1" name="Shape 75"/>
+        <p:cNvGrpSpPr/>
+        <p:nvPr/>
+      </p:nvGrpSpPr>
+      <p:grpSpPr>
+        <a:xfrm>
+          <a:off x="0" y="0"/>
+          <a:ext cx="0" cy="0"/>
+          <a:chOff x="0" y="0"/>
+          <a:chExt cx="0" cy="0"/>
+        </a:xfrm>
+      </p:grpSpPr>
+      <p:sp>
+        <p:nvSpPr>
+          <p:cNvPr id="76" name="Google Shape;76;g338ac0a8b6_0_27:notes"/>
+          <p:cNvSpPr>
+            <a:spLocks noGrp="1" noRot="1" noChangeAspect="1"/>
+          </p:cNvSpPr>
+          <p:nvPr>
+            <p:ph type="sldImg" idx="2"/>
+          </p:nvPr>
+        </p:nvSpPr>
+        <p:spPr>
+          <a:xfrm>
+            <a:off x="381000" y="685800"/>
+            <a:ext cx="6096000" cy="3429000"/>
+          </a:xfrm>
+          <a:custGeom>
+            <a:avLst/>
+            <a:gdLst/>
+            <a:ahLst/>
+            <a:cxnLst/>
+            <a:rect l="l" t="t" r="r" b="b"/>
+            <a:pathLst>
+              <a:path w="120000" h="120000" extrusionOk="0">
+                <a:moveTo>
+                  <a:pt x="0" y="0"/>
+                </a:moveTo>
+                <a:lnTo>
+                  <a:pt x="120000" y="0"/>
+                </a:lnTo>
+                <a:lnTo>
+                  <a:pt x="120000" y="120000"/>
+                </a:lnTo>
+                <a:lnTo>
+                  <a:pt x="0" y="120000"/>
+                </a:lnTo>
+                <a:close/>
+              </a:path>
+            </a:pathLst>
+          </a:custGeom>
+        </p:spPr>
+      </p:sp>
+      <p:sp>
+        <p:nvSpPr>
+          <p:cNvPr id="77" name="Google Shape;77;g338ac0a8b6_0_27:notes"/>
+          <p:cNvSpPr txBox="1">
+            <a:spLocks noGrp="1"/>
+          </p:cNvSpPr>
+          <p:nvPr>
+            <p:ph type="body" idx="1"/>
+          </p:nvPr>
+        </p:nvSpPr>
+        <p:spPr>
+          <a:xfrm>
+            <a:off x="685800" y="4343400"/>
+            <a:ext cx="5486400" cy="4114800"/>
+          </a:xfrm>
+          <a:prstGeom prst="rect">
+            <a:avLst/>
+          </a:prstGeom>
+        </p:spPr>
+        <p:txBody>
+          <a:bodyPr spcFirstLastPara="1" wrap="square" lIns="91425" tIns="91425" rIns="91425" bIns="91425" anchor="t" anchorCtr="0">
+            <a:noAutofit/>
+          </a:bodyPr>
+          <a:lstStyle/>
+          <a:p>
+            <a:pPr marL="0" lvl="0" indent="0" algn="l" rtl="0">
+              <a:spcBef>
+                <a:spcPts val="0"/>
+              </a:spcBef>
+              <a:spcAft>
+                <a:spcPts val="0"/>
+              </a:spcAft>
+              <a:buNone/>
+            </a:pPr>
+            <a:endParaRPr/>
+          </a:p>
+        </p:txBody>
+      </p:sp>
+    </p:spTree>
+    <p:extLst>
+      <p:ext uri="{BB962C8B-B14F-4D97-AF65-F5344CB8AC3E}">
+        <p14:creationId xmlns:p14="http://schemas.microsoft.com/office/powerpoint/2010/main" val="3848069153"/>
+      </p:ext>
+    </p:extLst>
+  </p:cSld>
+  <p:clrMapOvr>
+    <a:masterClrMapping/>
+  </p:clrMapOvr>
+</p:notes>
+</file>
+
+<file path=ppt/notesSlides/notesSlide32.xml><?xml version="1.0" encoding="utf-8"?>
+<p:notes xmlns:a="http://schemas.openxmlformats.org/drawingml/2006/main" xmlns:r="http://schemas.openxmlformats.org/officeDocument/2006/relationships" xmlns:p="http://schemas.openxmlformats.org/presentationml/2006/main" showMasterSp="0" showMasterPhAnim="0">
+  <p:cSld>
+    <p:spTree>
+      <p:nvGrpSpPr>
+        <p:cNvPr id="1" name="Shape 75"/>
+        <p:cNvGrpSpPr/>
+        <p:nvPr/>
+      </p:nvGrpSpPr>
+      <p:grpSpPr>
+        <a:xfrm>
+          <a:off x="0" y="0"/>
+          <a:ext cx="0" cy="0"/>
+          <a:chOff x="0" y="0"/>
+          <a:chExt cx="0" cy="0"/>
+        </a:xfrm>
+      </p:grpSpPr>
+      <p:sp>
+        <p:nvSpPr>
+          <p:cNvPr id="76" name="Google Shape;76;g338ac0a8b6_0_27:notes"/>
+          <p:cNvSpPr>
+            <a:spLocks noGrp="1" noRot="1" noChangeAspect="1"/>
+          </p:cNvSpPr>
+          <p:nvPr>
+            <p:ph type="sldImg" idx="2"/>
+          </p:nvPr>
+        </p:nvSpPr>
+        <p:spPr>
+          <a:xfrm>
+            <a:off x="381000" y="685800"/>
+            <a:ext cx="6096000" cy="3429000"/>
+          </a:xfrm>
+          <a:custGeom>
+            <a:avLst/>
+            <a:gdLst/>
+            <a:ahLst/>
+            <a:cxnLst/>
+            <a:rect l="l" t="t" r="r" b="b"/>
+            <a:pathLst>
+              <a:path w="120000" h="120000" extrusionOk="0">
+                <a:moveTo>
+                  <a:pt x="0" y="0"/>
+                </a:moveTo>
+                <a:lnTo>
+                  <a:pt x="120000" y="0"/>
+                </a:lnTo>
+                <a:lnTo>
+                  <a:pt x="120000" y="120000"/>
+                </a:lnTo>
+                <a:lnTo>
+                  <a:pt x="0" y="120000"/>
+                </a:lnTo>
+                <a:close/>
+              </a:path>
+            </a:pathLst>
+          </a:custGeom>
+        </p:spPr>
+      </p:sp>
+      <p:sp>
+        <p:nvSpPr>
+          <p:cNvPr id="77" name="Google Shape;77;g338ac0a8b6_0_27:notes"/>
+          <p:cNvSpPr txBox="1">
+            <a:spLocks noGrp="1"/>
+          </p:cNvSpPr>
+          <p:nvPr>
+            <p:ph type="body" idx="1"/>
+          </p:nvPr>
+        </p:nvSpPr>
+        <p:spPr>
+          <a:xfrm>
+            <a:off x="685800" y="4343400"/>
+            <a:ext cx="5486400" cy="4114800"/>
+          </a:xfrm>
+          <a:prstGeom prst="rect">
+            <a:avLst/>
+          </a:prstGeom>
+        </p:spPr>
+        <p:txBody>
+          <a:bodyPr spcFirstLastPara="1" wrap="square" lIns="91425" tIns="91425" rIns="91425" bIns="91425" anchor="t" anchorCtr="0">
+            <a:noAutofit/>
+          </a:bodyPr>
+          <a:lstStyle/>
+          <a:p>
+            <a:pPr marL="0" lvl="0" indent="0" algn="l" rtl="0">
+              <a:spcBef>
+                <a:spcPts val="0"/>
+              </a:spcBef>
+              <a:spcAft>
+                <a:spcPts val="0"/>
+              </a:spcAft>
+              <a:buNone/>
+            </a:pPr>
+            <a:endParaRPr/>
+          </a:p>
+        </p:txBody>
+      </p:sp>
+    </p:spTree>
+    <p:extLst>
+      <p:ext uri="{BB962C8B-B14F-4D97-AF65-F5344CB8AC3E}">
+        <p14:creationId xmlns:p14="http://schemas.microsoft.com/office/powerpoint/2010/main" val="611730214"/>
+      </p:ext>
+    </p:extLst>
+  </p:cSld>
+  <p:clrMapOvr>
+    <a:masterClrMapping/>
+  </p:clrMapOvr>
+</p:notes>
+</file>
+
+<file path=ppt/notesSlides/notesSlide33.xml><?xml version="1.0" encoding="utf-8"?>
+<p:notes xmlns:a="http://schemas.openxmlformats.org/drawingml/2006/main" xmlns:r="http://schemas.openxmlformats.org/officeDocument/2006/relationships" xmlns:p="http://schemas.openxmlformats.org/presentationml/2006/main" showMasterSp="0" showMasterPhAnim="0">
+  <p:cSld>
+    <p:spTree>
+      <p:nvGrpSpPr>
+        <p:cNvPr id="1" name="Shape 75"/>
+        <p:cNvGrpSpPr/>
+        <p:nvPr/>
+      </p:nvGrpSpPr>
+      <p:grpSpPr>
+        <a:xfrm>
+          <a:off x="0" y="0"/>
+          <a:ext cx="0" cy="0"/>
+          <a:chOff x="0" y="0"/>
+          <a:chExt cx="0" cy="0"/>
+        </a:xfrm>
+      </p:grpSpPr>
+      <p:sp>
+        <p:nvSpPr>
+          <p:cNvPr id="76" name="Google Shape;76;g338ac0a8b6_0_27:notes"/>
+          <p:cNvSpPr>
+            <a:spLocks noGrp="1" noRot="1" noChangeAspect="1"/>
+          </p:cNvSpPr>
+          <p:nvPr>
+            <p:ph type="sldImg" idx="2"/>
+          </p:nvPr>
+        </p:nvSpPr>
+        <p:spPr>
+          <a:xfrm>
+            <a:off x="381000" y="685800"/>
+            <a:ext cx="6096000" cy="3429000"/>
+          </a:xfrm>
+          <a:custGeom>
+            <a:avLst/>
+            <a:gdLst/>
+            <a:ahLst/>
+            <a:cxnLst/>
+            <a:rect l="l" t="t" r="r" b="b"/>
+            <a:pathLst>
+              <a:path w="120000" h="120000" extrusionOk="0">
+                <a:moveTo>
+                  <a:pt x="0" y="0"/>
+                </a:moveTo>
+                <a:lnTo>
+                  <a:pt x="120000" y="0"/>
+                </a:lnTo>
+                <a:lnTo>
+                  <a:pt x="120000" y="120000"/>
+                </a:lnTo>
+                <a:lnTo>
+                  <a:pt x="0" y="120000"/>
+                </a:lnTo>
+                <a:close/>
+              </a:path>
+            </a:pathLst>
+          </a:custGeom>
+        </p:spPr>
+      </p:sp>
+      <p:sp>
+        <p:nvSpPr>
+          <p:cNvPr id="77" name="Google Shape;77;g338ac0a8b6_0_27:notes"/>
+          <p:cNvSpPr txBox="1">
+            <a:spLocks noGrp="1"/>
+          </p:cNvSpPr>
+          <p:nvPr>
+            <p:ph type="body" idx="1"/>
+          </p:nvPr>
+        </p:nvSpPr>
+        <p:spPr>
+          <a:xfrm>
+            <a:off x="685800" y="4343400"/>
+            <a:ext cx="5486400" cy="4114800"/>
+          </a:xfrm>
+          <a:prstGeom prst="rect">
+            <a:avLst/>
+          </a:prstGeom>
+        </p:spPr>
+        <p:txBody>
+          <a:bodyPr spcFirstLastPara="1" wrap="square" lIns="91425" tIns="91425" rIns="91425" bIns="91425" anchor="t" anchorCtr="0">
+            <a:noAutofit/>
+          </a:bodyPr>
+          <a:lstStyle/>
+          <a:p>
+            <a:pPr marL="0" lvl="0" indent="0" algn="l" rtl="0">
+              <a:spcBef>
+                <a:spcPts val="0"/>
+              </a:spcBef>
+              <a:spcAft>
+                <a:spcPts val="0"/>
+              </a:spcAft>
+              <a:buNone/>
+            </a:pPr>
+            <a:endParaRPr/>
+          </a:p>
+        </p:txBody>
+      </p:sp>
+    </p:spTree>
+    <p:extLst>
+      <p:ext uri="{BB962C8B-B14F-4D97-AF65-F5344CB8AC3E}">
+        <p14:creationId xmlns:p14="http://schemas.microsoft.com/office/powerpoint/2010/main" val="3317428041"/>
+      </p:ext>
+    </p:extLst>
+  </p:cSld>
+  <p:clrMapOvr>
+    <a:masterClrMapping/>
+  </p:clrMapOvr>
+</p:notes>
+</file>
+
+<file path=ppt/notesSlides/notesSlide34.xml><?xml version="1.0" encoding="utf-8"?>
+<p:notes xmlns:a="http://schemas.openxmlformats.org/drawingml/2006/main" xmlns:r="http://schemas.openxmlformats.org/officeDocument/2006/relationships" xmlns:p="http://schemas.openxmlformats.org/presentationml/2006/main" showMasterSp="0" showMasterPhAnim="0">
+  <p:cSld>
+    <p:spTree>
+      <p:nvGrpSpPr>
+        <p:cNvPr id="1" name="Shape 70"/>
+        <p:cNvGrpSpPr/>
+        <p:nvPr/>
+      </p:nvGrpSpPr>
+      <p:grpSpPr>
+        <a:xfrm>
+          <a:off x="0" y="0"/>
+          <a:ext cx="0" cy="0"/>
+          <a:chOff x="0" y="0"/>
+          <a:chExt cx="0" cy="0"/>
+        </a:xfrm>
+      </p:grpSpPr>
+      <p:sp>
+        <p:nvSpPr>
+          <p:cNvPr id="71" name="Google Shape;71;g338ac0a8b6_0_36:notes"/>
+          <p:cNvSpPr>
+            <a:spLocks noGrp="1" noRot="1" noChangeAspect="1"/>
+          </p:cNvSpPr>
+          <p:nvPr>
+            <p:ph type="sldImg" idx="2"/>
+          </p:nvPr>
+        </p:nvSpPr>
+        <p:spPr>
+          <a:xfrm>
+            <a:off x="381000" y="685800"/>
+            <a:ext cx="6096000" cy="3429000"/>
+          </a:xfrm>
+          <a:custGeom>
+            <a:avLst/>
+            <a:gdLst/>
+            <a:ahLst/>
+            <a:cxnLst/>
+            <a:rect l="l" t="t" r="r" b="b"/>
+            <a:pathLst>
+              <a:path w="120000" h="120000" extrusionOk="0">
+                <a:moveTo>
+                  <a:pt x="0" y="0"/>
+                </a:moveTo>
+                <a:lnTo>
+                  <a:pt x="120000" y="0"/>
+                </a:lnTo>
+                <a:lnTo>
+                  <a:pt x="120000" y="120000"/>
+                </a:lnTo>
+                <a:lnTo>
+                  <a:pt x="0" y="120000"/>
+                </a:lnTo>
+                <a:close/>
+              </a:path>
+            </a:pathLst>
+          </a:custGeom>
+        </p:spPr>
+      </p:sp>
+      <p:sp>
+        <p:nvSpPr>
+          <p:cNvPr id="72" name="Google Shape;72;g338ac0a8b6_0_36:notes"/>
+          <p:cNvSpPr txBox="1">
+            <a:spLocks noGrp="1"/>
+          </p:cNvSpPr>
+          <p:nvPr>
+            <p:ph type="body" idx="1"/>
+          </p:nvPr>
+        </p:nvSpPr>
+        <p:spPr>
+          <a:xfrm>
+            <a:off x="685800" y="4343400"/>
+            <a:ext cx="5486400" cy="4114800"/>
+          </a:xfrm>
+          <a:prstGeom prst="rect">
+            <a:avLst/>
+          </a:prstGeom>
+        </p:spPr>
+        <p:txBody>
+          <a:bodyPr spcFirstLastPara="1" wrap="square" lIns="91425" tIns="91425" rIns="91425" bIns="91425" anchor="t" anchorCtr="0">
+            <a:noAutofit/>
+          </a:bodyPr>
+          <a:lstStyle/>
+          <a:p>
+            <a:pPr marL="0" lvl="0" indent="0" algn="l" rtl="0">
+              <a:spcBef>
+                <a:spcPts val="0"/>
+              </a:spcBef>
+              <a:spcAft>
+                <a:spcPts val="0"/>
+              </a:spcAft>
+              <a:buNone/>
+            </a:pPr>
+            <a:endParaRPr/>
+          </a:p>
+        </p:txBody>
+      </p:sp>
+    </p:spTree>
+    <p:extLst>
+      <p:ext uri="{BB962C8B-B14F-4D97-AF65-F5344CB8AC3E}">
+        <p14:creationId xmlns:p14="http://schemas.microsoft.com/office/powerpoint/2010/main" val="1767170695"/>
+      </p:ext>
+    </p:extLst>
+  </p:cSld>
+  <p:clrMapOvr>
+    <a:masterClrMapping/>
+  </p:clrMapOvr>
+</p:notes>
+</file>
+
+<file path=ppt/notesSlides/notesSlide35.xml><?xml version="1.0" encoding="utf-8"?>
+<p:notes xmlns:a="http://schemas.openxmlformats.org/drawingml/2006/main" xmlns:r="http://schemas.openxmlformats.org/officeDocument/2006/relationships" xmlns:p="http://schemas.openxmlformats.org/presentationml/2006/main" showMasterSp="0" showMasterPhAnim="0">
+  <p:cSld>
+    <p:spTree>
+      <p:nvGrpSpPr>
+        <p:cNvPr id="1" name="Shape 92"/>
+        <p:cNvGrpSpPr/>
+        <p:nvPr/>
+      </p:nvGrpSpPr>
+      <p:grpSpPr>
+        <a:xfrm>
+          <a:off x="0" y="0"/>
+          <a:ext cx="0" cy="0"/>
+          <a:chOff x="0" y="0"/>
+          <a:chExt cx="0" cy="0"/>
+        </a:xfrm>
+      </p:grpSpPr>
+      <p:sp>
+        <p:nvSpPr>
+          <p:cNvPr id="93" name="Google Shape;93;g338ac0a8b6_0_72:notes"/>
+          <p:cNvSpPr>
+            <a:spLocks noGrp="1" noRot="1" noChangeAspect="1"/>
+          </p:cNvSpPr>
+          <p:nvPr>
+            <p:ph type="sldImg" idx="2"/>
+          </p:nvPr>
+        </p:nvSpPr>
+        <p:spPr>
+          <a:xfrm>
+            <a:off x="381000" y="685800"/>
+            <a:ext cx="6096000" cy="3429000"/>
+          </a:xfrm>
+          <a:custGeom>
+            <a:avLst/>
+            <a:gdLst/>
+            <a:ahLst/>
+            <a:cxnLst/>
+            <a:rect l="l" t="t" r="r" b="b"/>
+            <a:pathLst>
+              <a:path w="120000" h="120000" extrusionOk="0">
+                <a:moveTo>
+                  <a:pt x="0" y="0"/>
+                </a:moveTo>
+                <a:lnTo>
+                  <a:pt x="120000" y="0"/>
+                </a:lnTo>
+                <a:lnTo>
+                  <a:pt x="120000" y="120000"/>
+                </a:lnTo>
+                <a:lnTo>
+                  <a:pt x="0" y="120000"/>
+                </a:lnTo>
+                <a:close/>
+              </a:path>
+            </a:pathLst>
+          </a:custGeom>
+        </p:spPr>
+      </p:sp>
+      <p:sp>
+        <p:nvSpPr>
+          <p:cNvPr id="94" name="Google Shape;94;g338ac0a8b6_0_72:notes"/>
+          <p:cNvSpPr txBox="1">
+            <a:spLocks noGrp="1"/>
+          </p:cNvSpPr>
+          <p:nvPr>
+            <p:ph type="body" idx="1"/>
+          </p:nvPr>
+        </p:nvSpPr>
+        <p:spPr>
+          <a:xfrm>
+            <a:off x="685800" y="4343400"/>
+            <a:ext cx="5486400" cy="4114800"/>
+          </a:xfrm>
+          <a:prstGeom prst="rect">
+            <a:avLst/>
+          </a:prstGeom>
+        </p:spPr>
+        <p:txBody>
+          <a:bodyPr spcFirstLastPara="1" wrap="square" lIns="91425" tIns="91425" rIns="91425" bIns="91425" anchor="t" anchorCtr="0">
+            <a:noAutofit/>
+          </a:bodyPr>
+          <a:lstStyle/>
+          <a:p>
+            <a:pPr marL="0" lvl="0" indent="0" algn="l" rtl="0">
+              <a:spcBef>
+                <a:spcPts val="0"/>
+              </a:spcBef>
+              <a:spcAft>
+                <a:spcPts val="0"/>
+              </a:spcAft>
+              <a:buNone/>
+            </a:pPr>
+            <a:endParaRPr/>
+          </a:p>
+        </p:txBody>
+      </p:sp>
+    </p:spTree>
+    <p:extLst>
+      <p:ext uri="{BB962C8B-B14F-4D97-AF65-F5344CB8AC3E}">
+        <p14:creationId xmlns:p14="http://schemas.microsoft.com/office/powerpoint/2010/main" val="174481297"/>
+      </p:ext>
+    </p:extLst>
+  </p:cSld>
+  <p:clrMapOvr>
+    <a:masterClrMapping/>
+  </p:clrMapOvr>
+</p:notes>
+</file>
+
+<file path=ppt/notesSlides/notesSlide36.xml><?xml version="1.0" encoding="utf-8"?>
+<p:notes xmlns:a="http://schemas.openxmlformats.org/drawingml/2006/main" xmlns:r="http://schemas.openxmlformats.org/officeDocument/2006/relationships" xmlns:p="http://schemas.openxmlformats.org/presentationml/2006/main" showMasterSp="0" showMasterPhAnim="0">
+  <p:cSld>
+    <p:spTree>
+      <p:nvGrpSpPr>
+        <p:cNvPr id="1" name="Shape 47"/>
+        <p:cNvGrpSpPr/>
+        <p:nvPr/>
+      </p:nvGrpSpPr>
+      <p:grpSpPr>
+        <a:xfrm>
+          <a:off x="0" y="0"/>
+          <a:ext cx="0" cy="0"/>
+          <a:chOff x="0" y="0"/>
+          <a:chExt cx="0" cy="0"/>
+        </a:xfrm>
+      </p:grpSpPr>
+      <p:sp>
+        <p:nvSpPr>
+          <p:cNvPr id="48" name="Google Shape;48;g401c104a3c_0_0:notes"/>
+          <p:cNvSpPr>
+            <a:spLocks noGrp="1" noRot="1" noChangeAspect="1"/>
+          </p:cNvSpPr>
+          <p:nvPr>
+            <p:ph type="sldImg" idx="2"/>
+          </p:nvPr>
+        </p:nvSpPr>
+        <p:spPr>
+          <a:xfrm>
+            <a:off x="381000" y="685800"/>
+            <a:ext cx="6096000" cy="3429000"/>
+          </a:xfrm>
+          <a:custGeom>
+            <a:avLst/>
+            <a:gdLst/>
+            <a:ahLst/>
+            <a:cxnLst/>
+            <a:rect l="l" t="t" r="r" b="b"/>
+            <a:pathLst>
+              <a:path w="120000" h="120000" extrusionOk="0">
+                <a:moveTo>
+                  <a:pt x="0" y="0"/>
+                </a:moveTo>
+                <a:lnTo>
+                  <a:pt x="120000" y="0"/>
+                </a:lnTo>
+                <a:lnTo>
+                  <a:pt x="120000" y="120000"/>
+                </a:lnTo>
+                <a:lnTo>
+                  <a:pt x="0" y="120000"/>
+                </a:lnTo>
+                <a:close/>
+              </a:path>
+            </a:pathLst>
+          </a:custGeom>
+        </p:spPr>
+      </p:sp>
+      <p:sp>
+        <p:nvSpPr>
+          <p:cNvPr id="49" name="Google Shape;49;g401c104a3c_0_0:notes"/>
+          <p:cNvSpPr txBox="1">
+            <a:spLocks noGrp="1"/>
+          </p:cNvSpPr>
+          <p:nvPr>
+            <p:ph type="body" idx="1"/>
+          </p:nvPr>
+        </p:nvSpPr>
+        <p:spPr>
+          <a:xfrm>
+            <a:off x="685800" y="4343400"/>
+            <a:ext cx="5486400" cy="4114800"/>
+          </a:xfrm>
+          <a:prstGeom prst="rect">
+            <a:avLst/>
+          </a:prstGeom>
+        </p:spPr>
+        <p:txBody>
+          <a:bodyPr spcFirstLastPara="1" wrap="square" lIns="91425" tIns="91425" rIns="91425" bIns="91425" anchor="t" anchorCtr="0">
+            <a:noAutofit/>
+          </a:bodyPr>
+          <a:lstStyle/>
+          <a:p>
+            <a:pPr marL="0" lvl="0" indent="0" algn="l" rtl="0">
+              <a:spcBef>
+                <a:spcPts val="0"/>
+              </a:spcBef>
+              <a:spcAft>
+                <a:spcPts val="0"/>
+              </a:spcAft>
+              <a:buNone/>
+            </a:pPr>
+            <a:endParaRPr/>
+          </a:p>
+        </p:txBody>
+      </p:sp>
+    </p:spTree>
+    <p:extLst>
+      <p:ext uri="{BB962C8B-B14F-4D97-AF65-F5344CB8AC3E}">
+        <p14:creationId xmlns:p14="http://schemas.microsoft.com/office/powerpoint/2010/main" val="1048227667"/>
       </p:ext>
     </p:extLst>
   </p:cSld>
@@ -7241,19 +8231,7 @@
                 <a:cs typeface="Roboto"/>
                 <a:sym typeface="Roboto"/>
               </a:rPr>
-              <a:t>Docker là công cụ bậc cao cho phép người dùng dễ dàng quản lý container runtime sử dụng dòng </a:t>
-            </a:r>
-            <a:r>
-              <a:rPr lang="en-US" smtClean="0">
-                <a:solidFill>
-                  <a:srgbClr val="666666"/>
-                </a:solidFill>
-                <a:latin typeface="Roboto"/>
-                <a:ea typeface="Roboto"/>
-                <a:cs typeface="Roboto"/>
-                <a:sym typeface="Roboto"/>
-              </a:rPr>
-              <a:t>lệnh</a:t>
+              <a:t>Docker là công cụ bậc cao cho phép người dùng dễ dàng quản lý container runtime sử dụng dòng lệnh</a:t>
             </a:r>
           </a:p>
           <a:p>
@@ -7271,7 +8249,7 @@
                   <a:srgbClr val="666666"/>
                 </a:solidFill>
               </a:rPr>
-              <a:t>Docker được dùng với containerd</a:t>
+              <a:t>Containerd là runtime của Docker</a:t>
             </a:r>
             <a:endParaRPr>
               <a:solidFill>
@@ -8047,6 +9025,13 @@
   <p:clrMapOvr>
     <a:masterClrMapping/>
   </p:clrMapOvr>
+  <p:timing>
+    <p:tnLst>
+      <p:par>
+        <p:cTn id="1" dur="indefinite" restart="never" nodeType="tmRoot"/>
+      </p:par>
+    </p:tnLst>
+  </p:timing>
 </p:sld>
 </file>
 
@@ -8133,8 +9118,8 @@
         </p:blipFill>
         <p:spPr bwMode="auto">
           <a:xfrm>
-            <a:off x="1637326" y="1213918"/>
-            <a:ext cx="6010383" cy="3380841"/>
+            <a:off x="811417" y="1223750"/>
+            <a:ext cx="6503784" cy="3658379"/>
           </a:xfrm>
           <a:prstGeom prst="rect">
             <a:avLst/>
@@ -8161,6 +9146,13 @@
   <p:clrMapOvr>
     <a:masterClrMapping/>
   </p:clrMapOvr>
+  <p:timing>
+    <p:tnLst>
+      <p:par>
+        <p:cTn id="1" dur="indefinite" restart="never" nodeType="tmRoot"/>
+      </p:par>
+    </p:tnLst>
+  </p:timing>
 </p:sld>
 </file>
 
@@ -8209,6 +9201,696 @@
             <a:pPr lvl="0"/>
             <a:r>
               <a:rPr lang="en-US" smtClean="0"/>
+              <a:t>Kubernetes Overviews</a:t>
+            </a:r>
+            <a:endParaRPr>
+              <a:latin typeface="Roboto Medium"/>
+              <a:ea typeface="Roboto Medium"/>
+              <a:cs typeface="Roboto Medium"/>
+              <a:sym typeface="Roboto Medium"/>
+            </a:endParaRPr>
+          </a:p>
+        </p:txBody>
+      </p:sp>
+    </p:spTree>
+    <p:extLst>
+      <p:ext uri="{BB962C8B-B14F-4D97-AF65-F5344CB8AC3E}">
+        <p14:creationId xmlns:p14="http://schemas.microsoft.com/office/powerpoint/2010/main" val="4132879285"/>
+      </p:ext>
+    </p:extLst>
+  </p:cSld>
+  <p:clrMapOvr>
+    <a:masterClrMapping/>
+  </p:clrMapOvr>
+  <p:timing>
+    <p:tnLst>
+      <p:par>
+        <p:cTn id="1" dur="indefinite" restart="never" nodeType="tmRoot"/>
+      </p:par>
+    </p:tnLst>
+  </p:timing>
+</p:sld>
+</file>
+
+<file path=ppt/slides/slide16.xml><?xml version="1.0" encoding="utf-8"?>
+<p:sld xmlns:a="http://schemas.openxmlformats.org/drawingml/2006/main" xmlns:r="http://schemas.openxmlformats.org/officeDocument/2006/relationships" xmlns:p="http://schemas.openxmlformats.org/presentationml/2006/main">
+  <p:cSld>
+    <p:spTree>
+      <p:nvGrpSpPr>
+        <p:cNvPr id="1" name="Shape 78"/>
+        <p:cNvGrpSpPr/>
+        <p:nvPr/>
+      </p:nvGrpSpPr>
+      <p:grpSpPr>
+        <a:xfrm>
+          <a:off x="0" y="0"/>
+          <a:ext cx="0" cy="0"/>
+          <a:chOff x="0" y="0"/>
+          <a:chExt cx="0" cy="0"/>
+        </a:xfrm>
+      </p:grpSpPr>
+      <p:sp>
+        <p:nvSpPr>
+          <p:cNvPr id="79" name="Google Shape;79;p16"/>
+          <p:cNvSpPr txBox="1">
+            <a:spLocks noGrp="1"/>
+          </p:cNvSpPr>
+          <p:nvPr>
+            <p:ph type="title"/>
+          </p:nvPr>
+        </p:nvSpPr>
+        <p:spPr>
+          <a:xfrm>
+            <a:off x="311700" y="292625"/>
+            <a:ext cx="8520600" cy="572700"/>
+          </a:xfrm>
+          <a:prstGeom prst="rect">
+            <a:avLst/>
+          </a:prstGeom>
+        </p:spPr>
+        <p:txBody>
+          <a:bodyPr spcFirstLastPara="1" wrap="square" lIns="91425" tIns="91425" rIns="91425" bIns="91425" anchor="t" anchorCtr="0">
+            <a:noAutofit/>
+          </a:bodyPr>
+          <a:lstStyle/>
+          <a:p>
+            <a:pPr marL="0" lvl="0" indent="0" algn="l" rtl="0">
+              <a:spcBef>
+                <a:spcPts val="0"/>
+              </a:spcBef>
+              <a:spcAft>
+                <a:spcPts val="0"/>
+              </a:spcAft>
+              <a:buNone/>
+            </a:pPr>
+            <a:r>
+              <a:rPr lang="en" smtClean="0"/>
+              <a:t>What is Kubernetes</a:t>
+            </a:r>
+            <a:endParaRPr>
+              <a:latin typeface="Roboto Medium"/>
+              <a:ea typeface="Roboto Medium"/>
+              <a:cs typeface="Roboto Medium"/>
+              <a:sym typeface="Roboto Medium"/>
+            </a:endParaRPr>
+          </a:p>
+        </p:txBody>
+      </p:sp>
+      <p:sp>
+        <p:nvSpPr>
+          <p:cNvPr id="80" name="Google Shape;80;p16"/>
+          <p:cNvSpPr txBox="1">
+            <a:spLocks noGrp="1"/>
+          </p:cNvSpPr>
+          <p:nvPr>
+            <p:ph type="body" idx="1"/>
+          </p:nvPr>
+        </p:nvSpPr>
+        <p:spPr>
+          <a:xfrm>
+            <a:off x="311700" y="1283840"/>
+            <a:ext cx="6457400" cy="3554860"/>
+          </a:xfrm>
+          <a:prstGeom prst="rect">
+            <a:avLst/>
+          </a:prstGeom>
+        </p:spPr>
+        <p:txBody>
+          <a:bodyPr spcFirstLastPara="1" wrap="square" lIns="91425" tIns="91425" rIns="91425" bIns="91425" anchor="t" anchorCtr="0">
+            <a:noAutofit/>
+          </a:bodyPr>
+          <a:lstStyle/>
+          <a:p>
+            <a:pPr lvl="0">
+              <a:spcAft>
+                <a:spcPts val="600"/>
+              </a:spcAft>
+              <a:buClr>
+                <a:srgbClr val="666666"/>
+              </a:buClr>
+            </a:pPr>
+            <a:r>
+              <a:rPr lang="en-US" smtClean="0">
+                <a:solidFill>
+                  <a:srgbClr val="666666"/>
+                </a:solidFill>
+              </a:rPr>
+              <a:t>Triển khai container, scale các container, cung cấp chức năng loadbalance và route traffic đến chúng</a:t>
+            </a:r>
+          </a:p>
+          <a:p>
+            <a:pPr lvl="0">
+              <a:spcAft>
+                <a:spcPts val="600"/>
+              </a:spcAft>
+              <a:buClr>
+                <a:srgbClr val="666666"/>
+              </a:buClr>
+            </a:pPr>
+            <a:r>
+              <a:rPr lang="en-US">
+                <a:solidFill>
+                  <a:srgbClr val="666666"/>
+                </a:solidFill>
+              </a:rPr>
+              <a:t>Kubernetes cluster có thể nằm trên on-premise, public, private, </a:t>
+            </a:r>
+            <a:r>
+              <a:rPr lang="en-US" smtClean="0">
+                <a:solidFill>
+                  <a:srgbClr val="666666"/>
+                </a:solidFill>
+              </a:rPr>
+              <a:t>hoặc </a:t>
+            </a:r>
+            <a:r>
+              <a:rPr lang="en-US">
+                <a:solidFill>
+                  <a:srgbClr val="666666"/>
+                </a:solidFill>
+              </a:rPr>
+              <a:t>hybrid clouds</a:t>
+            </a:r>
+          </a:p>
+          <a:p>
+            <a:pPr lvl="0">
+              <a:spcAft>
+                <a:spcPts val="600"/>
+              </a:spcAft>
+              <a:buClr>
+                <a:srgbClr val="666666"/>
+              </a:buClr>
+            </a:pPr>
+            <a:r>
+              <a:rPr lang="en-US" smtClean="0">
+                <a:solidFill>
+                  <a:srgbClr val="666666"/>
+                </a:solidFill>
+              </a:rPr>
+              <a:t>Open Sources, được tạo bởi Google</a:t>
+            </a:r>
+          </a:p>
+          <a:p>
+            <a:pPr lvl="0">
+              <a:spcAft>
+                <a:spcPts val="600"/>
+              </a:spcAft>
+              <a:buClr>
+                <a:srgbClr val="666666"/>
+              </a:buClr>
+            </a:pPr>
+            <a:endParaRPr lang="en-US"/>
+          </a:p>
+        </p:txBody>
+      </p:sp>
+    </p:spTree>
+    <p:extLst>
+      <p:ext uri="{BB962C8B-B14F-4D97-AF65-F5344CB8AC3E}">
+        <p14:creationId xmlns:p14="http://schemas.microsoft.com/office/powerpoint/2010/main" val="3742896171"/>
+      </p:ext>
+    </p:extLst>
+  </p:cSld>
+  <p:clrMapOvr>
+    <a:masterClrMapping/>
+  </p:clrMapOvr>
+  <p:timing>
+    <p:tnLst>
+      <p:par>
+        <p:cTn id="1" dur="indefinite" restart="never" nodeType="tmRoot"/>
+      </p:par>
+    </p:tnLst>
+  </p:timing>
+</p:sld>
+</file>
+
+<file path=ppt/slides/slide17.xml><?xml version="1.0" encoding="utf-8"?>
+<p:sld xmlns:a="http://schemas.openxmlformats.org/drawingml/2006/main" xmlns:r="http://schemas.openxmlformats.org/officeDocument/2006/relationships" xmlns:p="http://schemas.openxmlformats.org/presentationml/2006/main">
+  <p:cSld>
+    <p:spTree>
+      <p:nvGrpSpPr>
+        <p:cNvPr id="1" name="Shape 78"/>
+        <p:cNvGrpSpPr/>
+        <p:nvPr/>
+      </p:nvGrpSpPr>
+      <p:grpSpPr>
+        <a:xfrm>
+          <a:off x="0" y="0"/>
+          <a:ext cx="0" cy="0"/>
+          <a:chOff x="0" y="0"/>
+          <a:chExt cx="0" cy="0"/>
+        </a:xfrm>
+      </p:grpSpPr>
+      <p:sp>
+        <p:nvSpPr>
+          <p:cNvPr id="79" name="Google Shape;79;p16"/>
+          <p:cNvSpPr txBox="1">
+            <a:spLocks noGrp="1"/>
+          </p:cNvSpPr>
+          <p:nvPr>
+            <p:ph type="title"/>
+          </p:nvPr>
+        </p:nvSpPr>
+        <p:spPr>
+          <a:xfrm>
+            <a:off x="311700" y="292625"/>
+            <a:ext cx="8520600" cy="572700"/>
+          </a:xfrm>
+          <a:prstGeom prst="rect">
+            <a:avLst/>
+          </a:prstGeom>
+        </p:spPr>
+        <p:txBody>
+          <a:bodyPr spcFirstLastPara="1" wrap="square" lIns="91425" tIns="91425" rIns="91425" bIns="91425" anchor="t" anchorCtr="0">
+            <a:noAutofit/>
+          </a:bodyPr>
+          <a:lstStyle/>
+          <a:p>
+            <a:pPr lvl="0"/>
+            <a:r>
+              <a:rPr lang="en-US" smtClean="0"/>
+              <a:t>Các lựa chọn cài đặt</a:t>
+            </a:r>
+            <a:endParaRPr>
+              <a:latin typeface="Roboto Medium"/>
+              <a:ea typeface="Roboto Medium"/>
+              <a:cs typeface="Roboto Medium"/>
+              <a:sym typeface="Roboto Medium"/>
+            </a:endParaRPr>
+          </a:p>
+        </p:txBody>
+      </p:sp>
+      <p:sp>
+        <p:nvSpPr>
+          <p:cNvPr id="80" name="Google Shape;80;p16"/>
+          <p:cNvSpPr txBox="1">
+            <a:spLocks noGrp="1"/>
+          </p:cNvSpPr>
+          <p:nvPr>
+            <p:ph type="body" idx="1"/>
+          </p:nvPr>
+        </p:nvSpPr>
+        <p:spPr>
+          <a:xfrm>
+            <a:off x="311700" y="1283840"/>
+            <a:ext cx="6457400" cy="3554860"/>
+          </a:xfrm>
+          <a:prstGeom prst="rect">
+            <a:avLst/>
+          </a:prstGeom>
+        </p:spPr>
+        <p:txBody>
+          <a:bodyPr spcFirstLastPara="1" wrap="square" lIns="91425" tIns="91425" rIns="91425" bIns="91425" anchor="t" anchorCtr="0">
+            <a:noAutofit/>
+          </a:bodyPr>
+          <a:lstStyle/>
+          <a:p>
+            <a:pPr lvl="0">
+              <a:spcAft>
+                <a:spcPts val="600"/>
+              </a:spcAft>
+              <a:buClr>
+                <a:srgbClr val="666666"/>
+              </a:buClr>
+            </a:pPr>
+            <a:r>
+              <a:rPr lang="en-US" smtClean="0">
+                <a:solidFill>
+                  <a:srgbClr val="666666"/>
+                </a:solidFill>
+              </a:rPr>
+              <a:t>Minikube (local work station)</a:t>
+            </a:r>
+          </a:p>
+          <a:p>
+            <a:pPr lvl="0">
+              <a:spcAft>
+                <a:spcPts val="600"/>
+              </a:spcAft>
+              <a:buClr>
+                <a:srgbClr val="666666"/>
+              </a:buClr>
+            </a:pPr>
+            <a:r>
+              <a:rPr lang="en-US" smtClean="0"/>
+              <a:t>Installers (on-prem, hybrid cloud, custom)</a:t>
+            </a:r>
+            <a:endParaRPr lang="en-US"/>
+          </a:p>
+          <a:p>
+            <a:pPr lvl="1">
+              <a:spcBef>
+                <a:spcPts val="0"/>
+              </a:spcBef>
+              <a:spcAft>
+                <a:spcPts val="600"/>
+              </a:spcAft>
+              <a:buClr>
+                <a:srgbClr val="666666"/>
+              </a:buClr>
+            </a:pPr>
+            <a:r>
+              <a:rPr lang="en-US" sz="1600" smtClean="0"/>
+              <a:t>Kubeadm (official installer)</a:t>
+            </a:r>
+          </a:p>
+          <a:p>
+            <a:pPr lvl="1">
+              <a:spcBef>
+                <a:spcPts val="0"/>
+              </a:spcBef>
+              <a:spcAft>
+                <a:spcPts val="600"/>
+              </a:spcAft>
+              <a:buClr>
+                <a:srgbClr val="666666"/>
+              </a:buClr>
+            </a:pPr>
+            <a:r>
+              <a:rPr lang="en-US" sz="1600" smtClean="0"/>
+              <a:t>Kubespray (Ansible)</a:t>
+            </a:r>
+          </a:p>
+          <a:p>
+            <a:pPr lvl="1">
+              <a:spcBef>
+                <a:spcPts val="0"/>
+              </a:spcBef>
+              <a:spcAft>
+                <a:spcPts val="600"/>
+              </a:spcAft>
+              <a:buClr>
+                <a:srgbClr val="666666"/>
+              </a:buClr>
+            </a:pPr>
+            <a:r>
+              <a:rPr lang="en-US" sz="1600" smtClean="0"/>
+              <a:t>Kops</a:t>
+            </a:r>
+          </a:p>
+          <a:p>
+            <a:pPr>
+              <a:spcAft>
+                <a:spcPts val="600"/>
+              </a:spcAft>
+              <a:buClr>
+                <a:srgbClr val="666666"/>
+              </a:buClr>
+            </a:pPr>
+            <a:r>
+              <a:rPr lang="en-US" smtClean="0"/>
+              <a:t>Cloud</a:t>
+            </a:r>
+          </a:p>
+          <a:p>
+            <a:pPr lvl="1">
+              <a:spcBef>
+                <a:spcPts val="0"/>
+              </a:spcBef>
+              <a:buClr>
+                <a:srgbClr val="666666"/>
+              </a:buClr>
+            </a:pPr>
+            <a:r>
+              <a:rPr lang="en-US" sz="1600"/>
+              <a:t>Google Container </a:t>
+            </a:r>
+            <a:r>
+              <a:rPr lang="en-US" sz="1600" smtClean="0"/>
+              <a:t>Engine (GKE)</a:t>
+            </a:r>
+          </a:p>
+          <a:p>
+            <a:pPr lvl="1">
+              <a:spcBef>
+                <a:spcPts val="0"/>
+              </a:spcBef>
+              <a:buClr>
+                <a:srgbClr val="666666"/>
+              </a:buClr>
+            </a:pPr>
+            <a:r>
+              <a:rPr lang="en-US" sz="1600" smtClean="0"/>
+              <a:t>Azure Container Service</a:t>
+            </a:r>
+          </a:p>
+          <a:p>
+            <a:pPr lvl="1">
+              <a:spcBef>
+                <a:spcPts val="0"/>
+              </a:spcBef>
+              <a:buClr>
+                <a:srgbClr val="666666"/>
+              </a:buClr>
+            </a:pPr>
+            <a:r>
+              <a:rPr lang="en-US" sz="1600" smtClean="0"/>
+              <a:t>Amazon EKS</a:t>
+            </a:r>
+            <a:endParaRPr lang="en-US" sz="1600"/>
+          </a:p>
+          <a:p>
+            <a:pPr lvl="1">
+              <a:spcAft>
+                <a:spcPts val="600"/>
+              </a:spcAft>
+              <a:buClr>
+                <a:srgbClr val="666666"/>
+              </a:buClr>
+            </a:pPr>
+            <a:endParaRPr lang="en-US" smtClean="0"/>
+          </a:p>
+        </p:txBody>
+      </p:sp>
+    </p:spTree>
+    <p:extLst>
+      <p:ext uri="{BB962C8B-B14F-4D97-AF65-F5344CB8AC3E}">
+        <p14:creationId xmlns:p14="http://schemas.microsoft.com/office/powerpoint/2010/main" val="759900831"/>
+      </p:ext>
+    </p:extLst>
+  </p:cSld>
+  <p:clrMapOvr>
+    <a:masterClrMapping/>
+  </p:clrMapOvr>
+  <p:timing>
+    <p:tnLst>
+      <p:par>
+        <p:cTn id="1" dur="indefinite" restart="never" nodeType="tmRoot"/>
+      </p:par>
+    </p:tnLst>
+  </p:timing>
+</p:sld>
+</file>
+
+<file path=ppt/slides/slide18.xml><?xml version="1.0" encoding="utf-8"?>
+<p:sld xmlns:a="http://schemas.openxmlformats.org/drawingml/2006/main" xmlns:r="http://schemas.openxmlformats.org/officeDocument/2006/relationships" xmlns:p="http://schemas.openxmlformats.org/presentationml/2006/main">
+  <p:cSld>
+    <p:spTree>
+      <p:nvGrpSpPr>
+        <p:cNvPr id="1" name="Shape 78"/>
+        <p:cNvGrpSpPr/>
+        <p:nvPr/>
+      </p:nvGrpSpPr>
+      <p:grpSpPr>
+        <a:xfrm>
+          <a:off x="0" y="0"/>
+          <a:ext cx="0" cy="0"/>
+          <a:chOff x="0" y="0"/>
+          <a:chExt cx="0" cy="0"/>
+        </a:xfrm>
+      </p:grpSpPr>
+      <p:sp>
+        <p:nvSpPr>
+          <p:cNvPr id="79" name="Google Shape;79;p16"/>
+          <p:cNvSpPr txBox="1">
+            <a:spLocks noGrp="1"/>
+          </p:cNvSpPr>
+          <p:nvPr>
+            <p:ph type="title"/>
+          </p:nvPr>
+        </p:nvSpPr>
+        <p:spPr>
+          <a:xfrm>
+            <a:off x="311700" y="292625"/>
+            <a:ext cx="8520600" cy="572700"/>
+          </a:xfrm>
+          <a:prstGeom prst="rect">
+            <a:avLst/>
+          </a:prstGeom>
+        </p:spPr>
+        <p:txBody>
+          <a:bodyPr spcFirstLastPara="1" wrap="square" lIns="91425" tIns="91425" rIns="91425" bIns="91425" anchor="t" anchorCtr="0">
+            <a:noAutofit/>
+          </a:bodyPr>
+          <a:lstStyle/>
+          <a:p>
+            <a:pPr marL="0" lvl="0" indent="0" algn="l" rtl="0">
+              <a:spcBef>
+                <a:spcPts val="0"/>
+              </a:spcBef>
+              <a:spcAft>
+                <a:spcPts val="0"/>
+              </a:spcAft>
+              <a:buNone/>
+            </a:pPr>
+            <a:r>
+              <a:rPr lang="en" smtClean="0"/>
+              <a:t>Container deployment</a:t>
+            </a:r>
+            <a:endParaRPr>
+              <a:latin typeface="Roboto Medium"/>
+              <a:ea typeface="Roboto Medium"/>
+              <a:cs typeface="Roboto Medium"/>
+              <a:sym typeface="Roboto Medium"/>
+            </a:endParaRPr>
+          </a:p>
+        </p:txBody>
+      </p:sp>
+      <p:sp>
+        <p:nvSpPr>
+          <p:cNvPr id="80" name="Google Shape;80;p16"/>
+          <p:cNvSpPr txBox="1">
+            <a:spLocks noGrp="1"/>
+          </p:cNvSpPr>
+          <p:nvPr>
+            <p:ph type="body" idx="1"/>
+          </p:nvPr>
+        </p:nvSpPr>
+        <p:spPr>
+          <a:xfrm>
+            <a:off x="311700" y="1283840"/>
+            <a:ext cx="6457400" cy="3554860"/>
+          </a:xfrm>
+          <a:prstGeom prst="rect">
+            <a:avLst/>
+          </a:prstGeom>
+        </p:spPr>
+        <p:txBody>
+          <a:bodyPr spcFirstLastPara="1" wrap="square" lIns="91425" tIns="91425" rIns="91425" bIns="91425" anchor="t" anchorCtr="0">
+            <a:noAutofit/>
+          </a:bodyPr>
+          <a:lstStyle/>
+          <a:p>
+            <a:pPr lvl="0">
+              <a:spcAft>
+                <a:spcPts val="600"/>
+              </a:spcAft>
+              <a:buClr>
+                <a:srgbClr val="666666"/>
+              </a:buClr>
+            </a:pPr>
+            <a:r>
+              <a:rPr lang="en-US" smtClean="0"/>
+              <a:t>Kubectl </a:t>
+            </a:r>
+            <a:r>
+              <a:rPr lang="en-US"/>
+              <a:t>&amp; ~/.</a:t>
+            </a:r>
+            <a:r>
+              <a:rPr lang="en-US" smtClean="0"/>
+              <a:t>kube/config</a:t>
+            </a:r>
+          </a:p>
+          <a:p>
+            <a:pPr lvl="0">
+              <a:spcAft>
+                <a:spcPts val="600"/>
+              </a:spcAft>
+              <a:buClr>
+                <a:srgbClr val="666666"/>
+              </a:buClr>
+            </a:pPr>
+            <a:r>
+              <a:rPr lang="en-US" smtClean="0"/>
+              <a:t>Minikube CLI</a:t>
+            </a:r>
+          </a:p>
+          <a:p>
+            <a:pPr lvl="0">
+              <a:spcAft>
+                <a:spcPts val="600"/>
+              </a:spcAft>
+              <a:buClr>
+                <a:srgbClr val="666666"/>
+              </a:buClr>
+            </a:pPr>
+            <a:r>
+              <a:rPr lang="en-US" smtClean="0"/>
+              <a:t>CI System</a:t>
+            </a:r>
+            <a:endParaRPr lang="en-US"/>
+          </a:p>
+        </p:txBody>
+      </p:sp>
+    </p:spTree>
+    <p:extLst>
+      <p:ext uri="{BB962C8B-B14F-4D97-AF65-F5344CB8AC3E}">
+        <p14:creationId xmlns:p14="http://schemas.microsoft.com/office/powerpoint/2010/main" val="1582400425"/>
+      </p:ext>
+    </p:extLst>
+  </p:cSld>
+  <p:clrMapOvr>
+    <a:masterClrMapping/>
+  </p:clrMapOvr>
+  <p:timing>
+    <p:tnLst>
+      <p:par>
+        <p:cTn id="1" dur="indefinite" restart="never" nodeType="tmRoot"/>
+      </p:par>
+    </p:tnLst>
+  </p:timing>
+</p:sld>
+</file>
+
+<file path=ppt/slides/slide19.xml><?xml version="1.0" encoding="utf-8"?>
+<p:sld xmlns:a="http://schemas.openxmlformats.org/drawingml/2006/main" xmlns:r="http://schemas.openxmlformats.org/officeDocument/2006/relationships" xmlns:p="http://schemas.openxmlformats.org/presentationml/2006/main">
+  <p:cSld>
+    <p:spTree>
+      <p:nvGrpSpPr>
+        <p:cNvPr id="1" name="Shape 73"/>
+        <p:cNvGrpSpPr/>
+        <p:nvPr/>
+      </p:nvGrpSpPr>
+      <p:grpSpPr>
+        <a:xfrm>
+          <a:off x="0" y="0"/>
+          <a:ext cx="0" cy="0"/>
+          <a:chOff x="0" y="0"/>
+          <a:chExt cx="0" cy="0"/>
+        </a:xfrm>
+      </p:grpSpPr>
+      <p:sp>
+        <p:nvSpPr>
+          <p:cNvPr id="74" name="Google Shape;74;p15"/>
+          <p:cNvSpPr txBox="1">
+            <a:spLocks noGrp="1"/>
+          </p:cNvSpPr>
+          <p:nvPr>
+            <p:ph type="title"/>
+          </p:nvPr>
+        </p:nvSpPr>
+        <p:spPr>
+          <a:xfrm>
+            <a:off x="418000" y="1791025"/>
+            <a:ext cx="5093400" cy="2001900"/>
+          </a:xfrm>
+          <a:prstGeom prst="rect">
+            <a:avLst/>
+          </a:prstGeom>
+        </p:spPr>
+        <p:txBody>
+          <a:bodyPr spcFirstLastPara="1" wrap="square" lIns="91425" tIns="91425" rIns="91425" bIns="91425" anchor="t" anchorCtr="0">
+            <a:noAutofit/>
+          </a:bodyPr>
+          <a:lstStyle/>
+          <a:p>
+            <a:pPr lvl="0"/>
+            <a:r>
+              <a:rPr lang="en-US"/>
+              <a:t>Kubernetes </a:t>
+            </a:r>
+            <a:r>
+              <a:rPr lang="en-US" smtClean="0"/>
               <a:t>Architecture</a:t>
             </a:r>
             <a:endParaRPr>
@@ -8240,7 +9922,91 @@
 </p:sld>
 </file>
 
-<file path=ppt/slides/slide16.xml><?xml version="1.0" encoding="utf-8"?>
+<file path=ppt/slides/slide2.xml><?xml version="1.0" encoding="utf-8"?>
+<p:sld xmlns:a="http://schemas.openxmlformats.org/drawingml/2006/main" xmlns:r="http://schemas.openxmlformats.org/officeDocument/2006/relationships" xmlns:p="http://schemas.openxmlformats.org/presentationml/2006/main">
+  <p:cSld>
+    <p:spTree>
+      <p:nvGrpSpPr>
+        <p:cNvPr id="1" name="Shape 73"/>
+        <p:cNvGrpSpPr/>
+        <p:nvPr/>
+      </p:nvGrpSpPr>
+      <p:grpSpPr>
+        <a:xfrm>
+          <a:off x="0" y="0"/>
+          <a:ext cx="0" cy="0"/>
+          <a:chOff x="0" y="0"/>
+          <a:chExt cx="0" cy="0"/>
+        </a:xfrm>
+      </p:grpSpPr>
+      <p:sp>
+        <p:nvSpPr>
+          <p:cNvPr id="74" name="Google Shape;74;p15"/>
+          <p:cNvSpPr txBox="1">
+            <a:spLocks noGrp="1"/>
+          </p:cNvSpPr>
+          <p:nvPr>
+            <p:ph type="title"/>
+          </p:nvPr>
+        </p:nvSpPr>
+        <p:spPr>
+          <a:xfrm>
+            <a:off x="418000" y="1791025"/>
+            <a:ext cx="5093400" cy="2001900"/>
+          </a:xfrm>
+          <a:prstGeom prst="rect">
+            <a:avLst/>
+          </a:prstGeom>
+        </p:spPr>
+        <p:txBody>
+          <a:bodyPr spcFirstLastPara="1" wrap="square" lIns="91425" tIns="91425" rIns="91425" bIns="91425" anchor="t" anchorCtr="0">
+            <a:noAutofit/>
+          </a:bodyPr>
+          <a:lstStyle/>
+          <a:p>
+            <a:pPr marL="0" lvl="0" indent="0" algn="l" rtl="0">
+              <a:spcBef>
+                <a:spcPts val="0"/>
+              </a:spcBef>
+              <a:spcAft>
+                <a:spcPts val="0"/>
+              </a:spcAft>
+              <a:buNone/>
+            </a:pPr>
+            <a:r>
+              <a:rPr lang="en" smtClean="0"/>
+              <a:t>Container</a:t>
+            </a:r>
+            <a:endParaRPr>
+              <a:latin typeface="Roboto Medium"/>
+              <a:ea typeface="Roboto Medium"/>
+              <a:cs typeface="Roboto Medium"/>
+              <a:sym typeface="Roboto Medium"/>
+            </a:endParaRPr>
+          </a:p>
+        </p:txBody>
+      </p:sp>
+    </p:spTree>
+    <p:extLst>
+      <p:ext uri="{BB962C8B-B14F-4D97-AF65-F5344CB8AC3E}">
+        <p14:creationId xmlns:p14="http://schemas.microsoft.com/office/powerpoint/2010/main" val="3728832963"/>
+      </p:ext>
+    </p:extLst>
+  </p:cSld>
+  <p:clrMapOvr>
+    <a:masterClrMapping/>
+  </p:clrMapOvr>
+  <p:timing>
+    <p:tnLst>
+      <p:par>
+        <p:cTn id="1" dur="indefinite" restart="never" nodeType="tmRoot"/>
+      </p:par>
+    </p:tnLst>
+  </p:timing>
+</p:sld>
+</file>
+
+<file path=ppt/slides/slide20.xml><?xml version="1.0" encoding="utf-8"?>
 <p:sld xmlns:a="http://schemas.openxmlformats.org/drawingml/2006/main" xmlns:r="http://schemas.openxmlformats.org/officeDocument/2006/relationships" xmlns:p="http://schemas.openxmlformats.org/presentationml/2006/main">
   <p:cSld>
     <p:spTree>
@@ -8629,7 +10395,7 @@
 </p:sld>
 </file>
 
-<file path=ppt/slides/slide17.xml><?xml version="1.0" encoding="utf-8"?>
+<file path=ppt/slides/slide21.xml><?xml version="1.0" encoding="utf-8"?>
 <p:sld xmlns:a="http://schemas.openxmlformats.org/drawingml/2006/main" xmlns:r="http://schemas.openxmlformats.org/officeDocument/2006/relationships" xmlns:p="http://schemas.openxmlformats.org/presentationml/2006/main">
   <p:cSld>
     <p:spTree>
@@ -9704,7 +11470,7 @@
 </p:sld>
 </file>
 
-<file path=ppt/slides/slide18.xml><?xml version="1.0" encoding="utf-8"?>
+<file path=ppt/slides/slide22.xml><?xml version="1.0" encoding="utf-8"?>
 <p:sld xmlns:a="http://schemas.openxmlformats.org/drawingml/2006/main" xmlns:r="http://schemas.openxmlformats.org/officeDocument/2006/relationships" xmlns:p="http://schemas.openxmlformats.org/presentationml/2006/main">
   <p:cSld>
     <p:spTree>
@@ -10726,7 +12492,7 @@
 </p:sld>
 </file>
 
-<file path=ppt/slides/slide19.xml><?xml version="1.0" encoding="utf-8"?>
+<file path=ppt/slides/slide23.xml><?xml version="1.0" encoding="utf-8"?>
 <p:sld xmlns:a="http://schemas.openxmlformats.org/drawingml/2006/main" xmlns:r="http://schemas.openxmlformats.org/officeDocument/2006/relationships" xmlns:p="http://schemas.openxmlformats.org/presentationml/2006/main">
   <p:cSld>
     <p:spTree>
@@ -10784,26 +12550,43 @@
       </p:sp>
       <p:pic>
         <p:nvPicPr>
-          <p:cNvPr id="25" name="Picture 24"/>
+          <p:cNvPr id="1026" name="Picture 2" descr="https://res.cloudinary.com/dukp6c7f7/image/upload/f_auto,fl_lossy,q_auto/s3-ghost/2016/06/o7leok.png"/>
           <p:cNvPicPr>
-            <a:picLocks noChangeAspect="1"/>
+            <a:picLocks noChangeAspect="1" noChangeArrowheads="1"/>
           </p:cNvPicPr>
           <p:nvPr/>
         </p:nvPicPr>
         <p:blipFill>
-          <a:blip r:embed="rId3"/>
+          <a:blip r:embed="rId3">
+            <a:extLst>
+              <a:ext uri="{28A0092B-C50C-407E-A947-70E740481C1C}">
+                <a14:useLocalDpi xmlns:a14="http://schemas.microsoft.com/office/drawing/2010/main" val="0"/>
+              </a:ext>
+            </a:extLst>
+          </a:blip>
+          <a:srcRect/>
           <a:stretch>
             <a:fillRect/>
           </a:stretch>
         </p:blipFill>
-        <p:spPr>
+        <p:spPr bwMode="auto">
           <a:xfrm>
-            <a:off x="894556" y="1252077"/>
-            <a:ext cx="7354887" cy="3404060"/>
+            <a:off x="1469204" y="1306273"/>
+            <a:ext cx="5825447" cy="3750153"/>
           </a:xfrm>
           <a:prstGeom prst="rect">
             <a:avLst/>
           </a:prstGeom>
+          <a:noFill/>
+          <a:extLst>
+            <a:ext uri="{909E8E84-426E-40DD-AFC4-6F175D3DCCD1}">
+              <a14:hiddenFill xmlns:a14="http://schemas.microsoft.com/office/drawing/2010/main">
+                <a:solidFill>
+                  <a:srgbClr val="FFFFFF"/>
+                </a:solidFill>
+              </a14:hiddenFill>
+            </a:ext>
+          </a:extLst>
         </p:spPr>
       </p:pic>
     </p:spTree>
@@ -10826,91 +12609,7 @@
 </p:sld>
 </file>
 
-<file path=ppt/slides/slide2.xml><?xml version="1.0" encoding="utf-8"?>
-<p:sld xmlns:a="http://schemas.openxmlformats.org/drawingml/2006/main" xmlns:r="http://schemas.openxmlformats.org/officeDocument/2006/relationships" xmlns:p="http://schemas.openxmlformats.org/presentationml/2006/main">
-  <p:cSld>
-    <p:spTree>
-      <p:nvGrpSpPr>
-        <p:cNvPr id="1" name="Shape 73"/>
-        <p:cNvGrpSpPr/>
-        <p:nvPr/>
-      </p:nvGrpSpPr>
-      <p:grpSpPr>
-        <a:xfrm>
-          <a:off x="0" y="0"/>
-          <a:ext cx="0" cy="0"/>
-          <a:chOff x="0" y="0"/>
-          <a:chExt cx="0" cy="0"/>
-        </a:xfrm>
-      </p:grpSpPr>
-      <p:sp>
-        <p:nvSpPr>
-          <p:cNvPr id="74" name="Google Shape;74;p15"/>
-          <p:cNvSpPr txBox="1">
-            <a:spLocks noGrp="1"/>
-          </p:cNvSpPr>
-          <p:nvPr>
-            <p:ph type="title"/>
-          </p:nvPr>
-        </p:nvSpPr>
-        <p:spPr>
-          <a:xfrm>
-            <a:off x="418000" y="1791025"/>
-            <a:ext cx="5093400" cy="2001900"/>
-          </a:xfrm>
-          <a:prstGeom prst="rect">
-            <a:avLst/>
-          </a:prstGeom>
-        </p:spPr>
-        <p:txBody>
-          <a:bodyPr spcFirstLastPara="1" wrap="square" lIns="91425" tIns="91425" rIns="91425" bIns="91425" anchor="t" anchorCtr="0">
-            <a:noAutofit/>
-          </a:bodyPr>
-          <a:lstStyle/>
-          <a:p>
-            <a:pPr marL="0" lvl="0" indent="0" algn="l" rtl="0">
-              <a:spcBef>
-                <a:spcPts val="0"/>
-              </a:spcBef>
-              <a:spcAft>
-                <a:spcPts val="0"/>
-              </a:spcAft>
-              <a:buNone/>
-            </a:pPr>
-            <a:r>
-              <a:rPr lang="en" smtClean="0"/>
-              <a:t>Container</a:t>
-            </a:r>
-            <a:endParaRPr>
-              <a:latin typeface="Roboto Medium"/>
-              <a:ea typeface="Roboto Medium"/>
-              <a:cs typeface="Roboto Medium"/>
-              <a:sym typeface="Roboto Medium"/>
-            </a:endParaRPr>
-          </a:p>
-        </p:txBody>
-      </p:sp>
-    </p:spTree>
-    <p:extLst>
-      <p:ext uri="{BB962C8B-B14F-4D97-AF65-F5344CB8AC3E}">
-        <p14:creationId xmlns:p14="http://schemas.microsoft.com/office/powerpoint/2010/main" val="3728832963"/>
-      </p:ext>
-    </p:extLst>
-  </p:cSld>
-  <p:clrMapOvr>
-    <a:masterClrMapping/>
-  </p:clrMapOvr>
-  <p:timing>
-    <p:tnLst>
-      <p:par>
-        <p:cTn id="1" dur="indefinite" restart="never" nodeType="tmRoot"/>
-      </p:par>
-    </p:tnLst>
-  </p:timing>
-</p:sld>
-</file>
-
-<file path=ppt/slides/slide20.xml><?xml version="1.0" encoding="utf-8"?>
+<file path=ppt/slides/slide24.xml><?xml version="1.0" encoding="utf-8"?>
 <p:sld xmlns:a="http://schemas.openxmlformats.org/drawingml/2006/main" xmlns:r="http://schemas.openxmlformats.org/officeDocument/2006/relationships" xmlns:p="http://schemas.openxmlformats.org/presentationml/2006/main">
   <p:cSld>
     <p:spTree>
@@ -10955,7 +12654,7 @@
             <a:pPr lvl="0"/>
             <a:r>
               <a:rPr lang="en-US" smtClean="0"/>
-              <a:t>Kubernetes resources</a:t>
+              <a:t>Kubernetes Resources</a:t>
             </a:r>
             <a:endParaRPr>
               <a:latin typeface="Roboto Medium"/>
@@ -10986,7 +12685,7 @@
 </p:sld>
 </file>
 
-<file path=ppt/slides/slide21.xml><?xml version="1.0" encoding="utf-8"?>
+<file path=ppt/slides/slide25.xml><?xml version="1.0" encoding="utf-8"?>
 <p:sld xmlns:a="http://schemas.openxmlformats.org/drawingml/2006/main" xmlns:r="http://schemas.openxmlformats.org/officeDocument/2006/relationships" xmlns:p="http://schemas.openxmlformats.org/presentationml/2006/main">
   <p:cSld>
     <p:spTree>
@@ -11064,8 +12763,8 @@
         </p:blipFill>
         <p:spPr>
           <a:xfrm>
-            <a:off x="1213702" y="1363146"/>
-            <a:ext cx="1323646" cy="1282282"/>
+            <a:off x="1056388" y="1422142"/>
+            <a:ext cx="1097280" cy="1062989"/>
           </a:xfrm>
           <a:prstGeom prst="rect">
             <a:avLst/>
@@ -11094,8 +12793,8 @@
         </p:blipFill>
         <p:spPr>
           <a:xfrm>
-            <a:off x="6424681" y="1363146"/>
-            <a:ext cx="1323646" cy="1282282"/>
+            <a:off x="5004680" y="1422140"/>
+            <a:ext cx="1097280" cy="1062990"/>
           </a:xfrm>
           <a:prstGeom prst="rect">
             <a:avLst/>
@@ -11124,8 +12823,8 @@
         </p:blipFill>
         <p:spPr>
           <a:xfrm>
-            <a:off x="6417693" y="3390105"/>
-            <a:ext cx="1330634" cy="1289051"/>
+            <a:off x="2990102" y="3449099"/>
+            <a:ext cx="1097280" cy="1062990"/>
           </a:xfrm>
           <a:prstGeom prst="rect">
             <a:avLst/>
@@ -11154,8 +12853,8 @@
         </p:blipFill>
         <p:spPr>
           <a:xfrm>
-            <a:off x="3858618" y="1363146"/>
-            <a:ext cx="1323645" cy="1282282"/>
+            <a:off x="2990102" y="1422140"/>
+            <a:ext cx="1097280" cy="1062991"/>
           </a:xfrm>
           <a:prstGeom prst="rect">
             <a:avLst/>
@@ -11223,8 +12922,8 @@
         </p:blipFill>
         <p:spPr>
           <a:xfrm>
-            <a:off x="3906684" y="3390105"/>
-            <a:ext cx="1330632" cy="1289050"/>
+            <a:off x="1056388" y="3449099"/>
+            <a:ext cx="1097280" cy="1062990"/>
           </a:xfrm>
           <a:prstGeom prst="rect">
             <a:avLst/>
@@ -11253,8 +12952,68 @@
         </p:blipFill>
         <p:spPr>
           <a:xfrm>
-            <a:off x="1213702" y="3390105"/>
-            <a:ext cx="1330632" cy="1289050"/>
+            <a:off x="6925694" y="1422140"/>
+            <a:ext cx="1097280" cy="1062990"/>
+          </a:xfrm>
+          <a:prstGeom prst="rect">
+            <a:avLst/>
+          </a:prstGeom>
+        </p:spPr>
+      </p:pic>
+      <p:pic>
+        <p:nvPicPr>
+          <p:cNvPr id="2" name="Picture 1"/>
+          <p:cNvPicPr>
+            <a:picLocks noChangeAspect="1"/>
+          </p:cNvPicPr>
+          <p:nvPr/>
+        </p:nvPicPr>
+        <p:blipFill>
+          <a:blip r:embed="rId9">
+            <a:extLst>
+              <a:ext uri="{28A0092B-C50C-407E-A947-70E740481C1C}">
+                <a14:useLocalDpi xmlns:a14="http://schemas.microsoft.com/office/drawing/2010/main" val="0"/>
+              </a:ext>
+            </a:extLst>
+          </a:blip>
+          <a:stretch>
+            <a:fillRect/>
+          </a:stretch>
+        </p:blipFill>
+        <p:spPr>
+          <a:xfrm>
+            <a:off x="5004680" y="3449099"/>
+            <a:ext cx="1097280" cy="1062990"/>
+          </a:xfrm>
+          <a:prstGeom prst="rect">
+            <a:avLst/>
+          </a:prstGeom>
+        </p:spPr>
+      </p:pic>
+      <p:pic>
+        <p:nvPicPr>
+          <p:cNvPr id="3" name="Picture 2"/>
+          <p:cNvPicPr>
+            <a:picLocks noChangeAspect="1"/>
+          </p:cNvPicPr>
+          <p:nvPr/>
+        </p:nvPicPr>
+        <p:blipFill>
+          <a:blip r:embed="rId10">
+            <a:extLst>
+              <a:ext uri="{28A0092B-C50C-407E-A947-70E740481C1C}">
+                <a14:useLocalDpi xmlns:a14="http://schemas.microsoft.com/office/drawing/2010/main" val="0"/>
+              </a:ext>
+            </a:extLst>
+          </a:blip>
+          <a:stretch>
+            <a:fillRect/>
+          </a:stretch>
+        </p:blipFill>
+        <p:spPr>
+          <a:xfrm>
+            <a:off x="6925694" y="3449099"/>
+            <a:ext cx="1097280" cy="1062990"/>
           </a:xfrm>
           <a:prstGeom prst="rect">
             <a:avLst/>
@@ -11271,10 +13030,17 @@
   <p:clrMapOvr>
     <a:masterClrMapping/>
   </p:clrMapOvr>
+  <p:timing>
+    <p:tnLst>
+      <p:par>
+        <p:cTn id="1" dur="indefinite" restart="never" nodeType="tmRoot"/>
+      </p:par>
+    </p:tnLst>
+  </p:timing>
 </p:sld>
 </file>
 
-<file path=ppt/slides/slide22.xml><?xml version="1.0" encoding="utf-8"?>
+<file path=ppt/slides/slide26.xml><?xml version="1.0" encoding="utf-8"?>
 <p:sld xmlns:a="http://schemas.openxmlformats.org/drawingml/2006/main" xmlns:r="http://schemas.openxmlformats.org/officeDocument/2006/relationships" xmlns:p="http://schemas.openxmlformats.org/presentationml/2006/main">
   <p:cSld>
     <p:spTree>
@@ -11394,7 +13160,31 @@
                   <a:srgbClr val="666666"/>
                 </a:solidFill>
               </a:rPr>
-              <a:t>Các containers chia sẻ địa chỉ ip</a:t>
+              <a:t>Các containers chia sẻ </a:t>
+            </a:r>
+            <a:r>
+              <a:rPr lang="en-US" smtClean="0">
+                <a:solidFill>
+                  <a:srgbClr val="666666"/>
+                </a:solidFill>
+              </a:rPr>
+              <a:t>cùng địa </a:t>
+            </a:r>
+            <a:r>
+              <a:rPr lang="en-US" smtClean="0">
+                <a:solidFill>
+                  <a:srgbClr val="666666"/>
+                </a:solidFill>
+              </a:rPr>
+              <a:t>chỉ </a:t>
+            </a:r>
+            <a:r>
+              <a:rPr lang="en-US" smtClean="0">
+                <a:solidFill>
+                  <a:srgbClr val="666666"/>
+                </a:solidFill>
+              </a:rPr>
+              <a:t>IP</a:t>
             </a:r>
             <a:endParaRPr>
               <a:solidFill>
@@ -11448,10 +13238,17 @@
   <p:clrMapOvr>
     <a:masterClrMapping/>
   </p:clrMapOvr>
+  <p:timing>
+    <p:tnLst>
+      <p:par>
+        <p:cTn id="1" dur="indefinite" restart="never" nodeType="tmRoot"/>
+      </p:par>
+    </p:tnLst>
+  </p:timing>
 </p:sld>
 </file>
 
-<file path=ppt/slides/slide23.xml><?xml version="1.0" encoding="utf-8"?>
+<file path=ppt/slides/slide27.xml><?xml version="1.0" encoding="utf-8"?>
 <p:sld xmlns:a="http://schemas.openxmlformats.org/drawingml/2006/main" xmlns:r="http://schemas.openxmlformats.org/officeDocument/2006/relationships" xmlns:p="http://schemas.openxmlformats.org/presentationml/2006/main">
   <p:cSld>
     <p:spTree>
@@ -11694,7 +13491,7 @@
 </p:sld>
 </file>
 
-<file path=ppt/slides/slide24.xml><?xml version="1.0" encoding="utf-8"?>
+<file path=ppt/slides/slide28.xml><?xml version="1.0" encoding="utf-8"?>
 <p:sld xmlns:a="http://schemas.openxmlformats.org/drawingml/2006/main" xmlns:r="http://schemas.openxmlformats.org/officeDocument/2006/relationships" xmlns:p="http://schemas.openxmlformats.org/presentationml/2006/main">
   <p:cSld>
     <p:spTree>
@@ -11913,7 +13710,7 @@
 </p:sld>
 </file>
 
-<file path=ppt/slides/slide25.xml><?xml version="1.0" encoding="utf-8"?>
+<file path=ppt/slides/slide29.xml><?xml version="1.0" encoding="utf-8"?>
 <p:sld xmlns:a="http://schemas.openxmlformats.org/drawingml/2006/main" xmlns:r="http://schemas.openxmlformats.org/officeDocument/2006/relationships" xmlns:p="http://schemas.openxmlformats.org/presentationml/2006/main">
   <p:cSld>
     <p:spTree>
@@ -12112,368 +13909,6 @@
 </p:sld>
 </file>
 
-<file path=ppt/slides/slide26.xml><?xml version="1.0" encoding="utf-8"?>
-<p:sld xmlns:a="http://schemas.openxmlformats.org/drawingml/2006/main" xmlns:r="http://schemas.openxmlformats.org/officeDocument/2006/relationships" xmlns:p="http://schemas.openxmlformats.org/presentationml/2006/main">
-  <p:cSld>
-    <p:spTree>
-      <p:nvGrpSpPr>
-        <p:cNvPr id="1" name="Shape 78"/>
-        <p:cNvGrpSpPr/>
-        <p:nvPr/>
-      </p:nvGrpSpPr>
-      <p:grpSpPr>
-        <a:xfrm>
-          <a:off x="0" y="0"/>
-          <a:ext cx="0" cy="0"/>
-          <a:chOff x="0" y="0"/>
-          <a:chExt cx="0" cy="0"/>
-        </a:xfrm>
-      </p:grpSpPr>
-      <p:sp>
-        <p:nvSpPr>
-          <p:cNvPr id="79" name="Google Shape;79;p16"/>
-          <p:cNvSpPr txBox="1">
-            <a:spLocks noGrp="1"/>
-          </p:cNvSpPr>
-          <p:nvPr>
-            <p:ph type="title"/>
-          </p:nvPr>
-        </p:nvSpPr>
-        <p:spPr>
-          <a:xfrm>
-            <a:off x="311700" y="292625"/>
-            <a:ext cx="8520600" cy="572700"/>
-          </a:xfrm>
-          <a:prstGeom prst="rect">
-            <a:avLst/>
-          </a:prstGeom>
-        </p:spPr>
-        <p:txBody>
-          <a:bodyPr spcFirstLastPara="1" wrap="square" lIns="91425" tIns="91425" rIns="91425" bIns="91425" anchor="t" anchorCtr="0">
-            <a:noAutofit/>
-          </a:bodyPr>
-          <a:lstStyle/>
-          <a:p>
-            <a:pPr marL="0" lvl="0" indent="0" algn="l" rtl="0">
-              <a:spcBef>
-                <a:spcPts val="0"/>
-              </a:spcBef>
-              <a:spcAft>
-                <a:spcPts val="0"/>
-              </a:spcAft>
-              <a:buNone/>
-            </a:pPr>
-            <a:r>
-              <a:rPr lang="en" smtClean="0">
-                <a:latin typeface="Roboto Medium"/>
-                <a:ea typeface="Roboto Medium"/>
-                <a:cs typeface="Roboto Medium"/>
-                <a:sym typeface="Roboto Medium"/>
-              </a:rPr>
-              <a:t>Ingress</a:t>
-            </a:r>
-            <a:endParaRPr>
-              <a:latin typeface="Roboto Medium"/>
-              <a:ea typeface="Roboto Medium"/>
-              <a:cs typeface="Roboto Medium"/>
-              <a:sym typeface="Roboto Medium"/>
-            </a:endParaRPr>
-          </a:p>
-        </p:txBody>
-      </p:sp>
-      <p:sp>
-        <p:nvSpPr>
-          <p:cNvPr id="80" name="Google Shape;80;p16"/>
-          <p:cNvSpPr txBox="1">
-            <a:spLocks noGrp="1"/>
-          </p:cNvSpPr>
-          <p:nvPr>
-            <p:ph type="body" idx="1"/>
-          </p:nvPr>
-        </p:nvSpPr>
-        <p:spPr>
-          <a:xfrm>
-            <a:off x="311700" y="1283840"/>
-            <a:ext cx="4374600" cy="3431035"/>
-          </a:xfrm>
-          <a:prstGeom prst="rect">
-            <a:avLst/>
-          </a:prstGeom>
-        </p:spPr>
-        <p:txBody>
-          <a:bodyPr spcFirstLastPara="1" wrap="square" lIns="91425" tIns="91425" rIns="91425" bIns="91425" anchor="t" anchorCtr="0">
-            <a:noAutofit/>
-          </a:bodyPr>
-          <a:lstStyle/>
-          <a:p>
-            <a:pPr lvl="0">
-              <a:buClr>
-                <a:srgbClr val="666666"/>
-              </a:buClr>
-            </a:pPr>
-            <a:r>
-              <a:rPr lang="en-US" smtClean="0">
-                <a:solidFill>
-                  <a:srgbClr val="666666"/>
-                </a:solidFill>
-              </a:rPr>
-              <a:t>Quản lý các kết nối từ bên ngoài đến các services trong cluster, thông thường là HTTP</a:t>
-            </a:r>
-          </a:p>
-          <a:p>
-            <a:pPr lvl="0">
-              <a:buClr>
-                <a:srgbClr val="666666"/>
-              </a:buClr>
-            </a:pPr>
-            <a:r>
-              <a:rPr lang="en-US" smtClean="0">
-                <a:solidFill>
-                  <a:srgbClr val="666666"/>
-                </a:solidFill>
-              </a:rPr>
-              <a:t>Smart router cho phép route đến các service khác nhau dựa trên tên miền trên tất các kết nối trên cùng một port</a:t>
-            </a:r>
-          </a:p>
-          <a:p>
-            <a:pPr lvl="0">
-              <a:buClr>
-                <a:srgbClr val="666666"/>
-              </a:buClr>
-            </a:pPr>
-            <a:r>
-              <a:rPr lang="en-US" smtClean="0">
-                <a:solidFill>
-                  <a:srgbClr val="666666"/>
-                </a:solidFill>
-              </a:rPr>
-              <a:t>Có thể cung cấp SSL termination và loadbalancing</a:t>
-            </a:r>
-          </a:p>
-          <a:p>
-            <a:pPr lvl="0">
-              <a:buClr>
-                <a:srgbClr val="666666"/>
-              </a:buClr>
-            </a:pPr>
-            <a:endParaRPr>
-              <a:solidFill>
-                <a:srgbClr val="666666"/>
-              </a:solidFill>
-              <a:latin typeface="Roboto"/>
-              <a:ea typeface="Roboto"/>
-              <a:cs typeface="Roboto"/>
-              <a:sym typeface="Roboto"/>
-            </a:endParaRPr>
-          </a:p>
-        </p:txBody>
-      </p:sp>
-      <p:pic>
-        <p:nvPicPr>
-          <p:cNvPr id="2" name="Picture 1"/>
-          <p:cNvPicPr>
-            <a:picLocks noChangeAspect="1"/>
-          </p:cNvPicPr>
-          <p:nvPr/>
-        </p:nvPicPr>
-        <p:blipFill>
-          <a:blip r:embed="rId3">
-            <a:extLst>
-              <a:ext uri="{28A0092B-C50C-407E-A947-70E740481C1C}">
-                <a14:useLocalDpi xmlns:a14="http://schemas.microsoft.com/office/drawing/2010/main" val="0"/>
-              </a:ext>
-            </a:extLst>
-          </a:blip>
-          <a:stretch>
-            <a:fillRect/>
-          </a:stretch>
-        </p:blipFill>
-        <p:spPr>
-          <a:xfrm>
-            <a:off x="5178508" y="1283840"/>
-            <a:ext cx="3469595" cy="3231010"/>
-          </a:xfrm>
-          <a:prstGeom prst="rect">
-            <a:avLst/>
-          </a:prstGeom>
-        </p:spPr>
-      </p:pic>
-    </p:spTree>
-    <p:extLst>
-      <p:ext uri="{BB962C8B-B14F-4D97-AF65-F5344CB8AC3E}">
-        <p14:creationId xmlns:p14="http://schemas.microsoft.com/office/powerpoint/2010/main" val="4108072642"/>
-      </p:ext>
-    </p:extLst>
-  </p:cSld>
-  <p:clrMapOvr>
-    <a:masterClrMapping/>
-  </p:clrMapOvr>
-</p:sld>
-</file>
-
-<file path=ppt/slides/slide27.xml><?xml version="1.0" encoding="utf-8"?>
-<p:sld xmlns:a="http://schemas.openxmlformats.org/drawingml/2006/main" xmlns:r="http://schemas.openxmlformats.org/officeDocument/2006/relationships" xmlns:p="http://schemas.openxmlformats.org/presentationml/2006/main">
-  <p:cSld>
-    <p:spTree>
-      <p:nvGrpSpPr>
-        <p:cNvPr id="1" name="Shape 78"/>
-        <p:cNvGrpSpPr/>
-        <p:nvPr/>
-      </p:nvGrpSpPr>
-      <p:grpSpPr>
-        <a:xfrm>
-          <a:off x="0" y="0"/>
-          <a:ext cx="0" cy="0"/>
-          <a:chOff x="0" y="0"/>
-          <a:chExt cx="0" cy="0"/>
-        </a:xfrm>
-      </p:grpSpPr>
-      <p:sp>
-        <p:nvSpPr>
-          <p:cNvPr id="79" name="Google Shape;79;p16"/>
-          <p:cNvSpPr txBox="1">
-            <a:spLocks noGrp="1"/>
-          </p:cNvSpPr>
-          <p:nvPr>
-            <p:ph type="title"/>
-          </p:nvPr>
-        </p:nvSpPr>
-        <p:spPr>
-          <a:xfrm>
-            <a:off x="311700" y="292625"/>
-            <a:ext cx="8520600" cy="572700"/>
-          </a:xfrm>
-          <a:prstGeom prst="rect">
-            <a:avLst/>
-          </a:prstGeom>
-        </p:spPr>
-        <p:txBody>
-          <a:bodyPr spcFirstLastPara="1" wrap="square" lIns="91425" tIns="91425" rIns="91425" bIns="91425" anchor="t" anchorCtr="0">
-            <a:noAutofit/>
-          </a:bodyPr>
-          <a:lstStyle/>
-          <a:p>
-            <a:pPr marL="0" lvl="0" indent="0" algn="l" rtl="0">
-              <a:spcBef>
-                <a:spcPts val="0"/>
-              </a:spcBef>
-              <a:spcAft>
-                <a:spcPts val="0"/>
-              </a:spcAft>
-              <a:buNone/>
-            </a:pPr>
-            <a:r>
-              <a:rPr lang="en" smtClean="0">
-                <a:latin typeface="Roboto Medium"/>
-                <a:ea typeface="Roboto Medium"/>
-                <a:cs typeface="Roboto Medium"/>
-                <a:sym typeface="Roboto Medium"/>
-              </a:rPr>
-              <a:t>Persitent volume</a:t>
-            </a:r>
-            <a:endParaRPr>
-              <a:latin typeface="Roboto Medium"/>
-              <a:ea typeface="Roboto Medium"/>
-              <a:cs typeface="Roboto Medium"/>
-              <a:sym typeface="Roboto Medium"/>
-            </a:endParaRPr>
-          </a:p>
-        </p:txBody>
-      </p:sp>
-      <p:sp>
-        <p:nvSpPr>
-          <p:cNvPr id="2" name="Text Placeholder 1"/>
-          <p:cNvSpPr>
-            <a:spLocks noGrp="1"/>
-          </p:cNvSpPr>
-          <p:nvPr>
-            <p:ph type="body" idx="1"/>
-          </p:nvPr>
-        </p:nvSpPr>
-        <p:spPr>
-          <a:xfrm>
-            <a:off x="311700" y="1333499"/>
-            <a:ext cx="4822275" cy="3235375"/>
-          </a:xfrm>
-        </p:spPr>
-        <p:txBody>
-          <a:bodyPr/>
-          <a:lstStyle/>
-          <a:p>
-            <a:r>
-              <a:rPr lang="en-US" smtClean="0"/>
-              <a:t>Khi một container down, dữ liệu của nó sẽ bị mất</a:t>
-            </a:r>
-          </a:p>
-          <a:p>
-            <a:r>
-              <a:rPr lang="en-US" smtClean="0"/>
-              <a:t>Persistent volume cho phép mount một ổ đĩa ảo lên một thư mục trong container, dữ liệu ghi vào volume sẽ được dữ lại cho các container khác sử dụng</a:t>
-            </a:r>
-          </a:p>
-          <a:p>
-            <a:r>
-              <a:rPr lang="en-US" smtClean="0"/>
-              <a:t>Nhiều container có thể mount cùng một volume</a:t>
-            </a:r>
-            <a:endParaRPr lang="en-US"/>
-          </a:p>
-        </p:txBody>
-      </p:sp>
-      <p:pic>
-        <p:nvPicPr>
-          <p:cNvPr id="5124" name="Picture 4" descr="https://docs.ovh.com/au/en/kubernetes/ovh-kubernetes-persistent-volumes/images/working-with-persistent-volumes-01.png"/>
-          <p:cNvPicPr>
-            <a:picLocks noChangeAspect="1" noChangeArrowheads="1"/>
-          </p:cNvPicPr>
-          <p:nvPr/>
-        </p:nvPicPr>
-        <p:blipFill>
-          <a:blip r:embed="rId3">
-            <a:extLst>
-              <a:ext uri="{28A0092B-C50C-407E-A947-70E740481C1C}">
-                <a14:useLocalDpi xmlns:a14="http://schemas.microsoft.com/office/drawing/2010/main" val="0"/>
-              </a:ext>
-            </a:extLst>
-          </a:blip>
-          <a:srcRect/>
-          <a:stretch>
-            <a:fillRect/>
-          </a:stretch>
-        </p:blipFill>
-        <p:spPr bwMode="auto">
-          <a:xfrm>
-            <a:off x="6144298" y="1506608"/>
-            <a:ext cx="2507577" cy="2893941"/>
-          </a:xfrm>
-          <a:prstGeom prst="rect">
-            <a:avLst/>
-          </a:prstGeom>
-          <a:noFill/>
-          <a:extLst>
-            <a:ext uri="{909E8E84-426E-40DD-AFC4-6F175D3DCCD1}">
-              <a14:hiddenFill xmlns:a14="http://schemas.microsoft.com/office/drawing/2010/main">
-                <a:solidFill>
-                  <a:srgbClr val="FFFFFF"/>
-                </a:solidFill>
-              </a14:hiddenFill>
-            </a:ext>
-          </a:extLst>
-        </p:spPr>
-      </p:pic>
-    </p:spTree>
-    <p:extLst>
-      <p:ext uri="{BB962C8B-B14F-4D97-AF65-F5344CB8AC3E}">
-        <p14:creationId xmlns:p14="http://schemas.microsoft.com/office/powerpoint/2010/main" val="1286468589"/>
-      </p:ext>
-    </p:extLst>
-  </p:cSld>
-  <p:clrMapOvr>
-    <a:masterClrMapping/>
-  </p:clrMapOvr>
-</p:sld>
-</file>
-
 <file path=ppt/slides/slide3.xml><?xml version="1.0" encoding="utf-8"?>
 <p:sld xmlns:a="http://schemas.openxmlformats.org/drawingml/2006/main" xmlns:r="http://schemas.openxmlformats.org/officeDocument/2006/relationships" xmlns:p="http://schemas.openxmlformats.org/presentationml/2006/main">
   <p:cSld>
@@ -12660,6 +14095,1045 @@
     <p:extLst>
       <p:ext uri="{BB962C8B-B14F-4D97-AF65-F5344CB8AC3E}">
         <p14:creationId xmlns:p14="http://schemas.microsoft.com/office/powerpoint/2010/main" val="93403966"/>
+      </p:ext>
+    </p:extLst>
+  </p:cSld>
+  <p:clrMapOvr>
+    <a:masterClrMapping/>
+  </p:clrMapOvr>
+  <p:timing>
+    <p:tnLst>
+      <p:par>
+        <p:cTn id="1" dur="indefinite" restart="never" nodeType="tmRoot"/>
+      </p:par>
+    </p:tnLst>
+  </p:timing>
+</p:sld>
+</file>
+
+<file path=ppt/slides/slide30.xml><?xml version="1.0" encoding="utf-8"?>
+<p:sld xmlns:a="http://schemas.openxmlformats.org/drawingml/2006/main" xmlns:r="http://schemas.openxmlformats.org/officeDocument/2006/relationships" xmlns:p="http://schemas.openxmlformats.org/presentationml/2006/main">
+  <p:cSld>
+    <p:spTree>
+      <p:nvGrpSpPr>
+        <p:cNvPr id="1" name="Shape 78"/>
+        <p:cNvGrpSpPr/>
+        <p:nvPr/>
+      </p:nvGrpSpPr>
+      <p:grpSpPr>
+        <a:xfrm>
+          <a:off x="0" y="0"/>
+          <a:ext cx="0" cy="0"/>
+          <a:chOff x="0" y="0"/>
+          <a:chExt cx="0" cy="0"/>
+        </a:xfrm>
+      </p:grpSpPr>
+      <p:sp>
+        <p:nvSpPr>
+          <p:cNvPr id="79" name="Google Shape;79;p16"/>
+          <p:cNvSpPr txBox="1">
+            <a:spLocks noGrp="1"/>
+          </p:cNvSpPr>
+          <p:nvPr>
+            <p:ph type="title"/>
+          </p:nvPr>
+        </p:nvSpPr>
+        <p:spPr>
+          <a:xfrm>
+            <a:off x="311700" y="292625"/>
+            <a:ext cx="8520600" cy="572700"/>
+          </a:xfrm>
+          <a:prstGeom prst="rect">
+            <a:avLst/>
+          </a:prstGeom>
+        </p:spPr>
+        <p:txBody>
+          <a:bodyPr spcFirstLastPara="1" wrap="square" lIns="91425" tIns="91425" rIns="91425" bIns="91425" anchor="t" anchorCtr="0">
+            <a:noAutofit/>
+          </a:bodyPr>
+          <a:lstStyle/>
+          <a:p>
+            <a:pPr marL="0" lvl="0" indent="0" algn="l" rtl="0">
+              <a:spcBef>
+                <a:spcPts val="0"/>
+              </a:spcBef>
+              <a:spcAft>
+                <a:spcPts val="0"/>
+              </a:spcAft>
+              <a:buNone/>
+            </a:pPr>
+            <a:r>
+              <a:rPr lang="en" smtClean="0">
+                <a:latin typeface="Roboto Medium"/>
+                <a:ea typeface="Roboto Medium"/>
+                <a:cs typeface="Roboto Medium"/>
+                <a:sym typeface="Roboto Medium"/>
+              </a:rPr>
+              <a:t>Ingress and Ingress Controller</a:t>
+            </a:r>
+            <a:endParaRPr>
+              <a:latin typeface="Roboto Medium"/>
+              <a:ea typeface="Roboto Medium"/>
+              <a:cs typeface="Roboto Medium"/>
+              <a:sym typeface="Roboto Medium"/>
+            </a:endParaRPr>
+          </a:p>
+        </p:txBody>
+      </p:sp>
+      <p:sp>
+        <p:nvSpPr>
+          <p:cNvPr id="80" name="Google Shape;80;p16"/>
+          <p:cNvSpPr txBox="1">
+            <a:spLocks noGrp="1"/>
+          </p:cNvSpPr>
+          <p:nvPr>
+            <p:ph type="body" idx="1"/>
+          </p:nvPr>
+        </p:nvSpPr>
+        <p:spPr>
+          <a:xfrm>
+            <a:off x="311700" y="1283841"/>
+            <a:ext cx="5022300" cy="3402460"/>
+          </a:xfrm>
+          <a:prstGeom prst="rect">
+            <a:avLst/>
+          </a:prstGeom>
+        </p:spPr>
+        <p:txBody>
+          <a:bodyPr spcFirstLastPara="1" wrap="square" lIns="91425" tIns="91425" rIns="91425" bIns="91425" anchor="t" anchorCtr="0">
+            <a:noAutofit/>
+          </a:bodyPr>
+          <a:lstStyle/>
+          <a:p>
+            <a:pPr lvl="0">
+              <a:buClr>
+                <a:srgbClr val="666666"/>
+              </a:buClr>
+            </a:pPr>
+            <a:r>
+              <a:rPr lang="en-US">
+                <a:solidFill>
+                  <a:srgbClr val="0070C0"/>
+                </a:solidFill>
+              </a:rPr>
+              <a:t>Ingress </a:t>
+            </a:r>
+            <a:r>
+              <a:rPr lang="en-US" smtClean="0">
+                <a:solidFill>
+                  <a:srgbClr val="0070C0"/>
+                </a:solidFill>
+              </a:rPr>
+              <a:t>Controller </a:t>
+            </a:r>
+            <a:r>
+              <a:rPr lang="en-US" smtClean="0">
+                <a:solidFill>
+                  <a:srgbClr val="666666"/>
+                </a:solidFill>
+              </a:rPr>
+              <a:t>quản </a:t>
+            </a:r>
+            <a:r>
+              <a:rPr lang="en-US">
+                <a:solidFill>
+                  <a:srgbClr val="666666"/>
+                </a:solidFill>
+              </a:rPr>
+              <a:t>lý các kết nối từ bên ngoài đến các services trong cluster, thông thường là HTTP</a:t>
+            </a:r>
+          </a:p>
+          <a:p>
+            <a:pPr lvl="0">
+              <a:buClr>
+                <a:srgbClr val="666666"/>
+              </a:buClr>
+            </a:pPr>
+            <a:r>
+              <a:rPr lang="en-US" smtClean="0">
+                <a:solidFill>
+                  <a:srgbClr val="666666"/>
+                </a:solidFill>
+              </a:rPr>
+              <a:t>Smart router cho phép route đến các service khác nhau dựa trên tên miền trên tất các kết nối trên cùng một port</a:t>
+            </a:r>
+          </a:p>
+          <a:p>
+            <a:pPr lvl="0">
+              <a:buClr>
+                <a:srgbClr val="666666"/>
+              </a:buClr>
+            </a:pPr>
+            <a:r>
+              <a:rPr lang="en-US" smtClean="0">
+                <a:solidFill>
+                  <a:srgbClr val="666666"/>
+                </a:solidFill>
+              </a:rPr>
+              <a:t>Có thể cung cấp SSL termination và loadbalancing</a:t>
+            </a:r>
+          </a:p>
+          <a:p>
+            <a:pPr lvl="0">
+              <a:buClr>
+                <a:srgbClr val="666666"/>
+              </a:buClr>
+            </a:pPr>
+            <a:r>
+              <a:rPr lang="en-US" smtClean="0">
+                <a:solidFill>
+                  <a:srgbClr val="0070C0"/>
+                </a:solidFill>
+              </a:rPr>
+              <a:t>Ingress </a:t>
+            </a:r>
+            <a:r>
+              <a:rPr lang="en-US" smtClean="0">
+                <a:solidFill>
+                  <a:schemeClr val="tx1">
+                    <a:lumMod val="65000"/>
+                    <a:lumOff val="35000"/>
+                  </a:schemeClr>
+                </a:solidFill>
+              </a:rPr>
+              <a:t>là tập hợp các luật cho Ingress controller route đến services</a:t>
+            </a:r>
+            <a:endParaRPr lang="en-US" smtClean="0">
+              <a:solidFill>
+                <a:srgbClr val="0070C0"/>
+              </a:solidFill>
+            </a:endParaRPr>
+          </a:p>
+          <a:p>
+            <a:pPr lvl="0">
+              <a:buClr>
+                <a:srgbClr val="666666"/>
+              </a:buClr>
+            </a:pPr>
+            <a:endParaRPr>
+              <a:solidFill>
+                <a:srgbClr val="666666"/>
+              </a:solidFill>
+              <a:latin typeface="Roboto"/>
+              <a:ea typeface="Roboto"/>
+              <a:cs typeface="Roboto"/>
+              <a:sym typeface="Roboto"/>
+            </a:endParaRPr>
+          </a:p>
+        </p:txBody>
+      </p:sp>
+      <p:pic>
+        <p:nvPicPr>
+          <p:cNvPr id="2" name="Picture 1"/>
+          <p:cNvPicPr>
+            <a:picLocks noChangeAspect="1"/>
+          </p:cNvPicPr>
+          <p:nvPr/>
+        </p:nvPicPr>
+        <p:blipFill>
+          <a:blip r:embed="rId3">
+            <a:extLst>
+              <a:ext uri="{28A0092B-C50C-407E-A947-70E740481C1C}">
+                <a14:useLocalDpi xmlns:a14="http://schemas.microsoft.com/office/drawing/2010/main" val="0"/>
+              </a:ext>
+            </a:extLst>
+          </a:blip>
+          <a:stretch>
+            <a:fillRect/>
+          </a:stretch>
+        </p:blipFill>
+        <p:spPr>
+          <a:xfrm>
+            <a:off x="5403617" y="1283841"/>
+            <a:ext cx="3561649" cy="3316734"/>
+          </a:xfrm>
+          <a:prstGeom prst="rect">
+            <a:avLst/>
+          </a:prstGeom>
+        </p:spPr>
+      </p:pic>
+    </p:spTree>
+    <p:extLst>
+      <p:ext uri="{BB962C8B-B14F-4D97-AF65-F5344CB8AC3E}">
+        <p14:creationId xmlns:p14="http://schemas.microsoft.com/office/powerpoint/2010/main" val="4108072642"/>
+      </p:ext>
+    </p:extLst>
+  </p:cSld>
+  <p:clrMapOvr>
+    <a:masterClrMapping/>
+  </p:clrMapOvr>
+  <p:timing>
+    <p:tnLst>
+      <p:par>
+        <p:cTn id="1" dur="indefinite" restart="never" nodeType="tmRoot"/>
+      </p:par>
+    </p:tnLst>
+  </p:timing>
+</p:sld>
+</file>
+
+<file path=ppt/slides/slide31.xml><?xml version="1.0" encoding="utf-8"?>
+<p:sld xmlns:a="http://schemas.openxmlformats.org/drawingml/2006/main" xmlns:r="http://schemas.openxmlformats.org/officeDocument/2006/relationships" xmlns:p="http://schemas.openxmlformats.org/presentationml/2006/main">
+  <p:cSld>
+    <p:spTree>
+      <p:nvGrpSpPr>
+        <p:cNvPr id="1" name="Shape 78"/>
+        <p:cNvGrpSpPr/>
+        <p:nvPr/>
+      </p:nvGrpSpPr>
+      <p:grpSpPr>
+        <a:xfrm>
+          <a:off x="0" y="0"/>
+          <a:ext cx="0" cy="0"/>
+          <a:chOff x="0" y="0"/>
+          <a:chExt cx="0" cy="0"/>
+        </a:xfrm>
+      </p:grpSpPr>
+      <p:sp>
+        <p:nvSpPr>
+          <p:cNvPr id="79" name="Google Shape;79;p16"/>
+          <p:cNvSpPr txBox="1">
+            <a:spLocks noGrp="1"/>
+          </p:cNvSpPr>
+          <p:nvPr>
+            <p:ph type="title"/>
+          </p:nvPr>
+        </p:nvSpPr>
+        <p:spPr>
+          <a:xfrm>
+            <a:off x="311700" y="292625"/>
+            <a:ext cx="8520600" cy="572700"/>
+          </a:xfrm>
+          <a:prstGeom prst="rect">
+            <a:avLst/>
+          </a:prstGeom>
+        </p:spPr>
+        <p:txBody>
+          <a:bodyPr spcFirstLastPara="1" wrap="square" lIns="91425" tIns="91425" rIns="91425" bIns="91425" anchor="t" anchorCtr="0">
+            <a:noAutofit/>
+          </a:bodyPr>
+          <a:lstStyle/>
+          <a:p>
+            <a:pPr marL="0" lvl="0" indent="0" algn="l" rtl="0">
+              <a:spcBef>
+                <a:spcPts val="0"/>
+              </a:spcBef>
+              <a:spcAft>
+                <a:spcPts val="0"/>
+              </a:spcAft>
+              <a:buNone/>
+            </a:pPr>
+            <a:r>
+              <a:rPr lang="en" smtClean="0">
+                <a:latin typeface="Roboto Medium"/>
+                <a:ea typeface="Roboto Medium"/>
+                <a:cs typeface="Roboto Medium"/>
+                <a:sym typeface="Roboto Medium"/>
+              </a:rPr>
+              <a:t>Persitent volume</a:t>
+            </a:r>
+            <a:endParaRPr>
+              <a:latin typeface="Roboto Medium"/>
+              <a:ea typeface="Roboto Medium"/>
+              <a:cs typeface="Roboto Medium"/>
+              <a:sym typeface="Roboto Medium"/>
+            </a:endParaRPr>
+          </a:p>
+        </p:txBody>
+      </p:sp>
+      <p:sp>
+        <p:nvSpPr>
+          <p:cNvPr id="2" name="Text Placeholder 1"/>
+          <p:cNvSpPr>
+            <a:spLocks noGrp="1"/>
+          </p:cNvSpPr>
+          <p:nvPr>
+            <p:ph type="body" idx="1"/>
+          </p:nvPr>
+        </p:nvSpPr>
+        <p:spPr>
+          <a:xfrm>
+            <a:off x="311700" y="1333499"/>
+            <a:ext cx="4822275" cy="3235375"/>
+          </a:xfrm>
+        </p:spPr>
+        <p:txBody>
+          <a:bodyPr/>
+          <a:lstStyle/>
+          <a:p>
+            <a:r>
+              <a:rPr lang="en-US" smtClean="0"/>
+              <a:t>Khi một container down, dữ liệu của nó sẽ bị mất</a:t>
+            </a:r>
+          </a:p>
+          <a:p>
+            <a:r>
+              <a:rPr lang="en-US" smtClean="0"/>
+              <a:t>Persistent volume cho phép mount một ổ đĩa ảo lên một thư mục trong container, dữ liệu ghi vào volume sẽ được dữ lại cho các container khác sử dụng</a:t>
+            </a:r>
+          </a:p>
+          <a:p>
+            <a:r>
+              <a:rPr lang="en-US" smtClean="0"/>
+              <a:t>Nhiều container có thể mount cùng một volume</a:t>
+            </a:r>
+            <a:endParaRPr lang="en-US"/>
+          </a:p>
+        </p:txBody>
+      </p:sp>
+      <p:pic>
+        <p:nvPicPr>
+          <p:cNvPr id="5124" name="Picture 4" descr="https://docs.ovh.com/au/en/kubernetes/ovh-kubernetes-persistent-volumes/images/working-with-persistent-volumes-01.png"/>
+          <p:cNvPicPr>
+            <a:picLocks noChangeAspect="1" noChangeArrowheads="1"/>
+          </p:cNvPicPr>
+          <p:nvPr/>
+        </p:nvPicPr>
+        <p:blipFill>
+          <a:blip r:embed="rId3">
+            <a:extLst>
+              <a:ext uri="{28A0092B-C50C-407E-A947-70E740481C1C}">
+                <a14:useLocalDpi xmlns:a14="http://schemas.microsoft.com/office/drawing/2010/main" val="0"/>
+              </a:ext>
+            </a:extLst>
+          </a:blip>
+          <a:srcRect/>
+          <a:stretch>
+            <a:fillRect/>
+          </a:stretch>
+        </p:blipFill>
+        <p:spPr bwMode="auto">
+          <a:xfrm>
+            <a:off x="6144298" y="1506608"/>
+            <a:ext cx="2507577" cy="2893941"/>
+          </a:xfrm>
+          <a:prstGeom prst="rect">
+            <a:avLst/>
+          </a:prstGeom>
+          <a:noFill/>
+          <a:extLst>
+            <a:ext uri="{909E8E84-426E-40DD-AFC4-6F175D3DCCD1}">
+              <a14:hiddenFill xmlns:a14="http://schemas.microsoft.com/office/drawing/2010/main">
+                <a:solidFill>
+                  <a:srgbClr val="FFFFFF"/>
+                </a:solidFill>
+              </a14:hiddenFill>
+            </a:ext>
+          </a:extLst>
+        </p:spPr>
+      </p:pic>
+    </p:spTree>
+    <p:extLst>
+      <p:ext uri="{BB962C8B-B14F-4D97-AF65-F5344CB8AC3E}">
+        <p14:creationId xmlns:p14="http://schemas.microsoft.com/office/powerpoint/2010/main" val="1286468589"/>
+      </p:ext>
+    </p:extLst>
+  </p:cSld>
+  <p:clrMapOvr>
+    <a:masterClrMapping/>
+  </p:clrMapOvr>
+  <p:timing>
+    <p:tnLst>
+      <p:par>
+        <p:cTn id="1" dur="indefinite" restart="never" nodeType="tmRoot"/>
+      </p:par>
+    </p:tnLst>
+  </p:timing>
+</p:sld>
+</file>
+
+<file path=ppt/slides/slide32.xml><?xml version="1.0" encoding="utf-8"?>
+<p:sld xmlns:a="http://schemas.openxmlformats.org/drawingml/2006/main" xmlns:r="http://schemas.openxmlformats.org/officeDocument/2006/relationships" xmlns:p="http://schemas.openxmlformats.org/presentationml/2006/main">
+  <p:cSld>
+    <p:spTree>
+      <p:nvGrpSpPr>
+        <p:cNvPr id="1" name="Shape 78"/>
+        <p:cNvGrpSpPr/>
+        <p:nvPr/>
+      </p:nvGrpSpPr>
+      <p:grpSpPr>
+        <a:xfrm>
+          <a:off x="0" y="0"/>
+          <a:ext cx="0" cy="0"/>
+          <a:chOff x="0" y="0"/>
+          <a:chExt cx="0" cy="0"/>
+        </a:xfrm>
+      </p:grpSpPr>
+      <p:sp>
+        <p:nvSpPr>
+          <p:cNvPr id="79" name="Google Shape;79;p16"/>
+          <p:cNvSpPr txBox="1">
+            <a:spLocks noGrp="1"/>
+          </p:cNvSpPr>
+          <p:nvPr>
+            <p:ph type="title"/>
+          </p:nvPr>
+        </p:nvSpPr>
+        <p:spPr>
+          <a:xfrm>
+            <a:off x="311700" y="292625"/>
+            <a:ext cx="8520600" cy="572700"/>
+          </a:xfrm>
+          <a:prstGeom prst="rect">
+            <a:avLst/>
+          </a:prstGeom>
+        </p:spPr>
+        <p:txBody>
+          <a:bodyPr spcFirstLastPara="1" wrap="square" lIns="91425" tIns="91425" rIns="91425" bIns="91425" anchor="t" anchorCtr="0">
+            <a:noAutofit/>
+          </a:bodyPr>
+          <a:lstStyle/>
+          <a:p>
+            <a:pPr marL="0" lvl="0" indent="0" algn="l" rtl="0">
+              <a:spcBef>
+                <a:spcPts val="0"/>
+              </a:spcBef>
+              <a:spcAft>
+                <a:spcPts val="0"/>
+              </a:spcAft>
+              <a:buNone/>
+            </a:pPr>
+            <a:r>
+              <a:rPr lang="en" smtClean="0">
+                <a:latin typeface="Roboto Medium"/>
+                <a:ea typeface="Roboto Medium"/>
+                <a:cs typeface="Roboto Medium"/>
+                <a:sym typeface="Roboto Medium"/>
+              </a:rPr>
+              <a:t>ConfigMaps</a:t>
+            </a:r>
+            <a:endParaRPr>
+              <a:latin typeface="Roboto Medium"/>
+              <a:ea typeface="Roboto Medium"/>
+              <a:cs typeface="Roboto Medium"/>
+              <a:sym typeface="Roboto Medium"/>
+            </a:endParaRPr>
+          </a:p>
+        </p:txBody>
+      </p:sp>
+      <p:sp>
+        <p:nvSpPr>
+          <p:cNvPr id="80" name="Google Shape;80;p16"/>
+          <p:cNvSpPr txBox="1">
+            <a:spLocks noGrp="1"/>
+          </p:cNvSpPr>
+          <p:nvPr>
+            <p:ph type="body" idx="1"/>
+          </p:nvPr>
+        </p:nvSpPr>
+        <p:spPr>
+          <a:xfrm>
+            <a:off x="311700" y="1283840"/>
+            <a:ext cx="6457400" cy="3554860"/>
+          </a:xfrm>
+          <a:prstGeom prst="rect">
+            <a:avLst/>
+          </a:prstGeom>
+        </p:spPr>
+        <p:txBody>
+          <a:bodyPr spcFirstLastPara="1" wrap="square" lIns="91425" tIns="91425" rIns="91425" bIns="91425" anchor="t" anchorCtr="0">
+            <a:noAutofit/>
+          </a:bodyPr>
+          <a:lstStyle/>
+          <a:p>
+            <a:pPr lvl="0">
+              <a:buClr>
+                <a:srgbClr val="666666"/>
+              </a:buClr>
+            </a:pPr>
+            <a:r>
+              <a:rPr lang="en-US" smtClean="0">
+                <a:solidFill>
+                  <a:srgbClr val="666666"/>
+                </a:solidFill>
+              </a:rPr>
+              <a:t>Chứa dữ liệu không nhạy cảm dưới dạng key-value</a:t>
+            </a:r>
+          </a:p>
+          <a:p>
+            <a:pPr lvl="0">
+              <a:buClr>
+                <a:srgbClr val="666666"/>
+              </a:buClr>
+            </a:pPr>
+            <a:r>
+              <a:rPr lang="en-US" smtClean="0">
+                <a:solidFill>
+                  <a:srgbClr val="666666"/>
+                </a:solidFill>
+              </a:rPr>
+              <a:t>Pod có thể sử dụng ConfigMaps làm biến môi trường, command line arguments hoặc file trong volume</a:t>
+            </a:r>
+          </a:p>
+          <a:p>
+            <a:pPr lvl="0">
+              <a:buClr>
+                <a:srgbClr val="666666"/>
+              </a:buClr>
+            </a:pPr>
+            <a:r>
+              <a:rPr lang="en-US" smtClean="0">
+                <a:solidFill>
+                  <a:srgbClr val="666666"/>
+                </a:solidFill>
+                <a:latin typeface="Roboto"/>
+                <a:ea typeface="Roboto"/>
+                <a:cs typeface="Roboto"/>
+                <a:sym typeface="Roboto"/>
+              </a:rPr>
+              <a:t>Cho phép decouple cấu hình môi trường khỏi containers images</a:t>
+            </a:r>
+            <a:endParaRPr>
+              <a:solidFill>
+                <a:srgbClr val="666666"/>
+              </a:solidFill>
+              <a:latin typeface="Roboto"/>
+              <a:ea typeface="Roboto"/>
+              <a:cs typeface="Roboto"/>
+              <a:sym typeface="Roboto"/>
+            </a:endParaRPr>
+          </a:p>
+        </p:txBody>
+      </p:sp>
+    </p:spTree>
+    <p:extLst>
+      <p:ext uri="{BB962C8B-B14F-4D97-AF65-F5344CB8AC3E}">
+        <p14:creationId xmlns:p14="http://schemas.microsoft.com/office/powerpoint/2010/main" val="1896844077"/>
+      </p:ext>
+    </p:extLst>
+  </p:cSld>
+  <p:clrMapOvr>
+    <a:masterClrMapping/>
+  </p:clrMapOvr>
+  <p:timing>
+    <p:tnLst>
+      <p:par>
+        <p:cTn id="1" dur="indefinite" restart="never" nodeType="tmRoot"/>
+      </p:par>
+    </p:tnLst>
+  </p:timing>
+</p:sld>
+</file>
+
+<file path=ppt/slides/slide33.xml><?xml version="1.0" encoding="utf-8"?>
+<p:sld xmlns:a="http://schemas.openxmlformats.org/drawingml/2006/main" xmlns:r="http://schemas.openxmlformats.org/officeDocument/2006/relationships" xmlns:p="http://schemas.openxmlformats.org/presentationml/2006/main">
+  <p:cSld>
+    <p:spTree>
+      <p:nvGrpSpPr>
+        <p:cNvPr id="1" name="Shape 78"/>
+        <p:cNvGrpSpPr/>
+        <p:nvPr/>
+      </p:nvGrpSpPr>
+      <p:grpSpPr>
+        <a:xfrm>
+          <a:off x="0" y="0"/>
+          <a:ext cx="0" cy="0"/>
+          <a:chOff x="0" y="0"/>
+          <a:chExt cx="0" cy="0"/>
+        </a:xfrm>
+      </p:grpSpPr>
+      <p:sp>
+        <p:nvSpPr>
+          <p:cNvPr id="79" name="Google Shape;79;p16"/>
+          <p:cNvSpPr txBox="1">
+            <a:spLocks noGrp="1"/>
+          </p:cNvSpPr>
+          <p:nvPr>
+            <p:ph type="title"/>
+          </p:nvPr>
+        </p:nvSpPr>
+        <p:spPr>
+          <a:xfrm>
+            <a:off x="311700" y="292625"/>
+            <a:ext cx="8520600" cy="572700"/>
+          </a:xfrm>
+          <a:prstGeom prst="rect">
+            <a:avLst/>
+          </a:prstGeom>
+        </p:spPr>
+        <p:txBody>
+          <a:bodyPr spcFirstLastPara="1" wrap="square" lIns="91425" tIns="91425" rIns="91425" bIns="91425" anchor="t" anchorCtr="0">
+            <a:noAutofit/>
+          </a:bodyPr>
+          <a:lstStyle/>
+          <a:p>
+            <a:pPr marL="0" lvl="0" indent="0" algn="l" rtl="0">
+              <a:spcBef>
+                <a:spcPts val="0"/>
+              </a:spcBef>
+              <a:spcAft>
+                <a:spcPts val="0"/>
+              </a:spcAft>
+              <a:buNone/>
+            </a:pPr>
+            <a:r>
+              <a:rPr lang="en" smtClean="0">
+                <a:latin typeface="Roboto Medium"/>
+                <a:ea typeface="Roboto Medium"/>
+                <a:cs typeface="Roboto Medium"/>
+                <a:sym typeface="Roboto Medium"/>
+              </a:rPr>
+              <a:t>Secret</a:t>
+            </a:r>
+            <a:endParaRPr>
+              <a:latin typeface="Roboto Medium"/>
+              <a:ea typeface="Roboto Medium"/>
+              <a:cs typeface="Roboto Medium"/>
+              <a:sym typeface="Roboto Medium"/>
+            </a:endParaRPr>
+          </a:p>
+        </p:txBody>
+      </p:sp>
+      <p:sp>
+        <p:nvSpPr>
+          <p:cNvPr id="80" name="Google Shape;80;p16"/>
+          <p:cNvSpPr txBox="1">
+            <a:spLocks noGrp="1"/>
+          </p:cNvSpPr>
+          <p:nvPr>
+            <p:ph type="body" idx="1"/>
+          </p:nvPr>
+        </p:nvSpPr>
+        <p:spPr>
+          <a:xfrm>
+            <a:off x="311700" y="1283840"/>
+            <a:ext cx="6457400" cy="3554860"/>
+          </a:xfrm>
+          <a:prstGeom prst="rect">
+            <a:avLst/>
+          </a:prstGeom>
+        </p:spPr>
+        <p:txBody>
+          <a:bodyPr spcFirstLastPara="1" wrap="square" lIns="91425" tIns="91425" rIns="91425" bIns="91425" anchor="t" anchorCtr="0">
+            <a:noAutofit/>
+          </a:bodyPr>
+          <a:lstStyle/>
+          <a:p>
+            <a:pPr lvl="0">
+              <a:buClr>
+                <a:srgbClr val="666666"/>
+              </a:buClr>
+            </a:pPr>
+            <a:r>
+              <a:rPr lang="en-US" smtClean="0">
+                <a:solidFill>
+                  <a:srgbClr val="666666"/>
+                </a:solidFill>
+              </a:rPr>
+              <a:t>Giống ConfigMaps: chứa dữ liệu dưới dạng key-pair</a:t>
+            </a:r>
+          </a:p>
+          <a:p>
+            <a:pPr lvl="0">
+              <a:buClr>
+                <a:srgbClr val="666666"/>
+              </a:buClr>
+            </a:pPr>
+            <a:r>
+              <a:rPr lang="en-US" smtClean="0">
+                <a:solidFill>
+                  <a:srgbClr val="666666"/>
+                </a:solidFill>
+              </a:rPr>
+              <a:t>Dữ liệu có thể được chứa dưới dạng base64 encode hoặc plain text</a:t>
+            </a:r>
+            <a:endParaRPr lang="en-US" smtClean="0">
+              <a:solidFill>
+                <a:srgbClr val="666666"/>
+              </a:solidFill>
+            </a:endParaRPr>
+          </a:p>
+          <a:p>
+            <a:pPr lvl="0">
+              <a:buClr>
+                <a:srgbClr val="666666"/>
+              </a:buClr>
+            </a:pPr>
+            <a:r>
+              <a:rPr lang="en-US" smtClean="0">
+                <a:solidFill>
+                  <a:srgbClr val="666666"/>
+                </a:solidFill>
+                <a:latin typeface="Roboto"/>
+                <a:ea typeface="Roboto"/>
+                <a:cs typeface="Roboto"/>
+                <a:sym typeface="Roboto"/>
+              </a:rPr>
+              <a:t>Dùng để chứa dữ liệu nhạy cảm: </a:t>
+            </a:r>
+            <a:r>
+              <a:rPr lang="en-US"/>
+              <a:t>passwords, </a:t>
+            </a:r>
+            <a:r>
+              <a:rPr lang="en-US"/>
+              <a:t>OAuth </a:t>
+            </a:r>
+            <a:r>
+              <a:rPr lang="en-US" smtClean="0"/>
+              <a:t>tokens</a:t>
+            </a:r>
+            <a:r>
+              <a:rPr lang="en-US"/>
+              <a:t> </a:t>
+            </a:r>
+            <a:r>
+              <a:rPr lang="en-US" smtClean="0"/>
+              <a:t>hoặc </a:t>
+            </a:r>
+            <a:r>
+              <a:rPr lang="en-US"/>
+              <a:t>ssh </a:t>
+            </a:r>
+            <a:r>
+              <a:rPr lang="en-US" smtClean="0"/>
+              <a:t>keys</a:t>
+            </a:r>
+          </a:p>
+        </p:txBody>
+      </p:sp>
+    </p:spTree>
+    <p:extLst>
+      <p:ext uri="{BB962C8B-B14F-4D97-AF65-F5344CB8AC3E}">
+        <p14:creationId xmlns:p14="http://schemas.microsoft.com/office/powerpoint/2010/main" val="3673215606"/>
+      </p:ext>
+    </p:extLst>
+  </p:cSld>
+  <p:clrMapOvr>
+    <a:masterClrMapping/>
+  </p:clrMapOvr>
+  <p:timing>
+    <p:tnLst>
+      <p:par>
+        <p:cTn id="1" dur="indefinite" restart="never" nodeType="tmRoot"/>
+      </p:par>
+    </p:tnLst>
+  </p:timing>
+</p:sld>
+</file>
+
+<file path=ppt/slides/slide34.xml><?xml version="1.0" encoding="utf-8"?>
+<p:sld xmlns:a="http://schemas.openxmlformats.org/drawingml/2006/main" xmlns:r="http://schemas.openxmlformats.org/officeDocument/2006/relationships" xmlns:p="http://schemas.openxmlformats.org/presentationml/2006/main">
+  <p:cSld>
+    <p:spTree>
+      <p:nvGrpSpPr>
+        <p:cNvPr id="1" name="Shape 73"/>
+        <p:cNvGrpSpPr/>
+        <p:nvPr/>
+      </p:nvGrpSpPr>
+      <p:grpSpPr>
+        <a:xfrm>
+          <a:off x="0" y="0"/>
+          <a:ext cx="0" cy="0"/>
+          <a:chOff x="0" y="0"/>
+          <a:chExt cx="0" cy="0"/>
+        </a:xfrm>
+      </p:grpSpPr>
+      <p:sp>
+        <p:nvSpPr>
+          <p:cNvPr id="74" name="Google Shape;74;p15"/>
+          <p:cNvSpPr txBox="1">
+            <a:spLocks noGrp="1"/>
+          </p:cNvSpPr>
+          <p:nvPr>
+            <p:ph type="title"/>
+          </p:nvPr>
+        </p:nvSpPr>
+        <p:spPr>
+          <a:xfrm>
+            <a:off x="418000" y="1791025"/>
+            <a:ext cx="5093400" cy="2001900"/>
+          </a:xfrm>
+          <a:prstGeom prst="rect">
+            <a:avLst/>
+          </a:prstGeom>
+        </p:spPr>
+        <p:txBody>
+          <a:bodyPr spcFirstLastPara="1" wrap="square" lIns="91425" tIns="91425" rIns="91425" bIns="91425" anchor="t" anchorCtr="0">
+            <a:noAutofit/>
+          </a:bodyPr>
+          <a:lstStyle/>
+          <a:p>
+            <a:pPr lvl="0"/>
+            <a:r>
+              <a:rPr lang="en-US" smtClean="0"/>
+              <a:t>Kubernetes Application Architecture Example</a:t>
+            </a:r>
+            <a:endParaRPr>
+              <a:latin typeface="Roboto Medium"/>
+              <a:ea typeface="Roboto Medium"/>
+              <a:cs typeface="Roboto Medium"/>
+              <a:sym typeface="Roboto Medium"/>
+            </a:endParaRPr>
+          </a:p>
+        </p:txBody>
+      </p:sp>
+    </p:spTree>
+    <p:extLst>
+      <p:ext uri="{BB962C8B-B14F-4D97-AF65-F5344CB8AC3E}">
+        <p14:creationId xmlns:p14="http://schemas.microsoft.com/office/powerpoint/2010/main" val="3909260951"/>
+      </p:ext>
+    </p:extLst>
+  </p:cSld>
+  <p:clrMapOvr>
+    <a:masterClrMapping/>
+  </p:clrMapOvr>
+  <p:timing>
+    <p:tnLst>
+      <p:par>
+        <p:cTn id="1" dur="indefinite" restart="never" nodeType="tmRoot"/>
+      </p:par>
+    </p:tnLst>
+  </p:timing>
+</p:sld>
+</file>
+
+<file path=ppt/slides/slide35.xml><?xml version="1.0" encoding="utf-8"?>
+<p:sld xmlns:a="http://schemas.openxmlformats.org/drawingml/2006/main" xmlns:r="http://schemas.openxmlformats.org/officeDocument/2006/relationships" xmlns:p="http://schemas.openxmlformats.org/presentationml/2006/main">
+  <p:cSld>
+    <p:spTree>
+      <p:nvGrpSpPr>
+        <p:cNvPr id="1" name="Shape 95"/>
+        <p:cNvGrpSpPr/>
+        <p:nvPr/>
+      </p:nvGrpSpPr>
+      <p:grpSpPr>
+        <a:xfrm>
+          <a:off x="0" y="0"/>
+          <a:ext cx="0" cy="0"/>
+          <a:chOff x="0" y="0"/>
+          <a:chExt cx="0" cy="0"/>
+        </a:xfrm>
+      </p:grpSpPr>
+      <p:pic>
+        <p:nvPicPr>
+          <p:cNvPr id="1026" name="Picture 2" descr="Kubernetes Deployment Architecture for E-commerce Backend Microservices"/>
+          <p:cNvPicPr>
+            <a:picLocks noChangeAspect="1" noChangeArrowheads="1"/>
+          </p:cNvPicPr>
+          <p:nvPr/>
+        </p:nvPicPr>
+        <p:blipFill>
+          <a:blip r:embed="rId3">
+            <a:extLst>
+              <a:ext uri="{28A0092B-C50C-407E-A947-70E740481C1C}">
+                <a14:useLocalDpi xmlns:a14="http://schemas.microsoft.com/office/drawing/2010/main" val="0"/>
+              </a:ext>
+            </a:extLst>
+          </a:blip>
+          <a:srcRect/>
+          <a:stretch>
+            <a:fillRect/>
+          </a:stretch>
+        </p:blipFill>
+        <p:spPr bwMode="auto">
+          <a:xfrm>
+            <a:off x="1403803" y="278113"/>
+            <a:ext cx="5983968" cy="4859708"/>
+          </a:xfrm>
+          <a:prstGeom prst="rect">
+            <a:avLst/>
+          </a:prstGeom>
+          <a:noFill/>
+          <a:extLst>
+            <a:ext uri="{909E8E84-426E-40DD-AFC4-6F175D3DCCD1}">
+              <a14:hiddenFill xmlns:a14="http://schemas.microsoft.com/office/drawing/2010/main">
+                <a:solidFill>
+                  <a:srgbClr val="FFFFFF"/>
+                </a:solidFill>
+              </a14:hiddenFill>
+            </a:ext>
+          </a:extLst>
+        </p:spPr>
+      </p:pic>
+    </p:spTree>
+    <p:extLst>
+      <p:ext uri="{BB962C8B-B14F-4D97-AF65-F5344CB8AC3E}">
+        <p14:creationId xmlns:p14="http://schemas.microsoft.com/office/powerpoint/2010/main" val="455656465"/>
+      </p:ext>
+    </p:extLst>
+  </p:cSld>
+  <p:clrMapOvr>
+    <a:masterClrMapping/>
+  </p:clrMapOvr>
+  <p:timing>
+    <p:tnLst>
+      <p:par>
+        <p:cTn id="1" dur="indefinite" restart="never" nodeType="tmRoot"/>
+      </p:par>
+    </p:tnLst>
+  </p:timing>
+</p:sld>
+</file>
+
+<file path=ppt/slides/slide36.xml><?xml version="1.0" encoding="utf-8"?>
+<p:sld xmlns:a="http://schemas.openxmlformats.org/drawingml/2006/main" xmlns:r="http://schemas.openxmlformats.org/officeDocument/2006/relationships" xmlns:p="http://schemas.openxmlformats.org/presentationml/2006/main">
+  <p:cSld>
+    <p:spTree>
+      <p:nvGrpSpPr>
+        <p:cNvPr id="1" name="Shape 50"/>
+        <p:cNvGrpSpPr/>
+        <p:nvPr/>
+      </p:nvGrpSpPr>
+      <p:grpSpPr>
+        <a:xfrm>
+          <a:off x="0" y="0"/>
+          <a:ext cx="0" cy="0"/>
+          <a:chOff x="0" y="0"/>
+          <a:chExt cx="0" cy="0"/>
+        </a:xfrm>
+      </p:grpSpPr>
+      <p:sp>
+        <p:nvSpPr>
+          <p:cNvPr id="51" name="Google Shape;51;p11"/>
+          <p:cNvSpPr txBox="1">
+            <a:spLocks noGrp="1"/>
+          </p:cNvSpPr>
+          <p:nvPr>
+            <p:ph type="title"/>
+          </p:nvPr>
+        </p:nvSpPr>
+        <p:spPr>
+          <a:xfrm>
+            <a:off x="418000" y="1791025"/>
+            <a:ext cx="4357200" cy="1396675"/>
+          </a:xfrm>
+          <a:prstGeom prst="rect">
+            <a:avLst/>
+          </a:prstGeom>
+        </p:spPr>
+        <p:txBody>
+          <a:bodyPr spcFirstLastPara="1" wrap="square" lIns="91425" tIns="91425" rIns="91425" bIns="91425" anchor="t" anchorCtr="0">
+            <a:noAutofit/>
+          </a:bodyPr>
+          <a:lstStyle/>
+          <a:p>
+            <a:pPr marL="0" lvl="0" indent="0" algn="l" rtl="0">
+              <a:spcBef>
+                <a:spcPts val="0"/>
+              </a:spcBef>
+              <a:spcAft>
+                <a:spcPts val="0"/>
+              </a:spcAft>
+              <a:buNone/>
+            </a:pPr>
+            <a:r>
+              <a:rPr lang="en" smtClean="0"/>
+              <a:t>Cảm ơn mọi người</a:t>
+            </a:r>
+            <a:endParaRPr>
+              <a:latin typeface="Roboto Medium"/>
+              <a:ea typeface="Roboto Medium"/>
+              <a:cs typeface="Roboto Medium"/>
+              <a:sym typeface="Roboto Medium"/>
+            </a:endParaRPr>
+          </a:p>
+        </p:txBody>
+      </p:sp>
+    </p:spTree>
+    <p:extLst>
+      <p:ext uri="{BB962C8B-B14F-4D97-AF65-F5344CB8AC3E}">
+        <p14:creationId xmlns:p14="http://schemas.microsoft.com/office/powerpoint/2010/main" val="847054805"/>
       </p:ext>
     </p:extLst>
   </p:cSld>

</xml_diff>

<commit_message>
doc: add kubernetes example
</commit_message>
<xml_diff>
--- a/slide-dao-tao/Kubernetes-cho-người-mới-bắt-đầu.pptx
+++ b/slide-dao-tao/Kubernetes-cho-người-mới-bắt-đầu.pptx
@@ -5,7 +5,7 @@
     <p:sldMasterId id="2147483657" r:id="rId1"/>
   </p:sldMasterIdLst>
   <p:notesMasterIdLst>
-    <p:notesMasterId r:id="rId38"/>
+    <p:notesMasterId r:id="rId40"/>
   </p:notesMasterIdLst>
   <p:sldIdLst>
     <p:sldId id="256" r:id="rId2"/>
@@ -42,8 +42,10 @@
     <p:sldId id="306" r:id="rId33"/>
     <p:sldId id="305" r:id="rId34"/>
     <p:sldId id="307" r:id="rId35"/>
-    <p:sldId id="308" r:id="rId36"/>
-    <p:sldId id="300" r:id="rId37"/>
+    <p:sldId id="311" r:id="rId36"/>
+    <p:sldId id="310" r:id="rId37"/>
+    <p:sldId id="312" r:id="rId38"/>
+    <p:sldId id="300" r:id="rId39"/>
   </p:sldIdLst>
   <p:sldSz cx="9144000" cy="5143500" type="screen16x9"/>
   <p:notesSz cx="6858000" cy="9144000"/>
@@ -279,12 +281,12 @@
   <p:extLst>
     <p:ext uri="{EFAFB233-063F-42B5-8137-9DF3F51BA10A}">
       <p15:sldGuideLst xmlns:p15="http://schemas.microsoft.com/office/powerpoint/2012/main">
-        <p15:guide id="1" orient="horz" pos="2004" userDrawn="1">
+        <p15:guide id="1" orient="horz" pos="852" userDrawn="1">
           <p15:clr>
             <a:srgbClr val="A4A3A4"/>
           </p15:clr>
         </p15:guide>
-        <p15:guide id="2" pos="2880">
+        <p15:guide id="2" pos="2784" userDrawn="1">
           <p15:clr>
             <a:srgbClr val="A4A3A4"/>
           </p15:clr>
@@ -3788,6 +3790,224 @@
   <p:cSld>
     <p:spTree>
       <p:nvGrpSpPr>
+        <p:cNvPr id="1" name="Shape 75"/>
+        <p:cNvGrpSpPr/>
+        <p:nvPr/>
+      </p:nvGrpSpPr>
+      <p:grpSpPr>
+        <a:xfrm>
+          <a:off x="0" y="0"/>
+          <a:ext cx="0" cy="0"/>
+          <a:chOff x="0" y="0"/>
+          <a:chExt cx="0" cy="0"/>
+        </a:xfrm>
+      </p:grpSpPr>
+      <p:sp>
+        <p:nvSpPr>
+          <p:cNvPr id="76" name="Google Shape;76;g338ac0a8b6_0_27:notes"/>
+          <p:cNvSpPr>
+            <a:spLocks noGrp="1" noRot="1" noChangeAspect="1"/>
+          </p:cNvSpPr>
+          <p:nvPr>
+            <p:ph type="sldImg" idx="2"/>
+          </p:nvPr>
+        </p:nvSpPr>
+        <p:spPr>
+          <a:xfrm>
+            <a:off x="381000" y="685800"/>
+            <a:ext cx="6096000" cy="3429000"/>
+          </a:xfrm>
+          <a:custGeom>
+            <a:avLst/>
+            <a:gdLst/>
+            <a:ahLst/>
+            <a:cxnLst/>
+            <a:rect l="l" t="t" r="r" b="b"/>
+            <a:pathLst>
+              <a:path w="120000" h="120000" extrusionOk="0">
+                <a:moveTo>
+                  <a:pt x="0" y="0"/>
+                </a:moveTo>
+                <a:lnTo>
+                  <a:pt x="120000" y="0"/>
+                </a:lnTo>
+                <a:lnTo>
+                  <a:pt x="120000" y="120000"/>
+                </a:lnTo>
+                <a:lnTo>
+                  <a:pt x="0" y="120000"/>
+                </a:lnTo>
+                <a:close/>
+              </a:path>
+            </a:pathLst>
+          </a:custGeom>
+        </p:spPr>
+      </p:sp>
+      <p:sp>
+        <p:nvSpPr>
+          <p:cNvPr id="77" name="Google Shape;77;g338ac0a8b6_0_27:notes"/>
+          <p:cNvSpPr txBox="1">
+            <a:spLocks noGrp="1"/>
+          </p:cNvSpPr>
+          <p:nvPr>
+            <p:ph type="body" idx="1"/>
+          </p:nvPr>
+        </p:nvSpPr>
+        <p:spPr>
+          <a:xfrm>
+            <a:off x="685800" y="4343400"/>
+            <a:ext cx="5486400" cy="4114800"/>
+          </a:xfrm>
+          <a:prstGeom prst="rect">
+            <a:avLst/>
+          </a:prstGeom>
+        </p:spPr>
+        <p:txBody>
+          <a:bodyPr spcFirstLastPara="1" wrap="square" lIns="91425" tIns="91425" rIns="91425" bIns="91425" anchor="t" anchorCtr="0">
+            <a:noAutofit/>
+          </a:bodyPr>
+          <a:lstStyle/>
+          <a:p>
+            <a:pPr marL="0" lvl="0" indent="0" algn="l" rtl="0">
+              <a:spcBef>
+                <a:spcPts val="0"/>
+              </a:spcBef>
+              <a:spcAft>
+                <a:spcPts val="0"/>
+              </a:spcAft>
+              <a:buNone/>
+            </a:pPr>
+            <a:endParaRPr/>
+          </a:p>
+        </p:txBody>
+      </p:sp>
+    </p:spTree>
+    <p:extLst>
+      <p:ext uri="{BB962C8B-B14F-4D97-AF65-F5344CB8AC3E}">
+        <p14:creationId xmlns:p14="http://schemas.microsoft.com/office/powerpoint/2010/main" val="951073961"/>
+      </p:ext>
+    </p:extLst>
+  </p:cSld>
+  <p:clrMapOvr>
+    <a:masterClrMapping/>
+  </p:clrMapOvr>
+</p:notes>
+</file>
+
+<file path=ppt/notesSlides/notesSlide36.xml><?xml version="1.0" encoding="utf-8"?>
+<p:notes xmlns:a="http://schemas.openxmlformats.org/drawingml/2006/main" xmlns:r="http://schemas.openxmlformats.org/officeDocument/2006/relationships" xmlns:p="http://schemas.openxmlformats.org/presentationml/2006/main" showMasterSp="0" showMasterPhAnim="0">
+  <p:cSld>
+    <p:spTree>
+      <p:nvGrpSpPr>
+        <p:cNvPr id="1" name="Shape 75"/>
+        <p:cNvGrpSpPr/>
+        <p:nvPr/>
+      </p:nvGrpSpPr>
+      <p:grpSpPr>
+        <a:xfrm>
+          <a:off x="0" y="0"/>
+          <a:ext cx="0" cy="0"/>
+          <a:chOff x="0" y="0"/>
+          <a:chExt cx="0" cy="0"/>
+        </a:xfrm>
+      </p:grpSpPr>
+      <p:sp>
+        <p:nvSpPr>
+          <p:cNvPr id="76" name="Google Shape;76;g338ac0a8b6_0_27:notes"/>
+          <p:cNvSpPr>
+            <a:spLocks noGrp="1" noRot="1" noChangeAspect="1"/>
+          </p:cNvSpPr>
+          <p:nvPr>
+            <p:ph type="sldImg" idx="2"/>
+          </p:nvPr>
+        </p:nvSpPr>
+        <p:spPr>
+          <a:xfrm>
+            <a:off x="381000" y="685800"/>
+            <a:ext cx="6096000" cy="3429000"/>
+          </a:xfrm>
+          <a:custGeom>
+            <a:avLst/>
+            <a:gdLst/>
+            <a:ahLst/>
+            <a:cxnLst/>
+            <a:rect l="l" t="t" r="r" b="b"/>
+            <a:pathLst>
+              <a:path w="120000" h="120000" extrusionOk="0">
+                <a:moveTo>
+                  <a:pt x="0" y="0"/>
+                </a:moveTo>
+                <a:lnTo>
+                  <a:pt x="120000" y="0"/>
+                </a:lnTo>
+                <a:lnTo>
+                  <a:pt x="120000" y="120000"/>
+                </a:lnTo>
+                <a:lnTo>
+                  <a:pt x="0" y="120000"/>
+                </a:lnTo>
+                <a:close/>
+              </a:path>
+            </a:pathLst>
+          </a:custGeom>
+        </p:spPr>
+      </p:sp>
+      <p:sp>
+        <p:nvSpPr>
+          <p:cNvPr id="77" name="Google Shape;77;g338ac0a8b6_0_27:notes"/>
+          <p:cNvSpPr txBox="1">
+            <a:spLocks noGrp="1"/>
+          </p:cNvSpPr>
+          <p:nvPr>
+            <p:ph type="body" idx="1"/>
+          </p:nvPr>
+        </p:nvSpPr>
+        <p:spPr>
+          <a:xfrm>
+            <a:off x="685800" y="4343400"/>
+            <a:ext cx="5486400" cy="4114800"/>
+          </a:xfrm>
+          <a:prstGeom prst="rect">
+            <a:avLst/>
+          </a:prstGeom>
+        </p:spPr>
+        <p:txBody>
+          <a:bodyPr spcFirstLastPara="1" wrap="square" lIns="91425" tIns="91425" rIns="91425" bIns="91425" anchor="t" anchorCtr="0">
+            <a:noAutofit/>
+          </a:bodyPr>
+          <a:lstStyle/>
+          <a:p>
+            <a:pPr marL="0" lvl="0" indent="0" algn="l" rtl="0">
+              <a:spcBef>
+                <a:spcPts val="0"/>
+              </a:spcBef>
+              <a:spcAft>
+                <a:spcPts val="0"/>
+              </a:spcAft>
+              <a:buNone/>
+            </a:pPr>
+            <a:endParaRPr/>
+          </a:p>
+        </p:txBody>
+      </p:sp>
+    </p:spTree>
+    <p:extLst>
+      <p:ext uri="{BB962C8B-B14F-4D97-AF65-F5344CB8AC3E}">
+        <p14:creationId xmlns:p14="http://schemas.microsoft.com/office/powerpoint/2010/main" val="4145008033"/>
+      </p:ext>
+    </p:extLst>
+  </p:cSld>
+  <p:clrMapOvr>
+    <a:masterClrMapping/>
+  </p:clrMapOvr>
+</p:notes>
+</file>
+
+<file path=ppt/notesSlides/notesSlide37.xml><?xml version="1.0" encoding="utf-8"?>
+<p:notes xmlns:a="http://schemas.openxmlformats.org/drawingml/2006/main" xmlns:r="http://schemas.openxmlformats.org/officeDocument/2006/relationships" xmlns:p="http://schemas.openxmlformats.org/presentationml/2006/main" showMasterSp="0" showMasterPhAnim="0">
+  <p:cSld>
+    <p:spTree>
+      <p:nvGrpSpPr>
         <p:cNvPr id="1" name="Shape 92"/>
         <p:cNvGrpSpPr/>
         <p:nvPr/>
@@ -3882,7 +4102,7 @@
     </p:spTree>
     <p:extLst>
       <p:ext uri="{BB962C8B-B14F-4D97-AF65-F5344CB8AC3E}">
-        <p14:creationId xmlns:p14="http://schemas.microsoft.com/office/powerpoint/2010/main" val="174481297"/>
+        <p14:creationId xmlns:p14="http://schemas.microsoft.com/office/powerpoint/2010/main" val="2398161989"/>
       </p:ext>
     </p:extLst>
   </p:cSld>
@@ -3892,7 +4112,7 @@
 </p:notes>
 </file>
 
-<file path=ppt/notesSlides/notesSlide36.xml><?xml version="1.0" encoding="utf-8"?>
+<file path=ppt/notesSlides/notesSlide38.xml><?xml version="1.0" encoding="utf-8"?>
 <p:notes xmlns:a="http://schemas.openxmlformats.org/drawingml/2006/main" xmlns:r="http://schemas.openxmlformats.org/officeDocument/2006/relationships" xmlns:p="http://schemas.openxmlformats.org/presentationml/2006/main" showMasterSp="0" showMasterPhAnim="0">
   <p:cSld>
     <p:spTree>
@@ -13160,31 +13380,7 @@
                   <a:srgbClr val="666666"/>
                 </a:solidFill>
               </a:rPr>
-              <a:t>Các containers chia sẻ </a:t>
-            </a:r>
-            <a:r>
-              <a:rPr lang="en-US" smtClean="0">
-                <a:solidFill>
-                  <a:srgbClr val="666666"/>
-                </a:solidFill>
-              </a:rPr>
-              <a:t>cùng địa </a:t>
-            </a:r>
-            <a:r>
-              <a:rPr lang="en-US" smtClean="0">
-                <a:solidFill>
-                  <a:srgbClr val="666666"/>
-                </a:solidFill>
-              </a:rPr>
-              <a:t>chỉ </a:t>
-            </a:r>
-            <a:r>
-              <a:rPr lang="en-US" smtClean="0">
-                <a:solidFill>
-                  <a:srgbClr val="666666"/>
-                </a:solidFill>
-              </a:rPr>
-              <a:t>IP</a:t>
+              <a:t>Các containers chia sẻ cùng địa chỉ IP</a:t>
             </a:r>
             <a:endParaRPr>
               <a:solidFill>
@@ -14837,11 +15033,6 @@
               </a:rPr>
               <a:t>Dữ liệu có thể được chứa dưới dạng base64 encode hoặc plain text</a:t>
             </a:r>
-            <a:endParaRPr lang="en-US" smtClean="0">
-              <a:solidFill>
-                <a:srgbClr val="666666"/>
-              </a:solidFill>
-            </a:endParaRPr>
           </a:p>
           <a:p>
             <a:pPr lvl="0">
@@ -14863,11 +15054,7 @@
             </a:r>
             <a:r>
               <a:rPr lang="en-US"/>
-              <a:t>passwords, </a:t>
-            </a:r>
-            <a:r>
-              <a:rPr lang="en-US"/>
-              <a:t>OAuth </a:t>
+              <a:t>passwords, OAuth </a:t>
             </a:r>
             <a:r>
               <a:rPr lang="en-US" smtClean="0"/>
@@ -14993,7 +15180,7 @@
   <p:cSld>
     <p:spTree>
       <p:nvGrpSpPr>
-        <p:cNvPr id="1" name="Shape 95"/>
+        <p:cNvPr id="1" name="Shape 78"/>
         <p:cNvGrpSpPr/>
         <p:nvPr/>
       </p:nvGrpSpPr>
@@ -15005,16 +15192,102 @@
           <a:chExt cx="0" cy="0"/>
         </a:xfrm>
       </p:grpSpPr>
+      <p:sp>
+        <p:nvSpPr>
+          <p:cNvPr id="79" name="Google Shape;79;p16"/>
+          <p:cNvSpPr txBox="1">
+            <a:spLocks noGrp="1"/>
+          </p:cNvSpPr>
+          <p:nvPr>
+            <p:ph type="title"/>
+          </p:nvPr>
+        </p:nvSpPr>
+        <p:spPr>
+          <a:xfrm>
+            <a:off x="311700" y="292625"/>
+            <a:ext cx="8520600" cy="572700"/>
+          </a:xfrm>
+          <a:prstGeom prst="rect">
+            <a:avLst/>
+          </a:prstGeom>
+        </p:spPr>
+        <p:txBody>
+          <a:bodyPr spcFirstLastPara="1" wrap="square" lIns="91425" tIns="91425" rIns="91425" bIns="91425" anchor="t" anchorCtr="0">
+            <a:noAutofit/>
+          </a:bodyPr>
+          <a:lstStyle/>
+          <a:p>
+            <a:pPr marL="0" lvl="0" indent="0" algn="l" rtl="0">
+              <a:spcBef>
+                <a:spcPts val="0"/>
+              </a:spcBef>
+              <a:spcAft>
+                <a:spcPts val="0"/>
+              </a:spcAft>
+              <a:buNone/>
+            </a:pPr>
+            <a:r>
+              <a:rPr lang="en-US" smtClean="0">
+                <a:latin typeface="Roboto Medium"/>
+                <a:ea typeface="Roboto Medium"/>
+                <a:cs typeface="Roboto Medium"/>
+                <a:sym typeface="Roboto Medium"/>
+              </a:rPr>
+              <a:t>Example Vworkspace on docker</a:t>
+            </a:r>
+            <a:endParaRPr>
+              <a:latin typeface="Roboto Medium"/>
+              <a:ea typeface="Roboto Medium"/>
+              <a:cs typeface="Roboto Medium"/>
+              <a:sym typeface="Roboto Medium"/>
+            </a:endParaRPr>
+          </a:p>
+        </p:txBody>
+      </p:sp>
+      <p:sp>
+        <p:nvSpPr>
+          <p:cNvPr id="14" name="object 7"/>
+          <p:cNvSpPr/>
+          <p:nvPr/>
+        </p:nvSpPr>
+        <p:spPr>
+          <a:xfrm>
+            <a:off x="3832757" y="1820412"/>
+            <a:ext cx="809892" cy="789720"/>
+          </a:xfrm>
+          <a:prstGeom prst="rect">
+            <a:avLst/>
+          </a:prstGeom>
+          <a:blipFill>
+            <a:blip r:embed="rId3" cstate="print"/>
+            <a:stretch>
+              <a:fillRect/>
+            </a:stretch>
+          </a:blipFill>
+          <a:ln w="6350">
+            <a:solidFill>
+              <a:srgbClr val="002060"/>
+            </a:solidFill>
+          </a:ln>
+        </p:spPr>
+        <p:txBody>
+          <a:bodyPr wrap="square" lIns="0" tIns="0" rIns="0" bIns="0" rtlCol="0"/>
+          <a:lstStyle/>
+          <a:p>
+            <a:endParaRPr sz="1000"/>
+          </a:p>
+        </p:txBody>
+      </p:sp>
       <p:pic>
         <p:nvPicPr>
-          <p:cNvPr id="1026" name="Picture 2" descr="Kubernetes Deployment Architecture for E-commerce Backend Microservices"/>
+          <p:cNvPr id="1028" name="Picture 4" descr="https://cdn.iconscout.com/icon/free/png-512/nextcloud-2752119-2284936.png"/>
           <p:cNvPicPr>
             <a:picLocks noChangeAspect="1" noChangeArrowheads="1"/>
           </p:cNvPicPr>
           <p:nvPr/>
         </p:nvPicPr>
         <p:blipFill>
-          <a:blip r:embed="rId3">
+          <a:blip r:embed="rId4">
             <a:extLst>
               <a:ext uri="{28A0092B-C50C-407E-A947-70E740481C1C}">
                 <a14:useLocalDpi xmlns:a14="http://schemas.microsoft.com/office/drawing/2010/main" val="0"/>
@@ -15028,8 +15301,8 @@
         </p:blipFill>
         <p:spPr bwMode="auto">
           <a:xfrm>
-            <a:off x="1403803" y="278113"/>
-            <a:ext cx="5983968" cy="4859708"/>
+            <a:off x="4017747" y="2002853"/>
+            <a:ext cx="478053" cy="478053"/>
           </a:xfrm>
           <a:prstGeom prst="rect">
             <a:avLst/>
@@ -15046,10 +15319,506 @@
           </a:extLst>
         </p:spPr>
       </p:pic>
+      <p:cxnSp>
+        <p:nvCxnSpPr>
+          <p:cNvPr id="4" name="Straight Arrow Connector 3"/>
+          <p:cNvCxnSpPr>
+            <a:endCxn id="14" idx="0"/>
+          </p:cNvCxnSpPr>
+          <p:nvPr/>
+        </p:nvCxnSpPr>
+        <p:spPr>
+          <a:xfrm>
+            <a:off x="4237703" y="1248697"/>
+            <a:ext cx="0" cy="571715"/>
+          </a:xfrm>
+          <a:prstGeom prst="straightConnector1">
+            <a:avLst/>
+          </a:prstGeom>
+          <a:ln>
+            <a:tailEnd type="triangle"/>
+          </a:ln>
+        </p:spPr>
+        <p:style>
+          <a:lnRef idx="1">
+            <a:schemeClr val="accent3"/>
+          </a:lnRef>
+          <a:fillRef idx="0">
+            <a:schemeClr val="accent3"/>
+          </a:fillRef>
+          <a:effectRef idx="0">
+            <a:schemeClr val="accent3"/>
+          </a:effectRef>
+          <a:fontRef idx="minor">
+            <a:schemeClr val="tx1"/>
+          </a:fontRef>
+        </p:style>
+      </p:cxnSp>
+      <p:sp>
+        <p:nvSpPr>
+          <p:cNvPr id="37" name="TextBox 36"/>
+          <p:cNvSpPr txBox="1"/>
+          <p:nvPr/>
+        </p:nvSpPr>
+        <p:spPr>
+          <a:xfrm>
+            <a:off x="4237703" y="1390650"/>
+            <a:ext cx="766916" cy="261610"/>
+          </a:xfrm>
+          <a:prstGeom prst="rect">
+            <a:avLst/>
+          </a:prstGeom>
+          <a:noFill/>
+        </p:spPr>
+        <p:txBody>
+          <a:bodyPr wrap="square" rtlCol="0">
+            <a:spAutoFit/>
+          </a:bodyPr>
+          <a:lstStyle/>
+          <a:p>
+            <a:r>
+              <a:rPr lang="en-US" sz="1100" smtClean="0">
+                <a:latin typeface="Calibri" panose="020F0502020204030204" pitchFamily="34" charset="0"/>
+                <a:cs typeface="Calibri" panose="020F0502020204030204" pitchFamily="34" charset="0"/>
+              </a:rPr>
+              <a:t>ingress</a:t>
+            </a:r>
+            <a:endParaRPr lang="en-US" sz="1100">
+              <a:latin typeface="Calibri" panose="020F0502020204030204" pitchFamily="34" charset="0"/>
+              <a:cs typeface="Calibri" panose="020F0502020204030204" pitchFamily="34" charset="0"/>
+            </a:endParaRPr>
+          </a:p>
+        </p:txBody>
+      </p:sp>
+      <p:sp>
+        <p:nvSpPr>
+          <p:cNvPr id="29" name="object 7"/>
+          <p:cNvSpPr/>
+          <p:nvPr/>
+        </p:nvSpPr>
+        <p:spPr>
+          <a:xfrm>
+            <a:off x="3832757" y="3744613"/>
+            <a:ext cx="809892" cy="789720"/>
+          </a:xfrm>
+          <a:prstGeom prst="rect">
+            <a:avLst/>
+          </a:prstGeom>
+          <a:blipFill>
+            <a:blip r:embed="rId3" cstate="print"/>
+            <a:stretch>
+              <a:fillRect/>
+            </a:stretch>
+          </a:blipFill>
+          <a:ln w="6350">
+            <a:solidFill>
+              <a:srgbClr val="002060"/>
+            </a:solidFill>
+          </a:ln>
+        </p:spPr>
+        <p:txBody>
+          <a:bodyPr wrap="square" lIns="0" tIns="0" rIns="0" bIns="0" rtlCol="0"/>
+          <a:lstStyle/>
+          <a:p>
+            <a:endParaRPr sz="1000"/>
+          </a:p>
+        </p:txBody>
+      </p:sp>
+      <p:pic>
+        <p:nvPicPr>
+          <p:cNvPr id="2054" name="Picture 6" descr="https://i.pinimg.com/originals/16/aa/8a/16aa8acf3d8103d8c4ba31c722f9b345.png"/>
+          <p:cNvPicPr>
+            <a:picLocks noChangeAspect="1" noChangeArrowheads="1"/>
+          </p:cNvPicPr>
+          <p:nvPr/>
+        </p:nvPicPr>
+        <p:blipFill>
+          <a:blip r:embed="rId5">
+            <a:extLst>
+              <a:ext uri="{28A0092B-C50C-407E-A947-70E740481C1C}">
+                <a14:useLocalDpi xmlns:a14="http://schemas.microsoft.com/office/drawing/2010/main" val="0"/>
+              </a:ext>
+            </a:extLst>
+          </a:blip>
+          <a:srcRect/>
+          <a:stretch>
+            <a:fillRect/>
+          </a:stretch>
+        </p:blipFill>
+        <p:spPr bwMode="auto">
+          <a:xfrm>
+            <a:off x="3913740" y="3909030"/>
+            <a:ext cx="635905" cy="421001"/>
+          </a:xfrm>
+          <a:prstGeom prst="rect">
+            <a:avLst/>
+          </a:prstGeom>
+          <a:noFill/>
+          <a:extLst>
+            <a:ext uri="{909E8E84-426E-40DD-AFC4-6F175D3DCCD1}">
+              <a14:hiddenFill xmlns:a14="http://schemas.microsoft.com/office/drawing/2010/main">
+                <a:solidFill>
+                  <a:srgbClr val="FFFFFF"/>
+                </a:solidFill>
+              </a14:hiddenFill>
+            </a:ext>
+          </a:extLst>
+        </p:spPr>
+      </p:pic>
+      <p:sp>
+        <p:nvSpPr>
+          <p:cNvPr id="51" name="object 7"/>
+          <p:cNvSpPr/>
+          <p:nvPr/>
+        </p:nvSpPr>
+        <p:spPr>
+          <a:xfrm>
+            <a:off x="1474305" y="3744613"/>
+            <a:ext cx="809892" cy="789720"/>
+          </a:xfrm>
+          <a:prstGeom prst="rect">
+            <a:avLst/>
+          </a:prstGeom>
+          <a:blipFill>
+            <a:blip r:embed="rId3" cstate="print"/>
+            <a:stretch>
+              <a:fillRect/>
+            </a:stretch>
+          </a:blipFill>
+          <a:ln w="6350">
+            <a:solidFill>
+              <a:srgbClr val="002060"/>
+            </a:solidFill>
+          </a:ln>
+        </p:spPr>
+        <p:txBody>
+          <a:bodyPr wrap="square" lIns="0" tIns="0" rIns="0" bIns="0" rtlCol="0"/>
+          <a:lstStyle/>
+          <a:p>
+            <a:endParaRPr sz="1000"/>
+          </a:p>
+        </p:txBody>
+      </p:sp>
+      <p:pic>
+        <p:nvPicPr>
+          <p:cNvPr id="38" name="Picture 37"/>
+          <p:cNvPicPr>
+            <a:picLocks noChangeAspect="1"/>
+          </p:cNvPicPr>
+          <p:nvPr/>
+        </p:nvPicPr>
+        <p:blipFill>
+          <a:blip r:embed="rId6">
+            <a:extLst>
+              <a:ext uri="{28A0092B-C50C-407E-A947-70E740481C1C}">
+                <a14:useLocalDpi xmlns:a14="http://schemas.microsoft.com/office/drawing/2010/main" val="0"/>
+              </a:ext>
+            </a:extLst>
+          </a:blip>
+          <a:stretch>
+            <a:fillRect/>
+          </a:stretch>
+        </p:blipFill>
+        <p:spPr>
+          <a:xfrm>
+            <a:off x="1518202" y="3847710"/>
+            <a:ext cx="765995" cy="619000"/>
+          </a:xfrm>
+          <a:prstGeom prst="rect">
+            <a:avLst/>
+          </a:prstGeom>
+        </p:spPr>
+      </p:pic>
+      <p:sp>
+        <p:nvSpPr>
+          <p:cNvPr id="52" name="object 7"/>
+          <p:cNvSpPr/>
+          <p:nvPr/>
+        </p:nvSpPr>
+        <p:spPr>
+          <a:xfrm>
+            <a:off x="6356882" y="3744613"/>
+            <a:ext cx="809892" cy="789720"/>
+          </a:xfrm>
+          <a:prstGeom prst="rect">
+            <a:avLst/>
+          </a:prstGeom>
+          <a:blipFill>
+            <a:blip r:embed="rId3" cstate="print"/>
+            <a:stretch>
+              <a:fillRect/>
+            </a:stretch>
+          </a:blipFill>
+          <a:ln w="6350">
+            <a:solidFill>
+              <a:srgbClr val="002060"/>
+            </a:solidFill>
+          </a:ln>
+        </p:spPr>
+        <p:txBody>
+          <a:bodyPr wrap="square" lIns="0" tIns="0" rIns="0" bIns="0" rtlCol="0"/>
+          <a:lstStyle/>
+          <a:p>
+            <a:endParaRPr sz="1000"/>
+          </a:p>
+        </p:txBody>
+      </p:sp>
+      <p:pic>
+        <p:nvPicPr>
+          <p:cNvPr id="2062" name="Picture 14" descr="https://download.onlyoffice.com/assets/fb/fb_icon_325x325.jpg"/>
+          <p:cNvPicPr>
+            <a:picLocks noChangeAspect="1" noChangeArrowheads="1"/>
+          </p:cNvPicPr>
+          <p:nvPr/>
+        </p:nvPicPr>
+        <p:blipFill>
+          <a:blip r:embed="rId7">
+            <a:extLst>
+              <a:ext uri="{28A0092B-C50C-407E-A947-70E740481C1C}">
+                <a14:useLocalDpi xmlns:a14="http://schemas.microsoft.com/office/drawing/2010/main" val="0"/>
+              </a:ext>
+            </a:extLst>
+          </a:blip>
+          <a:srcRect/>
+          <a:stretch>
+            <a:fillRect/>
+          </a:stretch>
+        </p:blipFill>
+        <p:spPr bwMode="auto">
+          <a:xfrm>
+            <a:off x="6523303" y="3909030"/>
+            <a:ext cx="506147" cy="506147"/>
+          </a:xfrm>
+          <a:prstGeom prst="rect">
+            <a:avLst/>
+          </a:prstGeom>
+          <a:noFill/>
+          <a:extLst>
+            <a:ext uri="{909E8E84-426E-40DD-AFC4-6F175D3DCCD1}">
+              <a14:hiddenFill xmlns:a14="http://schemas.microsoft.com/office/drawing/2010/main">
+                <a:solidFill>
+                  <a:srgbClr val="FFFFFF"/>
+                </a:solidFill>
+              </a14:hiddenFill>
+            </a:ext>
+          </a:extLst>
+        </p:spPr>
+      </p:pic>
+      <p:cxnSp>
+        <p:nvCxnSpPr>
+          <p:cNvPr id="13" name="Straight Arrow Connector 12"/>
+          <p:cNvCxnSpPr>
+            <a:stCxn id="14" idx="2"/>
+            <a:endCxn id="51" idx="0"/>
+          </p:cNvCxnSpPr>
+          <p:nvPr/>
+        </p:nvCxnSpPr>
+        <p:spPr>
+          <a:xfrm flipH="1">
+            <a:off x="1879251" y="2610132"/>
+            <a:ext cx="2358452" cy="1134481"/>
+          </a:xfrm>
+          <a:prstGeom prst="straightConnector1">
+            <a:avLst/>
+          </a:prstGeom>
+          <a:ln>
+            <a:tailEnd type="triangle"/>
+          </a:ln>
+        </p:spPr>
+        <p:style>
+          <a:lnRef idx="1">
+            <a:schemeClr val="accent3"/>
+          </a:lnRef>
+          <a:fillRef idx="0">
+            <a:schemeClr val="accent3"/>
+          </a:fillRef>
+          <a:effectRef idx="0">
+            <a:schemeClr val="accent3"/>
+          </a:effectRef>
+          <a:fontRef idx="minor">
+            <a:schemeClr val="tx1"/>
+          </a:fontRef>
+        </p:style>
+      </p:cxnSp>
+      <p:cxnSp>
+        <p:nvCxnSpPr>
+          <p:cNvPr id="17" name="Straight Arrow Connector 16"/>
+          <p:cNvCxnSpPr>
+            <a:stCxn id="14" idx="2"/>
+            <a:endCxn id="29" idx="0"/>
+          </p:cNvCxnSpPr>
+          <p:nvPr/>
+        </p:nvCxnSpPr>
+        <p:spPr>
+          <a:xfrm>
+            <a:off x="4237703" y="2610132"/>
+            <a:ext cx="0" cy="1134481"/>
+          </a:xfrm>
+          <a:prstGeom prst="straightConnector1">
+            <a:avLst/>
+          </a:prstGeom>
+          <a:ln>
+            <a:tailEnd type="triangle"/>
+          </a:ln>
+        </p:spPr>
+        <p:style>
+          <a:lnRef idx="1">
+            <a:schemeClr val="accent3"/>
+          </a:lnRef>
+          <a:fillRef idx="0">
+            <a:schemeClr val="accent3"/>
+          </a:fillRef>
+          <a:effectRef idx="0">
+            <a:schemeClr val="accent3"/>
+          </a:effectRef>
+          <a:fontRef idx="minor">
+            <a:schemeClr val="tx1"/>
+          </a:fontRef>
+        </p:style>
+      </p:cxnSp>
+      <p:cxnSp>
+        <p:nvCxnSpPr>
+          <p:cNvPr id="19" name="Straight Arrow Connector 18"/>
+          <p:cNvCxnSpPr>
+            <a:stCxn id="14" idx="2"/>
+            <a:endCxn id="52" idx="0"/>
+          </p:cNvCxnSpPr>
+          <p:nvPr/>
+        </p:nvCxnSpPr>
+        <p:spPr>
+          <a:xfrm>
+            <a:off x="4237703" y="2610132"/>
+            <a:ext cx="2524125" cy="1134481"/>
+          </a:xfrm>
+          <a:prstGeom prst="straightConnector1">
+            <a:avLst/>
+          </a:prstGeom>
+          <a:ln>
+            <a:tailEnd type="triangle"/>
+          </a:ln>
+        </p:spPr>
+        <p:style>
+          <a:lnRef idx="1">
+            <a:schemeClr val="accent3"/>
+          </a:lnRef>
+          <a:fillRef idx="0">
+            <a:schemeClr val="accent3"/>
+          </a:fillRef>
+          <a:effectRef idx="0">
+            <a:schemeClr val="accent3"/>
+          </a:effectRef>
+          <a:fontRef idx="minor">
+            <a:schemeClr val="tx1"/>
+          </a:fontRef>
+        </p:style>
+      </p:cxnSp>
+      <p:sp>
+        <p:nvSpPr>
+          <p:cNvPr id="20" name="TextBox 19"/>
+          <p:cNvSpPr txBox="1"/>
+          <p:nvPr/>
+        </p:nvSpPr>
+        <p:spPr>
+          <a:xfrm>
+            <a:off x="1660309" y="3057525"/>
+            <a:ext cx="1247776" cy="261610"/>
+          </a:xfrm>
+          <a:prstGeom prst="rect">
+            <a:avLst/>
+          </a:prstGeom>
+          <a:noFill/>
+        </p:spPr>
+        <p:txBody>
+          <a:bodyPr wrap="square" rtlCol="0">
+            <a:spAutoFit/>
+          </a:bodyPr>
+          <a:lstStyle/>
+          <a:p>
+            <a:pPr algn="ctr"/>
+            <a:r>
+              <a:rPr lang="en-US" sz="1100" smtClean="0">
+                <a:latin typeface="Calibri" panose="020F0502020204030204" pitchFamily="34" charset="0"/>
+                <a:cs typeface="Calibri" panose="020F0502020204030204" pitchFamily="34" charset="0"/>
+              </a:rPr>
+              <a:t>Session Storage</a:t>
+            </a:r>
+            <a:endParaRPr lang="en-US" sz="1100">
+              <a:latin typeface="Calibri" panose="020F0502020204030204" pitchFamily="34" charset="0"/>
+              <a:cs typeface="Calibri" panose="020F0502020204030204" pitchFamily="34" charset="0"/>
+            </a:endParaRPr>
+          </a:p>
+        </p:txBody>
+      </p:sp>
+      <p:sp>
+        <p:nvSpPr>
+          <p:cNvPr id="58" name="TextBox 57"/>
+          <p:cNvSpPr txBox="1"/>
+          <p:nvPr/>
+        </p:nvSpPr>
+        <p:spPr>
+          <a:xfrm>
+            <a:off x="3793808" y="3057525"/>
+            <a:ext cx="437884" cy="261610"/>
+          </a:xfrm>
+          <a:prstGeom prst="rect">
+            <a:avLst/>
+          </a:prstGeom>
+          <a:noFill/>
+        </p:spPr>
+        <p:txBody>
+          <a:bodyPr wrap="square" rtlCol="0">
+            <a:spAutoFit/>
+          </a:bodyPr>
+          <a:lstStyle/>
+          <a:p>
+            <a:pPr algn="ctr"/>
+            <a:r>
+              <a:rPr lang="en-US" sz="1100" smtClean="0">
+                <a:latin typeface="Calibri" panose="020F0502020204030204" pitchFamily="34" charset="0"/>
+                <a:cs typeface="Calibri" panose="020F0502020204030204" pitchFamily="34" charset="0"/>
+              </a:rPr>
+              <a:t>DB</a:t>
+            </a:r>
+          </a:p>
+        </p:txBody>
+      </p:sp>
+      <p:sp>
+        <p:nvSpPr>
+          <p:cNvPr id="59" name="TextBox 58"/>
+          <p:cNvSpPr txBox="1"/>
+          <p:nvPr/>
+        </p:nvSpPr>
+        <p:spPr>
+          <a:xfrm>
+            <a:off x="5770325" y="3048000"/>
+            <a:ext cx="1296303" cy="261610"/>
+          </a:xfrm>
+          <a:prstGeom prst="rect">
+            <a:avLst/>
+          </a:prstGeom>
+          <a:noFill/>
+        </p:spPr>
+        <p:txBody>
+          <a:bodyPr wrap="square" rtlCol="0">
+            <a:spAutoFit/>
+          </a:bodyPr>
+          <a:lstStyle/>
+          <a:p>
+            <a:pPr algn="ctr"/>
+            <a:r>
+              <a:rPr lang="en-US" sz="1100" smtClean="0">
+                <a:latin typeface="Calibri" panose="020F0502020204030204" pitchFamily="34" charset="0"/>
+                <a:cs typeface="Calibri" panose="020F0502020204030204" pitchFamily="34" charset="0"/>
+              </a:rPr>
+              <a:t>Document Server</a:t>
+            </a:r>
+          </a:p>
+        </p:txBody>
+      </p:sp>
     </p:spTree>
     <p:extLst>
       <p:ext uri="{BB962C8B-B14F-4D97-AF65-F5344CB8AC3E}">
-        <p14:creationId xmlns:p14="http://schemas.microsoft.com/office/powerpoint/2010/main" val="455656465"/>
+        <p14:creationId xmlns:p14="http://schemas.microsoft.com/office/powerpoint/2010/main" val="3453946702"/>
       </p:ext>
     </p:extLst>
   </p:cSld>
@@ -15067,6 +15836,3039 @@
 </file>
 
 <file path=ppt/slides/slide36.xml><?xml version="1.0" encoding="utf-8"?>
+<p:sld xmlns:a="http://schemas.openxmlformats.org/drawingml/2006/main" xmlns:r="http://schemas.openxmlformats.org/officeDocument/2006/relationships" xmlns:p="http://schemas.openxmlformats.org/presentationml/2006/main">
+  <p:cSld>
+    <p:spTree>
+      <p:nvGrpSpPr>
+        <p:cNvPr id="1" name="Shape 78"/>
+        <p:cNvGrpSpPr/>
+        <p:nvPr/>
+      </p:nvGrpSpPr>
+      <p:grpSpPr>
+        <a:xfrm>
+          <a:off x="0" y="0"/>
+          <a:ext cx="0" cy="0"/>
+          <a:chOff x="0" y="0"/>
+          <a:chExt cx="0" cy="0"/>
+        </a:xfrm>
+      </p:grpSpPr>
+      <p:sp>
+        <p:nvSpPr>
+          <p:cNvPr id="79" name="Google Shape;79;p16"/>
+          <p:cNvSpPr txBox="1">
+            <a:spLocks noGrp="1"/>
+          </p:cNvSpPr>
+          <p:nvPr>
+            <p:ph type="title"/>
+          </p:nvPr>
+        </p:nvSpPr>
+        <p:spPr>
+          <a:xfrm>
+            <a:off x="311700" y="292625"/>
+            <a:ext cx="8520600" cy="572700"/>
+          </a:xfrm>
+          <a:prstGeom prst="rect">
+            <a:avLst/>
+          </a:prstGeom>
+        </p:spPr>
+        <p:txBody>
+          <a:bodyPr spcFirstLastPara="1" wrap="square" lIns="91425" tIns="91425" rIns="91425" bIns="91425" anchor="t" anchorCtr="0">
+            <a:noAutofit/>
+          </a:bodyPr>
+          <a:lstStyle/>
+          <a:p>
+            <a:pPr marL="0" lvl="0" indent="0" algn="l" rtl="0">
+              <a:spcBef>
+                <a:spcPts val="0"/>
+              </a:spcBef>
+              <a:spcAft>
+                <a:spcPts val="0"/>
+              </a:spcAft>
+              <a:buNone/>
+            </a:pPr>
+            <a:r>
+              <a:rPr lang="en-US" smtClean="0">
+                <a:latin typeface="Roboto Medium"/>
+                <a:ea typeface="Roboto Medium"/>
+                <a:cs typeface="Roboto Medium"/>
+                <a:sym typeface="Roboto Medium"/>
+              </a:rPr>
+              <a:t>Example Vworkspace on Kubernetes</a:t>
+            </a:r>
+            <a:endParaRPr>
+              <a:latin typeface="Roboto Medium"/>
+              <a:ea typeface="Roboto Medium"/>
+              <a:cs typeface="Roboto Medium"/>
+              <a:sym typeface="Roboto Medium"/>
+            </a:endParaRPr>
+          </a:p>
+        </p:txBody>
+      </p:sp>
+      <p:grpSp>
+        <p:nvGrpSpPr>
+          <p:cNvPr id="68" name="Group 67"/>
+          <p:cNvGrpSpPr/>
+          <p:nvPr/>
+        </p:nvGrpSpPr>
+        <p:grpSpPr>
+          <a:xfrm>
+            <a:off x="5660857" y="2077524"/>
+            <a:ext cx="1179871" cy="1032386"/>
+            <a:chOff x="1342103" y="3593275"/>
+            <a:chExt cx="1179871" cy="1032386"/>
+          </a:xfrm>
+        </p:grpSpPr>
+        <p:sp>
+          <p:nvSpPr>
+            <p:cNvPr id="69" name="Rectangle 68"/>
+            <p:cNvSpPr/>
+            <p:nvPr/>
+          </p:nvSpPr>
+          <p:spPr>
+            <a:xfrm>
+              <a:off x="1342103" y="3593275"/>
+              <a:ext cx="1179871" cy="1032386"/>
+            </a:xfrm>
+            <a:prstGeom prst="rect">
+              <a:avLst/>
+            </a:prstGeom>
+            <a:solidFill>
+              <a:srgbClr val="7BC9F9"/>
+            </a:solidFill>
+            <a:ln w="6350">
+              <a:solidFill>
+                <a:srgbClr val="002060"/>
+              </a:solidFill>
+            </a:ln>
+          </p:spPr>
+          <p:style>
+            <a:lnRef idx="2">
+              <a:schemeClr val="accent1">
+                <a:shade val="50000"/>
+              </a:schemeClr>
+            </a:lnRef>
+            <a:fillRef idx="1">
+              <a:schemeClr val="accent1"/>
+            </a:fillRef>
+            <a:effectRef idx="0">
+              <a:schemeClr val="accent1"/>
+            </a:effectRef>
+            <a:fontRef idx="minor">
+              <a:schemeClr val="lt1"/>
+            </a:fontRef>
+          </p:style>
+          <p:txBody>
+            <a:bodyPr rtlCol="0" anchor="t"/>
+            <a:lstStyle/>
+            <a:p>
+              <a:pPr algn="ctr"/>
+              <a:r>
+                <a:rPr lang="en-US" sz="900" smtClean="0"/>
+                <a:t>POD</a:t>
+              </a:r>
+              <a:endParaRPr lang="en-US" sz="900"/>
+            </a:p>
+          </p:txBody>
+        </p:sp>
+        <p:sp>
+          <p:nvSpPr>
+            <p:cNvPr id="70" name="Rectangle 69"/>
+            <p:cNvSpPr/>
+            <p:nvPr/>
+          </p:nvSpPr>
+          <p:spPr>
+            <a:xfrm>
+              <a:off x="1402081" y="3807885"/>
+              <a:ext cx="1059913" cy="760610"/>
+            </a:xfrm>
+            <a:prstGeom prst="rect">
+              <a:avLst/>
+            </a:prstGeom>
+            <a:solidFill>
+              <a:srgbClr val="4AB4F6"/>
+            </a:solidFill>
+            <a:ln w="6350">
+              <a:solidFill>
+                <a:srgbClr val="002060"/>
+              </a:solidFill>
+            </a:ln>
+          </p:spPr>
+          <p:style>
+            <a:lnRef idx="2">
+              <a:schemeClr val="accent1">
+                <a:shade val="50000"/>
+              </a:schemeClr>
+            </a:lnRef>
+            <a:fillRef idx="1">
+              <a:schemeClr val="accent1"/>
+            </a:fillRef>
+            <a:effectRef idx="0">
+              <a:schemeClr val="accent1"/>
+            </a:effectRef>
+            <a:fontRef idx="minor">
+              <a:schemeClr val="lt1"/>
+            </a:fontRef>
+          </p:style>
+          <p:txBody>
+            <a:bodyPr rtlCol="0" anchor="t"/>
+            <a:lstStyle/>
+            <a:p>
+              <a:pPr algn="ctr"/>
+              <a:r>
+                <a:rPr lang="en-US" sz="900" smtClean="0"/>
+                <a:t>Session Storage</a:t>
+              </a:r>
+              <a:endParaRPr lang="en-US" sz="900"/>
+            </a:p>
+          </p:txBody>
+        </p:sp>
+        <p:sp>
+          <p:nvSpPr>
+            <p:cNvPr id="71" name="object 7"/>
+            <p:cNvSpPr/>
+            <p:nvPr/>
+          </p:nvSpPr>
+          <p:spPr>
+            <a:xfrm>
+              <a:off x="1706633" y="4060640"/>
+              <a:ext cx="465067" cy="474854"/>
+            </a:xfrm>
+            <a:prstGeom prst="rect">
+              <a:avLst/>
+            </a:prstGeom>
+            <a:blipFill>
+              <a:blip r:embed="rId3" cstate="print"/>
+              <a:stretch>
+                <a:fillRect/>
+              </a:stretch>
+            </a:blipFill>
+            <a:ln w="6350">
+              <a:solidFill>
+                <a:srgbClr val="002060"/>
+              </a:solidFill>
+            </a:ln>
+          </p:spPr>
+          <p:txBody>
+            <a:bodyPr wrap="square" lIns="0" tIns="0" rIns="0" bIns="0" rtlCol="0"/>
+            <a:lstStyle/>
+            <a:p>
+              <a:endParaRPr sz="1000"/>
+            </a:p>
+          </p:txBody>
+        </p:sp>
+        <p:pic>
+          <p:nvPicPr>
+            <p:cNvPr id="72" name="Picture 4" descr="https://cdn.iconscout.com/icon/free/png-512/nextcloud-2752119-2284936.png"/>
+            <p:cNvPicPr>
+              <a:picLocks noChangeAspect="1" noChangeArrowheads="1"/>
+            </p:cNvPicPr>
+            <p:nvPr/>
+          </p:nvPicPr>
+          <p:blipFill>
+            <a:blip r:embed="rId4">
+              <a:extLst>
+                <a:ext uri="{28A0092B-C50C-407E-A947-70E740481C1C}">
+                  <a14:useLocalDpi xmlns:a14="http://schemas.microsoft.com/office/drawing/2010/main" val="0"/>
+                </a:ext>
+              </a:extLst>
+            </a:blip>
+            <a:srcRect/>
+            <a:stretch>
+              <a:fillRect/>
+            </a:stretch>
+          </p:blipFill>
+          <p:spPr bwMode="auto">
+            <a:xfrm>
+              <a:off x="1809338" y="4183627"/>
+              <a:ext cx="275634" cy="275634"/>
+            </a:xfrm>
+            <a:prstGeom prst="rect">
+              <a:avLst/>
+            </a:prstGeom>
+            <a:noFill/>
+            <a:extLst>
+              <a:ext uri="{909E8E84-426E-40DD-AFC4-6F175D3DCCD1}">
+                <a14:hiddenFill xmlns:a14="http://schemas.microsoft.com/office/drawing/2010/main">
+                  <a:solidFill>
+                    <a:srgbClr val="FFFFFF"/>
+                  </a:solidFill>
+                </a14:hiddenFill>
+              </a:ext>
+            </a:extLst>
+          </p:spPr>
+        </p:pic>
+      </p:grpSp>
+      <p:grpSp>
+        <p:nvGrpSpPr>
+          <p:cNvPr id="55" name="Group 54"/>
+          <p:cNvGrpSpPr/>
+          <p:nvPr/>
+        </p:nvGrpSpPr>
+        <p:grpSpPr>
+          <a:xfrm>
+            <a:off x="3730346" y="3606896"/>
+            <a:ext cx="1179871" cy="1032386"/>
+            <a:chOff x="1780253" y="3776701"/>
+            <a:chExt cx="1179871" cy="1032386"/>
+          </a:xfrm>
+        </p:grpSpPr>
+        <p:grpSp>
+          <p:nvGrpSpPr>
+            <p:cNvPr id="53" name="Group 52"/>
+            <p:cNvGrpSpPr/>
+            <p:nvPr/>
+          </p:nvGrpSpPr>
+          <p:grpSpPr>
+            <a:xfrm>
+              <a:off x="1780253" y="3776701"/>
+              <a:ext cx="1179871" cy="1032386"/>
+              <a:chOff x="1342103" y="3593275"/>
+              <a:chExt cx="1179871" cy="1032386"/>
+            </a:xfrm>
+          </p:grpSpPr>
+          <p:sp>
+            <p:nvSpPr>
+              <p:cNvPr id="39" name="Rectangle 38"/>
+              <p:cNvSpPr/>
+              <p:nvPr/>
+            </p:nvSpPr>
+            <p:spPr>
+              <a:xfrm>
+                <a:off x="1342103" y="3593275"/>
+                <a:ext cx="1179871" cy="1032386"/>
+              </a:xfrm>
+              <a:prstGeom prst="rect">
+                <a:avLst/>
+              </a:prstGeom>
+              <a:solidFill>
+                <a:srgbClr val="7BC9F9"/>
+              </a:solidFill>
+              <a:ln w="6350">
+                <a:solidFill>
+                  <a:srgbClr val="002060"/>
+                </a:solidFill>
+              </a:ln>
+            </p:spPr>
+            <p:style>
+              <a:lnRef idx="2">
+                <a:schemeClr val="accent1">
+                  <a:shade val="50000"/>
+                </a:schemeClr>
+              </a:lnRef>
+              <a:fillRef idx="1">
+                <a:schemeClr val="accent1"/>
+              </a:fillRef>
+              <a:effectRef idx="0">
+                <a:schemeClr val="accent1"/>
+              </a:effectRef>
+              <a:fontRef idx="minor">
+                <a:schemeClr val="lt1"/>
+              </a:fontRef>
+            </p:style>
+            <p:txBody>
+              <a:bodyPr rtlCol="0" anchor="t"/>
+              <a:lstStyle/>
+              <a:p>
+                <a:pPr algn="ctr"/>
+                <a:r>
+                  <a:rPr lang="en-US" sz="900" smtClean="0"/>
+                  <a:t>POD</a:t>
+                </a:r>
+                <a:endParaRPr lang="en-US" sz="900"/>
+              </a:p>
+            </p:txBody>
+          </p:sp>
+          <p:sp>
+            <p:nvSpPr>
+              <p:cNvPr id="40" name="Rectangle 39"/>
+              <p:cNvSpPr/>
+              <p:nvPr/>
+            </p:nvSpPr>
+            <p:spPr>
+              <a:xfrm>
+                <a:off x="1402081" y="3807885"/>
+                <a:ext cx="1059913" cy="760610"/>
+              </a:xfrm>
+              <a:prstGeom prst="rect">
+                <a:avLst/>
+              </a:prstGeom>
+              <a:solidFill>
+                <a:srgbClr val="4AB4F6"/>
+              </a:solidFill>
+              <a:ln w="6350">
+                <a:solidFill>
+                  <a:srgbClr val="002060"/>
+                </a:solidFill>
+              </a:ln>
+            </p:spPr>
+            <p:style>
+              <a:lnRef idx="2">
+                <a:schemeClr val="accent1">
+                  <a:shade val="50000"/>
+                </a:schemeClr>
+              </a:lnRef>
+              <a:fillRef idx="1">
+                <a:schemeClr val="accent1"/>
+              </a:fillRef>
+              <a:effectRef idx="0">
+                <a:schemeClr val="accent1"/>
+              </a:effectRef>
+              <a:fontRef idx="minor">
+                <a:schemeClr val="lt1"/>
+              </a:fontRef>
+            </p:style>
+            <p:txBody>
+              <a:bodyPr rtlCol="0" anchor="t"/>
+              <a:lstStyle/>
+              <a:p>
+                <a:pPr algn="ctr"/>
+                <a:r>
+                  <a:rPr lang="en-US" sz="900" smtClean="0"/>
+                  <a:t>Session Storage</a:t>
+                </a:r>
+                <a:endParaRPr lang="en-US" sz="900"/>
+              </a:p>
+            </p:txBody>
+          </p:sp>
+          <p:sp>
+            <p:nvSpPr>
+              <p:cNvPr id="41" name="object 7"/>
+              <p:cNvSpPr/>
+              <p:nvPr/>
+            </p:nvSpPr>
+            <p:spPr>
+              <a:xfrm>
+                <a:off x="1706633" y="4060640"/>
+                <a:ext cx="465067" cy="474854"/>
+              </a:xfrm>
+              <a:prstGeom prst="rect">
+                <a:avLst/>
+              </a:prstGeom>
+              <a:blipFill>
+                <a:blip r:embed="rId3" cstate="print"/>
+                <a:stretch>
+                  <a:fillRect/>
+                </a:stretch>
+              </a:blipFill>
+              <a:ln w="6350">
+                <a:solidFill>
+                  <a:srgbClr val="002060"/>
+                </a:solidFill>
+              </a:ln>
+            </p:spPr>
+            <p:txBody>
+              <a:bodyPr wrap="square" lIns="0" tIns="0" rIns="0" bIns="0" rtlCol="0"/>
+              <a:lstStyle/>
+              <a:p>
+                <a:endParaRPr sz="1000"/>
+              </a:p>
+            </p:txBody>
+          </p:sp>
+        </p:grpSp>
+        <p:pic>
+          <p:nvPicPr>
+            <p:cNvPr id="78" name="Picture 77"/>
+            <p:cNvPicPr>
+              <a:picLocks noChangeAspect="1"/>
+            </p:cNvPicPr>
+            <p:nvPr/>
+          </p:nvPicPr>
+          <p:blipFill>
+            <a:blip r:embed="rId5">
+              <a:extLst>
+                <a:ext uri="{28A0092B-C50C-407E-A947-70E740481C1C}">
+                  <a14:useLocalDpi xmlns:a14="http://schemas.microsoft.com/office/drawing/2010/main" val="0"/>
+                </a:ext>
+              </a:extLst>
+            </a:blip>
+            <a:stretch>
+              <a:fillRect/>
+            </a:stretch>
+          </p:blipFill>
+          <p:spPr>
+            <a:xfrm>
+              <a:off x="2182056" y="4323703"/>
+              <a:ext cx="390519" cy="315579"/>
+            </a:xfrm>
+            <a:prstGeom prst="rect">
+              <a:avLst/>
+            </a:prstGeom>
+          </p:spPr>
+        </p:pic>
+      </p:grpSp>
+      <p:grpSp>
+        <p:nvGrpSpPr>
+          <p:cNvPr id="56" name="Group 55"/>
+          <p:cNvGrpSpPr/>
+          <p:nvPr/>
+        </p:nvGrpSpPr>
+        <p:grpSpPr>
+          <a:xfrm>
+            <a:off x="5652437" y="3609297"/>
+            <a:ext cx="1179871" cy="1032386"/>
+            <a:chOff x="3896339" y="3776701"/>
+            <a:chExt cx="1179871" cy="1032386"/>
+          </a:xfrm>
+        </p:grpSpPr>
+        <p:grpSp>
+          <p:nvGrpSpPr>
+            <p:cNvPr id="73" name="Group 72"/>
+            <p:cNvGrpSpPr/>
+            <p:nvPr/>
+          </p:nvGrpSpPr>
+          <p:grpSpPr>
+            <a:xfrm>
+              <a:off x="3896339" y="3776701"/>
+              <a:ext cx="1179871" cy="1032386"/>
+              <a:chOff x="1342103" y="3593275"/>
+              <a:chExt cx="1179871" cy="1032386"/>
+            </a:xfrm>
+          </p:grpSpPr>
+          <p:sp>
+            <p:nvSpPr>
+              <p:cNvPr id="74" name="Rectangle 73"/>
+              <p:cNvSpPr/>
+              <p:nvPr/>
+            </p:nvSpPr>
+            <p:spPr>
+              <a:xfrm>
+                <a:off x="1342103" y="3593275"/>
+                <a:ext cx="1179871" cy="1032386"/>
+              </a:xfrm>
+              <a:prstGeom prst="rect">
+                <a:avLst/>
+              </a:prstGeom>
+              <a:solidFill>
+                <a:srgbClr val="7BC9F9"/>
+              </a:solidFill>
+              <a:ln w="6350">
+                <a:solidFill>
+                  <a:srgbClr val="002060"/>
+                </a:solidFill>
+              </a:ln>
+            </p:spPr>
+            <p:style>
+              <a:lnRef idx="2">
+                <a:schemeClr val="accent1">
+                  <a:shade val="50000"/>
+                </a:schemeClr>
+              </a:lnRef>
+              <a:fillRef idx="1">
+                <a:schemeClr val="accent1"/>
+              </a:fillRef>
+              <a:effectRef idx="0">
+                <a:schemeClr val="accent1"/>
+              </a:effectRef>
+              <a:fontRef idx="minor">
+                <a:schemeClr val="lt1"/>
+              </a:fontRef>
+            </p:style>
+            <p:txBody>
+              <a:bodyPr rtlCol="0" anchor="t"/>
+              <a:lstStyle/>
+              <a:p>
+                <a:pPr algn="ctr"/>
+                <a:r>
+                  <a:rPr lang="en-US" sz="900" smtClean="0"/>
+                  <a:t>POD</a:t>
+                </a:r>
+                <a:endParaRPr lang="en-US" sz="900"/>
+              </a:p>
+            </p:txBody>
+          </p:sp>
+          <p:sp>
+            <p:nvSpPr>
+              <p:cNvPr id="75" name="Rectangle 74"/>
+              <p:cNvSpPr/>
+              <p:nvPr/>
+            </p:nvSpPr>
+            <p:spPr>
+              <a:xfrm>
+                <a:off x="1402081" y="3807885"/>
+                <a:ext cx="1059913" cy="760610"/>
+              </a:xfrm>
+              <a:prstGeom prst="rect">
+                <a:avLst/>
+              </a:prstGeom>
+              <a:solidFill>
+                <a:srgbClr val="4AB4F6"/>
+              </a:solidFill>
+              <a:ln w="6350">
+                <a:solidFill>
+                  <a:srgbClr val="002060"/>
+                </a:solidFill>
+              </a:ln>
+            </p:spPr>
+            <p:style>
+              <a:lnRef idx="2">
+                <a:schemeClr val="accent1">
+                  <a:shade val="50000"/>
+                </a:schemeClr>
+              </a:lnRef>
+              <a:fillRef idx="1">
+                <a:schemeClr val="accent1"/>
+              </a:fillRef>
+              <a:effectRef idx="0">
+                <a:schemeClr val="accent1"/>
+              </a:effectRef>
+              <a:fontRef idx="minor">
+                <a:schemeClr val="lt1"/>
+              </a:fontRef>
+            </p:style>
+            <p:txBody>
+              <a:bodyPr rtlCol="0" anchor="t"/>
+              <a:lstStyle/>
+              <a:p>
+                <a:pPr algn="ctr"/>
+                <a:r>
+                  <a:rPr lang="en-US" sz="900" smtClean="0"/>
+                  <a:t>Session Storage</a:t>
+                </a:r>
+                <a:endParaRPr lang="en-US" sz="900"/>
+              </a:p>
+            </p:txBody>
+          </p:sp>
+          <p:sp>
+            <p:nvSpPr>
+              <p:cNvPr id="76" name="object 7"/>
+              <p:cNvSpPr/>
+              <p:nvPr/>
+            </p:nvSpPr>
+            <p:spPr>
+              <a:xfrm>
+                <a:off x="1706633" y="4060640"/>
+                <a:ext cx="465067" cy="474854"/>
+              </a:xfrm>
+              <a:prstGeom prst="rect">
+                <a:avLst/>
+              </a:prstGeom>
+              <a:blipFill>
+                <a:blip r:embed="rId3" cstate="print"/>
+                <a:stretch>
+                  <a:fillRect/>
+                </a:stretch>
+              </a:blipFill>
+              <a:ln w="6350">
+                <a:solidFill>
+                  <a:srgbClr val="002060"/>
+                </a:solidFill>
+              </a:ln>
+            </p:spPr>
+            <p:txBody>
+              <a:bodyPr wrap="square" lIns="0" tIns="0" rIns="0" bIns="0" rtlCol="0"/>
+              <a:lstStyle/>
+              <a:p>
+                <a:endParaRPr sz="1000"/>
+              </a:p>
+            </p:txBody>
+          </p:sp>
+        </p:grpSp>
+        <p:pic>
+          <p:nvPicPr>
+            <p:cNvPr id="81" name="Picture 6" descr="https://i.pinimg.com/originals/16/aa/8a/16aa8acf3d8103d8c4ba31c722f9b345.png"/>
+            <p:cNvPicPr>
+              <a:picLocks noChangeAspect="1" noChangeArrowheads="1"/>
+            </p:cNvPicPr>
+            <p:nvPr/>
+          </p:nvPicPr>
+          <p:blipFill>
+            <a:blip r:embed="rId6">
+              <a:extLst>
+                <a:ext uri="{28A0092B-C50C-407E-A947-70E740481C1C}">
+                  <a14:useLocalDpi xmlns:a14="http://schemas.microsoft.com/office/drawing/2010/main" val="0"/>
+                </a:ext>
+              </a:extLst>
+            </a:blip>
+            <a:srcRect/>
+            <a:stretch>
+              <a:fillRect/>
+            </a:stretch>
+          </p:blipFill>
+          <p:spPr bwMode="auto">
+            <a:xfrm>
+              <a:off x="4324097" y="4360011"/>
+              <a:ext cx="343406" cy="227352"/>
+            </a:xfrm>
+            <a:prstGeom prst="rect">
+              <a:avLst/>
+            </a:prstGeom>
+            <a:noFill/>
+            <a:extLst>
+              <a:ext uri="{909E8E84-426E-40DD-AFC4-6F175D3DCCD1}">
+                <a14:hiddenFill xmlns:a14="http://schemas.microsoft.com/office/drawing/2010/main">
+                  <a:solidFill>
+                    <a:srgbClr val="FFFFFF"/>
+                  </a:solidFill>
+                </a14:hiddenFill>
+              </a:ext>
+            </a:extLst>
+          </p:spPr>
+        </p:pic>
+      </p:grpSp>
+      <p:grpSp>
+        <p:nvGrpSpPr>
+          <p:cNvPr id="57" name="Group 56"/>
+          <p:cNvGrpSpPr/>
+          <p:nvPr/>
+        </p:nvGrpSpPr>
+        <p:grpSpPr>
+          <a:xfrm>
+            <a:off x="7574525" y="3606896"/>
+            <a:ext cx="1179871" cy="1032386"/>
+            <a:chOff x="6012425" y="3756881"/>
+            <a:chExt cx="1179871" cy="1032386"/>
+          </a:xfrm>
+        </p:grpSpPr>
+        <p:grpSp>
+          <p:nvGrpSpPr>
+            <p:cNvPr id="63" name="Group 62"/>
+            <p:cNvGrpSpPr/>
+            <p:nvPr/>
+          </p:nvGrpSpPr>
+          <p:grpSpPr>
+            <a:xfrm>
+              <a:off x="6012425" y="3756881"/>
+              <a:ext cx="1179871" cy="1032386"/>
+              <a:chOff x="1342103" y="3593275"/>
+              <a:chExt cx="1179871" cy="1032386"/>
+            </a:xfrm>
+          </p:grpSpPr>
+          <p:sp>
+            <p:nvSpPr>
+              <p:cNvPr id="64" name="Rectangle 63"/>
+              <p:cNvSpPr/>
+              <p:nvPr/>
+            </p:nvSpPr>
+            <p:spPr>
+              <a:xfrm>
+                <a:off x="1342103" y="3593275"/>
+                <a:ext cx="1179871" cy="1032386"/>
+              </a:xfrm>
+              <a:prstGeom prst="rect">
+                <a:avLst/>
+              </a:prstGeom>
+              <a:solidFill>
+                <a:srgbClr val="7BC9F9"/>
+              </a:solidFill>
+              <a:ln w="6350">
+                <a:solidFill>
+                  <a:srgbClr val="002060"/>
+                </a:solidFill>
+              </a:ln>
+            </p:spPr>
+            <p:style>
+              <a:lnRef idx="2">
+                <a:schemeClr val="accent1">
+                  <a:shade val="50000"/>
+                </a:schemeClr>
+              </a:lnRef>
+              <a:fillRef idx="1">
+                <a:schemeClr val="accent1"/>
+              </a:fillRef>
+              <a:effectRef idx="0">
+                <a:schemeClr val="accent1"/>
+              </a:effectRef>
+              <a:fontRef idx="minor">
+                <a:schemeClr val="lt1"/>
+              </a:fontRef>
+            </p:style>
+            <p:txBody>
+              <a:bodyPr rtlCol="0" anchor="t"/>
+              <a:lstStyle/>
+              <a:p>
+                <a:pPr algn="ctr"/>
+                <a:r>
+                  <a:rPr lang="en-US" sz="900" smtClean="0"/>
+                  <a:t>POD</a:t>
+                </a:r>
+                <a:endParaRPr lang="en-US" sz="900"/>
+              </a:p>
+            </p:txBody>
+          </p:sp>
+          <p:sp>
+            <p:nvSpPr>
+              <p:cNvPr id="65" name="Rectangle 64"/>
+              <p:cNvSpPr/>
+              <p:nvPr/>
+            </p:nvSpPr>
+            <p:spPr>
+              <a:xfrm>
+                <a:off x="1402081" y="3807885"/>
+                <a:ext cx="1059913" cy="760610"/>
+              </a:xfrm>
+              <a:prstGeom prst="rect">
+                <a:avLst/>
+              </a:prstGeom>
+              <a:solidFill>
+                <a:srgbClr val="4AB4F6"/>
+              </a:solidFill>
+              <a:ln w="6350">
+                <a:solidFill>
+                  <a:srgbClr val="002060"/>
+                </a:solidFill>
+              </a:ln>
+            </p:spPr>
+            <p:style>
+              <a:lnRef idx="2">
+                <a:schemeClr val="accent1">
+                  <a:shade val="50000"/>
+                </a:schemeClr>
+              </a:lnRef>
+              <a:fillRef idx="1">
+                <a:schemeClr val="accent1"/>
+              </a:fillRef>
+              <a:effectRef idx="0">
+                <a:schemeClr val="accent1"/>
+              </a:effectRef>
+              <a:fontRef idx="minor">
+                <a:schemeClr val="lt1"/>
+              </a:fontRef>
+            </p:style>
+            <p:txBody>
+              <a:bodyPr rtlCol="0" anchor="t"/>
+              <a:lstStyle/>
+              <a:p>
+                <a:pPr algn="ctr"/>
+                <a:r>
+                  <a:rPr lang="en-US" sz="900" smtClean="0"/>
+                  <a:t>Session Storage</a:t>
+                </a:r>
+                <a:endParaRPr lang="en-US" sz="900"/>
+              </a:p>
+            </p:txBody>
+          </p:sp>
+          <p:sp>
+            <p:nvSpPr>
+              <p:cNvPr id="66" name="object 7"/>
+              <p:cNvSpPr/>
+              <p:nvPr/>
+            </p:nvSpPr>
+            <p:spPr>
+              <a:xfrm>
+                <a:off x="1706633" y="4060640"/>
+                <a:ext cx="465067" cy="474854"/>
+              </a:xfrm>
+              <a:prstGeom prst="rect">
+                <a:avLst/>
+              </a:prstGeom>
+              <a:blipFill>
+                <a:blip r:embed="rId3" cstate="print"/>
+                <a:stretch>
+                  <a:fillRect/>
+                </a:stretch>
+              </a:blipFill>
+              <a:ln w="6350">
+                <a:solidFill>
+                  <a:srgbClr val="002060"/>
+                </a:solidFill>
+              </a:ln>
+            </p:spPr>
+            <p:txBody>
+              <a:bodyPr wrap="square" lIns="0" tIns="0" rIns="0" bIns="0" rtlCol="0"/>
+              <a:lstStyle/>
+              <a:p>
+                <a:endParaRPr sz="1000"/>
+              </a:p>
+            </p:txBody>
+          </p:sp>
+        </p:grpSp>
+        <p:pic>
+          <p:nvPicPr>
+            <p:cNvPr id="82" name="Picture 14" descr="https://download.onlyoffice.com/assets/fb/fb_icon_325x325.jpg"/>
+            <p:cNvPicPr>
+              <a:picLocks noChangeAspect="1" noChangeArrowheads="1"/>
+            </p:cNvPicPr>
+            <p:nvPr/>
+          </p:nvPicPr>
+          <p:blipFill>
+            <a:blip r:embed="rId7">
+              <a:extLst>
+                <a:ext uri="{28A0092B-C50C-407E-A947-70E740481C1C}">
+                  <a14:useLocalDpi xmlns:a14="http://schemas.microsoft.com/office/drawing/2010/main" val="0"/>
+                </a:ext>
+              </a:extLst>
+            </a:blip>
+            <a:srcRect/>
+            <a:stretch>
+              <a:fillRect/>
+            </a:stretch>
+          </p:blipFill>
+          <p:spPr bwMode="auto">
+            <a:xfrm>
+              <a:off x="6447411" y="4311610"/>
+              <a:ext cx="324153" cy="324153"/>
+            </a:xfrm>
+            <a:prstGeom prst="rect">
+              <a:avLst/>
+            </a:prstGeom>
+            <a:noFill/>
+            <a:extLst>
+              <a:ext uri="{909E8E84-426E-40DD-AFC4-6F175D3DCCD1}">
+                <a14:hiddenFill xmlns:a14="http://schemas.microsoft.com/office/drawing/2010/main">
+                  <a:solidFill>
+                    <a:srgbClr val="FFFFFF"/>
+                  </a:solidFill>
+                </a14:hiddenFill>
+              </a:ext>
+            </a:extLst>
+          </p:spPr>
+        </p:pic>
+      </p:grpSp>
+      <p:sp>
+        <p:nvSpPr>
+          <p:cNvPr id="62" name="Left-Right Arrow 61"/>
+          <p:cNvSpPr/>
+          <p:nvPr/>
+        </p:nvSpPr>
+        <p:spPr>
+          <a:xfrm>
+            <a:off x="3730344" y="3327233"/>
+            <a:ext cx="1179873" cy="200025"/>
+          </a:xfrm>
+          <a:prstGeom prst="leftRightArrow">
+            <a:avLst/>
+          </a:prstGeom>
+          <a:solidFill>
+            <a:srgbClr val="FF0000"/>
+          </a:solidFill>
+          <a:ln w="3175">
+            <a:solidFill>
+              <a:srgbClr val="00B0F0"/>
+            </a:solidFill>
+          </a:ln>
+        </p:spPr>
+        <p:style>
+          <a:lnRef idx="2">
+            <a:schemeClr val="accent1">
+              <a:shade val="50000"/>
+            </a:schemeClr>
+          </a:lnRef>
+          <a:fillRef idx="1">
+            <a:schemeClr val="accent1"/>
+          </a:fillRef>
+          <a:effectRef idx="0">
+            <a:schemeClr val="accent1"/>
+          </a:effectRef>
+          <a:fontRef idx="minor">
+            <a:schemeClr val="lt1"/>
+          </a:fontRef>
+        </p:style>
+        <p:txBody>
+          <a:bodyPr rtlCol="0" anchor="ctr"/>
+          <a:lstStyle/>
+          <a:p>
+            <a:pPr algn="ctr"/>
+            <a:r>
+              <a:rPr lang="en-US" sz="1200" smtClean="0">
+                <a:latin typeface="Calibri" panose="020F0502020204030204" pitchFamily="34" charset="0"/>
+                <a:cs typeface="Calibri" panose="020F0502020204030204" pitchFamily="34" charset="0"/>
+              </a:rPr>
+              <a:t>Service</a:t>
+            </a:r>
+            <a:endParaRPr lang="en-US" sz="1200">
+              <a:latin typeface="Calibri" panose="020F0502020204030204" pitchFamily="34" charset="0"/>
+              <a:cs typeface="Calibri" panose="020F0502020204030204" pitchFamily="34" charset="0"/>
+            </a:endParaRPr>
+          </a:p>
+        </p:txBody>
+      </p:sp>
+      <p:sp>
+        <p:nvSpPr>
+          <p:cNvPr id="85" name="Left-Right Arrow 84"/>
+          <p:cNvSpPr/>
+          <p:nvPr/>
+        </p:nvSpPr>
+        <p:spPr>
+          <a:xfrm>
+            <a:off x="5652434" y="3329634"/>
+            <a:ext cx="1179873" cy="200025"/>
+          </a:xfrm>
+          <a:prstGeom prst="leftRightArrow">
+            <a:avLst/>
+          </a:prstGeom>
+          <a:solidFill>
+            <a:schemeClr val="bg2"/>
+          </a:solidFill>
+          <a:ln w="3175">
+            <a:solidFill>
+              <a:srgbClr val="00B0F0"/>
+            </a:solidFill>
+          </a:ln>
+        </p:spPr>
+        <p:style>
+          <a:lnRef idx="2">
+            <a:schemeClr val="accent1">
+              <a:shade val="50000"/>
+            </a:schemeClr>
+          </a:lnRef>
+          <a:fillRef idx="1">
+            <a:schemeClr val="accent1"/>
+          </a:fillRef>
+          <a:effectRef idx="0">
+            <a:schemeClr val="accent1"/>
+          </a:effectRef>
+          <a:fontRef idx="minor">
+            <a:schemeClr val="lt1"/>
+          </a:fontRef>
+        </p:style>
+        <p:txBody>
+          <a:bodyPr rtlCol="0" anchor="ctr"/>
+          <a:lstStyle/>
+          <a:p>
+            <a:pPr algn="ctr"/>
+            <a:r>
+              <a:rPr lang="en-US" sz="1200" smtClean="0">
+                <a:latin typeface="Calibri" panose="020F0502020204030204" pitchFamily="34" charset="0"/>
+                <a:cs typeface="Calibri" panose="020F0502020204030204" pitchFamily="34" charset="0"/>
+              </a:rPr>
+              <a:t>Service</a:t>
+            </a:r>
+            <a:endParaRPr lang="en-US" sz="1200">
+              <a:latin typeface="Calibri" panose="020F0502020204030204" pitchFamily="34" charset="0"/>
+              <a:cs typeface="Calibri" panose="020F0502020204030204" pitchFamily="34" charset="0"/>
+            </a:endParaRPr>
+          </a:p>
+        </p:txBody>
+      </p:sp>
+      <p:sp>
+        <p:nvSpPr>
+          <p:cNvPr id="86" name="Left-Right Arrow 85"/>
+          <p:cNvSpPr/>
+          <p:nvPr/>
+        </p:nvSpPr>
+        <p:spPr>
+          <a:xfrm>
+            <a:off x="7574521" y="3343534"/>
+            <a:ext cx="1179873" cy="200025"/>
+          </a:xfrm>
+          <a:prstGeom prst="leftRightArrow">
+            <a:avLst/>
+          </a:prstGeom>
+          <a:solidFill>
+            <a:schemeClr val="accent1"/>
+          </a:solidFill>
+          <a:ln w="3175">
+            <a:solidFill>
+              <a:srgbClr val="00B0F0"/>
+            </a:solidFill>
+          </a:ln>
+        </p:spPr>
+        <p:style>
+          <a:lnRef idx="2">
+            <a:schemeClr val="accent1">
+              <a:shade val="50000"/>
+            </a:schemeClr>
+          </a:lnRef>
+          <a:fillRef idx="1">
+            <a:schemeClr val="accent1"/>
+          </a:fillRef>
+          <a:effectRef idx="0">
+            <a:schemeClr val="accent1"/>
+          </a:effectRef>
+          <a:fontRef idx="minor">
+            <a:schemeClr val="lt1"/>
+          </a:fontRef>
+        </p:style>
+        <p:txBody>
+          <a:bodyPr rtlCol="0" anchor="ctr"/>
+          <a:lstStyle/>
+          <a:p>
+            <a:pPr algn="ctr"/>
+            <a:r>
+              <a:rPr lang="en-US" sz="1200" smtClean="0">
+                <a:latin typeface="Calibri" panose="020F0502020204030204" pitchFamily="34" charset="0"/>
+                <a:cs typeface="Calibri" panose="020F0502020204030204" pitchFamily="34" charset="0"/>
+              </a:rPr>
+              <a:t>Service</a:t>
+            </a:r>
+            <a:endParaRPr lang="en-US" sz="1200">
+              <a:latin typeface="Calibri" panose="020F0502020204030204" pitchFamily="34" charset="0"/>
+              <a:cs typeface="Calibri" panose="020F0502020204030204" pitchFamily="34" charset="0"/>
+            </a:endParaRPr>
+          </a:p>
+        </p:txBody>
+      </p:sp>
+      <p:sp>
+        <p:nvSpPr>
+          <p:cNvPr id="87" name="Left-Right Arrow 86"/>
+          <p:cNvSpPr/>
+          <p:nvPr/>
+        </p:nvSpPr>
+        <p:spPr>
+          <a:xfrm>
+            <a:off x="5652434" y="1805817"/>
+            <a:ext cx="1179873" cy="200025"/>
+          </a:xfrm>
+          <a:prstGeom prst="leftRightArrow">
+            <a:avLst/>
+          </a:prstGeom>
+          <a:solidFill>
+            <a:srgbClr val="0070C0"/>
+          </a:solidFill>
+          <a:ln w="3175">
+            <a:solidFill>
+              <a:srgbClr val="00B0F0"/>
+            </a:solidFill>
+          </a:ln>
+        </p:spPr>
+        <p:style>
+          <a:lnRef idx="2">
+            <a:schemeClr val="accent1">
+              <a:shade val="50000"/>
+            </a:schemeClr>
+          </a:lnRef>
+          <a:fillRef idx="1">
+            <a:schemeClr val="accent1"/>
+          </a:fillRef>
+          <a:effectRef idx="0">
+            <a:schemeClr val="accent1"/>
+          </a:effectRef>
+          <a:fontRef idx="minor">
+            <a:schemeClr val="lt1"/>
+          </a:fontRef>
+        </p:style>
+        <p:txBody>
+          <a:bodyPr rtlCol="0" anchor="ctr"/>
+          <a:lstStyle/>
+          <a:p>
+            <a:pPr algn="ctr"/>
+            <a:r>
+              <a:rPr lang="en-US" sz="1200" smtClean="0">
+                <a:latin typeface="Calibri" panose="020F0502020204030204" pitchFamily="34" charset="0"/>
+                <a:cs typeface="Calibri" panose="020F0502020204030204" pitchFamily="34" charset="0"/>
+              </a:rPr>
+              <a:t>Service</a:t>
+            </a:r>
+            <a:endParaRPr lang="en-US" sz="1200">
+              <a:latin typeface="Calibri" panose="020F0502020204030204" pitchFamily="34" charset="0"/>
+              <a:cs typeface="Calibri" panose="020F0502020204030204" pitchFamily="34" charset="0"/>
+            </a:endParaRPr>
+          </a:p>
+        </p:txBody>
+      </p:sp>
+      <p:cxnSp>
+        <p:nvCxnSpPr>
+          <p:cNvPr id="90" name="Straight Arrow Connector 89"/>
+          <p:cNvCxnSpPr>
+            <a:stCxn id="69" idx="2"/>
+            <a:endCxn id="62" idx="1"/>
+          </p:cNvCxnSpPr>
+          <p:nvPr/>
+        </p:nvCxnSpPr>
+        <p:spPr>
+          <a:xfrm flipH="1">
+            <a:off x="4320281" y="3109910"/>
+            <a:ext cx="1930512" cy="267329"/>
+          </a:xfrm>
+          <a:prstGeom prst="straightConnector1">
+            <a:avLst/>
+          </a:prstGeom>
+          <a:ln>
+            <a:tailEnd type="triangle"/>
+          </a:ln>
+        </p:spPr>
+        <p:style>
+          <a:lnRef idx="1">
+            <a:schemeClr val="accent3"/>
+          </a:lnRef>
+          <a:fillRef idx="0">
+            <a:schemeClr val="accent3"/>
+          </a:fillRef>
+          <a:effectRef idx="0">
+            <a:schemeClr val="accent3"/>
+          </a:effectRef>
+          <a:fontRef idx="minor">
+            <a:schemeClr val="tx1"/>
+          </a:fontRef>
+        </p:style>
+      </p:cxnSp>
+      <p:cxnSp>
+        <p:nvCxnSpPr>
+          <p:cNvPr id="92" name="Straight Arrow Connector 91"/>
+          <p:cNvCxnSpPr>
+            <a:stCxn id="69" idx="2"/>
+            <a:endCxn id="85" idx="1"/>
+          </p:cNvCxnSpPr>
+          <p:nvPr/>
+        </p:nvCxnSpPr>
+        <p:spPr>
+          <a:xfrm flipH="1">
+            <a:off x="6242371" y="3109910"/>
+            <a:ext cx="8422" cy="269730"/>
+          </a:xfrm>
+          <a:prstGeom prst="straightConnector1">
+            <a:avLst/>
+          </a:prstGeom>
+          <a:ln>
+            <a:tailEnd type="triangle"/>
+          </a:ln>
+        </p:spPr>
+        <p:style>
+          <a:lnRef idx="1">
+            <a:schemeClr val="accent3"/>
+          </a:lnRef>
+          <a:fillRef idx="0">
+            <a:schemeClr val="accent3"/>
+          </a:fillRef>
+          <a:effectRef idx="0">
+            <a:schemeClr val="accent3"/>
+          </a:effectRef>
+          <a:fontRef idx="minor">
+            <a:schemeClr val="tx1"/>
+          </a:fontRef>
+        </p:style>
+      </p:cxnSp>
+      <p:cxnSp>
+        <p:nvCxnSpPr>
+          <p:cNvPr id="94" name="Straight Arrow Connector 93"/>
+          <p:cNvCxnSpPr>
+            <a:stCxn id="69" idx="2"/>
+            <a:endCxn id="86" idx="1"/>
+          </p:cNvCxnSpPr>
+          <p:nvPr/>
+        </p:nvCxnSpPr>
+        <p:spPr>
+          <a:xfrm>
+            <a:off x="6250793" y="3109910"/>
+            <a:ext cx="1913665" cy="283630"/>
+          </a:xfrm>
+          <a:prstGeom prst="straightConnector1">
+            <a:avLst/>
+          </a:prstGeom>
+          <a:ln>
+            <a:tailEnd type="triangle"/>
+          </a:ln>
+        </p:spPr>
+        <p:style>
+          <a:lnRef idx="1">
+            <a:schemeClr val="accent3"/>
+          </a:lnRef>
+          <a:fillRef idx="0">
+            <a:schemeClr val="accent3"/>
+          </a:fillRef>
+          <a:effectRef idx="0">
+            <a:schemeClr val="accent3"/>
+          </a:effectRef>
+          <a:fontRef idx="minor">
+            <a:schemeClr val="tx1"/>
+          </a:fontRef>
+        </p:style>
+      </p:cxnSp>
+      <p:sp>
+        <p:nvSpPr>
+          <p:cNvPr id="99" name="Google Shape;80;p16"/>
+          <p:cNvSpPr txBox="1">
+            <a:spLocks noGrp="1"/>
+          </p:cNvSpPr>
+          <p:nvPr>
+            <p:ph type="body" idx="1"/>
+          </p:nvPr>
+        </p:nvSpPr>
+        <p:spPr>
+          <a:xfrm>
+            <a:off x="311700" y="1283841"/>
+            <a:ext cx="3275313" cy="3298275"/>
+          </a:xfrm>
+          <a:prstGeom prst="rect">
+            <a:avLst/>
+          </a:prstGeom>
+        </p:spPr>
+        <p:txBody>
+          <a:bodyPr spcFirstLastPara="1" wrap="square" lIns="91425" tIns="91425" rIns="91425" bIns="91425" anchor="t" anchorCtr="0">
+            <a:noAutofit/>
+          </a:bodyPr>
+          <a:lstStyle/>
+          <a:p>
+            <a:pPr lvl="0">
+              <a:buClr>
+                <a:srgbClr val="666666"/>
+              </a:buClr>
+            </a:pPr>
+            <a:r>
+              <a:rPr lang="en-US" sz="1600" smtClean="0">
+                <a:solidFill>
+                  <a:srgbClr val="666666"/>
+                </a:solidFill>
+                <a:latin typeface="Roboto"/>
+                <a:ea typeface="Roboto"/>
+                <a:cs typeface="Roboto"/>
+                <a:sym typeface="Roboto"/>
+              </a:rPr>
+              <a:t>Các bước triển khai:</a:t>
+            </a:r>
+            <a:endParaRPr lang="en-US" sz="1200">
+              <a:solidFill>
+                <a:srgbClr val="666666"/>
+              </a:solidFill>
+            </a:endParaRPr>
+          </a:p>
+          <a:p>
+            <a:pPr lvl="1">
+              <a:spcBef>
+                <a:spcPts val="0"/>
+              </a:spcBef>
+              <a:buClr>
+                <a:srgbClr val="666666"/>
+              </a:buClr>
+            </a:pPr>
+            <a:r>
+              <a:rPr lang="en-US" smtClean="0">
+                <a:solidFill>
+                  <a:srgbClr val="666666"/>
+                </a:solidFill>
+                <a:sym typeface="Roboto"/>
+              </a:rPr>
+              <a:t>Triển khai Pods</a:t>
+            </a:r>
+          </a:p>
+          <a:p>
+            <a:pPr lvl="1">
+              <a:spcBef>
+                <a:spcPts val="0"/>
+              </a:spcBef>
+              <a:buClr>
+                <a:srgbClr val="666666"/>
+              </a:buClr>
+            </a:pPr>
+            <a:r>
+              <a:rPr lang="en-US" smtClean="0">
+                <a:solidFill>
+                  <a:srgbClr val="666666"/>
+                </a:solidFill>
+              </a:rPr>
+              <a:t>Triển khai ingress</a:t>
+            </a:r>
+            <a:endParaRPr lang="en-US" smtClean="0">
+              <a:solidFill>
+                <a:srgbClr val="666666"/>
+              </a:solidFill>
+              <a:sym typeface="Roboto"/>
+            </a:endParaRPr>
+          </a:p>
+          <a:p>
+            <a:pPr lvl="1">
+              <a:spcBef>
+                <a:spcPts val="0"/>
+              </a:spcBef>
+              <a:buClr>
+                <a:srgbClr val="666666"/>
+              </a:buClr>
+            </a:pPr>
+            <a:r>
+              <a:rPr lang="en-US" smtClean="0">
+                <a:solidFill>
+                  <a:srgbClr val="666666"/>
+                </a:solidFill>
+              </a:rPr>
+              <a:t>Triển khai các service</a:t>
+            </a:r>
+            <a:endParaRPr lang="en-US" smtClean="0">
+              <a:solidFill>
+                <a:srgbClr val="666666"/>
+              </a:solidFill>
+              <a:sym typeface="Roboto"/>
+            </a:endParaRPr>
+          </a:p>
+        </p:txBody>
+      </p:sp>
+      <p:sp>
+        <p:nvSpPr>
+          <p:cNvPr id="97" name="Rectangle 96"/>
+          <p:cNvSpPr/>
+          <p:nvPr/>
+        </p:nvSpPr>
+        <p:spPr>
+          <a:xfrm>
+            <a:off x="5667616" y="1406113"/>
+            <a:ext cx="1119891" cy="247650"/>
+          </a:xfrm>
+          <a:prstGeom prst="rect">
+            <a:avLst/>
+          </a:prstGeom>
+          <a:solidFill>
+            <a:srgbClr val="00B050"/>
+          </a:solidFill>
+          <a:ln>
+            <a:noFill/>
+          </a:ln>
+        </p:spPr>
+        <p:style>
+          <a:lnRef idx="2">
+            <a:schemeClr val="accent1">
+              <a:shade val="50000"/>
+            </a:schemeClr>
+          </a:lnRef>
+          <a:fillRef idx="1">
+            <a:schemeClr val="accent1"/>
+          </a:fillRef>
+          <a:effectRef idx="0">
+            <a:schemeClr val="accent1"/>
+          </a:effectRef>
+          <a:fontRef idx="minor">
+            <a:schemeClr val="lt1"/>
+          </a:fontRef>
+        </p:style>
+        <p:txBody>
+          <a:bodyPr rtlCol="0" anchor="ctr"/>
+          <a:lstStyle/>
+          <a:p>
+            <a:pPr algn="ctr"/>
+            <a:r>
+              <a:rPr lang="en-US" sz="1200" smtClean="0">
+                <a:latin typeface="Calibri" panose="020F0502020204030204" pitchFamily="34" charset="0"/>
+                <a:cs typeface="Calibri" panose="020F0502020204030204" pitchFamily="34" charset="0"/>
+              </a:rPr>
+              <a:t>Ingress</a:t>
+            </a:r>
+            <a:endParaRPr lang="en-US" sz="1200">
+              <a:latin typeface="Calibri" panose="020F0502020204030204" pitchFamily="34" charset="0"/>
+              <a:cs typeface="Calibri" panose="020F0502020204030204" pitchFamily="34" charset="0"/>
+            </a:endParaRPr>
+          </a:p>
+        </p:txBody>
+      </p:sp>
+      <p:cxnSp>
+        <p:nvCxnSpPr>
+          <p:cNvPr id="100" name="Straight Arrow Connector 99"/>
+          <p:cNvCxnSpPr>
+            <a:endCxn id="97" idx="0"/>
+          </p:cNvCxnSpPr>
+          <p:nvPr/>
+        </p:nvCxnSpPr>
+        <p:spPr>
+          <a:xfrm>
+            <a:off x="6227561" y="1160732"/>
+            <a:ext cx="1" cy="245381"/>
+          </a:xfrm>
+          <a:prstGeom prst="straightConnector1">
+            <a:avLst/>
+          </a:prstGeom>
+          <a:ln>
+            <a:tailEnd type="triangle"/>
+          </a:ln>
+        </p:spPr>
+        <p:style>
+          <a:lnRef idx="1">
+            <a:schemeClr val="accent3"/>
+          </a:lnRef>
+          <a:fillRef idx="0">
+            <a:schemeClr val="accent3"/>
+          </a:fillRef>
+          <a:effectRef idx="0">
+            <a:schemeClr val="accent3"/>
+          </a:effectRef>
+          <a:fontRef idx="minor">
+            <a:schemeClr val="tx1"/>
+          </a:fontRef>
+        </p:style>
+      </p:cxnSp>
+      <p:cxnSp>
+        <p:nvCxnSpPr>
+          <p:cNvPr id="103" name="Straight Arrow Connector 102"/>
+          <p:cNvCxnSpPr>
+            <a:stCxn id="97" idx="2"/>
+            <a:endCxn id="87" idx="1"/>
+          </p:cNvCxnSpPr>
+          <p:nvPr/>
+        </p:nvCxnSpPr>
+        <p:spPr>
+          <a:xfrm>
+            <a:off x="6227562" y="1653763"/>
+            <a:ext cx="14809" cy="202060"/>
+          </a:xfrm>
+          <a:prstGeom prst="straightConnector1">
+            <a:avLst/>
+          </a:prstGeom>
+          <a:ln>
+            <a:tailEnd type="triangle"/>
+          </a:ln>
+        </p:spPr>
+        <p:style>
+          <a:lnRef idx="1">
+            <a:schemeClr val="accent3"/>
+          </a:lnRef>
+          <a:fillRef idx="0">
+            <a:schemeClr val="accent3"/>
+          </a:fillRef>
+          <a:effectRef idx="0">
+            <a:schemeClr val="accent3"/>
+          </a:effectRef>
+          <a:fontRef idx="minor">
+            <a:schemeClr val="tx1"/>
+          </a:fontRef>
+        </p:style>
+      </p:cxnSp>
+    </p:spTree>
+    <p:extLst>
+      <p:ext uri="{BB962C8B-B14F-4D97-AF65-F5344CB8AC3E}">
+        <p14:creationId xmlns:p14="http://schemas.microsoft.com/office/powerpoint/2010/main" val="3078019112"/>
+      </p:ext>
+    </p:extLst>
+  </p:cSld>
+  <p:clrMapOvr>
+    <a:masterClrMapping/>
+  </p:clrMapOvr>
+  <p:timing>
+    <p:tnLst>
+      <p:par>
+        <p:cTn id="1" dur="indefinite" restart="never" nodeType="tmRoot"/>
+      </p:par>
+    </p:tnLst>
+  </p:timing>
+</p:sld>
+</file>
+
+<file path=ppt/slides/slide37.xml><?xml version="1.0" encoding="utf-8"?>
+<p:sld xmlns:a="http://schemas.openxmlformats.org/drawingml/2006/main" xmlns:r="http://schemas.openxmlformats.org/officeDocument/2006/relationships" xmlns:p="http://schemas.openxmlformats.org/presentationml/2006/main">
+  <p:cSld>
+    <p:spTree>
+      <p:nvGrpSpPr>
+        <p:cNvPr id="1" name="Shape 95"/>
+        <p:cNvGrpSpPr/>
+        <p:nvPr/>
+      </p:nvGrpSpPr>
+      <p:grpSpPr>
+        <a:xfrm>
+          <a:off x="0" y="0"/>
+          <a:ext cx="0" cy="0"/>
+          <a:chOff x="0" y="0"/>
+          <a:chExt cx="0" cy="0"/>
+        </a:xfrm>
+      </p:grpSpPr>
+      <p:sp>
+        <p:nvSpPr>
+          <p:cNvPr id="2" name="Rectangle 1"/>
+          <p:cNvSpPr/>
+          <p:nvPr/>
+        </p:nvSpPr>
+        <p:spPr>
+          <a:xfrm>
+            <a:off x="715976" y="2188518"/>
+            <a:ext cx="923924" cy="874620"/>
+          </a:xfrm>
+          <a:prstGeom prst="rect">
+            <a:avLst/>
+          </a:prstGeom>
+          <a:noFill/>
+          <a:ln w="3175">
+            <a:solidFill>
+              <a:schemeClr val="bg2"/>
+            </a:solidFill>
+            <a:prstDash val="lgDash"/>
+          </a:ln>
+        </p:spPr>
+        <p:style>
+          <a:lnRef idx="2">
+            <a:schemeClr val="accent1">
+              <a:shade val="50000"/>
+            </a:schemeClr>
+          </a:lnRef>
+          <a:fillRef idx="1">
+            <a:schemeClr val="accent1"/>
+          </a:fillRef>
+          <a:effectRef idx="0">
+            <a:schemeClr val="accent1"/>
+          </a:effectRef>
+          <a:fontRef idx="minor">
+            <a:schemeClr val="lt1"/>
+          </a:fontRef>
+        </p:style>
+        <p:txBody>
+          <a:bodyPr rtlCol="0" anchor="t"/>
+          <a:lstStyle/>
+          <a:p>
+            <a:pPr algn="ctr"/>
+            <a:r>
+              <a:rPr lang="en-US" sz="1050" smtClean="0">
+                <a:solidFill>
+                  <a:schemeClr val="bg2"/>
+                </a:solidFill>
+              </a:rPr>
+              <a:t>Ingress</a:t>
+            </a:r>
+            <a:endParaRPr lang="en-US">
+              <a:solidFill>
+                <a:schemeClr val="bg2"/>
+              </a:solidFill>
+            </a:endParaRPr>
+          </a:p>
+        </p:txBody>
+      </p:sp>
+      <p:cxnSp>
+        <p:nvCxnSpPr>
+          <p:cNvPr id="10" name="Straight Arrow Connector 9"/>
+          <p:cNvCxnSpPr/>
+          <p:nvPr/>
+        </p:nvCxnSpPr>
+        <p:spPr>
+          <a:xfrm>
+            <a:off x="195170" y="2662701"/>
+            <a:ext cx="688632" cy="0"/>
+          </a:xfrm>
+          <a:prstGeom prst="straightConnector1">
+            <a:avLst/>
+          </a:prstGeom>
+          <a:ln w="12700" cap="flat" cmpd="sng" algn="ctr">
+            <a:solidFill>
+              <a:schemeClr val="accent5"/>
+            </a:solidFill>
+            <a:prstDash val="dash"/>
+            <a:round/>
+            <a:headEnd type="none" w="med" len="med"/>
+            <a:tailEnd type="none" w="med" len="med"/>
+          </a:ln>
+        </p:spPr>
+        <p:style>
+          <a:lnRef idx="0">
+            <a:scrgbClr r="0" g="0" b="0"/>
+          </a:lnRef>
+          <a:fillRef idx="0">
+            <a:scrgbClr r="0" g="0" b="0"/>
+          </a:fillRef>
+          <a:effectRef idx="0">
+            <a:scrgbClr r="0" g="0" b="0"/>
+          </a:effectRef>
+          <a:fontRef idx="minor">
+            <a:schemeClr val="tx1"/>
+          </a:fontRef>
+        </p:style>
+      </p:cxnSp>
+      <p:sp>
+        <p:nvSpPr>
+          <p:cNvPr id="17" name="Rectangle 16"/>
+          <p:cNvSpPr/>
+          <p:nvPr/>
+        </p:nvSpPr>
+        <p:spPr>
+          <a:xfrm>
+            <a:off x="1974905" y="2115403"/>
+            <a:ext cx="1628775" cy="1445781"/>
+          </a:xfrm>
+          <a:prstGeom prst="rect">
+            <a:avLst/>
+          </a:prstGeom>
+          <a:noFill/>
+          <a:ln w="12700">
+            <a:solidFill>
+              <a:schemeClr val="bg2"/>
+            </a:solidFill>
+            <a:prstDash val="lgDash"/>
+          </a:ln>
+        </p:spPr>
+        <p:style>
+          <a:lnRef idx="2">
+            <a:schemeClr val="accent1">
+              <a:shade val="50000"/>
+            </a:schemeClr>
+          </a:lnRef>
+          <a:fillRef idx="1">
+            <a:schemeClr val="accent1"/>
+          </a:fillRef>
+          <a:effectRef idx="0">
+            <a:schemeClr val="accent1"/>
+          </a:effectRef>
+          <a:fontRef idx="minor">
+            <a:schemeClr val="lt1"/>
+          </a:fontRef>
+        </p:style>
+        <p:txBody>
+          <a:bodyPr rtlCol="0" anchor="t"/>
+          <a:lstStyle/>
+          <a:p>
+            <a:pPr algn="ctr"/>
+            <a:r>
+              <a:rPr lang="en-US" sz="1050" smtClean="0">
+                <a:solidFill>
+                  <a:schemeClr val="bg2"/>
+                </a:solidFill>
+              </a:rPr>
+              <a:t>Nextcloud</a:t>
+            </a:r>
+            <a:endParaRPr lang="en-US">
+              <a:solidFill>
+                <a:schemeClr val="bg2"/>
+              </a:solidFill>
+            </a:endParaRPr>
+          </a:p>
+        </p:txBody>
+      </p:sp>
+      <p:pic>
+        <p:nvPicPr>
+          <p:cNvPr id="18" name="Picture 17"/>
+          <p:cNvPicPr>
+            <a:picLocks noChangeAspect="1"/>
+          </p:cNvPicPr>
+          <p:nvPr/>
+        </p:nvPicPr>
+        <p:blipFill>
+          <a:blip r:embed="rId3">
+            <a:extLst>
+              <a:ext uri="{28A0092B-C50C-407E-A947-70E740481C1C}">
+                <a14:useLocalDpi xmlns:a14="http://schemas.microsoft.com/office/drawing/2010/main" val="0"/>
+              </a:ext>
+            </a:extLst>
+          </a:blip>
+          <a:stretch>
+            <a:fillRect/>
+          </a:stretch>
+        </p:blipFill>
+        <p:spPr>
+          <a:xfrm>
+            <a:off x="2544803" y="2391182"/>
+            <a:ext cx="548640" cy="531494"/>
+          </a:xfrm>
+          <a:prstGeom prst="rect">
+            <a:avLst/>
+          </a:prstGeom>
+        </p:spPr>
+      </p:pic>
+      <p:pic>
+        <p:nvPicPr>
+          <p:cNvPr id="24" name="Picture 23"/>
+          <p:cNvPicPr>
+            <a:picLocks noChangeAspect="1"/>
+          </p:cNvPicPr>
+          <p:nvPr/>
+        </p:nvPicPr>
+        <p:blipFill>
+          <a:blip r:embed="rId4">
+            <a:extLst>
+              <a:ext uri="{28A0092B-C50C-407E-A947-70E740481C1C}">
+                <a14:useLocalDpi xmlns:a14="http://schemas.microsoft.com/office/drawing/2010/main" val="0"/>
+              </a:ext>
+            </a:extLst>
+          </a:blip>
+          <a:stretch>
+            <a:fillRect/>
+          </a:stretch>
+        </p:blipFill>
+        <p:spPr>
+          <a:xfrm>
+            <a:off x="2990211" y="2906354"/>
+            <a:ext cx="548640" cy="548640"/>
+          </a:xfrm>
+          <a:prstGeom prst="rect">
+            <a:avLst/>
+          </a:prstGeom>
+        </p:spPr>
+      </p:pic>
+      <p:cxnSp>
+        <p:nvCxnSpPr>
+          <p:cNvPr id="29" name="Elbow Connector 28"/>
+          <p:cNvCxnSpPr>
+            <a:stCxn id="18" idx="3"/>
+            <a:endCxn id="24" idx="0"/>
+          </p:cNvCxnSpPr>
+          <p:nvPr/>
+        </p:nvCxnSpPr>
+        <p:spPr>
+          <a:xfrm>
+            <a:off x="3093443" y="2656929"/>
+            <a:ext cx="171088" cy="249425"/>
+          </a:xfrm>
+          <a:prstGeom prst="bentConnector2">
+            <a:avLst/>
+          </a:prstGeom>
+          <a:ln w="12700" cap="flat" cmpd="sng" algn="ctr">
+            <a:solidFill>
+              <a:schemeClr val="accent5"/>
+            </a:solidFill>
+            <a:prstDash val="dash"/>
+            <a:round/>
+            <a:headEnd type="none" w="med" len="med"/>
+            <a:tailEnd type="none" w="med" len="med"/>
+          </a:ln>
+        </p:spPr>
+        <p:style>
+          <a:lnRef idx="0">
+            <a:scrgbClr r="0" g="0" b="0"/>
+          </a:lnRef>
+          <a:fillRef idx="0">
+            <a:scrgbClr r="0" g="0" b="0"/>
+          </a:fillRef>
+          <a:effectRef idx="0">
+            <a:scrgbClr r="0" g="0" b="0"/>
+          </a:effectRef>
+          <a:fontRef idx="minor">
+            <a:schemeClr val="tx1"/>
+          </a:fontRef>
+        </p:style>
+      </p:cxnSp>
+      <p:sp>
+        <p:nvSpPr>
+          <p:cNvPr id="46" name="Rectangle 45"/>
+          <p:cNvSpPr/>
+          <p:nvPr/>
+        </p:nvSpPr>
+        <p:spPr>
+          <a:xfrm>
+            <a:off x="3671611" y="562296"/>
+            <a:ext cx="1552575" cy="1407418"/>
+          </a:xfrm>
+          <a:prstGeom prst="rect">
+            <a:avLst/>
+          </a:prstGeom>
+          <a:noFill/>
+          <a:ln w="3175">
+            <a:solidFill>
+              <a:schemeClr val="bg2"/>
+            </a:solidFill>
+            <a:prstDash val="lgDash"/>
+          </a:ln>
+        </p:spPr>
+        <p:style>
+          <a:lnRef idx="2">
+            <a:schemeClr val="accent1">
+              <a:shade val="50000"/>
+            </a:schemeClr>
+          </a:lnRef>
+          <a:fillRef idx="1">
+            <a:schemeClr val="accent1"/>
+          </a:fillRef>
+          <a:effectRef idx="0">
+            <a:schemeClr val="accent1"/>
+          </a:effectRef>
+          <a:fontRef idx="minor">
+            <a:schemeClr val="lt1"/>
+          </a:fontRef>
+        </p:style>
+        <p:txBody>
+          <a:bodyPr rtlCol="0" anchor="t"/>
+          <a:lstStyle/>
+          <a:p>
+            <a:pPr algn="ctr"/>
+            <a:r>
+              <a:rPr lang="en-US" sz="1050" smtClean="0">
+                <a:solidFill>
+                  <a:schemeClr val="bg2"/>
+                </a:solidFill>
+              </a:rPr>
+              <a:t>Database (Mariadb)</a:t>
+            </a:r>
+            <a:endParaRPr lang="en-US">
+              <a:solidFill>
+                <a:schemeClr val="bg2"/>
+              </a:solidFill>
+            </a:endParaRPr>
+          </a:p>
+        </p:txBody>
+      </p:sp>
+      <p:pic>
+        <p:nvPicPr>
+          <p:cNvPr id="47" name="Picture 46"/>
+          <p:cNvPicPr>
+            <a:picLocks noChangeAspect="1"/>
+          </p:cNvPicPr>
+          <p:nvPr/>
+        </p:nvPicPr>
+        <p:blipFill>
+          <a:blip r:embed="rId3">
+            <a:extLst>
+              <a:ext uri="{28A0092B-C50C-407E-A947-70E740481C1C}">
+                <a14:useLocalDpi xmlns:a14="http://schemas.microsoft.com/office/drawing/2010/main" val="0"/>
+              </a:ext>
+            </a:extLst>
+          </a:blip>
+          <a:stretch>
+            <a:fillRect/>
+          </a:stretch>
+        </p:blipFill>
+        <p:spPr>
+          <a:xfrm>
+            <a:off x="4193171" y="830228"/>
+            <a:ext cx="548640" cy="531494"/>
+          </a:xfrm>
+          <a:prstGeom prst="rect">
+            <a:avLst/>
+          </a:prstGeom>
+        </p:spPr>
+      </p:pic>
+      <p:pic>
+        <p:nvPicPr>
+          <p:cNvPr id="48" name="Picture 47"/>
+          <p:cNvPicPr>
+            <a:picLocks noChangeAspect="1"/>
+          </p:cNvPicPr>
+          <p:nvPr/>
+        </p:nvPicPr>
+        <p:blipFill>
+          <a:blip r:embed="rId4">
+            <a:extLst>
+              <a:ext uri="{28A0092B-C50C-407E-A947-70E740481C1C}">
+                <a14:useLocalDpi xmlns:a14="http://schemas.microsoft.com/office/drawing/2010/main" val="0"/>
+              </a:ext>
+            </a:extLst>
+          </a:blip>
+          <a:stretch>
+            <a:fillRect/>
+          </a:stretch>
+        </p:blipFill>
+        <p:spPr>
+          <a:xfrm>
+            <a:off x="4632198" y="1361722"/>
+            <a:ext cx="548640" cy="548640"/>
+          </a:xfrm>
+          <a:prstGeom prst="rect">
+            <a:avLst/>
+          </a:prstGeom>
+        </p:spPr>
+      </p:pic>
+      <p:cxnSp>
+        <p:nvCxnSpPr>
+          <p:cNvPr id="49" name="Elbow Connector 48"/>
+          <p:cNvCxnSpPr>
+            <a:stCxn id="47" idx="3"/>
+            <a:endCxn id="48" idx="0"/>
+          </p:cNvCxnSpPr>
+          <p:nvPr/>
+        </p:nvCxnSpPr>
+        <p:spPr>
+          <a:xfrm>
+            <a:off x="4741811" y="1095975"/>
+            <a:ext cx="164707" cy="265747"/>
+          </a:xfrm>
+          <a:prstGeom prst="bentConnector2">
+            <a:avLst/>
+          </a:prstGeom>
+          <a:ln w="12700" cap="flat" cmpd="sng" algn="ctr">
+            <a:solidFill>
+              <a:schemeClr val="accent5"/>
+            </a:solidFill>
+            <a:prstDash val="dash"/>
+            <a:round/>
+            <a:headEnd type="none" w="med" len="med"/>
+            <a:tailEnd type="none" w="med" len="med"/>
+          </a:ln>
+        </p:spPr>
+        <p:style>
+          <a:lnRef idx="0">
+            <a:scrgbClr r="0" g="0" b="0"/>
+          </a:lnRef>
+          <a:fillRef idx="0">
+            <a:scrgbClr r="0" g="0" b="0"/>
+          </a:fillRef>
+          <a:effectRef idx="0">
+            <a:scrgbClr r="0" g="0" b="0"/>
+          </a:effectRef>
+          <a:fontRef idx="minor">
+            <a:schemeClr val="tx1"/>
+          </a:fontRef>
+        </p:style>
+      </p:cxnSp>
+      <p:sp>
+        <p:nvSpPr>
+          <p:cNvPr id="50" name="Rectangle 49"/>
+          <p:cNvSpPr/>
+          <p:nvPr/>
+        </p:nvSpPr>
+        <p:spPr>
+          <a:xfrm>
+            <a:off x="1965351" y="450356"/>
+            <a:ext cx="1577645" cy="1154568"/>
+          </a:xfrm>
+          <a:prstGeom prst="rect">
+            <a:avLst/>
+          </a:prstGeom>
+          <a:noFill/>
+          <a:ln w="3175">
+            <a:solidFill>
+              <a:schemeClr val="bg2"/>
+            </a:solidFill>
+            <a:prstDash val="lgDash"/>
+          </a:ln>
+        </p:spPr>
+        <p:style>
+          <a:lnRef idx="2">
+            <a:schemeClr val="accent1">
+              <a:shade val="50000"/>
+            </a:schemeClr>
+          </a:lnRef>
+          <a:fillRef idx="1">
+            <a:schemeClr val="accent1"/>
+          </a:fillRef>
+          <a:effectRef idx="0">
+            <a:schemeClr val="accent1"/>
+          </a:effectRef>
+          <a:fontRef idx="minor">
+            <a:schemeClr val="lt1"/>
+          </a:fontRef>
+        </p:style>
+        <p:txBody>
+          <a:bodyPr rtlCol="0" anchor="t"/>
+          <a:lstStyle/>
+          <a:p>
+            <a:pPr algn="ctr"/>
+            <a:r>
+              <a:rPr lang="en-US" sz="1050" smtClean="0">
+                <a:solidFill>
+                  <a:schemeClr val="bg2"/>
+                </a:solidFill>
+              </a:rPr>
+              <a:t>Session </a:t>
+            </a:r>
+            <a:r>
+              <a:rPr lang="en-US" sz="1050" smtClean="0">
+                <a:solidFill>
+                  <a:schemeClr val="bg2"/>
+                </a:solidFill>
+              </a:rPr>
+              <a:t>Storage (Redis)</a:t>
+            </a:r>
+            <a:endParaRPr lang="en-US">
+              <a:solidFill>
+                <a:schemeClr val="bg2"/>
+              </a:solidFill>
+            </a:endParaRPr>
+          </a:p>
+        </p:txBody>
+      </p:sp>
+      <p:pic>
+        <p:nvPicPr>
+          <p:cNvPr id="51" name="Picture 50"/>
+          <p:cNvPicPr>
+            <a:picLocks noChangeAspect="1"/>
+          </p:cNvPicPr>
+          <p:nvPr/>
+        </p:nvPicPr>
+        <p:blipFill>
+          <a:blip r:embed="rId3">
+            <a:extLst>
+              <a:ext uri="{28A0092B-C50C-407E-A947-70E740481C1C}">
+                <a14:useLocalDpi xmlns:a14="http://schemas.microsoft.com/office/drawing/2010/main" val="0"/>
+              </a:ext>
+            </a:extLst>
+          </a:blip>
+          <a:stretch>
+            <a:fillRect/>
+          </a:stretch>
+        </p:blipFill>
+        <p:spPr>
+          <a:xfrm>
+            <a:off x="2886399" y="842023"/>
+            <a:ext cx="548640" cy="531494"/>
+          </a:xfrm>
+          <a:prstGeom prst="rect">
+            <a:avLst/>
+          </a:prstGeom>
+        </p:spPr>
+      </p:pic>
+      <p:sp>
+        <p:nvSpPr>
+          <p:cNvPr id="55" name="Rectangle 54"/>
+          <p:cNvSpPr/>
+          <p:nvPr/>
+        </p:nvSpPr>
+        <p:spPr>
+          <a:xfrm>
+            <a:off x="1977991" y="3934474"/>
+            <a:ext cx="1625689" cy="982131"/>
+          </a:xfrm>
+          <a:prstGeom prst="rect">
+            <a:avLst/>
+          </a:prstGeom>
+          <a:noFill/>
+          <a:ln w="3175">
+            <a:solidFill>
+              <a:schemeClr val="bg2"/>
+            </a:solidFill>
+            <a:prstDash val="lgDash"/>
+          </a:ln>
+        </p:spPr>
+        <p:style>
+          <a:lnRef idx="2">
+            <a:schemeClr val="accent1">
+              <a:shade val="50000"/>
+            </a:schemeClr>
+          </a:lnRef>
+          <a:fillRef idx="1">
+            <a:schemeClr val="accent1"/>
+          </a:fillRef>
+          <a:effectRef idx="0">
+            <a:schemeClr val="accent1"/>
+          </a:effectRef>
+          <a:fontRef idx="minor">
+            <a:schemeClr val="lt1"/>
+          </a:fontRef>
+        </p:style>
+        <p:txBody>
+          <a:bodyPr rtlCol="0" anchor="t"/>
+          <a:lstStyle/>
+          <a:p>
+            <a:pPr algn="ctr"/>
+            <a:r>
+              <a:rPr lang="en-US" sz="1050" smtClean="0">
+                <a:solidFill>
+                  <a:schemeClr val="bg2"/>
+                </a:solidFill>
+              </a:rPr>
+              <a:t>Document Server</a:t>
+            </a:r>
+          </a:p>
+          <a:p>
+            <a:pPr algn="ctr"/>
+            <a:r>
+              <a:rPr lang="en-US" sz="1050" smtClean="0">
+                <a:solidFill>
+                  <a:schemeClr val="bg2"/>
+                </a:solidFill>
+              </a:rPr>
+              <a:t>(OnlyOffice)</a:t>
+            </a:r>
+            <a:endParaRPr lang="en-US">
+              <a:solidFill>
+                <a:schemeClr val="bg2"/>
+              </a:solidFill>
+            </a:endParaRPr>
+          </a:p>
+        </p:txBody>
+      </p:sp>
+      <p:pic>
+        <p:nvPicPr>
+          <p:cNvPr id="56" name="Picture 55"/>
+          <p:cNvPicPr>
+            <a:picLocks noChangeAspect="1"/>
+          </p:cNvPicPr>
+          <p:nvPr/>
+        </p:nvPicPr>
+        <p:blipFill>
+          <a:blip r:embed="rId3">
+            <a:extLst>
+              <a:ext uri="{28A0092B-C50C-407E-A947-70E740481C1C}">
+                <a14:useLocalDpi xmlns:a14="http://schemas.microsoft.com/office/drawing/2010/main" val="0"/>
+              </a:ext>
+            </a:extLst>
+          </a:blip>
+          <a:stretch>
+            <a:fillRect/>
+          </a:stretch>
+        </p:blipFill>
+        <p:spPr>
+          <a:xfrm>
+            <a:off x="2948588" y="4283052"/>
+            <a:ext cx="548640" cy="531494"/>
+          </a:xfrm>
+          <a:prstGeom prst="rect">
+            <a:avLst/>
+          </a:prstGeom>
+        </p:spPr>
+      </p:pic>
+      <p:sp>
+        <p:nvSpPr>
+          <p:cNvPr id="73" name="Rectangle 72"/>
+          <p:cNvSpPr/>
+          <p:nvPr/>
+        </p:nvSpPr>
+        <p:spPr>
+          <a:xfrm>
+            <a:off x="5668585" y="572431"/>
+            <a:ext cx="2639673" cy="4344174"/>
+          </a:xfrm>
+          <a:prstGeom prst="rect">
+            <a:avLst/>
+          </a:prstGeom>
+          <a:noFill/>
+          <a:ln w="3175">
+            <a:solidFill>
+              <a:schemeClr val="bg2"/>
+            </a:solidFill>
+            <a:prstDash val="lgDash"/>
+          </a:ln>
+        </p:spPr>
+        <p:style>
+          <a:lnRef idx="2">
+            <a:schemeClr val="accent1">
+              <a:shade val="50000"/>
+            </a:schemeClr>
+          </a:lnRef>
+          <a:fillRef idx="1">
+            <a:schemeClr val="accent1"/>
+          </a:fillRef>
+          <a:effectRef idx="0">
+            <a:schemeClr val="accent1"/>
+          </a:effectRef>
+          <a:fontRef idx="minor">
+            <a:schemeClr val="lt1"/>
+          </a:fontRef>
+        </p:style>
+        <p:txBody>
+          <a:bodyPr rtlCol="0" anchor="t"/>
+          <a:lstStyle/>
+          <a:p>
+            <a:pPr algn="ctr"/>
+            <a:r>
+              <a:rPr lang="en-US" sz="1050" smtClean="0">
+                <a:solidFill>
+                  <a:schemeClr val="bg2"/>
+                </a:solidFill>
+              </a:rPr>
+              <a:t>Volume</a:t>
+            </a:r>
+            <a:endParaRPr lang="en-US">
+              <a:solidFill>
+                <a:schemeClr val="bg2"/>
+              </a:solidFill>
+            </a:endParaRPr>
+          </a:p>
+        </p:txBody>
+      </p:sp>
+      <p:pic>
+        <p:nvPicPr>
+          <p:cNvPr id="1031" name="Picture 1030"/>
+          <p:cNvPicPr>
+            <a:picLocks noChangeAspect="1"/>
+          </p:cNvPicPr>
+          <p:nvPr/>
+        </p:nvPicPr>
+        <p:blipFill>
+          <a:blip r:embed="rId5">
+            <a:extLst>
+              <a:ext uri="{28A0092B-C50C-407E-A947-70E740481C1C}">
+                <a14:useLocalDpi xmlns:a14="http://schemas.microsoft.com/office/drawing/2010/main" val="0"/>
+              </a:ext>
+            </a:extLst>
+          </a:blip>
+          <a:stretch>
+            <a:fillRect/>
+          </a:stretch>
+        </p:blipFill>
+        <p:spPr>
+          <a:xfrm>
+            <a:off x="5856836" y="842023"/>
+            <a:ext cx="548640" cy="531495"/>
+          </a:xfrm>
+          <a:prstGeom prst="rect">
+            <a:avLst/>
+          </a:prstGeom>
+        </p:spPr>
+      </p:pic>
+      <p:pic>
+        <p:nvPicPr>
+          <p:cNvPr id="75" name="Picture 74"/>
+          <p:cNvPicPr>
+            <a:picLocks noChangeAspect="1"/>
+          </p:cNvPicPr>
+          <p:nvPr/>
+        </p:nvPicPr>
+        <p:blipFill>
+          <a:blip r:embed="rId5">
+            <a:extLst>
+              <a:ext uri="{28A0092B-C50C-407E-A947-70E740481C1C}">
+                <a14:useLocalDpi xmlns:a14="http://schemas.microsoft.com/office/drawing/2010/main" val="0"/>
+              </a:ext>
+            </a:extLst>
+          </a:blip>
+          <a:stretch>
+            <a:fillRect/>
+          </a:stretch>
+        </p:blipFill>
+        <p:spPr>
+          <a:xfrm>
+            <a:off x="5797078" y="2385316"/>
+            <a:ext cx="548640" cy="531495"/>
+          </a:xfrm>
+          <a:prstGeom prst="rect">
+            <a:avLst/>
+          </a:prstGeom>
+        </p:spPr>
+      </p:pic>
+      <p:cxnSp>
+        <p:nvCxnSpPr>
+          <p:cNvPr id="6" name="Straight Connector 5"/>
+          <p:cNvCxnSpPr>
+            <a:stCxn id="47" idx="3"/>
+            <a:endCxn id="1031" idx="1"/>
+          </p:cNvCxnSpPr>
+          <p:nvPr/>
+        </p:nvCxnSpPr>
+        <p:spPr>
+          <a:xfrm>
+            <a:off x="4741811" y="1095975"/>
+            <a:ext cx="1115025" cy="11796"/>
+          </a:xfrm>
+          <a:prstGeom prst="line">
+            <a:avLst/>
+          </a:prstGeom>
+          <a:ln w="12700" cap="flat" cmpd="sng" algn="ctr">
+            <a:solidFill>
+              <a:schemeClr val="accent5"/>
+            </a:solidFill>
+            <a:prstDash val="dash"/>
+            <a:round/>
+            <a:headEnd type="none" w="med" len="med"/>
+            <a:tailEnd type="none" w="med" len="med"/>
+          </a:ln>
+        </p:spPr>
+        <p:style>
+          <a:lnRef idx="0">
+            <a:scrgbClr r="0" g="0" b="0"/>
+          </a:lnRef>
+          <a:fillRef idx="0">
+            <a:scrgbClr r="0" g="0" b="0"/>
+          </a:fillRef>
+          <a:effectRef idx="0">
+            <a:scrgbClr r="0" g="0" b="0"/>
+          </a:effectRef>
+          <a:fontRef idx="minor">
+            <a:schemeClr val="tx1"/>
+          </a:fontRef>
+        </p:style>
+      </p:cxnSp>
+      <p:pic>
+        <p:nvPicPr>
+          <p:cNvPr id="32" name="Picture 31"/>
+          <p:cNvPicPr>
+            <a:picLocks noChangeAspect="1"/>
+          </p:cNvPicPr>
+          <p:nvPr/>
+        </p:nvPicPr>
+        <p:blipFill>
+          <a:blip r:embed="rId6">
+            <a:extLst>
+              <a:ext uri="{28A0092B-C50C-407E-A947-70E740481C1C}">
+                <a14:useLocalDpi xmlns:a14="http://schemas.microsoft.com/office/drawing/2010/main" val="0"/>
+              </a:ext>
+            </a:extLst>
+          </a:blip>
+          <a:stretch>
+            <a:fillRect/>
+          </a:stretch>
+        </p:blipFill>
+        <p:spPr>
+          <a:xfrm>
+            <a:off x="6608187" y="2385316"/>
+            <a:ext cx="548640" cy="531495"/>
+          </a:xfrm>
+          <a:prstGeom prst="rect">
+            <a:avLst/>
+          </a:prstGeom>
+        </p:spPr>
+      </p:pic>
+      <p:cxnSp>
+        <p:nvCxnSpPr>
+          <p:cNvPr id="14" name="Elbow Connector 13"/>
+          <p:cNvCxnSpPr>
+            <a:stCxn id="1031" idx="3"/>
+            <a:endCxn id="32" idx="0"/>
+          </p:cNvCxnSpPr>
+          <p:nvPr/>
+        </p:nvCxnSpPr>
+        <p:spPr>
+          <a:xfrm>
+            <a:off x="6405476" y="1107771"/>
+            <a:ext cx="477031" cy="1277545"/>
+          </a:xfrm>
+          <a:prstGeom prst="bentConnector2">
+            <a:avLst/>
+          </a:prstGeom>
+          <a:ln w="12700" cap="flat" cmpd="sng" algn="ctr">
+            <a:solidFill>
+              <a:schemeClr val="accent5"/>
+            </a:solidFill>
+            <a:prstDash val="dash"/>
+            <a:round/>
+            <a:headEnd type="none" w="med" len="med"/>
+            <a:tailEnd type="none" w="med" len="med"/>
+          </a:ln>
+        </p:spPr>
+        <p:style>
+          <a:lnRef idx="0">
+            <a:scrgbClr r="0" g="0" b="0"/>
+          </a:lnRef>
+          <a:fillRef idx="0">
+            <a:scrgbClr r="0" g="0" b="0"/>
+          </a:fillRef>
+          <a:effectRef idx="0">
+            <a:scrgbClr r="0" g="0" b="0"/>
+          </a:effectRef>
+          <a:fontRef idx="minor">
+            <a:schemeClr val="tx1"/>
+          </a:fontRef>
+        </p:style>
+      </p:cxnSp>
+      <p:sp>
+        <p:nvSpPr>
+          <p:cNvPr id="19" name="Rectangle 18"/>
+          <p:cNvSpPr/>
+          <p:nvPr/>
+        </p:nvSpPr>
+        <p:spPr>
+          <a:xfrm>
+            <a:off x="7653346" y="723275"/>
+            <a:ext cx="536789" cy="3854935"/>
+          </a:xfrm>
+          <a:prstGeom prst="rect">
+            <a:avLst/>
+          </a:prstGeom>
+          <a:solidFill>
+            <a:srgbClr val="6CACD4"/>
+          </a:solidFill>
+          <a:ln>
+            <a:solidFill>
+              <a:srgbClr val="0070C0"/>
+            </a:solidFill>
+          </a:ln>
+        </p:spPr>
+        <p:style>
+          <a:lnRef idx="2">
+            <a:schemeClr val="accent1">
+              <a:shade val="50000"/>
+            </a:schemeClr>
+          </a:lnRef>
+          <a:fillRef idx="1">
+            <a:schemeClr val="accent1"/>
+          </a:fillRef>
+          <a:effectRef idx="0">
+            <a:schemeClr val="accent1"/>
+          </a:effectRef>
+          <a:fontRef idx="minor">
+            <a:schemeClr val="lt1"/>
+          </a:fontRef>
+        </p:style>
+        <p:txBody>
+          <a:bodyPr vert="eaVert" rtlCol="0" anchor="ctr"/>
+          <a:lstStyle/>
+          <a:p>
+            <a:pPr algn="ctr"/>
+            <a:r>
+              <a:rPr lang="en-US" smtClean="0"/>
+              <a:t>Shared Storage (Glusterfs)</a:t>
+            </a:r>
+            <a:endParaRPr lang="en-US"/>
+          </a:p>
+        </p:txBody>
+      </p:sp>
+      <p:cxnSp>
+        <p:nvCxnSpPr>
+          <p:cNvPr id="54" name="Elbow Connector 53"/>
+          <p:cNvCxnSpPr>
+            <a:stCxn id="32" idx="3"/>
+            <a:endCxn id="19" idx="1"/>
+          </p:cNvCxnSpPr>
+          <p:nvPr/>
+        </p:nvCxnSpPr>
+        <p:spPr>
+          <a:xfrm flipV="1">
+            <a:off x="7156827" y="2650743"/>
+            <a:ext cx="496519" cy="321"/>
+          </a:xfrm>
+          <a:prstGeom prst="bentConnector3">
+            <a:avLst/>
+          </a:prstGeom>
+          <a:ln w="12700" cap="flat" cmpd="sng" algn="ctr">
+            <a:solidFill>
+              <a:schemeClr val="accent5"/>
+            </a:solidFill>
+            <a:prstDash val="dash"/>
+            <a:round/>
+            <a:headEnd type="none" w="med" len="med"/>
+            <a:tailEnd type="none" w="med" len="med"/>
+          </a:ln>
+        </p:spPr>
+        <p:style>
+          <a:lnRef idx="0">
+            <a:scrgbClr r="0" g="0" b="0"/>
+          </a:lnRef>
+          <a:fillRef idx="0">
+            <a:scrgbClr r="0" g="0" b="0"/>
+          </a:fillRef>
+          <a:effectRef idx="0">
+            <a:scrgbClr r="0" g="0" b="0"/>
+          </a:effectRef>
+          <a:fontRef idx="minor">
+            <a:schemeClr val="tx1"/>
+          </a:fontRef>
+        </p:style>
+      </p:cxnSp>
+      <p:cxnSp>
+        <p:nvCxnSpPr>
+          <p:cNvPr id="74" name="Straight Connector 73"/>
+          <p:cNvCxnSpPr>
+            <a:stCxn id="75" idx="3"/>
+            <a:endCxn id="32" idx="1"/>
+          </p:cNvCxnSpPr>
+          <p:nvPr/>
+        </p:nvCxnSpPr>
+        <p:spPr>
+          <a:xfrm>
+            <a:off x="6345718" y="2651064"/>
+            <a:ext cx="262469" cy="0"/>
+          </a:xfrm>
+          <a:prstGeom prst="line">
+            <a:avLst/>
+          </a:prstGeom>
+          <a:ln w="12700" cap="flat" cmpd="sng" algn="ctr">
+            <a:solidFill>
+              <a:schemeClr val="accent5"/>
+            </a:solidFill>
+            <a:prstDash val="dash"/>
+            <a:round/>
+            <a:headEnd type="none" w="med" len="med"/>
+            <a:tailEnd type="none" w="med" len="med"/>
+          </a:ln>
+        </p:spPr>
+        <p:style>
+          <a:lnRef idx="0">
+            <a:scrgbClr r="0" g="0" b="0"/>
+          </a:lnRef>
+          <a:fillRef idx="0">
+            <a:scrgbClr r="0" g="0" b="0"/>
+          </a:fillRef>
+          <a:effectRef idx="0">
+            <a:scrgbClr r="0" g="0" b="0"/>
+          </a:effectRef>
+          <a:fontRef idx="minor">
+            <a:schemeClr val="tx1"/>
+          </a:fontRef>
+        </p:style>
+      </p:cxnSp>
+      <p:pic>
+        <p:nvPicPr>
+          <p:cNvPr id="85" name="Picture 84"/>
+          <p:cNvPicPr>
+            <a:picLocks noChangeAspect="1"/>
+          </p:cNvPicPr>
+          <p:nvPr/>
+        </p:nvPicPr>
+        <p:blipFill>
+          <a:blip r:embed="rId7">
+            <a:extLst>
+              <a:ext uri="{28A0092B-C50C-407E-A947-70E740481C1C}">
+                <a14:useLocalDpi xmlns:a14="http://schemas.microsoft.com/office/drawing/2010/main" val="0"/>
+              </a:ext>
+            </a:extLst>
+          </a:blip>
+          <a:stretch>
+            <a:fillRect/>
+          </a:stretch>
+        </p:blipFill>
+        <p:spPr>
+          <a:xfrm>
+            <a:off x="2108485" y="831888"/>
+            <a:ext cx="566338" cy="548640"/>
+          </a:xfrm>
+          <a:prstGeom prst="rect">
+            <a:avLst/>
+          </a:prstGeom>
+        </p:spPr>
+      </p:pic>
+      <p:pic>
+        <p:nvPicPr>
+          <p:cNvPr id="97" name="Picture 96"/>
+          <p:cNvPicPr>
+            <a:picLocks noChangeAspect="1"/>
+          </p:cNvPicPr>
+          <p:nvPr/>
+        </p:nvPicPr>
+        <p:blipFill>
+          <a:blip r:embed="rId7">
+            <a:extLst>
+              <a:ext uri="{28A0092B-C50C-407E-A947-70E740481C1C}">
+                <a14:useLocalDpi xmlns:a14="http://schemas.microsoft.com/office/drawing/2010/main" val="0"/>
+              </a:ext>
+            </a:extLst>
+          </a:blip>
+          <a:stretch>
+            <a:fillRect/>
+          </a:stretch>
+        </p:blipFill>
+        <p:spPr>
+          <a:xfrm>
+            <a:off x="3786626" y="1373518"/>
+            <a:ext cx="566338" cy="548640"/>
+          </a:xfrm>
+          <a:prstGeom prst="rect">
+            <a:avLst/>
+          </a:prstGeom>
+        </p:spPr>
+      </p:pic>
+      <p:pic>
+        <p:nvPicPr>
+          <p:cNvPr id="105" name="Picture 104"/>
+          <p:cNvPicPr>
+            <a:picLocks noChangeAspect="1"/>
+          </p:cNvPicPr>
+          <p:nvPr/>
+        </p:nvPicPr>
+        <p:blipFill>
+          <a:blip r:embed="rId7">
+            <a:extLst>
+              <a:ext uri="{28A0092B-C50C-407E-A947-70E740481C1C}">
+                <a14:useLocalDpi xmlns:a14="http://schemas.microsoft.com/office/drawing/2010/main" val="0"/>
+              </a:ext>
+            </a:extLst>
+          </a:blip>
+          <a:stretch>
+            <a:fillRect/>
+          </a:stretch>
+        </p:blipFill>
+        <p:spPr>
+          <a:xfrm>
+            <a:off x="2142902" y="4274479"/>
+            <a:ext cx="566338" cy="548640"/>
+          </a:xfrm>
+          <a:prstGeom prst="rect">
+            <a:avLst/>
+          </a:prstGeom>
+        </p:spPr>
+      </p:pic>
+      <p:pic>
+        <p:nvPicPr>
+          <p:cNvPr id="106" name="Picture 105"/>
+          <p:cNvPicPr>
+            <a:picLocks noChangeAspect="1"/>
+          </p:cNvPicPr>
+          <p:nvPr/>
+        </p:nvPicPr>
+        <p:blipFill>
+          <a:blip r:embed="rId7">
+            <a:extLst>
+              <a:ext uri="{28A0092B-C50C-407E-A947-70E740481C1C}">
+                <a14:useLocalDpi xmlns:a14="http://schemas.microsoft.com/office/drawing/2010/main" val="0"/>
+              </a:ext>
+            </a:extLst>
+          </a:blip>
+          <a:stretch>
+            <a:fillRect/>
+          </a:stretch>
+        </p:blipFill>
+        <p:spPr>
+          <a:xfrm>
+            <a:off x="2127570" y="2890286"/>
+            <a:ext cx="566338" cy="548640"/>
+          </a:xfrm>
+          <a:prstGeom prst="rect">
+            <a:avLst/>
+          </a:prstGeom>
+        </p:spPr>
+      </p:pic>
+      <p:cxnSp>
+        <p:nvCxnSpPr>
+          <p:cNvPr id="120" name="Elbow Connector 119"/>
+          <p:cNvCxnSpPr>
+            <a:stCxn id="18" idx="0"/>
+            <a:endCxn id="85" idx="2"/>
+          </p:cNvCxnSpPr>
+          <p:nvPr/>
+        </p:nvCxnSpPr>
+        <p:spPr>
+          <a:xfrm rot="16200000" flipV="1">
+            <a:off x="2100062" y="1672120"/>
+            <a:ext cx="1010654" cy="427469"/>
+          </a:xfrm>
+          <a:prstGeom prst="bentConnector3">
+            <a:avLst/>
+          </a:prstGeom>
+          <a:ln w="12700" cap="flat" cmpd="sng" algn="ctr">
+            <a:solidFill>
+              <a:schemeClr val="accent5"/>
+            </a:solidFill>
+            <a:prstDash val="dash"/>
+            <a:round/>
+            <a:headEnd type="none" w="med" len="med"/>
+            <a:tailEnd type="none" w="med" len="med"/>
+          </a:ln>
+        </p:spPr>
+        <p:style>
+          <a:lnRef idx="0">
+            <a:scrgbClr r="0" g="0" b="0"/>
+          </a:lnRef>
+          <a:fillRef idx="0">
+            <a:scrgbClr r="0" g="0" b="0"/>
+          </a:fillRef>
+          <a:effectRef idx="0">
+            <a:scrgbClr r="0" g="0" b="0"/>
+          </a:effectRef>
+          <a:fontRef idx="minor">
+            <a:schemeClr val="tx1"/>
+          </a:fontRef>
+        </p:style>
+      </p:cxnSp>
+      <p:cxnSp>
+        <p:nvCxnSpPr>
+          <p:cNvPr id="122" name="Elbow Connector 121"/>
+          <p:cNvCxnSpPr>
+            <a:stCxn id="18" idx="1"/>
+            <a:endCxn id="106" idx="0"/>
+          </p:cNvCxnSpPr>
+          <p:nvPr/>
+        </p:nvCxnSpPr>
+        <p:spPr>
+          <a:xfrm rot="10800000" flipV="1">
+            <a:off x="2410739" y="2656928"/>
+            <a:ext cx="134064" cy="233357"/>
+          </a:xfrm>
+          <a:prstGeom prst="bentConnector2">
+            <a:avLst/>
+          </a:prstGeom>
+          <a:ln w="12700" cap="flat" cmpd="sng" algn="ctr">
+            <a:solidFill>
+              <a:schemeClr val="accent5"/>
+            </a:solidFill>
+            <a:prstDash val="dash"/>
+            <a:round/>
+            <a:headEnd type="none" w="med" len="med"/>
+            <a:tailEnd type="none" w="med" len="med"/>
+          </a:ln>
+        </p:spPr>
+        <p:style>
+          <a:lnRef idx="0">
+            <a:scrgbClr r="0" g="0" b="0"/>
+          </a:lnRef>
+          <a:fillRef idx="0">
+            <a:scrgbClr r="0" g="0" b="0"/>
+          </a:fillRef>
+          <a:effectRef idx="0">
+            <a:scrgbClr r="0" g="0" b="0"/>
+          </a:effectRef>
+          <a:fontRef idx="minor">
+            <a:schemeClr val="tx1"/>
+          </a:fontRef>
+        </p:style>
+      </p:cxnSp>
+      <p:cxnSp>
+        <p:nvCxnSpPr>
+          <p:cNvPr id="126" name="Elbow Connector 125"/>
+          <p:cNvCxnSpPr>
+            <a:stCxn id="106" idx="1"/>
+          </p:cNvCxnSpPr>
+          <p:nvPr/>
+        </p:nvCxnSpPr>
+        <p:spPr>
+          <a:xfrm rot="10800000">
+            <a:off x="1432442" y="2662702"/>
+            <a:ext cx="695128" cy="501905"/>
+          </a:xfrm>
+          <a:prstGeom prst="bentConnector3">
+            <a:avLst/>
+          </a:prstGeom>
+          <a:ln w="12700" cap="flat" cmpd="sng" algn="ctr">
+            <a:solidFill>
+              <a:schemeClr val="accent5"/>
+            </a:solidFill>
+            <a:prstDash val="dash"/>
+            <a:round/>
+            <a:headEnd type="none" w="med" len="med"/>
+            <a:tailEnd type="none" w="med" len="med"/>
+          </a:ln>
+        </p:spPr>
+        <p:style>
+          <a:lnRef idx="0">
+            <a:scrgbClr r="0" g="0" b="0"/>
+          </a:lnRef>
+          <a:fillRef idx="0">
+            <a:scrgbClr r="0" g="0" b="0"/>
+          </a:fillRef>
+          <a:effectRef idx="0">
+            <a:scrgbClr r="0" g="0" b="0"/>
+          </a:effectRef>
+          <a:fontRef idx="minor">
+            <a:schemeClr val="tx1"/>
+          </a:fontRef>
+        </p:style>
+      </p:cxnSp>
+      <p:cxnSp>
+        <p:nvCxnSpPr>
+          <p:cNvPr id="1026" name="Elbow Connector 1025"/>
+          <p:cNvCxnSpPr>
+            <a:stCxn id="18" idx="2"/>
+            <a:endCxn id="105" idx="0"/>
+          </p:cNvCxnSpPr>
+          <p:nvPr/>
+        </p:nvCxnSpPr>
+        <p:spPr>
+          <a:xfrm rot="5400000">
+            <a:off x="1946696" y="3402051"/>
+            <a:ext cx="1351803" cy="393052"/>
+          </a:xfrm>
+          <a:prstGeom prst="bentConnector3">
+            <a:avLst/>
+          </a:prstGeom>
+          <a:ln w="12700" cap="flat" cmpd="sng" algn="ctr">
+            <a:solidFill>
+              <a:schemeClr val="accent5"/>
+            </a:solidFill>
+            <a:prstDash val="dash"/>
+            <a:round/>
+            <a:headEnd type="none" w="med" len="med"/>
+            <a:tailEnd type="none" w="med" len="med"/>
+          </a:ln>
+        </p:spPr>
+        <p:style>
+          <a:lnRef idx="0">
+            <a:scrgbClr r="0" g="0" b="0"/>
+          </a:lnRef>
+          <a:fillRef idx="0">
+            <a:scrgbClr r="0" g="0" b="0"/>
+          </a:fillRef>
+          <a:effectRef idx="0">
+            <a:scrgbClr r="0" g="0" b="0"/>
+          </a:effectRef>
+          <a:fontRef idx="minor">
+            <a:schemeClr val="tx1"/>
+          </a:fontRef>
+        </p:style>
+      </p:cxnSp>
+      <p:cxnSp>
+        <p:nvCxnSpPr>
+          <p:cNvPr id="1030" name="Straight Connector 1029"/>
+          <p:cNvCxnSpPr>
+            <a:stCxn id="105" idx="3"/>
+            <a:endCxn id="56" idx="1"/>
+          </p:cNvCxnSpPr>
+          <p:nvPr/>
+        </p:nvCxnSpPr>
+        <p:spPr>
+          <a:xfrm>
+            <a:off x="2709240" y="4548799"/>
+            <a:ext cx="239348" cy="0"/>
+          </a:xfrm>
+          <a:prstGeom prst="line">
+            <a:avLst/>
+          </a:prstGeom>
+          <a:ln w="12700" cap="flat" cmpd="sng" algn="ctr">
+            <a:solidFill>
+              <a:schemeClr val="accent5"/>
+            </a:solidFill>
+            <a:prstDash val="dash"/>
+            <a:round/>
+            <a:headEnd type="none" w="med" len="med"/>
+            <a:tailEnd type="none" w="med" len="med"/>
+          </a:ln>
+        </p:spPr>
+        <p:style>
+          <a:lnRef idx="0">
+            <a:scrgbClr r="0" g="0" b="0"/>
+          </a:lnRef>
+          <a:fillRef idx="0">
+            <a:scrgbClr r="0" g="0" b="0"/>
+          </a:fillRef>
+          <a:effectRef idx="0">
+            <a:scrgbClr r="0" g="0" b="0"/>
+          </a:effectRef>
+          <a:fontRef idx="minor">
+            <a:schemeClr val="tx1"/>
+          </a:fontRef>
+        </p:style>
+      </p:cxnSp>
+      <p:cxnSp>
+        <p:nvCxnSpPr>
+          <p:cNvPr id="1034" name="Straight Connector 1033"/>
+          <p:cNvCxnSpPr>
+            <a:stCxn id="85" idx="3"/>
+            <a:endCxn id="51" idx="1"/>
+          </p:cNvCxnSpPr>
+          <p:nvPr/>
+        </p:nvCxnSpPr>
+        <p:spPr>
+          <a:xfrm>
+            <a:off x="2674823" y="1106208"/>
+            <a:ext cx="211576" cy="1562"/>
+          </a:xfrm>
+          <a:prstGeom prst="line">
+            <a:avLst/>
+          </a:prstGeom>
+          <a:ln w="12700" cap="flat" cmpd="sng" algn="ctr">
+            <a:solidFill>
+              <a:schemeClr val="accent5"/>
+            </a:solidFill>
+            <a:prstDash val="dash"/>
+            <a:round/>
+            <a:headEnd type="none" w="med" len="med"/>
+            <a:tailEnd type="none" w="med" len="med"/>
+          </a:ln>
+        </p:spPr>
+        <p:style>
+          <a:lnRef idx="0">
+            <a:scrgbClr r="0" g="0" b="0"/>
+          </a:lnRef>
+          <a:fillRef idx="0">
+            <a:scrgbClr r="0" g="0" b="0"/>
+          </a:fillRef>
+          <a:effectRef idx="0">
+            <a:scrgbClr r="0" g="0" b="0"/>
+          </a:effectRef>
+          <a:fontRef idx="minor">
+            <a:schemeClr val="tx1"/>
+          </a:fontRef>
+        </p:style>
+      </p:cxnSp>
+      <p:cxnSp>
+        <p:nvCxnSpPr>
+          <p:cNvPr id="1039" name="Elbow Connector 1038"/>
+          <p:cNvCxnSpPr>
+            <a:stCxn id="47" idx="1"/>
+            <a:endCxn id="97" idx="0"/>
+          </p:cNvCxnSpPr>
+          <p:nvPr/>
+        </p:nvCxnSpPr>
+        <p:spPr>
+          <a:xfrm rot="10800000" flipV="1">
+            <a:off x="4069795" y="1095974"/>
+            <a:ext cx="123376" cy="277543"/>
+          </a:xfrm>
+          <a:prstGeom prst="bentConnector2">
+            <a:avLst/>
+          </a:prstGeom>
+          <a:ln w="12700" cap="flat" cmpd="sng" algn="ctr">
+            <a:solidFill>
+              <a:schemeClr val="accent5"/>
+            </a:solidFill>
+            <a:prstDash val="dash"/>
+            <a:round/>
+            <a:headEnd type="none" w="med" len="med"/>
+            <a:tailEnd type="none" w="med" len="med"/>
+          </a:ln>
+        </p:spPr>
+        <p:style>
+          <a:lnRef idx="0">
+            <a:scrgbClr r="0" g="0" b="0"/>
+          </a:lnRef>
+          <a:fillRef idx="0">
+            <a:scrgbClr r="0" g="0" b="0"/>
+          </a:fillRef>
+          <a:effectRef idx="0">
+            <a:scrgbClr r="0" g="0" b="0"/>
+          </a:effectRef>
+          <a:fontRef idx="minor">
+            <a:schemeClr val="tx1"/>
+          </a:fontRef>
+        </p:style>
+      </p:cxnSp>
+      <p:cxnSp>
+        <p:nvCxnSpPr>
+          <p:cNvPr id="1041" name="Elbow Connector 1040"/>
+          <p:cNvCxnSpPr>
+            <a:stCxn id="18" idx="0"/>
+            <a:endCxn id="97" idx="2"/>
+          </p:cNvCxnSpPr>
+          <p:nvPr/>
+        </p:nvCxnSpPr>
+        <p:spPr>
+          <a:xfrm rot="5400000" flipH="1" flipV="1">
+            <a:off x="3209947" y="1531334"/>
+            <a:ext cx="469024" cy="1250672"/>
+          </a:xfrm>
+          <a:prstGeom prst="bentConnector3">
+            <a:avLst/>
+          </a:prstGeom>
+          <a:ln w="12700" cap="flat" cmpd="sng" algn="ctr">
+            <a:solidFill>
+              <a:schemeClr val="accent5"/>
+            </a:solidFill>
+            <a:prstDash val="dash"/>
+            <a:round/>
+            <a:headEnd type="none" w="med" len="med"/>
+            <a:tailEnd type="none" w="med" len="med"/>
+          </a:ln>
+        </p:spPr>
+        <p:style>
+          <a:lnRef idx="0">
+            <a:scrgbClr r="0" g="0" b="0"/>
+          </a:lnRef>
+          <a:fillRef idx="0">
+            <a:scrgbClr r="0" g="0" b="0"/>
+          </a:fillRef>
+          <a:effectRef idx="0">
+            <a:scrgbClr r="0" g="0" b="0"/>
+          </a:effectRef>
+          <a:fontRef idx="minor">
+            <a:schemeClr val="tx1"/>
+          </a:fontRef>
+        </p:style>
+      </p:cxnSp>
+      <p:cxnSp>
+        <p:nvCxnSpPr>
+          <p:cNvPr id="1044" name="Straight Connector 1043"/>
+          <p:cNvCxnSpPr>
+            <a:stCxn id="18" idx="3"/>
+            <a:endCxn id="75" idx="1"/>
+          </p:cNvCxnSpPr>
+          <p:nvPr/>
+        </p:nvCxnSpPr>
+        <p:spPr>
+          <a:xfrm flipV="1">
+            <a:off x="3093443" y="2651064"/>
+            <a:ext cx="2703635" cy="5865"/>
+          </a:xfrm>
+          <a:prstGeom prst="line">
+            <a:avLst/>
+          </a:prstGeom>
+          <a:ln w="12700" cap="flat" cmpd="sng" algn="ctr">
+            <a:solidFill>
+              <a:schemeClr val="accent5"/>
+            </a:solidFill>
+            <a:prstDash val="dash"/>
+            <a:round/>
+            <a:headEnd type="none" w="med" len="med"/>
+            <a:tailEnd type="none" w="med" len="med"/>
+          </a:ln>
+        </p:spPr>
+        <p:style>
+          <a:lnRef idx="0">
+            <a:scrgbClr r="0" g="0" b="0"/>
+          </a:lnRef>
+          <a:fillRef idx="0">
+            <a:scrgbClr r="0" g="0" b="0"/>
+          </a:fillRef>
+          <a:effectRef idx="0">
+            <a:scrgbClr r="0" g="0" b="0"/>
+          </a:effectRef>
+          <a:fontRef idx="minor">
+            <a:schemeClr val="tx1"/>
+          </a:fontRef>
+        </p:style>
+      </p:cxnSp>
+      <p:pic>
+        <p:nvPicPr>
+          <p:cNvPr id="150" name="Picture 149"/>
+          <p:cNvPicPr>
+            <a:picLocks noChangeAspect="1"/>
+          </p:cNvPicPr>
+          <p:nvPr/>
+        </p:nvPicPr>
+        <p:blipFill>
+          <a:blip r:embed="rId8">
+            <a:extLst>
+              <a:ext uri="{28A0092B-C50C-407E-A947-70E740481C1C}">
+                <a14:useLocalDpi xmlns:a14="http://schemas.microsoft.com/office/drawing/2010/main" val="0"/>
+              </a:ext>
+            </a:extLst>
+          </a:blip>
+          <a:stretch>
+            <a:fillRect/>
+          </a:stretch>
+        </p:blipFill>
+        <p:spPr>
+          <a:xfrm>
+            <a:off x="871778" y="2397658"/>
+            <a:ext cx="566338" cy="548640"/>
+          </a:xfrm>
+          <a:prstGeom prst="rect">
+            <a:avLst/>
+          </a:prstGeom>
+        </p:spPr>
+      </p:pic>
+    </p:spTree>
+    <p:extLst>
+      <p:ext uri="{BB962C8B-B14F-4D97-AF65-F5344CB8AC3E}">
+        <p14:creationId xmlns:p14="http://schemas.microsoft.com/office/powerpoint/2010/main" val="2876949255"/>
+      </p:ext>
+    </p:extLst>
+  </p:cSld>
+  <p:clrMapOvr>
+    <a:masterClrMapping/>
+  </p:clrMapOvr>
+  <p:timing>
+    <p:tnLst>
+      <p:par>
+        <p:cTn id="1" dur="indefinite" restart="never" nodeType="tmRoot"/>
+      </p:par>
+    </p:tnLst>
+  </p:timing>
+</p:sld>
+</file>
+
+<file path=ppt/slides/slide38.xml><?xml version="1.0" encoding="utf-8"?>
 <p:sld xmlns:a="http://schemas.openxmlformats.org/drawingml/2006/main" xmlns:r="http://schemas.openxmlformats.org/officeDocument/2006/relationships" xmlns:p="http://schemas.openxmlformats.org/presentationml/2006/main">
   <p:cSld>
     <p:spTree>

</xml_diff>